<commit_message>
removing DIP snippets introducing carbon images
</commit_message>
<xml_diff>
--- a/docs/solid.pptx
+++ b/docs/solid.pptx
@@ -5,10 +5,10 @@
     <p:sldMasterId id="2147483650" r:id="rId1"/>
   </p:sldMasterIdLst>
   <p:notesMasterIdLst>
-    <p:notesMasterId r:id="rId35"/>
+    <p:notesMasterId r:id="rId37"/>
   </p:notesMasterIdLst>
   <p:handoutMasterIdLst>
-    <p:handoutMasterId r:id="rId36"/>
+    <p:handoutMasterId r:id="rId38"/>
   </p:handoutMasterIdLst>
   <p:sldIdLst>
     <p:sldId id="309" r:id="rId2"/>
@@ -41,9 +41,11 @@
     <p:sldId id="305" r:id="rId29"/>
     <p:sldId id="306" r:id="rId30"/>
     <p:sldId id="307" r:id="rId31"/>
-    <p:sldId id="319" r:id="rId32"/>
-    <p:sldId id="320" r:id="rId33"/>
-    <p:sldId id="308" r:id="rId34"/>
+    <p:sldId id="326" r:id="rId32"/>
+    <p:sldId id="327" r:id="rId33"/>
+    <p:sldId id="319" r:id="rId34"/>
+    <p:sldId id="320" r:id="rId35"/>
+    <p:sldId id="308" r:id="rId36"/>
   </p:sldIdLst>
   <p:sldSz cx="9144000" cy="6858000" type="screen4x3"/>
   <p:notesSz cx="6858000" cy="9144000"/>
@@ -3133,7 +3135,7 @@
     </p:spTree>
     <p:extLst>
       <p:ext uri="{BB962C8B-B14F-4D97-AF65-F5344CB8AC3E}">
-        <p14:creationId xmlns:p14="http://schemas.microsoft.com/office/powerpoint/2010/main" val="700657275"/>
+        <p14:creationId xmlns:p14="http://schemas.microsoft.com/office/powerpoint/2010/main" val="3986163092"/>
       </p:ext>
     </p:extLst>
   </p:cSld>
@@ -3225,7 +3227,7 @@
     </p:spTree>
     <p:extLst>
       <p:ext uri="{BB962C8B-B14F-4D97-AF65-F5344CB8AC3E}">
-        <p14:creationId xmlns:p14="http://schemas.microsoft.com/office/powerpoint/2010/main" val="4192043878"/>
+        <p14:creationId xmlns:p14="http://schemas.microsoft.com/office/powerpoint/2010/main" val="447199454"/>
       </p:ext>
     </p:extLst>
   </p:cSld>
@@ -3309,6 +3311,190 @@
             <a:fld id="{2C5A56FE-B2E8-4285-8F31-2AEEB8EA39C6}" type="slidenum">
               <a:rPr lang="en-GB" smtClean="0"/>
               <a:t>33</a:t>
+            </a:fld>
+            <a:endParaRPr lang="en-GB"/>
+          </a:p>
+        </p:txBody>
+      </p:sp>
+    </p:spTree>
+    <p:extLst>
+      <p:ext uri="{BB962C8B-B14F-4D97-AF65-F5344CB8AC3E}">
+        <p14:creationId xmlns:p14="http://schemas.microsoft.com/office/powerpoint/2010/main" val="700657275"/>
+      </p:ext>
+    </p:extLst>
+  </p:cSld>
+  <p:clrMapOvr>
+    <a:masterClrMapping/>
+  </p:clrMapOvr>
+</p:notes>
+</file>
+
+<file path=ppt/notesSlides/notesSlide34.xml><?xml version="1.0" encoding="utf-8"?>
+<p:notes xmlns:a="http://schemas.openxmlformats.org/drawingml/2006/main" xmlns:r="http://schemas.openxmlformats.org/officeDocument/2006/relationships" xmlns:p="http://schemas.openxmlformats.org/presentationml/2006/main">
+  <p:cSld>
+    <p:spTree>
+      <p:nvGrpSpPr>
+        <p:cNvPr id="1" name=""/>
+        <p:cNvGrpSpPr/>
+        <p:nvPr/>
+      </p:nvGrpSpPr>
+      <p:grpSpPr>
+        <a:xfrm>
+          <a:off x="0" y="0"/>
+          <a:ext cx="0" cy="0"/>
+          <a:chOff x="0" y="0"/>
+          <a:chExt cx="0" cy="0"/>
+        </a:xfrm>
+      </p:grpSpPr>
+      <p:sp>
+        <p:nvSpPr>
+          <p:cNvPr id="2" name="Slide Image Placeholder 1"/>
+          <p:cNvSpPr>
+            <a:spLocks noGrp="1" noRot="1" noChangeAspect="1"/>
+          </p:cNvSpPr>
+          <p:nvPr>
+            <p:ph type="sldImg"/>
+          </p:nvPr>
+        </p:nvSpPr>
+        <p:spPr>
+          <a:xfrm>
+            <a:off x="1143000" y="685800"/>
+            <a:ext cx="4572000" cy="3429000"/>
+          </a:xfrm>
+          <a:prstGeom prst="rect">
+            <a:avLst/>
+          </a:prstGeom>
+        </p:spPr>
+      </p:sp>
+      <p:sp>
+        <p:nvSpPr>
+          <p:cNvPr id="3" name="Notes Placeholder 2"/>
+          <p:cNvSpPr>
+            <a:spLocks noGrp="1"/>
+          </p:cNvSpPr>
+          <p:nvPr>
+            <p:ph type="body" idx="1"/>
+          </p:nvPr>
+        </p:nvSpPr>
+        <p:spPr/>
+        <p:txBody>
+          <a:bodyPr/>
+          <a:lstStyle/>
+          <a:p>
+            <a:endParaRPr lang="it-IT" dirty="0"/>
+          </a:p>
+        </p:txBody>
+      </p:sp>
+      <p:sp>
+        <p:nvSpPr>
+          <p:cNvPr id="4" name="Slide Number Placeholder 3"/>
+          <p:cNvSpPr>
+            <a:spLocks noGrp="1"/>
+          </p:cNvSpPr>
+          <p:nvPr>
+            <p:ph type="sldNum" sz="quarter" idx="10"/>
+          </p:nvPr>
+        </p:nvSpPr>
+        <p:spPr/>
+        <p:txBody>
+          <a:bodyPr/>
+          <a:lstStyle/>
+          <a:p>
+            <a:fld id="{2C5A56FE-B2E8-4285-8F31-2AEEB8EA39C6}" type="slidenum">
+              <a:rPr lang="en-GB" smtClean="0"/>
+              <a:t>34</a:t>
+            </a:fld>
+            <a:endParaRPr lang="en-GB"/>
+          </a:p>
+        </p:txBody>
+      </p:sp>
+    </p:spTree>
+    <p:extLst>
+      <p:ext uri="{BB962C8B-B14F-4D97-AF65-F5344CB8AC3E}">
+        <p14:creationId xmlns:p14="http://schemas.microsoft.com/office/powerpoint/2010/main" val="4192043878"/>
+      </p:ext>
+    </p:extLst>
+  </p:cSld>
+  <p:clrMapOvr>
+    <a:masterClrMapping/>
+  </p:clrMapOvr>
+</p:notes>
+</file>
+
+<file path=ppt/notesSlides/notesSlide35.xml><?xml version="1.0" encoding="utf-8"?>
+<p:notes xmlns:a="http://schemas.openxmlformats.org/drawingml/2006/main" xmlns:r="http://schemas.openxmlformats.org/officeDocument/2006/relationships" xmlns:p="http://schemas.openxmlformats.org/presentationml/2006/main">
+  <p:cSld>
+    <p:spTree>
+      <p:nvGrpSpPr>
+        <p:cNvPr id="1" name=""/>
+        <p:cNvGrpSpPr/>
+        <p:nvPr/>
+      </p:nvGrpSpPr>
+      <p:grpSpPr>
+        <a:xfrm>
+          <a:off x="0" y="0"/>
+          <a:ext cx="0" cy="0"/>
+          <a:chOff x="0" y="0"/>
+          <a:chExt cx="0" cy="0"/>
+        </a:xfrm>
+      </p:grpSpPr>
+      <p:sp>
+        <p:nvSpPr>
+          <p:cNvPr id="2" name="Slide Image Placeholder 1"/>
+          <p:cNvSpPr>
+            <a:spLocks noGrp="1" noRot="1" noChangeAspect="1"/>
+          </p:cNvSpPr>
+          <p:nvPr>
+            <p:ph type="sldImg"/>
+          </p:nvPr>
+        </p:nvSpPr>
+        <p:spPr>
+          <a:xfrm>
+            <a:off x="1143000" y="685800"/>
+            <a:ext cx="4572000" cy="3429000"/>
+          </a:xfrm>
+          <a:prstGeom prst="rect">
+            <a:avLst/>
+          </a:prstGeom>
+        </p:spPr>
+      </p:sp>
+      <p:sp>
+        <p:nvSpPr>
+          <p:cNvPr id="3" name="Notes Placeholder 2"/>
+          <p:cNvSpPr>
+            <a:spLocks noGrp="1"/>
+          </p:cNvSpPr>
+          <p:nvPr>
+            <p:ph type="body" idx="1"/>
+          </p:nvPr>
+        </p:nvSpPr>
+        <p:spPr/>
+        <p:txBody>
+          <a:bodyPr/>
+          <a:lstStyle/>
+          <a:p>
+            <a:endParaRPr lang="it-IT" dirty="0"/>
+          </a:p>
+        </p:txBody>
+      </p:sp>
+      <p:sp>
+        <p:nvSpPr>
+          <p:cNvPr id="4" name="Slide Number Placeholder 3"/>
+          <p:cNvSpPr>
+            <a:spLocks noGrp="1"/>
+          </p:cNvSpPr>
+          <p:nvPr>
+            <p:ph type="sldNum" sz="quarter" idx="10"/>
+          </p:nvPr>
+        </p:nvSpPr>
+        <p:spPr/>
+        <p:txBody>
+          <a:bodyPr/>
+          <a:lstStyle/>
+          <a:p>
+            <a:fld id="{2C5A56FE-B2E8-4285-8F31-2AEEB8EA39C6}" type="slidenum">
+              <a:rPr lang="en-GB" smtClean="0"/>
+              <a:t>35</a:t>
             </a:fld>
             <a:endParaRPr lang="en-GB"/>
           </a:p>
@@ -8561,1850 +8747,108 @@
           <a:lstStyle/>
           <a:p>
             <a:r>
-              <a:rPr lang="en-US"/>
+              <a:rPr lang="en-US" dirty="0"/>
               <a:t>DIP Dependency Inversion Principle</a:t>
             </a:r>
           </a:p>
           <a:p>
-            <a:endParaRPr lang="en-US"/>
-          </a:p>
-          <a:p>
             <a:endParaRPr lang="en-US" dirty="0"/>
           </a:p>
-        </p:txBody>
-      </p:sp>
-      <p:sp>
-        <p:nvSpPr>
-          <p:cNvPr id="6" name="TextBox 5"/>
-          <p:cNvSpPr txBox="1"/>
+          <a:p>
+            <a:endParaRPr lang="en-US" dirty="0"/>
+          </a:p>
+        </p:txBody>
+      </p:sp>
+      <p:pic>
+        <p:nvPicPr>
+          <p:cNvPr id="3" name="Picture 2">
+            <a:extLst>
+              <a:ext uri="{FF2B5EF4-FFF2-40B4-BE49-F238E27FC236}">
+                <a16:creationId xmlns:a16="http://schemas.microsoft.com/office/drawing/2014/main" id="{D386205D-CE29-445F-BCF2-E5672B6C0CD4}"/>
+              </a:ext>
+            </a:extLst>
+          </p:cNvPr>
+          <p:cNvPicPr>
+            <a:picLocks noChangeAspect="1"/>
+          </p:cNvPicPr>
           <p:nvPr/>
-        </p:nvSpPr>
-        <p:spPr>
-          <a:xfrm>
-            <a:off x="621370" y="1595329"/>
-            <a:ext cx="8210747" cy="4031873"/>
-          </a:xfrm>
-          <a:prstGeom prst="rect">
-            <a:avLst/>
-          </a:prstGeom>
-          <a:solidFill>
-            <a:schemeClr val="tx1"/>
-          </a:solidFill>
-        </p:spPr>
-        <p:txBody>
-          <a:bodyPr wrap="square" rtlCol="0">
-            <a:spAutoFit/>
-          </a:bodyPr>
-          <a:lstStyle/>
-          <a:p>
-            <a:r>
-              <a:rPr lang="it-IT" sz="800" dirty="0">
-                <a:solidFill>
-                  <a:srgbClr val="DCDCDC"/>
-                </a:solidFill>
-                <a:highlight>
-                  <a:srgbClr val="1E1E1E"/>
-                </a:highlight>
-                <a:latin typeface="Consolas" panose="020B0609020204030204" pitchFamily="49" charset="0"/>
-              </a:rPr>
-              <a:t> </a:t>
-            </a:r>
-            <a:r>
-              <a:rPr lang="it-IT" sz="800" dirty="0">
-                <a:solidFill>
-                  <a:srgbClr val="569CD6"/>
-                </a:solidFill>
-                <a:highlight>
-                  <a:srgbClr val="1E1E1E"/>
-                </a:highlight>
-                <a:latin typeface="Consolas" panose="020B0609020204030204" pitchFamily="49" charset="0"/>
-              </a:rPr>
-              <a:t>public</a:t>
-            </a:r>
-            <a:r>
-              <a:rPr lang="it-IT" sz="800" dirty="0">
-                <a:solidFill>
-                  <a:srgbClr val="DCDCDC"/>
-                </a:solidFill>
-                <a:highlight>
-                  <a:srgbClr val="1E1E1E"/>
-                </a:highlight>
-                <a:latin typeface="Consolas" panose="020B0609020204030204" pitchFamily="49" charset="0"/>
-              </a:rPr>
-              <a:t> </a:t>
-            </a:r>
-            <a:r>
-              <a:rPr lang="it-IT" sz="800" dirty="0" err="1">
-                <a:solidFill>
-                  <a:srgbClr val="569CD6"/>
-                </a:solidFill>
-                <a:highlight>
-                  <a:srgbClr val="1E1E1E"/>
-                </a:highlight>
-                <a:latin typeface="Consolas" panose="020B0609020204030204" pitchFamily="49" charset="0"/>
-              </a:rPr>
-              <a:t>class</a:t>
-            </a:r>
-            <a:r>
-              <a:rPr lang="it-IT" sz="800" dirty="0">
-                <a:solidFill>
-                  <a:srgbClr val="DCDCDC"/>
-                </a:solidFill>
-                <a:highlight>
-                  <a:srgbClr val="1E1E1E"/>
-                </a:highlight>
-                <a:latin typeface="Consolas" panose="020B0609020204030204" pitchFamily="49" charset="0"/>
-              </a:rPr>
-              <a:t> </a:t>
-            </a:r>
-            <a:r>
-              <a:rPr lang="it-IT" sz="800" dirty="0" err="1">
-                <a:solidFill>
-                  <a:srgbClr val="4EC9B0"/>
-                </a:solidFill>
-                <a:highlight>
-                  <a:srgbClr val="1E1E1E"/>
-                </a:highlight>
-                <a:latin typeface="Consolas" panose="020B0609020204030204" pitchFamily="49" charset="0"/>
-              </a:rPr>
-              <a:t>GenericCalculator</a:t>
-            </a:r>
-            <a:endParaRPr lang="it-IT" sz="800" dirty="0">
-              <a:solidFill>
-                <a:srgbClr val="DCDCDC"/>
-              </a:solidFill>
-              <a:highlight>
-                <a:srgbClr val="1E1E1E"/>
-              </a:highlight>
-              <a:latin typeface="Consolas" panose="020B0609020204030204" pitchFamily="49" charset="0"/>
-            </a:endParaRPr>
-          </a:p>
-          <a:p>
-            <a:r>
-              <a:rPr lang="it-IT" sz="800" dirty="0">
-                <a:solidFill>
-                  <a:srgbClr val="DCDCDC"/>
-                </a:solidFill>
-                <a:highlight>
-                  <a:srgbClr val="1E1E1E"/>
-                </a:highlight>
-                <a:latin typeface="Consolas" panose="020B0609020204030204" pitchFamily="49" charset="0"/>
-              </a:rPr>
-              <a:t> {</a:t>
-            </a:r>
-          </a:p>
-          <a:p>
-            <a:r>
-              <a:rPr lang="it-IT" sz="800" dirty="0">
-                <a:solidFill>
-                  <a:srgbClr val="DCDCDC"/>
-                </a:solidFill>
-                <a:highlight>
-                  <a:srgbClr val="1E1E1E"/>
-                </a:highlight>
-                <a:latin typeface="Consolas" panose="020B0609020204030204" pitchFamily="49" charset="0"/>
-              </a:rPr>
-              <a:t>        </a:t>
-            </a:r>
-            <a:r>
-              <a:rPr lang="it-IT" sz="800" dirty="0" err="1">
-                <a:solidFill>
-                  <a:srgbClr val="569CD6"/>
-                </a:solidFill>
-                <a:highlight>
-                  <a:srgbClr val="1E1E1E"/>
-                </a:highlight>
-                <a:latin typeface="Consolas" panose="020B0609020204030204" pitchFamily="49" charset="0"/>
-              </a:rPr>
-              <a:t>protected</a:t>
-            </a:r>
-            <a:r>
-              <a:rPr lang="it-IT" sz="800" dirty="0">
-                <a:solidFill>
-                  <a:srgbClr val="DCDCDC"/>
-                </a:solidFill>
-                <a:highlight>
-                  <a:srgbClr val="1E1E1E"/>
-                </a:highlight>
-                <a:latin typeface="Consolas" panose="020B0609020204030204" pitchFamily="49" charset="0"/>
-              </a:rPr>
-              <a:t> </a:t>
-            </a:r>
-            <a:r>
-              <a:rPr lang="it-IT" sz="800" dirty="0" err="1">
-                <a:solidFill>
-                  <a:srgbClr val="569CD6"/>
-                </a:solidFill>
-                <a:highlight>
-                  <a:srgbClr val="1E1E1E"/>
-                </a:highlight>
-                <a:latin typeface="Consolas" panose="020B0609020204030204" pitchFamily="49" charset="0"/>
-              </a:rPr>
-              <a:t>readonly</a:t>
-            </a:r>
-            <a:r>
-              <a:rPr lang="it-IT" sz="800" dirty="0">
-                <a:solidFill>
-                  <a:srgbClr val="DCDCDC"/>
-                </a:solidFill>
-                <a:highlight>
-                  <a:srgbClr val="1E1E1E"/>
-                </a:highlight>
-                <a:latin typeface="Consolas" panose="020B0609020204030204" pitchFamily="49" charset="0"/>
-              </a:rPr>
-              <a:t> </a:t>
-            </a:r>
-            <a:r>
-              <a:rPr lang="it-IT" sz="800" dirty="0" err="1">
-                <a:solidFill>
-                  <a:srgbClr val="B8D7A3"/>
-                </a:solidFill>
-                <a:highlight>
-                  <a:srgbClr val="1E1E1E"/>
-                </a:highlight>
-                <a:latin typeface="Consolas" panose="020B0609020204030204" pitchFamily="49" charset="0"/>
-              </a:rPr>
-              <a:t>IShape</a:t>
-            </a:r>
-            <a:r>
-              <a:rPr lang="it-IT" sz="800" dirty="0">
-                <a:solidFill>
-                  <a:srgbClr val="DCDCDC"/>
-                </a:solidFill>
-                <a:highlight>
-                  <a:srgbClr val="1E1E1E"/>
-                </a:highlight>
-                <a:latin typeface="Consolas" panose="020B0609020204030204" pitchFamily="49" charset="0"/>
-              </a:rPr>
-              <a:t>[] </a:t>
-            </a:r>
-            <a:r>
-              <a:rPr lang="it-IT" sz="800" dirty="0" err="1">
-                <a:solidFill>
-                  <a:srgbClr val="DCDCDC"/>
-                </a:solidFill>
-                <a:highlight>
-                  <a:srgbClr val="1E1E1E"/>
-                </a:highlight>
-                <a:latin typeface="Consolas" panose="020B0609020204030204" pitchFamily="49" charset="0"/>
-              </a:rPr>
-              <a:t>shapes</a:t>
-            </a:r>
-            <a:r>
-              <a:rPr lang="it-IT" sz="800" dirty="0">
-                <a:solidFill>
-                  <a:srgbClr val="DCDCDC"/>
-                </a:solidFill>
-                <a:highlight>
-                  <a:srgbClr val="1E1E1E"/>
-                </a:highlight>
-                <a:latin typeface="Consolas" panose="020B0609020204030204" pitchFamily="49" charset="0"/>
-              </a:rPr>
-              <a:t>;</a:t>
-            </a:r>
-          </a:p>
-          <a:p>
-            <a:r>
-              <a:rPr lang="it-IT" sz="800" dirty="0">
-                <a:solidFill>
-                  <a:srgbClr val="DCDCDC"/>
-                </a:solidFill>
-                <a:highlight>
-                  <a:srgbClr val="1E1E1E"/>
-                </a:highlight>
-                <a:latin typeface="Consolas" panose="020B0609020204030204" pitchFamily="49" charset="0"/>
-              </a:rPr>
-              <a:t>        </a:t>
-            </a:r>
-            <a:r>
-              <a:rPr lang="it-IT" sz="800" dirty="0">
-                <a:solidFill>
-                  <a:srgbClr val="569CD6"/>
-                </a:solidFill>
-                <a:highlight>
-                  <a:srgbClr val="1E1E1E"/>
-                </a:highlight>
-                <a:latin typeface="Consolas" panose="020B0609020204030204" pitchFamily="49" charset="0"/>
-              </a:rPr>
-              <a:t>public</a:t>
-            </a:r>
-            <a:r>
-              <a:rPr lang="it-IT" sz="800" dirty="0">
-                <a:solidFill>
-                  <a:srgbClr val="DCDCDC"/>
-                </a:solidFill>
-                <a:highlight>
-                  <a:srgbClr val="1E1E1E"/>
-                </a:highlight>
-                <a:latin typeface="Consolas" panose="020B0609020204030204" pitchFamily="49" charset="0"/>
-              </a:rPr>
-              <a:t> </a:t>
-            </a:r>
-            <a:r>
-              <a:rPr lang="it-IT" sz="800" dirty="0" err="1">
-                <a:solidFill>
-                  <a:srgbClr val="DCDCDC"/>
-                </a:solidFill>
-                <a:highlight>
-                  <a:srgbClr val="1E1E1E"/>
-                </a:highlight>
-                <a:latin typeface="Consolas" panose="020B0609020204030204" pitchFamily="49" charset="0"/>
-              </a:rPr>
-              <a:t>GenericCalculator</a:t>
-            </a:r>
-            <a:r>
-              <a:rPr lang="it-IT" sz="800" dirty="0">
-                <a:solidFill>
-                  <a:srgbClr val="DCDCDC"/>
-                </a:solidFill>
-                <a:highlight>
-                  <a:srgbClr val="1E1E1E"/>
-                </a:highlight>
-                <a:latin typeface="Consolas" panose="020B0609020204030204" pitchFamily="49" charset="0"/>
-              </a:rPr>
-              <a:t>(</a:t>
-            </a:r>
-            <a:r>
-              <a:rPr lang="it-IT" sz="800" dirty="0" err="1">
-                <a:solidFill>
-                  <a:srgbClr val="B8D7A3"/>
-                </a:solidFill>
-                <a:highlight>
-                  <a:srgbClr val="1E1E1E"/>
-                </a:highlight>
-                <a:latin typeface="Consolas" panose="020B0609020204030204" pitchFamily="49" charset="0"/>
-              </a:rPr>
-              <a:t>IShape</a:t>
-            </a:r>
-            <a:r>
-              <a:rPr lang="it-IT" sz="800" dirty="0">
-                <a:solidFill>
-                  <a:srgbClr val="DCDCDC"/>
-                </a:solidFill>
-                <a:highlight>
-                  <a:srgbClr val="1E1E1E"/>
-                </a:highlight>
-                <a:latin typeface="Consolas" panose="020B0609020204030204" pitchFamily="49" charset="0"/>
-              </a:rPr>
-              <a:t>[] </a:t>
-            </a:r>
-            <a:r>
-              <a:rPr lang="it-IT" sz="800" dirty="0" err="1">
-                <a:solidFill>
-                  <a:srgbClr val="DCDCDC"/>
-                </a:solidFill>
-                <a:highlight>
-                  <a:srgbClr val="1E1E1E"/>
-                </a:highlight>
-                <a:latin typeface="Consolas" panose="020B0609020204030204" pitchFamily="49" charset="0"/>
-              </a:rPr>
-              <a:t>shapes</a:t>
-            </a:r>
-            <a:r>
-              <a:rPr lang="it-IT" sz="800" dirty="0">
-                <a:solidFill>
-                  <a:srgbClr val="DCDCDC"/>
-                </a:solidFill>
-                <a:highlight>
-                  <a:srgbClr val="1E1E1E"/>
-                </a:highlight>
-                <a:latin typeface="Consolas" panose="020B0609020204030204" pitchFamily="49" charset="0"/>
-              </a:rPr>
-              <a:t>)</a:t>
-            </a:r>
-          </a:p>
-          <a:p>
-            <a:r>
-              <a:rPr lang="it-IT" sz="800" dirty="0">
-                <a:solidFill>
-                  <a:srgbClr val="DCDCDC"/>
-                </a:solidFill>
-                <a:highlight>
-                  <a:srgbClr val="1E1E1E"/>
-                </a:highlight>
-                <a:latin typeface="Consolas" panose="020B0609020204030204" pitchFamily="49" charset="0"/>
-              </a:rPr>
-              <a:t>        {</a:t>
-            </a:r>
-          </a:p>
-          <a:p>
-            <a:r>
-              <a:rPr lang="it-IT" sz="800" dirty="0">
-                <a:solidFill>
-                  <a:srgbClr val="DCDCDC"/>
-                </a:solidFill>
-                <a:highlight>
-                  <a:srgbClr val="1E1E1E"/>
-                </a:highlight>
-                <a:latin typeface="Consolas" panose="020B0609020204030204" pitchFamily="49" charset="0"/>
-              </a:rPr>
-              <a:t>            </a:t>
-            </a:r>
-            <a:r>
-              <a:rPr lang="it-IT" sz="800" dirty="0" err="1">
-                <a:solidFill>
-                  <a:srgbClr val="569CD6"/>
-                </a:solidFill>
-                <a:highlight>
-                  <a:srgbClr val="1E1E1E"/>
-                </a:highlight>
-                <a:latin typeface="Consolas" panose="020B0609020204030204" pitchFamily="49" charset="0"/>
-              </a:rPr>
-              <a:t>this</a:t>
-            </a:r>
-            <a:r>
-              <a:rPr lang="it-IT" sz="800" dirty="0" err="1">
-                <a:solidFill>
-                  <a:srgbClr val="B4B4B4"/>
-                </a:solidFill>
-                <a:highlight>
-                  <a:srgbClr val="1E1E1E"/>
-                </a:highlight>
-                <a:latin typeface="Consolas" panose="020B0609020204030204" pitchFamily="49" charset="0"/>
-              </a:rPr>
-              <a:t>.</a:t>
-            </a:r>
-            <a:r>
-              <a:rPr lang="it-IT" sz="800" dirty="0" err="1">
-                <a:solidFill>
-                  <a:srgbClr val="DCDCDC"/>
-                </a:solidFill>
-                <a:highlight>
-                  <a:srgbClr val="1E1E1E"/>
-                </a:highlight>
-                <a:latin typeface="Consolas" panose="020B0609020204030204" pitchFamily="49" charset="0"/>
-              </a:rPr>
-              <a:t>shapes</a:t>
-            </a:r>
-            <a:r>
-              <a:rPr lang="it-IT" sz="800" dirty="0">
-                <a:solidFill>
-                  <a:srgbClr val="DCDCDC"/>
-                </a:solidFill>
-                <a:highlight>
-                  <a:srgbClr val="1E1E1E"/>
-                </a:highlight>
-                <a:latin typeface="Consolas" panose="020B0609020204030204" pitchFamily="49" charset="0"/>
-              </a:rPr>
-              <a:t> </a:t>
-            </a:r>
-            <a:r>
-              <a:rPr lang="it-IT" sz="800" dirty="0">
-                <a:solidFill>
-                  <a:srgbClr val="B4B4B4"/>
-                </a:solidFill>
-                <a:highlight>
-                  <a:srgbClr val="1E1E1E"/>
-                </a:highlight>
-                <a:latin typeface="Consolas" panose="020B0609020204030204" pitchFamily="49" charset="0"/>
-              </a:rPr>
-              <a:t>=</a:t>
-            </a:r>
-            <a:r>
-              <a:rPr lang="it-IT" sz="800" dirty="0">
-                <a:solidFill>
-                  <a:srgbClr val="DCDCDC"/>
-                </a:solidFill>
-                <a:highlight>
-                  <a:srgbClr val="1E1E1E"/>
-                </a:highlight>
-                <a:latin typeface="Consolas" panose="020B0609020204030204" pitchFamily="49" charset="0"/>
-              </a:rPr>
-              <a:t> </a:t>
-            </a:r>
-            <a:r>
-              <a:rPr lang="it-IT" sz="800" dirty="0" err="1">
-                <a:solidFill>
-                  <a:srgbClr val="DCDCDC"/>
-                </a:solidFill>
-                <a:highlight>
-                  <a:srgbClr val="1E1E1E"/>
-                </a:highlight>
-                <a:latin typeface="Consolas" panose="020B0609020204030204" pitchFamily="49" charset="0"/>
-              </a:rPr>
-              <a:t>shapes</a:t>
-            </a:r>
-            <a:r>
-              <a:rPr lang="it-IT" sz="800" dirty="0">
-                <a:solidFill>
-                  <a:srgbClr val="DCDCDC"/>
-                </a:solidFill>
-                <a:highlight>
-                  <a:srgbClr val="1E1E1E"/>
-                </a:highlight>
-                <a:latin typeface="Consolas" panose="020B0609020204030204" pitchFamily="49" charset="0"/>
-              </a:rPr>
-              <a:t>;</a:t>
-            </a:r>
-          </a:p>
-          <a:p>
-            <a:r>
-              <a:rPr lang="it-IT" sz="800" dirty="0">
-                <a:solidFill>
-                  <a:srgbClr val="DCDCDC"/>
-                </a:solidFill>
-                <a:highlight>
-                  <a:srgbClr val="1E1E1E"/>
-                </a:highlight>
-                <a:latin typeface="Consolas" panose="020B0609020204030204" pitchFamily="49" charset="0"/>
-              </a:rPr>
-              <a:t>        }</a:t>
-            </a:r>
-          </a:p>
-          <a:p>
-            <a:r>
-              <a:rPr lang="it-IT" sz="800" dirty="0">
-                <a:solidFill>
-                  <a:srgbClr val="DCDCDC"/>
-                </a:solidFill>
-                <a:highlight>
-                  <a:srgbClr val="1E1E1E"/>
-                </a:highlight>
-                <a:latin typeface="Consolas" panose="020B0609020204030204" pitchFamily="49" charset="0"/>
-              </a:rPr>
-              <a:t>        </a:t>
-            </a:r>
-            <a:r>
-              <a:rPr lang="it-IT" sz="800" dirty="0">
-                <a:solidFill>
-                  <a:srgbClr val="569CD6"/>
-                </a:solidFill>
-                <a:highlight>
-                  <a:srgbClr val="1E1E1E"/>
-                </a:highlight>
-                <a:latin typeface="Consolas" panose="020B0609020204030204" pitchFamily="49" charset="0"/>
-              </a:rPr>
-              <a:t>public</a:t>
-            </a:r>
-            <a:r>
-              <a:rPr lang="it-IT" sz="800" dirty="0">
-                <a:solidFill>
-                  <a:srgbClr val="DCDCDC"/>
-                </a:solidFill>
-                <a:highlight>
-                  <a:srgbClr val="1E1E1E"/>
-                </a:highlight>
-                <a:latin typeface="Consolas" panose="020B0609020204030204" pitchFamily="49" charset="0"/>
-              </a:rPr>
-              <a:t> </a:t>
-            </a:r>
-            <a:r>
-              <a:rPr lang="it-IT" sz="800" dirty="0" err="1">
-                <a:solidFill>
-                  <a:srgbClr val="569CD6"/>
-                </a:solidFill>
-                <a:highlight>
-                  <a:srgbClr val="1E1E1E"/>
-                </a:highlight>
-                <a:latin typeface="Consolas" panose="020B0609020204030204" pitchFamily="49" charset="0"/>
-              </a:rPr>
-              <a:t>virtual</a:t>
-            </a:r>
-            <a:r>
-              <a:rPr lang="it-IT" sz="800" dirty="0">
-                <a:solidFill>
-                  <a:srgbClr val="DCDCDC"/>
-                </a:solidFill>
-                <a:highlight>
-                  <a:srgbClr val="1E1E1E"/>
-                </a:highlight>
-                <a:latin typeface="Consolas" panose="020B0609020204030204" pitchFamily="49" charset="0"/>
-              </a:rPr>
-              <a:t> </a:t>
-            </a:r>
-            <a:r>
-              <a:rPr lang="it-IT" sz="800" dirty="0">
-                <a:solidFill>
-                  <a:srgbClr val="569CD6"/>
-                </a:solidFill>
-                <a:highlight>
-                  <a:srgbClr val="1E1E1E"/>
-                </a:highlight>
-                <a:latin typeface="Consolas" panose="020B0609020204030204" pitchFamily="49" charset="0"/>
-              </a:rPr>
-              <a:t>float</a:t>
-            </a:r>
-            <a:r>
-              <a:rPr lang="it-IT" sz="800" dirty="0">
-                <a:solidFill>
-                  <a:srgbClr val="DCDCDC"/>
-                </a:solidFill>
-                <a:highlight>
-                  <a:srgbClr val="1E1E1E"/>
-                </a:highlight>
-                <a:latin typeface="Consolas" panose="020B0609020204030204" pitchFamily="49" charset="0"/>
-              </a:rPr>
-              <a:t> Sum()</a:t>
-            </a:r>
-          </a:p>
-          <a:p>
-            <a:r>
-              <a:rPr lang="it-IT" sz="800" dirty="0">
-                <a:solidFill>
-                  <a:srgbClr val="DCDCDC"/>
-                </a:solidFill>
-                <a:highlight>
-                  <a:srgbClr val="1E1E1E"/>
-                </a:highlight>
-                <a:latin typeface="Consolas" panose="020B0609020204030204" pitchFamily="49" charset="0"/>
-              </a:rPr>
-              <a:t>        {</a:t>
-            </a:r>
-          </a:p>
-          <a:p>
-            <a:r>
-              <a:rPr lang="it-IT" sz="800" dirty="0">
-                <a:solidFill>
-                  <a:srgbClr val="DCDCDC"/>
-                </a:solidFill>
-                <a:highlight>
-                  <a:srgbClr val="1E1E1E"/>
-                </a:highlight>
-                <a:latin typeface="Consolas" panose="020B0609020204030204" pitchFamily="49" charset="0"/>
-              </a:rPr>
-              <a:t>            </a:t>
-            </a:r>
-            <a:r>
-              <a:rPr lang="it-IT" sz="800" dirty="0" err="1">
-                <a:solidFill>
-                  <a:srgbClr val="569CD6"/>
-                </a:solidFill>
-                <a:highlight>
-                  <a:srgbClr val="1E1E1E"/>
-                </a:highlight>
-                <a:latin typeface="Consolas" panose="020B0609020204030204" pitchFamily="49" charset="0"/>
-              </a:rPr>
-              <a:t>return</a:t>
-            </a:r>
-            <a:r>
-              <a:rPr lang="it-IT" sz="800" dirty="0">
-                <a:solidFill>
-                  <a:srgbClr val="DCDCDC"/>
-                </a:solidFill>
-                <a:highlight>
-                  <a:srgbClr val="1E1E1E"/>
-                </a:highlight>
-                <a:latin typeface="Consolas" panose="020B0609020204030204" pitchFamily="49" charset="0"/>
-              </a:rPr>
-              <a:t> </a:t>
-            </a:r>
-            <a:r>
-              <a:rPr lang="it-IT" sz="800" dirty="0">
-                <a:solidFill>
-                  <a:srgbClr val="B5CEA8"/>
-                </a:solidFill>
-                <a:highlight>
-                  <a:srgbClr val="1E1E1E"/>
-                </a:highlight>
-                <a:latin typeface="Consolas" panose="020B0609020204030204" pitchFamily="49" charset="0"/>
-              </a:rPr>
-              <a:t>0</a:t>
-            </a:r>
-            <a:r>
-              <a:rPr lang="it-IT" sz="800" dirty="0">
-                <a:solidFill>
-                  <a:srgbClr val="DCDCDC"/>
-                </a:solidFill>
-                <a:highlight>
-                  <a:srgbClr val="1E1E1E"/>
-                </a:highlight>
-                <a:latin typeface="Consolas" panose="020B0609020204030204" pitchFamily="49" charset="0"/>
-              </a:rPr>
-              <a:t>;</a:t>
-            </a:r>
-          </a:p>
-          <a:p>
-            <a:r>
-              <a:rPr lang="it-IT" sz="800" dirty="0">
-                <a:solidFill>
-                  <a:srgbClr val="DCDCDC"/>
-                </a:solidFill>
-                <a:highlight>
-                  <a:srgbClr val="1E1E1E"/>
-                </a:highlight>
-                <a:latin typeface="Consolas" panose="020B0609020204030204" pitchFamily="49" charset="0"/>
-              </a:rPr>
-              <a:t>        }</a:t>
-            </a:r>
-          </a:p>
-          <a:p>
-            <a:r>
-              <a:rPr lang="it-IT" sz="800" dirty="0">
-                <a:solidFill>
-                  <a:srgbClr val="DCDCDC"/>
-                </a:solidFill>
-                <a:highlight>
-                  <a:srgbClr val="1E1E1E"/>
-                </a:highlight>
-                <a:latin typeface="Consolas" panose="020B0609020204030204" pitchFamily="49" charset="0"/>
-              </a:rPr>
-              <a:t> }</a:t>
-            </a:r>
-          </a:p>
-          <a:p>
-            <a:r>
-              <a:rPr lang="it-IT" sz="800" dirty="0">
-                <a:solidFill>
-                  <a:srgbClr val="DCDCDC"/>
-                </a:solidFill>
-                <a:highlight>
-                  <a:srgbClr val="1E1E1E"/>
-                </a:highlight>
-                <a:latin typeface="Consolas" panose="020B0609020204030204" pitchFamily="49" charset="0"/>
-              </a:rPr>
-              <a:t> </a:t>
-            </a:r>
-          </a:p>
-          <a:p>
-            <a:r>
-              <a:rPr lang="it-IT" sz="800" dirty="0">
-                <a:solidFill>
-                  <a:srgbClr val="569CD6"/>
-                </a:solidFill>
-                <a:highlight>
-                  <a:srgbClr val="1E1E1E"/>
-                </a:highlight>
-                <a:latin typeface="Consolas" panose="020B0609020204030204" pitchFamily="49" charset="0"/>
-              </a:rPr>
-              <a:t>public</a:t>
-            </a:r>
-            <a:r>
-              <a:rPr lang="it-IT" sz="800" dirty="0">
-                <a:solidFill>
-                  <a:srgbClr val="DCDCDC"/>
-                </a:solidFill>
-                <a:highlight>
-                  <a:srgbClr val="1E1E1E"/>
-                </a:highlight>
-                <a:latin typeface="Consolas" panose="020B0609020204030204" pitchFamily="49" charset="0"/>
-              </a:rPr>
-              <a:t> </a:t>
-            </a:r>
-            <a:r>
-              <a:rPr lang="it-IT" sz="800" dirty="0" err="1">
-                <a:solidFill>
-                  <a:srgbClr val="569CD6"/>
-                </a:solidFill>
-                <a:highlight>
-                  <a:srgbClr val="1E1E1E"/>
-                </a:highlight>
-                <a:latin typeface="Consolas" panose="020B0609020204030204" pitchFamily="49" charset="0"/>
-              </a:rPr>
-              <a:t>class</a:t>
-            </a:r>
-            <a:r>
-              <a:rPr lang="it-IT" sz="800" dirty="0">
-                <a:solidFill>
-                  <a:srgbClr val="DCDCDC"/>
-                </a:solidFill>
-                <a:highlight>
-                  <a:srgbClr val="1E1E1E"/>
-                </a:highlight>
-                <a:latin typeface="Consolas" panose="020B0609020204030204" pitchFamily="49" charset="0"/>
-              </a:rPr>
-              <a:t> </a:t>
-            </a:r>
-            <a:r>
-              <a:rPr lang="it-IT" sz="800" dirty="0" err="1">
-                <a:solidFill>
-                  <a:srgbClr val="4EC9B0"/>
-                </a:solidFill>
-                <a:highlight>
-                  <a:srgbClr val="1E1E1E"/>
-                </a:highlight>
-                <a:latin typeface="Consolas" panose="020B0609020204030204" pitchFamily="49" charset="0"/>
-              </a:rPr>
-              <a:t>AreaCalculator</a:t>
-            </a:r>
-            <a:r>
-              <a:rPr lang="it-IT" sz="800" dirty="0">
-                <a:solidFill>
-                  <a:srgbClr val="DCDCDC"/>
-                </a:solidFill>
-                <a:highlight>
-                  <a:srgbClr val="1E1E1E"/>
-                </a:highlight>
-                <a:latin typeface="Consolas" panose="020B0609020204030204" pitchFamily="49" charset="0"/>
-              </a:rPr>
-              <a:t> : </a:t>
-            </a:r>
-            <a:r>
-              <a:rPr lang="it-IT" sz="800" dirty="0" err="1">
-                <a:solidFill>
-                  <a:srgbClr val="4EC9B0"/>
-                </a:solidFill>
-                <a:highlight>
-                  <a:srgbClr val="1E1E1E"/>
-                </a:highlight>
-                <a:latin typeface="Consolas" panose="020B0609020204030204" pitchFamily="49" charset="0"/>
-              </a:rPr>
-              <a:t>GenericCalculator</a:t>
-            </a:r>
-            <a:endParaRPr lang="it-IT" sz="800" dirty="0">
-              <a:solidFill>
-                <a:srgbClr val="DCDCDC"/>
-              </a:solidFill>
-              <a:highlight>
-                <a:srgbClr val="1E1E1E"/>
-              </a:highlight>
-              <a:latin typeface="Consolas" panose="020B0609020204030204" pitchFamily="49" charset="0"/>
-            </a:endParaRPr>
-          </a:p>
-          <a:p>
-            <a:r>
-              <a:rPr lang="it-IT" sz="800" dirty="0">
-                <a:solidFill>
-                  <a:srgbClr val="DCDCDC"/>
-                </a:solidFill>
-                <a:highlight>
-                  <a:srgbClr val="1E1E1E"/>
-                </a:highlight>
-                <a:latin typeface="Consolas" panose="020B0609020204030204" pitchFamily="49" charset="0"/>
-              </a:rPr>
-              <a:t> {</a:t>
-            </a:r>
-          </a:p>
-          <a:p>
-            <a:r>
-              <a:rPr lang="it-IT" sz="800" dirty="0">
-                <a:solidFill>
-                  <a:srgbClr val="DCDCDC"/>
-                </a:solidFill>
-                <a:highlight>
-                  <a:srgbClr val="1E1E1E"/>
-                </a:highlight>
-                <a:latin typeface="Consolas" panose="020B0609020204030204" pitchFamily="49" charset="0"/>
-              </a:rPr>
-              <a:t>        </a:t>
-            </a:r>
-            <a:r>
-              <a:rPr lang="it-IT" sz="800" dirty="0">
-                <a:solidFill>
-                  <a:srgbClr val="569CD6"/>
-                </a:solidFill>
-                <a:highlight>
-                  <a:srgbClr val="1E1E1E"/>
-                </a:highlight>
-                <a:latin typeface="Consolas" panose="020B0609020204030204" pitchFamily="49" charset="0"/>
-              </a:rPr>
-              <a:t>public</a:t>
-            </a:r>
-            <a:r>
-              <a:rPr lang="it-IT" sz="800" dirty="0">
-                <a:solidFill>
-                  <a:srgbClr val="DCDCDC"/>
-                </a:solidFill>
-                <a:highlight>
-                  <a:srgbClr val="1E1E1E"/>
-                </a:highlight>
-                <a:latin typeface="Consolas" panose="020B0609020204030204" pitchFamily="49" charset="0"/>
-              </a:rPr>
-              <a:t> </a:t>
-            </a:r>
-            <a:r>
-              <a:rPr lang="it-IT" sz="800" dirty="0" err="1">
-                <a:solidFill>
-                  <a:srgbClr val="DCDCDC"/>
-                </a:solidFill>
-                <a:highlight>
-                  <a:srgbClr val="1E1E1E"/>
-                </a:highlight>
-                <a:latin typeface="Consolas" panose="020B0609020204030204" pitchFamily="49" charset="0"/>
-              </a:rPr>
-              <a:t>AreaCalculator</a:t>
-            </a:r>
-            <a:r>
-              <a:rPr lang="it-IT" sz="800" dirty="0">
-                <a:solidFill>
-                  <a:srgbClr val="DCDCDC"/>
-                </a:solidFill>
-                <a:highlight>
-                  <a:srgbClr val="1E1E1E"/>
-                </a:highlight>
-                <a:latin typeface="Consolas" panose="020B0609020204030204" pitchFamily="49" charset="0"/>
-              </a:rPr>
-              <a:t>(</a:t>
-            </a:r>
-            <a:r>
-              <a:rPr lang="it-IT" sz="800" dirty="0" err="1">
-                <a:solidFill>
-                  <a:srgbClr val="B8D7A3"/>
-                </a:solidFill>
-                <a:highlight>
-                  <a:srgbClr val="1E1E1E"/>
-                </a:highlight>
-                <a:latin typeface="Consolas" panose="020B0609020204030204" pitchFamily="49" charset="0"/>
-              </a:rPr>
-              <a:t>IShape</a:t>
-            </a:r>
-            <a:r>
-              <a:rPr lang="it-IT" sz="800" dirty="0">
-                <a:solidFill>
-                  <a:srgbClr val="DCDCDC"/>
-                </a:solidFill>
-                <a:highlight>
-                  <a:srgbClr val="1E1E1E"/>
-                </a:highlight>
-                <a:latin typeface="Consolas" panose="020B0609020204030204" pitchFamily="49" charset="0"/>
-              </a:rPr>
-              <a:t>[] </a:t>
-            </a:r>
-            <a:r>
-              <a:rPr lang="it-IT" sz="800" dirty="0" err="1">
-                <a:solidFill>
-                  <a:srgbClr val="DCDCDC"/>
-                </a:solidFill>
-                <a:highlight>
-                  <a:srgbClr val="1E1E1E"/>
-                </a:highlight>
-                <a:latin typeface="Consolas" panose="020B0609020204030204" pitchFamily="49" charset="0"/>
-              </a:rPr>
-              <a:t>shapes</a:t>
-            </a:r>
-            <a:r>
-              <a:rPr lang="it-IT" sz="800" dirty="0">
-                <a:solidFill>
-                  <a:srgbClr val="DCDCDC"/>
-                </a:solidFill>
-                <a:highlight>
-                  <a:srgbClr val="1E1E1E"/>
-                </a:highlight>
-                <a:latin typeface="Consolas" panose="020B0609020204030204" pitchFamily="49" charset="0"/>
-              </a:rPr>
-              <a:t>)</a:t>
-            </a:r>
-          </a:p>
-          <a:p>
-            <a:r>
-              <a:rPr lang="it-IT" sz="800" dirty="0">
-                <a:solidFill>
-                  <a:srgbClr val="DCDCDC"/>
-                </a:solidFill>
-                <a:highlight>
-                  <a:srgbClr val="1E1E1E"/>
-                </a:highlight>
-                <a:latin typeface="Consolas" panose="020B0609020204030204" pitchFamily="49" charset="0"/>
-              </a:rPr>
-              <a:t>            : </a:t>
-            </a:r>
-            <a:r>
-              <a:rPr lang="it-IT" sz="800" dirty="0">
-                <a:solidFill>
-                  <a:srgbClr val="569CD6"/>
-                </a:solidFill>
-                <a:highlight>
-                  <a:srgbClr val="1E1E1E"/>
-                </a:highlight>
-                <a:latin typeface="Consolas" panose="020B0609020204030204" pitchFamily="49" charset="0"/>
-              </a:rPr>
-              <a:t>base</a:t>
-            </a:r>
-            <a:r>
-              <a:rPr lang="it-IT" sz="800" dirty="0">
-                <a:solidFill>
-                  <a:srgbClr val="DCDCDC"/>
-                </a:solidFill>
-                <a:highlight>
-                  <a:srgbClr val="1E1E1E"/>
-                </a:highlight>
-                <a:latin typeface="Consolas" panose="020B0609020204030204" pitchFamily="49" charset="0"/>
-              </a:rPr>
-              <a:t>(</a:t>
-            </a:r>
-            <a:r>
-              <a:rPr lang="it-IT" sz="800" dirty="0" err="1">
-                <a:solidFill>
-                  <a:srgbClr val="DCDCDC"/>
-                </a:solidFill>
-                <a:highlight>
-                  <a:srgbClr val="1E1E1E"/>
-                </a:highlight>
-                <a:latin typeface="Consolas" panose="020B0609020204030204" pitchFamily="49" charset="0"/>
-              </a:rPr>
-              <a:t>shapes</a:t>
-            </a:r>
-            <a:r>
-              <a:rPr lang="it-IT" sz="800" dirty="0">
-                <a:solidFill>
-                  <a:srgbClr val="DCDCDC"/>
-                </a:solidFill>
-                <a:highlight>
-                  <a:srgbClr val="1E1E1E"/>
-                </a:highlight>
-                <a:latin typeface="Consolas" panose="020B0609020204030204" pitchFamily="49" charset="0"/>
-              </a:rPr>
-              <a:t>) { }</a:t>
-            </a:r>
-          </a:p>
-          <a:p>
-            <a:r>
-              <a:rPr lang="it-IT" sz="800" dirty="0">
-                <a:solidFill>
-                  <a:srgbClr val="DCDCDC"/>
-                </a:solidFill>
-                <a:highlight>
-                  <a:srgbClr val="1E1E1E"/>
-                </a:highlight>
-                <a:latin typeface="Consolas" panose="020B0609020204030204" pitchFamily="49" charset="0"/>
-              </a:rPr>
-              <a:t>        </a:t>
-            </a:r>
-            <a:r>
-              <a:rPr lang="it-IT" sz="800" dirty="0">
-                <a:solidFill>
-                  <a:srgbClr val="569CD6"/>
-                </a:solidFill>
-                <a:highlight>
-                  <a:srgbClr val="1E1E1E"/>
-                </a:highlight>
-                <a:latin typeface="Consolas" panose="020B0609020204030204" pitchFamily="49" charset="0"/>
-              </a:rPr>
-              <a:t>public</a:t>
-            </a:r>
-            <a:r>
-              <a:rPr lang="it-IT" sz="800" dirty="0">
-                <a:solidFill>
-                  <a:srgbClr val="DCDCDC"/>
-                </a:solidFill>
-                <a:highlight>
-                  <a:srgbClr val="1E1E1E"/>
-                </a:highlight>
-                <a:latin typeface="Consolas" panose="020B0609020204030204" pitchFamily="49" charset="0"/>
-              </a:rPr>
-              <a:t> </a:t>
-            </a:r>
-            <a:r>
-              <a:rPr lang="it-IT" sz="800" dirty="0" err="1">
-                <a:solidFill>
-                  <a:srgbClr val="569CD6"/>
-                </a:solidFill>
-                <a:highlight>
-                  <a:srgbClr val="1E1E1E"/>
-                </a:highlight>
-                <a:latin typeface="Consolas" panose="020B0609020204030204" pitchFamily="49" charset="0"/>
-              </a:rPr>
-              <a:t>override</a:t>
-            </a:r>
-            <a:r>
-              <a:rPr lang="it-IT" sz="800" dirty="0">
-                <a:solidFill>
-                  <a:srgbClr val="DCDCDC"/>
-                </a:solidFill>
-                <a:highlight>
-                  <a:srgbClr val="1E1E1E"/>
-                </a:highlight>
-                <a:latin typeface="Consolas" panose="020B0609020204030204" pitchFamily="49" charset="0"/>
-              </a:rPr>
-              <a:t> </a:t>
-            </a:r>
-            <a:r>
-              <a:rPr lang="it-IT" sz="800" dirty="0">
-                <a:solidFill>
-                  <a:srgbClr val="569CD6"/>
-                </a:solidFill>
-                <a:highlight>
-                  <a:srgbClr val="1E1E1E"/>
-                </a:highlight>
-                <a:latin typeface="Consolas" panose="020B0609020204030204" pitchFamily="49" charset="0"/>
-              </a:rPr>
-              <a:t>float</a:t>
-            </a:r>
-            <a:r>
-              <a:rPr lang="it-IT" sz="800" dirty="0">
-                <a:solidFill>
-                  <a:srgbClr val="DCDCDC"/>
-                </a:solidFill>
-                <a:highlight>
-                  <a:srgbClr val="1E1E1E"/>
-                </a:highlight>
-                <a:latin typeface="Consolas" panose="020B0609020204030204" pitchFamily="49" charset="0"/>
-              </a:rPr>
-              <a:t> Sum()</a:t>
-            </a:r>
-          </a:p>
-          <a:p>
-            <a:r>
-              <a:rPr lang="it-IT" sz="800" dirty="0">
-                <a:solidFill>
-                  <a:srgbClr val="DCDCDC"/>
-                </a:solidFill>
-                <a:highlight>
-                  <a:srgbClr val="1E1E1E"/>
-                </a:highlight>
-                <a:latin typeface="Consolas" panose="020B0609020204030204" pitchFamily="49" charset="0"/>
-              </a:rPr>
-              <a:t>        {</a:t>
-            </a:r>
-          </a:p>
-          <a:p>
-            <a:r>
-              <a:rPr lang="it-IT" sz="800" dirty="0">
-                <a:solidFill>
-                  <a:srgbClr val="DCDCDC"/>
-                </a:solidFill>
-                <a:highlight>
-                  <a:srgbClr val="1E1E1E"/>
-                </a:highlight>
-                <a:latin typeface="Consolas" panose="020B0609020204030204" pitchFamily="49" charset="0"/>
-              </a:rPr>
-              <a:t>            </a:t>
-            </a:r>
-            <a:r>
-              <a:rPr lang="it-IT" sz="800" dirty="0" err="1">
-                <a:solidFill>
-                  <a:srgbClr val="569CD6"/>
-                </a:solidFill>
-                <a:highlight>
-                  <a:srgbClr val="1E1E1E"/>
-                </a:highlight>
-                <a:latin typeface="Consolas" panose="020B0609020204030204" pitchFamily="49" charset="0"/>
-              </a:rPr>
-              <a:t>return</a:t>
-            </a:r>
-            <a:r>
-              <a:rPr lang="it-IT" sz="800" dirty="0">
-                <a:solidFill>
-                  <a:srgbClr val="DCDCDC"/>
-                </a:solidFill>
-                <a:highlight>
-                  <a:srgbClr val="1E1E1E"/>
-                </a:highlight>
-                <a:latin typeface="Consolas" panose="020B0609020204030204" pitchFamily="49" charset="0"/>
-              </a:rPr>
-              <a:t> </a:t>
-            </a:r>
-            <a:r>
-              <a:rPr lang="it-IT" sz="800" dirty="0" err="1">
-                <a:solidFill>
-                  <a:srgbClr val="DCDCDC"/>
-                </a:solidFill>
-                <a:highlight>
-                  <a:srgbClr val="1E1E1E"/>
-                </a:highlight>
-                <a:latin typeface="Consolas" panose="020B0609020204030204" pitchFamily="49" charset="0"/>
-              </a:rPr>
-              <a:t>shapes</a:t>
-            </a:r>
-            <a:r>
-              <a:rPr lang="it-IT" sz="800" dirty="0" err="1">
-                <a:solidFill>
-                  <a:srgbClr val="B4B4B4"/>
-                </a:solidFill>
-                <a:highlight>
-                  <a:srgbClr val="1E1E1E"/>
-                </a:highlight>
-                <a:latin typeface="Consolas" panose="020B0609020204030204" pitchFamily="49" charset="0"/>
-              </a:rPr>
-              <a:t>.</a:t>
-            </a:r>
-            <a:r>
-              <a:rPr lang="it-IT" sz="800" dirty="0" err="1">
-                <a:solidFill>
-                  <a:srgbClr val="DCDCDC"/>
-                </a:solidFill>
-                <a:highlight>
-                  <a:srgbClr val="1E1E1E"/>
-                </a:highlight>
-                <a:latin typeface="Consolas" panose="020B0609020204030204" pitchFamily="49" charset="0"/>
-              </a:rPr>
-              <a:t>Sum</a:t>
-            </a:r>
-            <a:r>
-              <a:rPr lang="it-IT" sz="800" dirty="0">
-                <a:solidFill>
-                  <a:srgbClr val="DCDCDC"/>
-                </a:solidFill>
-                <a:highlight>
-                  <a:srgbClr val="1E1E1E"/>
-                </a:highlight>
-                <a:latin typeface="Consolas" panose="020B0609020204030204" pitchFamily="49" charset="0"/>
-              </a:rPr>
-              <a:t>(s </a:t>
-            </a:r>
-            <a:r>
-              <a:rPr lang="it-IT" sz="800" dirty="0">
-                <a:solidFill>
-                  <a:srgbClr val="B4B4B4"/>
-                </a:solidFill>
-                <a:highlight>
-                  <a:srgbClr val="1E1E1E"/>
-                </a:highlight>
-                <a:latin typeface="Consolas" panose="020B0609020204030204" pitchFamily="49" charset="0"/>
-              </a:rPr>
-              <a:t>=&gt;</a:t>
-            </a:r>
-            <a:r>
-              <a:rPr lang="it-IT" sz="800" dirty="0">
-                <a:solidFill>
-                  <a:srgbClr val="DCDCDC"/>
-                </a:solidFill>
-                <a:highlight>
-                  <a:srgbClr val="1E1E1E"/>
-                </a:highlight>
-                <a:latin typeface="Consolas" panose="020B0609020204030204" pitchFamily="49" charset="0"/>
-              </a:rPr>
-              <a:t> </a:t>
-            </a:r>
-            <a:r>
-              <a:rPr lang="it-IT" sz="800" dirty="0" err="1">
-                <a:solidFill>
-                  <a:srgbClr val="DCDCDC"/>
-                </a:solidFill>
-                <a:highlight>
-                  <a:srgbClr val="1E1E1E"/>
-                </a:highlight>
-                <a:latin typeface="Consolas" panose="020B0609020204030204" pitchFamily="49" charset="0"/>
-              </a:rPr>
-              <a:t>s</a:t>
-            </a:r>
-            <a:r>
-              <a:rPr lang="it-IT" sz="800" dirty="0" err="1">
-                <a:solidFill>
-                  <a:srgbClr val="B4B4B4"/>
-                </a:solidFill>
-                <a:highlight>
-                  <a:srgbClr val="1E1E1E"/>
-                </a:highlight>
-                <a:latin typeface="Consolas" panose="020B0609020204030204" pitchFamily="49" charset="0"/>
-              </a:rPr>
-              <a:t>.</a:t>
-            </a:r>
-            <a:r>
-              <a:rPr lang="it-IT" sz="800" dirty="0" err="1">
-                <a:solidFill>
-                  <a:srgbClr val="DCDCDC"/>
-                </a:solidFill>
-                <a:highlight>
-                  <a:srgbClr val="1E1E1E"/>
-                </a:highlight>
-                <a:latin typeface="Consolas" panose="020B0609020204030204" pitchFamily="49" charset="0"/>
-              </a:rPr>
-              <a:t>GetArea</a:t>
-            </a:r>
-            <a:r>
-              <a:rPr lang="it-IT" sz="800" dirty="0">
-                <a:solidFill>
-                  <a:srgbClr val="DCDCDC"/>
-                </a:solidFill>
-                <a:highlight>
-                  <a:srgbClr val="1E1E1E"/>
-                </a:highlight>
-                <a:latin typeface="Consolas" panose="020B0609020204030204" pitchFamily="49" charset="0"/>
-              </a:rPr>
-              <a:t>());</a:t>
-            </a:r>
-          </a:p>
-          <a:p>
-            <a:r>
-              <a:rPr lang="it-IT" sz="800" dirty="0">
-                <a:solidFill>
-                  <a:srgbClr val="DCDCDC"/>
-                </a:solidFill>
-                <a:highlight>
-                  <a:srgbClr val="1E1E1E"/>
-                </a:highlight>
-                <a:latin typeface="Consolas" panose="020B0609020204030204" pitchFamily="49" charset="0"/>
-              </a:rPr>
-              <a:t>        }</a:t>
-            </a:r>
-          </a:p>
-          <a:p>
-            <a:r>
-              <a:rPr lang="it-IT" sz="800" dirty="0">
-                <a:solidFill>
-                  <a:srgbClr val="DCDCDC"/>
-                </a:solidFill>
-                <a:highlight>
-                  <a:srgbClr val="1E1E1E"/>
-                </a:highlight>
-                <a:latin typeface="Consolas" panose="020B0609020204030204" pitchFamily="49" charset="0"/>
-              </a:rPr>
-              <a:t> }</a:t>
-            </a:r>
-          </a:p>
-          <a:p>
-            <a:r>
-              <a:rPr lang="it-IT" sz="800" dirty="0">
-                <a:solidFill>
-                  <a:srgbClr val="DCDCDC"/>
-                </a:solidFill>
-                <a:highlight>
-                  <a:srgbClr val="1E1E1E"/>
-                </a:highlight>
-                <a:latin typeface="Consolas" panose="020B0609020204030204" pitchFamily="49" charset="0"/>
-              </a:rPr>
-              <a:t> </a:t>
-            </a:r>
-          </a:p>
-          <a:p>
-            <a:r>
-              <a:rPr lang="it-IT" sz="800" dirty="0">
-                <a:solidFill>
-                  <a:srgbClr val="569CD6"/>
-                </a:solidFill>
-                <a:highlight>
-                  <a:srgbClr val="1E1E1E"/>
-                </a:highlight>
-                <a:latin typeface="Consolas" panose="020B0609020204030204" pitchFamily="49" charset="0"/>
-              </a:rPr>
-              <a:t>public</a:t>
-            </a:r>
-            <a:r>
-              <a:rPr lang="it-IT" sz="800" dirty="0">
-                <a:solidFill>
-                  <a:srgbClr val="DCDCDC"/>
-                </a:solidFill>
-                <a:highlight>
-                  <a:srgbClr val="1E1E1E"/>
-                </a:highlight>
-                <a:latin typeface="Consolas" panose="020B0609020204030204" pitchFamily="49" charset="0"/>
-              </a:rPr>
-              <a:t> </a:t>
-            </a:r>
-            <a:r>
-              <a:rPr lang="it-IT" sz="800" dirty="0" err="1">
-                <a:solidFill>
-                  <a:srgbClr val="569CD6"/>
-                </a:solidFill>
-                <a:highlight>
-                  <a:srgbClr val="1E1E1E"/>
-                </a:highlight>
-                <a:latin typeface="Consolas" panose="020B0609020204030204" pitchFamily="49" charset="0"/>
-              </a:rPr>
-              <a:t>class</a:t>
-            </a:r>
-            <a:r>
-              <a:rPr lang="it-IT" sz="800" dirty="0">
-                <a:solidFill>
-                  <a:srgbClr val="DCDCDC"/>
-                </a:solidFill>
-                <a:highlight>
-                  <a:srgbClr val="1E1E1E"/>
-                </a:highlight>
-                <a:latin typeface="Consolas" panose="020B0609020204030204" pitchFamily="49" charset="0"/>
-              </a:rPr>
-              <a:t> </a:t>
-            </a:r>
-            <a:r>
-              <a:rPr lang="it-IT" sz="800" dirty="0" err="1">
-                <a:solidFill>
-                  <a:srgbClr val="4EC9B0"/>
-                </a:solidFill>
-                <a:highlight>
-                  <a:srgbClr val="1E1E1E"/>
-                </a:highlight>
-                <a:latin typeface="Consolas" panose="020B0609020204030204" pitchFamily="49" charset="0"/>
-              </a:rPr>
-              <a:t>PerimeterCalculator</a:t>
-            </a:r>
-            <a:r>
-              <a:rPr lang="it-IT" sz="800" dirty="0">
-                <a:solidFill>
-                  <a:srgbClr val="DCDCDC"/>
-                </a:solidFill>
-                <a:highlight>
-                  <a:srgbClr val="1E1E1E"/>
-                </a:highlight>
-                <a:latin typeface="Consolas" panose="020B0609020204030204" pitchFamily="49" charset="0"/>
-              </a:rPr>
-              <a:t> : </a:t>
-            </a:r>
-            <a:r>
-              <a:rPr lang="it-IT" sz="800" dirty="0" err="1">
-                <a:solidFill>
-                  <a:srgbClr val="4EC9B0"/>
-                </a:solidFill>
-                <a:highlight>
-                  <a:srgbClr val="1E1E1E"/>
-                </a:highlight>
-                <a:latin typeface="Consolas" panose="020B0609020204030204" pitchFamily="49" charset="0"/>
-              </a:rPr>
-              <a:t>GenericCalculator</a:t>
-            </a:r>
-            <a:endParaRPr lang="it-IT" sz="800" dirty="0">
-              <a:solidFill>
-                <a:srgbClr val="DCDCDC"/>
-              </a:solidFill>
-              <a:highlight>
-                <a:srgbClr val="1E1E1E"/>
-              </a:highlight>
-              <a:latin typeface="Consolas" panose="020B0609020204030204" pitchFamily="49" charset="0"/>
-            </a:endParaRPr>
-          </a:p>
-          <a:p>
-            <a:r>
-              <a:rPr lang="it-IT" sz="800" dirty="0">
-                <a:solidFill>
-                  <a:srgbClr val="DCDCDC"/>
-                </a:solidFill>
-                <a:highlight>
-                  <a:srgbClr val="1E1E1E"/>
-                </a:highlight>
-                <a:latin typeface="Consolas" panose="020B0609020204030204" pitchFamily="49" charset="0"/>
-              </a:rPr>
-              <a:t>{</a:t>
-            </a:r>
-          </a:p>
-          <a:p>
-            <a:r>
-              <a:rPr lang="it-IT" sz="800" dirty="0">
-                <a:solidFill>
-                  <a:srgbClr val="DCDCDC"/>
-                </a:solidFill>
-                <a:highlight>
-                  <a:srgbClr val="1E1E1E"/>
-                </a:highlight>
-                <a:latin typeface="Consolas" panose="020B0609020204030204" pitchFamily="49" charset="0"/>
-              </a:rPr>
-              <a:t>        </a:t>
-            </a:r>
-            <a:r>
-              <a:rPr lang="it-IT" sz="800" dirty="0">
-                <a:solidFill>
-                  <a:srgbClr val="569CD6"/>
-                </a:solidFill>
-                <a:highlight>
-                  <a:srgbClr val="1E1E1E"/>
-                </a:highlight>
-                <a:latin typeface="Consolas" panose="020B0609020204030204" pitchFamily="49" charset="0"/>
-              </a:rPr>
-              <a:t>public</a:t>
-            </a:r>
-            <a:r>
-              <a:rPr lang="it-IT" sz="800" dirty="0">
-                <a:solidFill>
-                  <a:srgbClr val="DCDCDC"/>
-                </a:solidFill>
-                <a:highlight>
-                  <a:srgbClr val="1E1E1E"/>
-                </a:highlight>
-                <a:latin typeface="Consolas" panose="020B0609020204030204" pitchFamily="49" charset="0"/>
-              </a:rPr>
-              <a:t> </a:t>
-            </a:r>
-            <a:r>
-              <a:rPr lang="it-IT" sz="800" dirty="0" err="1">
-                <a:solidFill>
-                  <a:srgbClr val="DCDCDC"/>
-                </a:solidFill>
-                <a:highlight>
-                  <a:srgbClr val="1E1E1E"/>
-                </a:highlight>
-                <a:latin typeface="Consolas" panose="020B0609020204030204" pitchFamily="49" charset="0"/>
-              </a:rPr>
-              <a:t>PerimeterCalculator</a:t>
-            </a:r>
-            <a:r>
-              <a:rPr lang="it-IT" sz="800" dirty="0">
-                <a:solidFill>
-                  <a:srgbClr val="DCDCDC"/>
-                </a:solidFill>
-                <a:highlight>
-                  <a:srgbClr val="1E1E1E"/>
-                </a:highlight>
-                <a:latin typeface="Consolas" panose="020B0609020204030204" pitchFamily="49" charset="0"/>
-              </a:rPr>
-              <a:t>(</a:t>
-            </a:r>
-            <a:r>
-              <a:rPr lang="it-IT" sz="800" dirty="0" err="1">
-                <a:solidFill>
-                  <a:srgbClr val="B8D7A3"/>
-                </a:solidFill>
-                <a:highlight>
-                  <a:srgbClr val="1E1E1E"/>
-                </a:highlight>
-                <a:latin typeface="Consolas" panose="020B0609020204030204" pitchFamily="49" charset="0"/>
-              </a:rPr>
-              <a:t>IShape</a:t>
-            </a:r>
-            <a:r>
-              <a:rPr lang="it-IT" sz="800" dirty="0">
-                <a:solidFill>
-                  <a:srgbClr val="DCDCDC"/>
-                </a:solidFill>
-                <a:highlight>
-                  <a:srgbClr val="1E1E1E"/>
-                </a:highlight>
-                <a:latin typeface="Consolas" panose="020B0609020204030204" pitchFamily="49" charset="0"/>
-              </a:rPr>
-              <a:t>[] </a:t>
-            </a:r>
-            <a:r>
-              <a:rPr lang="it-IT" sz="800" dirty="0" err="1">
-                <a:solidFill>
-                  <a:srgbClr val="DCDCDC"/>
-                </a:solidFill>
-                <a:highlight>
-                  <a:srgbClr val="1E1E1E"/>
-                </a:highlight>
-                <a:latin typeface="Consolas" panose="020B0609020204030204" pitchFamily="49" charset="0"/>
-              </a:rPr>
-              <a:t>shapes</a:t>
-            </a:r>
-            <a:r>
-              <a:rPr lang="it-IT" sz="800" dirty="0">
-                <a:solidFill>
-                  <a:srgbClr val="DCDCDC"/>
-                </a:solidFill>
-                <a:highlight>
-                  <a:srgbClr val="1E1E1E"/>
-                </a:highlight>
-                <a:latin typeface="Consolas" panose="020B0609020204030204" pitchFamily="49" charset="0"/>
-              </a:rPr>
-              <a:t>)</a:t>
-            </a:r>
-          </a:p>
-          <a:p>
-            <a:r>
-              <a:rPr lang="it-IT" sz="800" dirty="0">
-                <a:solidFill>
-                  <a:srgbClr val="DCDCDC"/>
-                </a:solidFill>
-                <a:highlight>
-                  <a:srgbClr val="1E1E1E"/>
-                </a:highlight>
-                <a:latin typeface="Consolas" panose="020B0609020204030204" pitchFamily="49" charset="0"/>
-              </a:rPr>
-              <a:t> 		: </a:t>
-            </a:r>
-            <a:r>
-              <a:rPr lang="it-IT" sz="800" dirty="0">
-                <a:solidFill>
-                  <a:srgbClr val="569CD6"/>
-                </a:solidFill>
-                <a:highlight>
-                  <a:srgbClr val="1E1E1E"/>
-                </a:highlight>
-                <a:latin typeface="Consolas" panose="020B0609020204030204" pitchFamily="49" charset="0"/>
-              </a:rPr>
-              <a:t>base</a:t>
-            </a:r>
-            <a:r>
-              <a:rPr lang="it-IT" sz="800" dirty="0">
-                <a:solidFill>
-                  <a:srgbClr val="DCDCDC"/>
-                </a:solidFill>
-                <a:highlight>
-                  <a:srgbClr val="1E1E1E"/>
-                </a:highlight>
-                <a:latin typeface="Consolas" panose="020B0609020204030204" pitchFamily="49" charset="0"/>
-              </a:rPr>
-              <a:t>(</a:t>
-            </a:r>
-            <a:r>
-              <a:rPr lang="it-IT" sz="800" dirty="0" err="1">
-                <a:solidFill>
-                  <a:srgbClr val="DCDCDC"/>
-                </a:solidFill>
-                <a:highlight>
-                  <a:srgbClr val="1E1E1E"/>
-                </a:highlight>
-                <a:latin typeface="Consolas" panose="020B0609020204030204" pitchFamily="49" charset="0"/>
-              </a:rPr>
-              <a:t>shapes</a:t>
-            </a:r>
-            <a:r>
-              <a:rPr lang="it-IT" sz="800" dirty="0">
-                <a:solidFill>
-                  <a:srgbClr val="DCDCDC"/>
-                </a:solidFill>
-                <a:highlight>
-                  <a:srgbClr val="1E1E1E"/>
-                </a:highlight>
-                <a:latin typeface="Consolas" panose="020B0609020204030204" pitchFamily="49" charset="0"/>
-              </a:rPr>
-              <a:t>) { }</a:t>
-            </a:r>
-          </a:p>
-          <a:p>
-            <a:r>
-              <a:rPr lang="it-IT" sz="800" dirty="0">
-                <a:solidFill>
-                  <a:srgbClr val="DCDCDC"/>
-                </a:solidFill>
-                <a:highlight>
-                  <a:srgbClr val="1E1E1E"/>
-                </a:highlight>
-                <a:latin typeface="Consolas" panose="020B0609020204030204" pitchFamily="49" charset="0"/>
-              </a:rPr>
-              <a:t>        </a:t>
-            </a:r>
-            <a:r>
-              <a:rPr lang="it-IT" sz="800" dirty="0">
-                <a:solidFill>
-                  <a:srgbClr val="569CD6"/>
-                </a:solidFill>
-                <a:highlight>
-                  <a:srgbClr val="1E1E1E"/>
-                </a:highlight>
-                <a:latin typeface="Consolas" panose="020B0609020204030204" pitchFamily="49" charset="0"/>
-              </a:rPr>
-              <a:t>public</a:t>
-            </a:r>
-            <a:r>
-              <a:rPr lang="it-IT" sz="800" dirty="0">
-                <a:solidFill>
-                  <a:srgbClr val="DCDCDC"/>
-                </a:solidFill>
-                <a:highlight>
-                  <a:srgbClr val="1E1E1E"/>
-                </a:highlight>
-                <a:latin typeface="Consolas" panose="020B0609020204030204" pitchFamily="49" charset="0"/>
-              </a:rPr>
-              <a:t> </a:t>
-            </a:r>
-            <a:r>
-              <a:rPr lang="it-IT" sz="800" dirty="0" err="1">
-                <a:solidFill>
-                  <a:srgbClr val="569CD6"/>
-                </a:solidFill>
-                <a:highlight>
-                  <a:srgbClr val="1E1E1E"/>
-                </a:highlight>
-                <a:latin typeface="Consolas" panose="020B0609020204030204" pitchFamily="49" charset="0"/>
-              </a:rPr>
-              <a:t>override</a:t>
-            </a:r>
-            <a:r>
-              <a:rPr lang="it-IT" sz="800" dirty="0">
-                <a:solidFill>
-                  <a:srgbClr val="DCDCDC"/>
-                </a:solidFill>
-                <a:highlight>
-                  <a:srgbClr val="1E1E1E"/>
-                </a:highlight>
-                <a:latin typeface="Consolas" panose="020B0609020204030204" pitchFamily="49" charset="0"/>
-              </a:rPr>
-              <a:t> </a:t>
-            </a:r>
-            <a:r>
-              <a:rPr lang="it-IT" sz="800" dirty="0">
-                <a:solidFill>
-                  <a:srgbClr val="569CD6"/>
-                </a:solidFill>
-                <a:highlight>
-                  <a:srgbClr val="1E1E1E"/>
-                </a:highlight>
-                <a:latin typeface="Consolas" panose="020B0609020204030204" pitchFamily="49" charset="0"/>
-              </a:rPr>
-              <a:t>float</a:t>
-            </a:r>
-            <a:r>
-              <a:rPr lang="it-IT" sz="800" dirty="0">
-                <a:solidFill>
-                  <a:srgbClr val="DCDCDC"/>
-                </a:solidFill>
-                <a:highlight>
-                  <a:srgbClr val="1E1E1E"/>
-                </a:highlight>
-                <a:latin typeface="Consolas" panose="020B0609020204030204" pitchFamily="49" charset="0"/>
-              </a:rPr>
-              <a:t> Sum()</a:t>
-            </a:r>
-          </a:p>
-          <a:p>
-            <a:r>
-              <a:rPr lang="it-IT" sz="800" dirty="0">
-                <a:solidFill>
-                  <a:srgbClr val="DCDCDC"/>
-                </a:solidFill>
-                <a:highlight>
-                  <a:srgbClr val="1E1E1E"/>
-                </a:highlight>
-                <a:latin typeface="Consolas" panose="020B0609020204030204" pitchFamily="49" charset="0"/>
-              </a:rPr>
-              <a:t>        {</a:t>
-            </a:r>
-          </a:p>
-          <a:p>
-            <a:r>
-              <a:rPr lang="it-IT" sz="800" dirty="0">
-                <a:solidFill>
-                  <a:srgbClr val="DCDCDC"/>
-                </a:solidFill>
-                <a:highlight>
-                  <a:srgbClr val="1E1E1E"/>
-                </a:highlight>
-                <a:latin typeface="Consolas" panose="020B0609020204030204" pitchFamily="49" charset="0"/>
-              </a:rPr>
-              <a:t>            </a:t>
-            </a:r>
-            <a:r>
-              <a:rPr lang="it-IT" sz="800" dirty="0" err="1">
-                <a:solidFill>
-                  <a:srgbClr val="569CD6"/>
-                </a:solidFill>
-                <a:highlight>
-                  <a:srgbClr val="1E1E1E"/>
-                </a:highlight>
-                <a:latin typeface="Consolas" panose="020B0609020204030204" pitchFamily="49" charset="0"/>
-              </a:rPr>
-              <a:t>return</a:t>
-            </a:r>
-            <a:r>
-              <a:rPr lang="it-IT" sz="800" dirty="0">
-                <a:solidFill>
-                  <a:srgbClr val="DCDCDC"/>
-                </a:solidFill>
-                <a:highlight>
-                  <a:srgbClr val="1E1E1E"/>
-                </a:highlight>
-                <a:latin typeface="Consolas" panose="020B0609020204030204" pitchFamily="49" charset="0"/>
-              </a:rPr>
-              <a:t> </a:t>
-            </a:r>
-            <a:r>
-              <a:rPr lang="it-IT" sz="800" dirty="0" err="1">
-                <a:solidFill>
-                  <a:srgbClr val="DCDCDC"/>
-                </a:solidFill>
-                <a:highlight>
-                  <a:srgbClr val="1E1E1E"/>
-                </a:highlight>
-                <a:latin typeface="Consolas" panose="020B0609020204030204" pitchFamily="49" charset="0"/>
-              </a:rPr>
-              <a:t>shapes</a:t>
-            </a:r>
-            <a:r>
-              <a:rPr lang="it-IT" sz="800" dirty="0" err="1">
-                <a:solidFill>
-                  <a:srgbClr val="B4B4B4"/>
-                </a:solidFill>
-                <a:highlight>
-                  <a:srgbClr val="1E1E1E"/>
-                </a:highlight>
-                <a:latin typeface="Consolas" panose="020B0609020204030204" pitchFamily="49" charset="0"/>
-              </a:rPr>
-              <a:t>.</a:t>
-            </a:r>
-            <a:r>
-              <a:rPr lang="it-IT" sz="800" dirty="0" err="1">
-                <a:solidFill>
-                  <a:srgbClr val="DCDCDC"/>
-                </a:solidFill>
-                <a:highlight>
-                  <a:srgbClr val="1E1E1E"/>
-                </a:highlight>
-                <a:latin typeface="Consolas" panose="020B0609020204030204" pitchFamily="49" charset="0"/>
-              </a:rPr>
-              <a:t>Sum</a:t>
-            </a:r>
-            <a:r>
-              <a:rPr lang="it-IT" sz="800" dirty="0">
-                <a:solidFill>
-                  <a:srgbClr val="DCDCDC"/>
-                </a:solidFill>
-                <a:highlight>
-                  <a:srgbClr val="1E1E1E"/>
-                </a:highlight>
-                <a:latin typeface="Consolas" panose="020B0609020204030204" pitchFamily="49" charset="0"/>
-              </a:rPr>
-              <a:t>(s </a:t>
-            </a:r>
-            <a:r>
-              <a:rPr lang="it-IT" sz="800" dirty="0">
-                <a:solidFill>
-                  <a:srgbClr val="B4B4B4"/>
-                </a:solidFill>
-                <a:highlight>
-                  <a:srgbClr val="1E1E1E"/>
-                </a:highlight>
-                <a:latin typeface="Consolas" panose="020B0609020204030204" pitchFamily="49" charset="0"/>
-              </a:rPr>
-              <a:t>=&gt;</a:t>
-            </a:r>
-            <a:r>
-              <a:rPr lang="it-IT" sz="800" dirty="0">
-                <a:solidFill>
-                  <a:srgbClr val="DCDCDC"/>
-                </a:solidFill>
-                <a:highlight>
-                  <a:srgbClr val="1E1E1E"/>
-                </a:highlight>
-                <a:latin typeface="Consolas" panose="020B0609020204030204" pitchFamily="49" charset="0"/>
-              </a:rPr>
-              <a:t> </a:t>
-            </a:r>
-            <a:r>
-              <a:rPr lang="it-IT" sz="800" dirty="0" err="1">
-                <a:solidFill>
-                  <a:srgbClr val="DCDCDC"/>
-                </a:solidFill>
-                <a:highlight>
-                  <a:srgbClr val="1E1E1E"/>
-                </a:highlight>
-                <a:latin typeface="Consolas" panose="020B0609020204030204" pitchFamily="49" charset="0"/>
-              </a:rPr>
-              <a:t>s</a:t>
-            </a:r>
-            <a:r>
-              <a:rPr lang="it-IT" sz="800" dirty="0" err="1">
-                <a:solidFill>
-                  <a:srgbClr val="B4B4B4"/>
-                </a:solidFill>
-                <a:highlight>
-                  <a:srgbClr val="1E1E1E"/>
-                </a:highlight>
-                <a:latin typeface="Consolas" panose="020B0609020204030204" pitchFamily="49" charset="0"/>
-              </a:rPr>
-              <a:t>.</a:t>
-            </a:r>
-            <a:r>
-              <a:rPr lang="it-IT" sz="800" dirty="0" err="1">
-                <a:solidFill>
-                  <a:srgbClr val="DCDCDC"/>
-                </a:solidFill>
-                <a:highlight>
-                  <a:srgbClr val="1E1E1E"/>
-                </a:highlight>
-                <a:latin typeface="Consolas" panose="020B0609020204030204" pitchFamily="49" charset="0"/>
-              </a:rPr>
-              <a:t>GetPerimeter</a:t>
-            </a:r>
-            <a:r>
-              <a:rPr lang="it-IT" sz="800" dirty="0">
-                <a:solidFill>
-                  <a:srgbClr val="DCDCDC"/>
-                </a:solidFill>
-                <a:highlight>
-                  <a:srgbClr val="1E1E1E"/>
-                </a:highlight>
-                <a:latin typeface="Consolas" panose="020B0609020204030204" pitchFamily="49" charset="0"/>
-              </a:rPr>
-              <a:t>());</a:t>
-            </a:r>
-          </a:p>
-          <a:p>
-            <a:r>
-              <a:rPr lang="it-IT" sz="800" dirty="0">
-                <a:solidFill>
-                  <a:srgbClr val="DCDCDC"/>
-                </a:solidFill>
-                <a:highlight>
-                  <a:srgbClr val="1E1E1E"/>
-                </a:highlight>
-                <a:latin typeface="Consolas" panose="020B0609020204030204" pitchFamily="49" charset="0"/>
-              </a:rPr>
-              <a:t>        }</a:t>
-            </a:r>
-          </a:p>
-          <a:p>
-            <a:r>
-              <a:rPr lang="it-IT" sz="800" dirty="0">
-                <a:solidFill>
-                  <a:srgbClr val="DCDCDC"/>
-                </a:solidFill>
-                <a:highlight>
-                  <a:srgbClr val="1E1E1E"/>
-                </a:highlight>
-                <a:latin typeface="Consolas" panose="020B0609020204030204" pitchFamily="49" charset="0"/>
-              </a:rPr>
-              <a:t>}</a:t>
-            </a:r>
-          </a:p>
-        </p:txBody>
-      </p:sp>
+        </p:nvPicPr>
+        <p:blipFill>
+          <a:blip r:embed="rId3"/>
+          <a:stretch>
+            <a:fillRect/>
+          </a:stretch>
+        </p:blipFill>
+        <p:spPr>
+          <a:xfrm>
+            <a:off x="2898822" y="2169173"/>
+            <a:ext cx="2562583" cy="1381318"/>
+          </a:xfrm>
+          <a:prstGeom prst="rect">
+            <a:avLst/>
+          </a:prstGeom>
+        </p:spPr>
+      </p:pic>
+      <p:pic>
+        <p:nvPicPr>
+          <p:cNvPr id="4" name="Picture 3">
+            <a:extLst>
+              <a:ext uri="{FF2B5EF4-FFF2-40B4-BE49-F238E27FC236}">
+                <a16:creationId xmlns:a16="http://schemas.microsoft.com/office/drawing/2014/main" id="{DB6E735D-D5C2-45DD-9E54-5CAC1880433E}"/>
+              </a:ext>
+            </a:extLst>
+          </p:cNvPr>
+          <p:cNvPicPr>
+            <a:picLocks noChangeAspect="1"/>
+          </p:cNvPicPr>
+          <p:nvPr/>
+        </p:nvPicPr>
+        <p:blipFill>
+          <a:blip r:embed="rId4"/>
+          <a:stretch>
+            <a:fillRect/>
+          </a:stretch>
+        </p:blipFill>
+        <p:spPr>
+          <a:xfrm>
+            <a:off x="647146" y="3646489"/>
+            <a:ext cx="3762900" cy="2743583"/>
+          </a:xfrm>
+          <a:prstGeom prst="rect">
+            <a:avLst/>
+          </a:prstGeom>
+        </p:spPr>
+      </p:pic>
+      <p:pic>
+        <p:nvPicPr>
+          <p:cNvPr id="5" name="Picture 4">
+            <a:extLst>
+              <a:ext uri="{FF2B5EF4-FFF2-40B4-BE49-F238E27FC236}">
+                <a16:creationId xmlns:a16="http://schemas.microsoft.com/office/drawing/2014/main" id="{7A4A4F1E-25F5-4DFB-978F-85F295217420}"/>
+              </a:ext>
+            </a:extLst>
+          </p:cNvPr>
+          <p:cNvPicPr>
+            <a:picLocks noChangeAspect="1"/>
+          </p:cNvPicPr>
+          <p:nvPr/>
+        </p:nvPicPr>
+        <p:blipFill>
+          <a:blip r:embed="rId5"/>
+          <a:stretch>
+            <a:fillRect/>
+          </a:stretch>
+        </p:blipFill>
+        <p:spPr>
+          <a:xfrm>
+            <a:off x="4547896" y="3646489"/>
+            <a:ext cx="4372585" cy="2743583"/>
+          </a:xfrm>
+          <a:prstGeom prst="rect">
+            <a:avLst/>
+          </a:prstGeom>
+        </p:spPr>
+      </p:pic>
     </p:spTree>
     <p:extLst>
       <p:ext uri="{BB962C8B-B14F-4D97-AF65-F5344CB8AC3E}">
@@ -10419,6 +8863,182 @@
 </file>
 
 <file path=ppt/slides/slide31.xml><?xml version="1.0" encoding="utf-8"?>
+<p:sld xmlns:a="http://schemas.openxmlformats.org/drawingml/2006/main" xmlns:r="http://schemas.openxmlformats.org/officeDocument/2006/relationships" xmlns:p="http://schemas.openxmlformats.org/presentationml/2006/main">
+  <p:cSld>
+    <p:spTree>
+      <p:nvGrpSpPr>
+        <p:cNvPr id="1" name=""/>
+        <p:cNvGrpSpPr/>
+        <p:nvPr/>
+      </p:nvGrpSpPr>
+      <p:grpSpPr>
+        <a:xfrm>
+          <a:off x="0" y="0"/>
+          <a:ext cx="0" cy="0"/>
+          <a:chOff x="0" y="0"/>
+          <a:chExt cx="0" cy="0"/>
+        </a:xfrm>
+      </p:grpSpPr>
+      <p:sp>
+        <p:nvSpPr>
+          <p:cNvPr id="2" name="Text Placeholder 1"/>
+          <p:cNvSpPr>
+            <a:spLocks noGrp="1"/>
+          </p:cNvSpPr>
+          <p:nvPr>
+            <p:ph type="body" sz="quarter" idx="11"/>
+          </p:nvPr>
+        </p:nvSpPr>
+        <p:spPr/>
+        <p:txBody>
+          <a:bodyPr/>
+          <a:lstStyle/>
+          <a:p>
+            <a:r>
+              <a:rPr lang="en-US"/>
+              <a:t>DIP Dependency Inversion Principle</a:t>
+            </a:r>
+          </a:p>
+          <a:p>
+            <a:endParaRPr lang="en-US"/>
+          </a:p>
+          <a:p>
+            <a:endParaRPr lang="en-US" dirty="0"/>
+          </a:p>
+        </p:txBody>
+      </p:sp>
+      <p:pic>
+        <p:nvPicPr>
+          <p:cNvPr id="3" name="Picture 2">
+            <a:extLst>
+              <a:ext uri="{FF2B5EF4-FFF2-40B4-BE49-F238E27FC236}">
+                <a16:creationId xmlns:a16="http://schemas.microsoft.com/office/drawing/2014/main" id="{2339C8CF-74A6-4C2F-BB51-E76C778D8BEA}"/>
+              </a:ext>
+            </a:extLst>
+          </p:cNvPr>
+          <p:cNvPicPr>
+            <a:picLocks noChangeAspect="1"/>
+          </p:cNvPicPr>
+          <p:nvPr/>
+        </p:nvPicPr>
+        <p:blipFill>
+          <a:blip r:embed="rId3"/>
+          <a:stretch>
+            <a:fillRect/>
+          </a:stretch>
+        </p:blipFill>
+        <p:spPr>
+          <a:xfrm>
+            <a:off x="2080865" y="2491179"/>
+            <a:ext cx="4982270" cy="2734057"/>
+          </a:xfrm>
+          <a:prstGeom prst="rect">
+            <a:avLst/>
+          </a:prstGeom>
+        </p:spPr>
+      </p:pic>
+    </p:spTree>
+    <p:extLst>
+      <p:ext uri="{BB962C8B-B14F-4D97-AF65-F5344CB8AC3E}">
+        <p14:creationId xmlns:p14="http://schemas.microsoft.com/office/powerpoint/2010/main" val="3073883093"/>
+      </p:ext>
+    </p:extLst>
+  </p:cSld>
+  <p:clrMapOvr>
+    <a:masterClrMapping/>
+  </p:clrMapOvr>
+</p:sld>
+</file>
+
+<file path=ppt/slides/slide32.xml><?xml version="1.0" encoding="utf-8"?>
+<p:sld xmlns:a="http://schemas.openxmlformats.org/drawingml/2006/main" xmlns:r="http://schemas.openxmlformats.org/officeDocument/2006/relationships" xmlns:p="http://schemas.openxmlformats.org/presentationml/2006/main">
+  <p:cSld>
+    <p:spTree>
+      <p:nvGrpSpPr>
+        <p:cNvPr id="1" name=""/>
+        <p:cNvGrpSpPr/>
+        <p:nvPr/>
+      </p:nvGrpSpPr>
+      <p:grpSpPr>
+        <a:xfrm>
+          <a:off x="0" y="0"/>
+          <a:ext cx="0" cy="0"/>
+          <a:chOff x="0" y="0"/>
+          <a:chExt cx="0" cy="0"/>
+        </a:xfrm>
+      </p:grpSpPr>
+      <p:sp>
+        <p:nvSpPr>
+          <p:cNvPr id="2" name="Text Placeholder 1"/>
+          <p:cNvSpPr>
+            <a:spLocks noGrp="1"/>
+          </p:cNvSpPr>
+          <p:nvPr>
+            <p:ph type="body" sz="quarter" idx="11"/>
+          </p:nvPr>
+        </p:nvSpPr>
+        <p:spPr/>
+        <p:txBody>
+          <a:bodyPr/>
+          <a:lstStyle/>
+          <a:p>
+            <a:r>
+              <a:rPr lang="en-US"/>
+              <a:t>DIP Dependency Inversion Principle</a:t>
+            </a:r>
+          </a:p>
+          <a:p>
+            <a:endParaRPr lang="en-US"/>
+          </a:p>
+          <a:p>
+            <a:endParaRPr lang="en-US" dirty="0"/>
+          </a:p>
+        </p:txBody>
+      </p:sp>
+      <p:pic>
+        <p:nvPicPr>
+          <p:cNvPr id="3" name="Picture 2">
+            <a:extLst>
+              <a:ext uri="{FF2B5EF4-FFF2-40B4-BE49-F238E27FC236}">
+                <a16:creationId xmlns:a16="http://schemas.microsoft.com/office/drawing/2014/main" id="{6BD5F852-8850-400B-B6BA-690EA969F557}"/>
+              </a:ext>
+            </a:extLst>
+          </p:cNvPr>
+          <p:cNvPicPr>
+            <a:picLocks noChangeAspect="1"/>
+          </p:cNvPicPr>
+          <p:nvPr/>
+        </p:nvPicPr>
+        <p:blipFill>
+          <a:blip r:embed="rId3"/>
+          <a:stretch>
+            <a:fillRect/>
+          </a:stretch>
+        </p:blipFill>
+        <p:spPr>
+          <a:xfrm>
+            <a:off x="1366390" y="2096506"/>
+            <a:ext cx="6411220" cy="3934374"/>
+          </a:xfrm>
+          <a:prstGeom prst="rect">
+            <a:avLst/>
+          </a:prstGeom>
+        </p:spPr>
+      </p:pic>
+    </p:spTree>
+    <p:extLst>
+      <p:ext uri="{BB962C8B-B14F-4D97-AF65-F5344CB8AC3E}">
+        <p14:creationId xmlns:p14="http://schemas.microsoft.com/office/powerpoint/2010/main" val="1237620757"/>
+      </p:ext>
+    </p:extLst>
+  </p:cSld>
+  <p:clrMapOvr>
+    <a:masterClrMapping/>
+  </p:clrMapOvr>
+</p:sld>
+</file>
+
+<file path=ppt/slides/slide33.xml><?xml version="1.0" encoding="utf-8"?>
 <p:sld xmlns:a="http://schemas.openxmlformats.org/drawingml/2006/main" xmlns:r="http://schemas.openxmlformats.org/officeDocument/2006/relationships" xmlns:p="http://schemas.openxmlformats.org/presentationml/2006/main">
   <p:cSld>
     <p:spTree>
@@ -10730,7 +9350,7 @@
 </p:sld>
 </file>
 
-<file path=ppt/slides/slide32.xml><?xml version="1.0" encoding="utf-8"?>
+<file path=ppt/slides/slide34.xml><?xml version="1.0" encoding="utf-8"?>
 <p:sld xmlns:a="http://schemas.openxmlformats.org/drawingml/2006/main" xmlns:r="http://schemas.openxmlformats.org/officeDocument/2006/relationships" xmlns:p="http://schemas.openxmlformats.org/presentationml/2006/main">
   <p:cSld>
     <p:spTree>
@@ -11042,7 +9662,7 @@
 </p:sld>
 </file>
 
-<file path=ppt/slides/slide33.xml><?xml version="1.0" encoding="utf-8"?>
+<file path=ppt/slides/slide35.xml><?xml version="1.0" encoding="utf-8"?>
 <p:sld xmlns:a="http://schemas.openxmlformats.org/drawingml/2006/main" xmlns:r="http://schemas.openxmlformats.org/officeDocument/2006/relationships" xmlns:p="http://schemas.openxmlformats.org/presentationml/2006/main">
   <p:cSld>
     <p:spTree>

</xml_diff>

<commit_message>
adding resources for SOLID and introduycing practical principles
</commit_message>
<xml_diff>
--- a/docs/solid.pptx
+++ b/docs/solid.pptx
@@ -43,9 +43,9 @@
     <p:sldId id="307" r:id="rId31"/>
     <p:sldId id="326" r:id="rId32"/>
     <p:sldId id="327" r:id="rId33"/>
-    <p:sldId id="319" r:id="rId34"/>
-    <p:sldId id="320" r:id="rId35"/>
-    <p:sldId id="308" r:id="rId36"/>
+    <p:sldId id="328" r:id="rId34"/>
+    <p:sldId id="319" r:id="rId35"/>
+    <p:sldId id="320" r:id="rId36"/>
   </p:sldIdLst>
   <p:sldSz cx="9144000" cy="6858000" type="screen4x3"/>
   <p:notesSz cx="6858000" cy="9144000"/>
@@ -3319,7 +3319,7 @@
     </p:spTree>
     <p:extLst>
       <p:ext uri="{BB962C8B-B14F-4D97-AF65-F5344CB8AC3E}">
-        <p14:creationId xmlns:p14="http://schemas.microsoft.com/office/powerpoint/2010/main" val="700657275"/>
+        <p14:creationId xmlns:p14="http://schemas.microsoft.com/office/powerpoint/2010/main" val="1895338400"/>
       </p:ext>
     </p:extLst>
   </p:cSld>
@@ -3411,7 +3411,7 @@
     </p:spTree>
     <p:extLst>
       <p:ext uri="{BB962C8B-B14F-4D97-AF65-F5344CB8AC3E}">
-        <p14:creationId xmlns:p14="http://schemas.microsoft.com/office/powerpoint/2010/main" val="4192043878"/>
+        <p14:creationId xmlns:p14="http://schemas.microsoft.com/office/powerpoint/2010/main" val="700657275"/>
       </p:ext>
     </p:extLst>
   </p:cSld>
@@ -3503,7 +3503,7 @@
     </p:spTree>
     <p:extLst>
       <p:ext uri="{BB962C8B-B14F-4D97-AF65-F5344CB8AC3E}">
-        <p14:creationId xmlns:p14="http://schemas.microsoft.com/office/powerpoint/2010/main" val="4111834462"/>
+        <p14:creationId xmlns:p14="http://schemas.microsoft.com/office/powerpoint/2010/main" val="4192043878"/>
       </p:ext>
     </p:extLst>
   </p:cSld>
@@ -9065,6 +9065,168 @@
             <p:ph type="body" sz="quarter" idx="11"/>
           </p:nvPr>
         </p:nvSpPr>
+        <p:spPr/>
+        <p:txBody>
+          <a:bodyPr/>
+          <a:lstStyle/>
+          <a:p>
+            <a:r>
+              <a:rPr lang="en-US" dirty="0"/>
+              <a:t>SOLID Principles</a:t>
+            </a:r>
+          </a:p>
+          <a:p>
+            <a:endParaRPr lang="en-US" dirty="0"/>
+          </a:p>
+        </p:txBody>
+      </p:sp>
+      <p:sp>
+        <p:nvSpPr>
+          <p:cNvPr id="5" name="TextBox 4"/>
+          <p:cNvSpPr txBox="1"/>
+          <p:nvPr/>
+        </p:nvSpPr>
+        <p:spPr>
+          <a:xfrm>
+            <a:off x="621372" y="1859340"/>
+            <a:ext cx="8210747" cy="3785652"/>
+          </a:xfrm>
+          <a:prstGeom prst="rect">
+            <a:avLst/>
+          </a:prstGeom>
+          <a:noFill/>
+        </p:spPr>
+        <p:txBody>
+          <a:bodyPr wrap="square" rtlCol="0">
+            <a:spAutoFit/>
+          </a:bodyPr>
+          <a:lstStyle/>
+          <a:p>
+            <a:endParaRPr lang="en-GB" sz="1600" u="sng" dirty="0">
+              <a:latin typeface="Chronicle Display" pitchFamily="50" charset="0"/>
+            </a:endParaRPr>
+          </a:p>
+          <a:p>
+            <a:endParaRPr lang="en-GB" sz="1600" u="sng" dirty="0">
+              <a:latin typeface="Chronicle Display" pitchFamily="50" charset="0"/>
+            </a:endParaRPr>
+          </a:p>
+          <a:p>
+            <a:r>
+              <a:rPr lang="en-GB" sz="3200" b="1" i="1" dirty="0">
+                <a:latin typeface="Chronicle Display" pitchFamily="50" charset="0"/>
+              </a:rPr>
+              <a:t>Resources</a:t>
+            </a:r>
+          </a:p>
+          <a:p>
+            <a:endParaRPr lang="en-GB" sz="3200" b="1" i="1" dirty="0">
+              <a:latin typeface="Chronicle Display" pitchFamily="50" charset="0"/>
+            </a:endParaRPr>
+          </a:p>
+          <a:p>
+            <a:endParaRPr lang="en-GB" sz="1600" dirty="0">
+              <a:latin typeface="Chronicle Display" pitchFamily="50" charset="0"/>
+            </a:endParaRPr>
+          </a:p>
+          <a:p>
+            <a:r>
+              <a:rPr lang="en-GB" sz="1600" b="1" i="1" dirty="0">
+                <a:latin typeface="Chronicle Display" pitchFamily="50" charset="0"/>
+                <a:hlinkClick r:id="rId3"/>
+              </a:rPr>
+              <a:t>https://github.com/franco-melandri/SOLID</a:t>
+            </a:r>
+            <a:endParaRPr lang="en-GB" sz="1600" b="1" i="1" dirty="0">
+              <a:latin typeface="Chronicle Display" pitchFamily="50" charset="0"/>
+            </a:endParaRPr>
+          </a:p>
+          <a:p>
+            <a:endParaRPr lang="en-GB" sz="1600" b="1" i="1" dirty="0">
+              <a:latin typeface="Chronicle Display" pitchFamily="50" charset="0"/>
+            </a:endParaRPr>
+          </a:p>
+          <a:p>
+            <a:r>
+              <a:rPr lang="en-GB" sz="1600" b="1" i="1" dirty="0">
+                <a:latin typeface="Chronicle Display" pitchFamily="50" charset="0"/>
+                <a:hlinkClick r:id="rId4"/>
+              </a:rPr>
+              <a:t>http://butunclebob.com/ArticleS.UncleBob.PrinciplesOfOod</a:t>
+            </a:r>
+            <a:endParaRPr lang="en-GB" sz="1600" b="1" i="1" dirty="0">
+              <a:latin typeface="Chronicle Display" pitchFamily="50" charset="0"/>
+            </a:endParaRPr>
+          </a:p>
+          <a:p>
+            <a:endParaRPr lang="en-GB" sz="1600" b="1" i="1" dirty="0">
+              <a:latin typeface="Chronicle Display" pitchFamily="50" charset="0"/>
+            </a:endParaRPr>
+          </a:p>
+          <a:p>
+            <a:r>
+              <a:rPr lang="en-GB" sz="1600" b="1" i="1" dirty="0">
+                <a:latin typeface="Chronicle Display" pitchFamily="50" charset="0"/>
+                <a:hlinkClick r:id="rId5"/>
+              </a:rPr>
+              <a:t>http://www.codeproject.com/Articles/703634/SOLID-architecture-principles-using-simple-Csharp</a:t>
+            </a:r>
+            <a:endParaRPr lang="en-GB" sz="1600" b="1" i="1" dirty="0">
+              <a:latin typeface="Chronicle Display" pitchFamily="50" charset="0"/>
+            </a:endParaRPr>
+          </a:p>
+          <a:p>
+            <a:endParaRPr lang="en-GB" sz="1600" dirty="0">
+              <a:latin typeface="Chronicle Display" pitchFamily="50" charset="0"/>
+            </a:endParaRPr>
+          </a:p>
+          <a:p>
+            <a:endParaRPr lang="en-GB" sz="1600" dirty="0">
+              <a:latin typeface="Chronicle Display" pitchFamily="50" charset="0"/>
+            </a:endParaRPr>
+          </a:p>
+        </p:txBody>
+      </p:sp>
+    </p:spTree>
+    <p:extLst>
+      <p:ext uri="{BB962C8B-B14F-4D97-AF65-F5344CB8AC3E}">
+        <p14:creationId xmlns:p14="http://schemas.microsoft.com/office/powerpoint/2010/main" val="2987290541"/>
+      </p:ext>
+    </p:extLst>
+  </p:cSld>
+  <p:clrMapOvr>
+    <a:masterClrMapping/>
+  </p:clrMapOvr>
+</p:sld>
+</file>
+
+<file path=ppt/slides/slide34.xml><?xml version="1.0" encoding="utf-8"?>
+<p:sld xmlns:a="http://schemas.openxmlformats.org/drawingml/2006/main" xmlns:r="http://schemas.openxmlformats.org/officeDocument/2006/relationships" xmlns:p="http://schemas.openxmlformats.org/presentationml/2006/main">
+  <p:cSld>
+    <p:spTree>
+      <p:nvGrpSpPr>
+        <p:cNvPr id="1" name=""/>
+        <p:cNvGrpSpPr/>
+        <p:nvPr/>
+      </p:nvGrpSpPr>
+      <p:grpSpPr>
+        <a:xfrm>
+          <a:off x="0" y="0"/>
+          <a:ext cx="0" cy="0"/>
+          <a:chOff x="0" y="0"/>
+          <a:chExt cx="0" cy="0"/>
+        </a:xfrm>
+      </p:grpSpPr>
+      <p:sp>
+        <p:nvSpPr>
+          <p:cNvPr id="2" name="Text Placeholder 1"/>
+          <p:cNvSpPr>
+            <a:spLocks noGrp="1"/>
+          </p:cNvSpPr>
+          <p:nvPr>
+            <p:ph type="body" sz="quarter" idx="11"/>
+          </p:nvPr>
+        </p:nvSpPr>
         <p:spPr>
           <a:xfrm>
             <a:off x="328613" y="1079048"/>
@@ -9102,7 +9264,7 @@
         <p:spPr>
           <a:xfrm>
             <a:off x="311881" y="2329394"/>
-            <a:ext cx="8401246" cy="485802"/>
+            <a:ext cx="8401246" cy="656402"/>
           </a:xfrm>
           <a:prstGeom prst="rect">
             <a:avLst/>
@@ -9249,7 +9411,7 @@
           </a:lstStyle>
           <a:p>
             <a:r>
-              <a:rPr lang="en-US" sz="2400" dirty="0"/>
+              <a:rPr lang="en-US" sz="4000" b="1" i="1" dirty="0"/>
               <a:t>KISS</a:t>
             </a:r>
           </a:p>
@@ -9275,7 +9437,7 @@
         </p:nvSpPr>
         <p:spPr>
           <a:xfrm>
-            <a:off x="621372" y="2791291"/>
+            <a:off x="621372" y="3073309"/>
             <a:ext cx="8210747" cy="1938992"/>
           </a:xfrm>
           <a:prstGeom prst="rect">
@@ -9329,7 +9491,7 @@
               <a:rPr lang="en-GB" sz="1600" dirty="0">
                 <a:latin typeface="Chronicle Display" pitchFamily="50" charset="0"/>
               </a:rPr>
-              <a:t>Avoid OVERENGINERING</a:t>
+              <a:t>Avoid OVER-ENGINEERING</a:t>
             </a:r>
             <a:endParaRPr lang="en-GB" sz="1600" b="1" i="1" dirty="0">
               <a:latin typeface="Chronicle Display" pitchFamily="50" charset="0"/>
@@ -9350,7 +9512,7 @@
 </p:sld>
 </file>
 
-<file path=ppt/slides/slide34.xml><?xml version="1.0" encoding="utf-8"?>
+<file path=ppt/slides/slide35.xml><?xml version="1.0" encoding="utf-8"?>
 <p:sld xmlns:a="http://schemas.openxmlformats.org/drawingml/2006/main" xmlns:r="http://schemas.openxmlformats.org/officeDocument/2006/relationships" xmlns:p="http://schemas.openxmlformats.org/presentationml/2006/main">
   <p:cSld>
     <p:spTree>
@@ -9561,7 +9723,7 @@
           </a:lstStyle>
           <a:p>
             <a:r>
-              <a:rPr lang="en-US" sz="2400" dirty="0"/>
+              <a:rPr lang="en-US" sz="4000" b="1" i="1" dirty="0"/>
               <a:t>YAGNI</a:t>
             </a:r>
           </a:p>
@@ -9587,8 +9749,8 @@
         </p:nvSpPr>
         <p:spPr>
           <a:xfrm>
-            <a:off x="599630" y="3109204"/>
-            <a:ext cx="8210747" cy="1200329"/>
+            <a:off x="599630" y="3333139"/>
+            <a:ext cx="8210747" cy="1938992"/>
           </a:xfrm>
           <a:prstGeom prst="rect">
             <a:avLst/>
@@ -9643,6 +9805,30 @@
             </a:endParaRPr>
           </a:p>
           <a:p>
+            <a:r>
+              <a:rPr lang="en-GB" sz="1600" dirty="0">
+                <a:latin typeface="Chronicle Display" pitchFamily="50" charset="0"/>
+              </a:rPr>
+              <a:t>If you don’t need it don’t do it</a:t>
+            </a:r>
+          </a:p>
+          <a:p>
+            <a:endParaRPr lang="en-GB" sz="1600" dirty="0">
+              <a:latin typeface="Chronicle Display" pitchFamily="50" charset="0"/>
+            </a:endParaRPr>
+          </a:p>
+          <a:p>
+            <a:r>
+              <a:rPr lang="en-GB" sz="1600" dirty="0">
+                <a:latin typeface="Chronicle Display" pitchFamily="50" charset="0"/>
+              </a:rPr>
+              <a:t>Avoid OVER-ENGINEERING</a:t>
+            </a:r>
+            <a:endParaRPr lang="en-GB" sz="1600" b="1" i="1" dirty="0">
+              <a:latin typeface="Chronicle Display" pitchFamily="50" charset="0"/>
+            </a:endParaRPr>
+          </a:p>
+          <a:p>
             <a:endParaRPr lang="en-GB" sz="1600" dirty="0">
               <a:latin typeface="Chronicle Display" pitchFamily="50" charset="0"/>
             </a:endParaRPr>
@@ -9653,148 +9839,6 @@
     <p:extLst>
       <p:ext uri="{BB962C8B-B14F-4D97-AF65-F5344CB8AC3E}">
         <p14:creationId xmlns:p14="http://schemas.microsoft.com/office/powerpoint/2010/main" val="2768036412"/>
-      </p:ext>
-    </p:extLst>
-  </p:cSld>
-  <p:clrMapOvr>
-    <a:masterClrMapping/>
-  </p:clrMapOvr>
-</p:sld>
-</file>
-
-<file path=ppt/slides/slide35.xml><?xml version="1.0" encoding="utf-8"?>
-<p:sld xmlns:a="http://schemas.openxmlformats.org/drawingml/2006/main" xmlns:r="http://schemas.openxmlformats.org/officeDocument/2006/relationships" xmlns:p="http://schemas.openxmlformats.org/presentationml/2006/main">
-  <p:cSld>
-    <p:spTree>
-      <p:nvGrpSpPr>
-        <p:cNvPr id="1" name=""/>
-        <p:cNvGrpSpPr/>
-        <p:nvPr/>
-      </p:nvGrpSpPr>
-      <p:grpSpPr>
-        <a:xfrm>
-          <a:off x="0" y="0"/>
-          <a:ext cx="0" cy="0"/>
-          <a:chOff x="0" y="0"/>
-          <a:chExt cx="0" cy="0"/>
-        </a:xfrm>
-      </p:grpSpPr>
-      <p:sp>
-        <p:nvSpPr>
-          <p:cNvPr id="2" name="Text Placeholder 1"/>
-          <p:cNvSpPr>
-            <a:spLocks noGrp="1"/>
-          </p:cNvSpPr>
-          <p:nvPr>
-            <p:ph type="body" sz="quarter" idx="11"/>
-          </p:nvPr>
-        </p:nvSpPr>
-        <p:spPr/>
-        <p:txBody>
-          <a:bodyPr/>
-          <a:lstStyle/>
-          <a:p>
-            <a:r>
-              <a:rPr lang="en-US"/>
-              <a:t>Resources</a:t>
-            </a:r>
-          </a:p>
-          <a:p>
-            <a:endParaRPr lang="en-US"/>
-          </a:p>
-          <a:p>
-            <a:endParaRPr lang="en-US" dirty="0"/>
-          </a:p>
-        </p:txBody>
-      </p:sp>
-      <p:sp>
-        <p:nvSpPr>
-          <p:cNvPr id="5" name="TextBox 4"/>
-          <p:cNvSpPr txBox="1"/>
-          <p:nvPr/>
-        </p:nvSpPr>
-        <p:spPr>
-          <a:xfrm>
-            <a:off x="621372" y="1501213"/>
-            <a:ext cx="8210747" cy="2308324"/>
-          </a:xfrm>
-          <a:prstGeom prst="rect">
-            <a:avLst/>
-          </a:prstGeom>
-          <a:noFill/>
-        </p:spPr>
-        <p:txBody>
-          <a:bodyPr wrap="square" rtlCol="0">
-            <a:spAutoFit/>
-          </a:bodyPr>
-          <a:lstStyle/>
-          <a:p>
-            <a:endParaRPr lang="en-GB" sz="1600" dirty="0">
-              <a:latin typeface="Chronicle Display" pitchFamily="50" charset="0"/>
-            </a:endParaRPr>
-          </a:p>
-          <a:p>
-            <a:endParaRPr lang="en-GB" sz="1600" dirty="0">
-              <a:latin typeface="Chronicle Display" pitchFamily="50" charset="0"/>
-            </a:endParaRPr>
-          </a:p>
-          <a:p>
-            <a:r>
-              <a:rPr lang="en-GB" sz="1600" b="1" i="1" dirty="0">
-                <a:latin typeface="Chronicle Display" pitchFamily="50" charset="0"/>
-                <a:hlinkClick r:id="rId3"/>
-              </a:rPr>
-              <a:t>https://github.com/franco-melandri/SOLID</a:t>
-            </a:r>
-            <a:endParaRPr lang="en-GB" sz="1600" b="1" i="1" dirty="0">
-              <a:latin typeface="Chronicle Display" pitchFamily="50" charset="0"/>
-            </a:endParaRPr>
-          </a:p>
-          <a:p>
-            <a:endParaRPr lang="en-GB" sz="1600" b="1" i="1" dirty="0">
-              <a:latin typeface="Chronicle Display" pitchFamily="50" charset="0"/>
-            </a:endParaRPr>
-          </a:p>
-          <a:p>
-            <a:r>
-              <a:rPr lang="en-GB" sz="1600" b="1" i="1" dirty="0">
-                <a:latin typeface="Chronicle Display" pitchFamily="50" charset="0"/>
-                <a:hlinkClick r:id="rId4"/>
-              </a:rPr>
-              <a:t>http://butunclebob.com/ArticleS.UncleBob.PrinciplesOfOod</a:t>
-            </a:r>
-            <a:endParaRPr lang="en-GB" sz="1600" b="1" i="1" dirty="0">
-              <a:latin typeface="Chronicle Display" pitchFamily="50" charset="0"/>
-            </a:endParaRPr>
-          </a:p>
-          <a:p>
-            <a:endParaRPr lang="en-GB" sz="1600" b="1" i="1" dirty="0">
-              <a:latin typeface="Chronicle Display" pitchFamily="50" charset="0"/>
-            </a:endParaRPr>
-          </a:p>
-          <a:p>
-            <a:r>
-              <a:rPr lang="en-GB" sz="1600" b="1" i="1" dirty="0">
-                <a:latin typeface="Chronicle Display" pitchFamily="50" charset="0"/>
-                <a:hlinkClick r:id="rId5"/>
-              </a:rPr>
-              <a:t>http://www.codeproject.com/Articles/703634/SOLID-architecture-principles-using-simple-Csharp</a:t>
-            </a:r>
-            <a:endParaRPr lang="en-GB" sz="1600" b="1" i="1" dirty="0">
-              <a:latin typeface="Chronicle Display" pitchFamily="50" charset="0"/>
-            </a:endParaRPr>
-          </a:p>
-          <a:p>
-            <a:endParaRPr lang="en-GB" sz="1600" b="1" i="1" dirty="0">
-              <a:latin typeface="Chronicle Display" pitchFamily="50" charset="0"/>
-            </a:endParaRPr>
-          </a:p>
-        </p:txBody>
-      </p:sp>
-    </p:spTree>
-    <p:extLst>
-      <p:ext uri="{BB962C8B-B14F-4D97-AF65-F5344CB8AC3E}">
-        <p14:creationId xmlns:p14="http://schemas.microsoft.com/office/powerpoint/2010/main" val="3293004043"/>
       </p:ext>
     </p:extLst>
   </p:cSld>

</xml_diff>

<commit_message>
adding slide related to IDEALS Interface segregation
</commit_message>
<xml_diff>
--- a/docs/solid.pptx
+++ b/docs/solid.pptx
@@ -5,10 +5,10 @@
     <p:sldMasterId id="2147483650" r:id="rId1"/>
   </p:sldMasterIdLst>
   <p:notesMasterIdLst>
-    <p:notesMasterId r:id="rId44"/>
+    <p:notesMasterId r:id="rId45"/>
   </p:notesMasterIdLst>
   <p:handoutMasterIdLst>
-    <p:handoutMasterId r:id="rId45"/>
+    <p:handoutMasterId r:id="rId46"/>
   </p:handoutMasterIdLst>
   <p:sldIdLst>
     <p:sldId id="309" r:id="rId2"/>
@@ -49,10 +49,11 @@
     <p:sldId id="329" r:id="rId37"/>
     <p:sldId id="331" r:id="rId38"/>
     <p:sldId id="332" r:id="rId39"/>
-    <p:sldId id="333" r:id="rId40"/>
-    <p:sldId id="334" r:id="rId41"/>
-    <p:sldId id="335" r:id="rId42"/>
-    <p:sldId id="330" r:id="rId43"/>
+    <p:sldId id="336" r:id="rId40"/>
+    <p:sldId id="333" r:id="rId41"/>
+    <p:sldId id="334" r:id="rId42"/>
+    <p:sldId id="335" r:id="rId43"/>
+    <p:sldId id="330" r:id="rId44"/>
   </p:sldIdLst>
   <p:sldSz cx="9144000" cy="6858000" type="screen4x3"/>
   <p:notesSz cx="6858000" cy="9144000"/>
@@ -3878,7 +3879,7 @@
     </p:spTree>
     <p:extLst>
       <p:ext uri="{BB962C8B-B14F-4D97-AF65-F5344CB8AC3E}">
-        <p14:creationId xmlns:p14="http://schemas.microsoft.com/office/powerpoint/2010/main" val="194811362"/>
+        <p14:creationId xmlns:p14="http://schemas.microsoft.com/office/powerpoint/2010/main" val="641130536"/>
       </p:ext>
     </p:extLst>
   </p:cSld>
@@ -4062,7 +4063,7 @@
     </p:spTree>
     <p:extLst>
       <p:ext uri="{BB962C8B-B14F-4D97-AF65-F5344CB8AC3E}">
-        <p14:creationId xmlns:p14="http://schemas.microsoft.com/office/powerpoint/2010/main" val="715644702"/>
+        <p14:creationId xmlns:p14="http://schemas.microsoft.com/office/powerpoint/2010/main" val="194811362"/>
       </p:ext>
     </p:extLst>
   </p:cSld>
@@ -4154,7 +4155,7 @@
     </p:spTree>
     <p:extLst>
       <p:ext uri="{BB962C8B-B14F-4D97-AF65-F5344CB8AC3E}">
-        <p14:creationId xmlns:p14="http://schemas.microsoft.com/office/powerpoint/2010/main" val="2866667866"/>
+        <p14:creationId xmlns:p14="http://schemas.microsoft.com/office/powerpoint/2010/main" val="715644702"/>
       </p:ext>
     </p:extLst>
   </p:cSld>
@@ -4238,6 +4239,98 @@
             <a:fld id="{2C5A56FE-B2E8-4285-8F31-2AEEB8EA39C6}" type="slidenum">
               <a:rPr lang="en-GB" smtClean="0"/>
               <a:t>42</a:t>
+            </a:fld>
+            <a:endParaRPr lang="en-GB"/>
+          </a:p>
+        </p:txBody>
+      </p:sp>
+    </p:spTree>
+    <p:extLst>
+      <p:ext uri="{BB962C8B-B14F-4D97-AF65-F5344CB8AC3E}">
+        <p14:creationId xmlns:p14="http://schemas.microsoft.com/office/powerpoint/2010/main" val="2866667866"/>
+      </p:ext>
+    </p:extLst>
+  </p:cSld>
+  <p:clrMapOvr>
+    <a:masterClrMapping/>
+  </p:clrMapOvr>
+</p:notes>
+</file>
+
+<file path=ppt/notesSlides/notesSlide43.xml><?xml version="1.0" encoding="utf-8"?>
+<p:notes xmlns:a="http://schemas.openxmlformats.org/drawingml/2006/main" xmlns:r="http://schemas.openxmlformats.org/officeDocument/2006/relationships" xmlns:p="http://schemas.openxmlformats.org/presentationml/2006/main">
+  <p:cSld>
+    <p:spTree>
+      <p:nvGrpSpPr>
+        <p:cNvPr id="1" name=""/>
+        <p:cNvGrpSpPr/>
+        <p:nvPr/>
+      </p:nvGrpSpPr>
+      <p:grpSpPr>
+        <a:xfrm>
+          <a:off x="0" y="0"/>
+          <a:ext cx="0" cy="0"/>
+          <a:chOff x="0" y="0"/>
+          <a:chExt cx="0" cy="0"/>
+        </a:xfrm>
+      </p:grpSpPr>
+      <p:sp>
+        <p:nvSpPr>
+          <p:cNvPr id="2" name="Slide Image Placeholder 1"/>
+          <p:cNvSpPr>
+            <a:spLocks noGrp="1" noRot="1" noChangeAspect="1"/>
+          </p:cNvSpPr>
+          <p:nvPr>
+            <p:ph type="sldImg"/>
+          </p:nvPr>
+        </p:nvSpPr>
+        <p:spPr>
+          <a:xfrm>
+            <a:off x="1143000" y="685800"/>
+            <a:ext cx="4572000" cy="3429000"/>
+          </a:xfrm>
+          <a:prstGeom prst="rect">
+            <a:avLst/>
+          </a:prstGeom>
+        </p:spPr>
+      </p:sp>
+      <p:sp>
+        <p:nvSpPr>
+          <p:cNvPr id="3" name="Notes Placeholder 2"/>
+          <p:cNvSpPr>
+            <a:spLocks noGrp="1"/>
+          </p:cNvSpPr>
+          <p:nvPr>
+            <p:ph type="body" idx="1"/>
+          </p:nvPr>
+        </p:nvSpPr>
+        <p:spPr/>
+        <p:txBody>
+          <a:bodyPr/>
+          <a:lstStyle/>
+          <a:p>
+            <a:endParaRPr lang="it-IT" dirty="0"/>
+          </a:p>
+        </p:txBody>
+      </p:sp>
+      <p:sp>
+        <p:nvSpPr>
+          <p:cNvPr id="4" name="Slide Number Placeholder 3"/>
+          <p:cNvSpPr>
+            <a:spLocks noGrp="1"/>
+          </p:cNvSpPr>
+          <p:nvPr>
+            <p:ph type="sldNum" sz="quarter" idx="10"/>
+          </p:nvPr>
+        </p:nvSpPr>
+        <p:spPr/>
+        <p:txBody>
+          <a:bodyPr/>
+          <a:lstStyle/>
+          <a:p>
+            <a:fld id="{2C5A56FE-B2E8-4285-8F31-2AEEB8EA39C6}" type="slidenum">
+              <a:rPr lang="en-GB" smtClean="0"/>
+              <a:t>43</a:t>
             </a:fld>
             <a:endParaRPr lang="en-GB"/>
           </a:p>
@@ -11915,13 +12008,20 @@
             <p:ph type="body" sz="quarter" idx="11"/>
           </p:nvPr>
         </p:nvSpPr>
-        <p:spPr/>
+        <p:spPr>
+          <a:xfrm>
+            <a:off x="328613" y="1079047"/>
+            <a:ext cx="8401246" cy="871051"/>
+          </a:xfrm>
+        </p:spPr>
         <p:txBody>
           <a:bodyPr/>
           <a:lstStyle/>
           <a:p>
             <a:r>
-              <a:rPr lang="en-US" dirty="0"/>
+              <a:rPr lang="en-US" dirty="0">
+                <a:latin typeface="+mj-lt"/>
+              </a:rPr>
               <a:t>Interface Segregation Principle</a:t>
             </a:r>
           </a:p>
@@ -11930,6 +12030,187 @@
           </a:p>
           <a:p>
             <a:endParaRPr lang="en-US" dirty="0"/>
+          </a:p>
+        </p:txBody>
+      </p:sp>
+      <p:sp>
+        <p:nvSpPr>
+          <p:cNvPr id="5" name="TextBox 4">
+            <a:extLst>
+              <a:ext uri="{FF2B5EF4-FFF2-40B4-BE49-F238E27FC236}">
+                <a16:creationId xmlns:a16="http://schemas.microsoft.com/office/drawing/2014/main" id="{0649C76A-653B-4936-A74E-66DFC4B23D52}"/>
+              </a:ext>
+            </a:extLst>
+          </p:cNvPr>
+          <p:cNvSpPr txBox="1"/>
+          <p:nvPr/>
+        </p:nvSpPr>
+        <p:spPr>
+          <a:xfrm>
+            <a:off x="328613" y="2359417"/>
+            <a:ext cx="8210747" cy="584775"/>
+          </a:xfrm>
+          <a:prstGeom prst="rect">
+            <a:avLst/>
+          </a:prstGeom>
+          <a:noFill/>
+        </p:spPr>
+        <p:txBody>
+          <a:bodyPr wrap="square" rtlCol="0">
+            <a:spAutoFit/>
+          </a:bodyPr>
+          <a:lstStyle/>
+          <a:p>
+            <a:r>
+              <a:rPr lang="en-GB" sz="1600" dirty="0"/>
+              <a:t>As we saw in OOD interface segregation principle admonish to use class implementing “fat” interfaces</a:t>
+            </a:r>
+          </a:p>
+        </p:txBody>
+      </p:sp>
+      <p:sp>
+        <p:nvSpPr>
+          <p:cNvPr id="6" name="TextBox 5">
+            <a:extLst>
+              <a:ext uri="{FF2B5EF4-FFF2-40B4-BE49-F238E27FC236}">
+                <a16:creationId xmlns:a16="http://schemas.microsoft.com/office/drawing/2014/main" id="{DEE95456-91F2-439B-8C12-F1FA4A1A8525}"/>
+              </a:ext>
+            </a:extLst>
+          </p:cNvPr>
+          <p:cNvSpPr txBox="1"/>
+          <p:nvPr/>
+        </p:nvSpPr>
+        <p:spPr>
+          <a:xfrm>
+            <a:off x="328613" y="3136612"/>
+            <a:ext cx="8210747" cy="584775"/>
+          </a:xfrm>
+          <a:prstGeom prst="rect">
+            <a:avLst/>
+          </a:prstGeom>
+          <a:noFill/>
+        </p:spPr>
+        <p:txBody>
+          <a:bodyPr wrap="square" rtlCol="0">
+            <a:spAutoFit/>
+          </a:bodyPr>
+          <a:lstStyle/>
+          <a:p>
+            <a:r>
+              <a:rPr lang="en-GB" sz="1600" dirty="0"/>
+              <a:t>Instead of a class interface with all possible methods client might needs, separate into granular interface for the clients specific needs</a:t>
+            </a:r>
+          </a:p>
+        </p:txBody>
+      </p:sp>
+      <p:sp>
+        <p:nvSpPr>
+          <p:cNvPr id="7" name="TextBox 6">
+            <a:extLst>
+              <a:ext uri="{FF2B5EF4-FFF2-40B4-BE49-F238E27FC236}">
+                <a16:creationId xmlns:a16="http://schemas.microsoft.com/office/drawing/2014/main" id="{4D1F56C7-8B39-4225-A837-A294AD9613D4}"/>
+              </a:ext>
+            </a:extLst>
+          </p:cNvPr>
+          <p:cNvSpPr txBox="1"/>
+          <p:nvPr/>
+        </p:nvSpPr>
+        <p:spPr>
+          <a:xfrm>
+            <a:off x="328612" y="3913807"/>
+            <a:ext cx="8210747" cy="584775"/>
+          </a:xfrm>
+          <a:prstGeom prst="rect">
+            <a:avLst/>
+          </a:prstGeom>
+          <a:noFill/>
+        </p:spPr>
+        <p:txBody>
+          <a:bodyPr wrap="square" rtlCol="0">
+            <a:spAutoFit/>
+          </a:bodyPr>
+          <a:lstStyle/>
+          <a:p>
+            <a:r>
+              <a:rPr lang="en-GB" sz="1600" dirty="0"/>
+              <a:t>In the era of microservices there are a multitude of client (frontend) to the same service logic; that’s the main motivation to apply interface segregation for each possible client with its needs</a:t>
+            </a:r>
+          </a:p>
+        </p:txBody>
+      </p:sp>
+      <p:sp>
+        <p:nvSpPr>
+          <p:cNvPr id="8" name="TextBox 7">
+            <a:extLst>
+              <a:ext uri="{FF2B5EF4-FFF2-40B4-BE49-F238E27FC236}">
+                <a16:creationId xmlns:a16="http://schemas.microsoft.com/office/drawing/2014/main" id="{A3B5B226-45B4-4ED4-99B8-EA815AFC504C}"/>
+              </a:ext>
+            </a:extLst>
+          </p:cNvPr>
+          <p:cNvSpPr txBox="1"/>
+          <p:nvPr/>
+        </p:nvSpPr>
+        <p:spPr>
+          <a:xfrm>
+            <a:off x="328611" y="4691002"/>
+            <a:ext cx="8210747" cy="584775"/>
+          </a:xfrm>
+          <a:prstGeom prst="rect">
+            <a:avLst/>
+          </a:prstGeom>
+          <a:noFill/>
+        </p:spPr>
+        <p:txBody>
+          <a:bodyPr wrap="square" rtlCol="0">
+            <a:spAutoFit/>
+          </a:bodyPr>
+          <a:lstStyle/>
+          <a:p>
+            <a:r>
+              <a:rPr lang="en-US" sz="1600" dirty="0"/>
+              <a:t>The goal of interface segregation for microservices is that each type of frontend sees the service contract that best suits its needs</a:t>
+            </a:r>
+            <a:endParaRPr lang="en-GB" sz="1600" dirty="0">
+              <a:latin typeface="Chronicle Display" pitchFamily="50" charset="0"/>
+            </a:endParaRPr>
+          </a:p>
+        </p:txBody>
+      </p:sp>
+      <p:sp>
+        <p:nvSpPr>
+          <p:cNvPr id="9" name="TextBox 8">
+            <a:extLst>
+              <a:ext uri="{FF2B5EF4-FFF2-40B4-BE49-F238E27FC236}">
+                <a16:creationId xmlns:a16="http://schemas.microsoft.com/office/drawing/2014/main" id="{E9B13102-124D-4A0B-A300-71EA0056CCF3}"/>
+              </a:ext>
+            </a:extLst>
+          </p:cNvPr>
+          <p:cNvSpPr txBox="1"/>
+          <p:nvPr/>
+        </p:nvSpPr>
+        <p:spPr>
+          <a:xfrm>
+            <a:off x="328613" y="5486565"/>
+            <a:ext cx="8210747" cy="338554"/>
+          </a:xfrm>
+          <a:prstGeom prst="rect">
+            <a:avLst/>
+          </a:prstGeom>
+          <a:noFill/>
+        </p:spPr>
+        <p:txBody>
+          <a:bodyPr wrap="square" rtlCol="0">
+            <a:spAutoFit/>
+          </a:bodyPr>
+          <a:lstStyle/>
+          <a:p>
+            <a:r>
+              <a:rPr lang="en-US" sz="1600" dirty="0"/>
+              <a:t>We can reach the goal using the API Gateway pattern or in alternative the BFF pattern</a:t>
+            </a:r>
+            <a:endParaRPr lang="en-GB" sz="1600" dirty="0">
+              <a:latin typeface="Chronicle Display" pitchFamily="50" charset="0"/>
+            </a:endParaRPr>
           </a:p>
         </p:txBody>
       </p:sp>
@@ -11943,6 +12224,308 @@
   <p:clrMapOvr>
     <a:masterClrMapping/>
   </p:clrMapOvr>
+  <p:timing>
+    <p:tnLst>
+      <p:par>
+        <p:cTn id="1" dur="indefinite" restart="never" nodeType="tmRoot">
+          <p:childTnLst>
+            <p:seq concurrent="1" nextAc="seek">
+              <p:cTn id="2" dur="indefinite" nodeType="mainSeq">
+                <p:childTnLst>
+                  <p:par>
+                    <p:cTn id="3" fill="hold">
+                      <p:stCondLst>
+                        <p:cond delay="indefinite"/>
+                      </p:stCondLst>
+                      <p:childTnLst>
+                        <p:par>
+                          <p:cTn id="4" fill="hold">
+                            <p:stCondLst>
+                              <p:cond delay="0"/>
+                            </p:stCondLst>
+                            <p:childTnLst>
+                              <p:par>
+                                <p:cTn id="5" presetID="10" presetClass="entr" presetSubtype="0" fill="hold" grpId="0" nodeType="clickEffect">
+                                  <p:stCondLst>
+                                    <p:cond delay="0"/>
+                                  </p:stCondLst>
+                                  <p:childTnLst>
+                                    <p:set>
+                                      <p:cBhvr>
+                                        <p:cTn id="6" dur="1" fill="hold">
+                                          <p:stCondLst>
+                                            <p:cond delay="0"/>
+                                          </p:stCondLst>
+                                        </p:cTn>
+                                        <p:tgtEl>
+                                          <p:spTgt spid="5"/>
+                                        </p:tgtEl>
+                                        <p:attrNameLst>
+                                          <p:attrName>style.visibility</p:attrName>
+                                        </p:attrNameLst>
+                                      </p:cBhvr>
+                                      <p:to>
+                                        <p:strVal val="visible"/>
+                                      </p:to>
+                                    </p:set>
+                                    <p:animEffect transition="in" filter="fade">
+                                      <p:cBhvr>
+                                        <p:cTn id="7" dur="500"/>
+                                        <p:tgtEl>
+                                          <p:spTgt spid="5"/>
+                                        </p:tgtEl>
+                                      </p:cBhvr>
+                                    </p:animEffect>
+                                  </p:childTnLst>
+                                </p:cTn>
+                              </p:par>
+                            </p:childTnLst>
+                          </p:cTn>
+                        </p:par>
+                      </p:childTnLst>
+                    </p:cTn>
+                  </p:par>
+                  <p:par>
+                    <p:cTn id="8" fill="hold">
+                      <p:stCondLst>
+                        <p:cond delay="indefinite"/>
+                      </p:stCondLst>
+                      <p:childTnLst>
+                        <p:par>
+                          <p:cTn id="9" fill="hold">
+                            <p:stCondLst>
+                              <p:cond delay="0"/>
+                            </p:stCondLst>
+                            <p:childTnLst>
+                              <p:par>
+                                <p:cTn id="10" presetID="10" presetClass="entr" presetSubtype="0" fill="hold" grpId="0" nodeType="clickEffect">
+                                  <p:stCondLst>
+                                    <p:cond delay="0"/>
+                                  </p:stCondLst>
+                                  <p:childTnLst>
+                                    <p:set>
+                                      <p:cBhvr>
+                                        <p:cTn id="11" dur="1" fill="hold">
+                                          <p:stCondLst>
+                                            <p:cond delay="0"/>
+                                          </p:stCondLst>
+                                        </p:cTn>
+                                        <p:tgtEl>
+                                          <p:spTgt spid="6"/>
+                                        </p:tgtEl>
+                                        <p:attrNameLst>
+                                          <p:attrName>style.visibility</p:attrName>
+                                        </p:attrNameLst>
+                                      </p:cBhvr>
+                                      <p:to>
+                                        <p:strVal val="visible"/>
+                                      </p:to>
+                                    </p:set>
+                                    <p:animEffect transition="in" filter="fade">
+                                      <p:cBhvr>
+                                        <p:cTn id="12" dur="500"/>
+                                        <p:tgtEl>
+                                          <p:spTgt spid="6"/>
+                                        </p:tgtEl>
+                                      </p:cBhvr>
+                                    </p:animEffect>
+                                  </p:childTnLst>
+                                </p:cTn>
+                              </p:par>
+                            </p:childTnLst>
+                          </p:cTn>
+                        </p:par>
+                      </p:childTnLst>
+                    </p:cTn>
+                  </p:par>
+                  <p:par>
+                    <p:cTn id="13" fill="hold">
+                      <p:stCondLst>
+                        <p:cond delay="indefinite"/>
+                      </p:stCondLst>
+                      <p:childTnLst>
+                        <p:par>
+                          <p:cTn id="14" fill="hold">
+                            <p:stCondLst>
+                              <p:cond delay="0"/>
+                            </p:stCondLst>
+                            <p:childTnLst>
+                              <p:par>
+                                <p:cTn id="15" presetID="10" presetClass="entr" presetSubtype="0" fill="hold" grpId="0" nodeType="clickEffect">
+                                  <p:stCondLst>
+                                    <p:cond delay="0"/>
+                                  </p:stCondLst>
+                                  <p:childTnLst>
+                                    <p:set>
+                                      <p:cBhvr>
+                                        <p:cTn id="16" dur="1" fill="hold">
+                                          <p:stCondLst>
+                                            <p:cond delay="0"/>
+                                          </p:stCondLst>
+                                        </p:cTn>
+                                        <p:tgtEl>
+                                          <p:spTgt spid="7"/>
+                                        </p:tgtEl>
+                                        <p:attrNameLst>
+                                          <p:attrName>style.visibility</p:attrName>
+                                        </p:attrNameLst>
+                                      </p:cBhvr>
+                                      <p:to>
+                                        <p:strVal val="visible"/>
+                                      </p:to>
+                                    </p:set>
+                                    <p:animEffect transition="in" filter="fade">
+                                      <p:cBhvr>
+                                        <p:cTn id="17" dur="500"/>
+                                        <p:tgtEl>
+                                          <p:spTgt spid="7"/>
+                                        </p:tgtEl>
+                                      </p:cBhvr>
+                                    </p:animEffect>
+                                  </p:childTnLst>
+                                </p:cTn>
+                              </p:par>
+                            </p:childTnLst>
+                          </p:cTn>
+                        </p:par>
+                      </p:childTnLst>
+                    </p:cTn>
+                  </p:par>
+                  <p:par>
+                    <p:cTn id="18" fill="hold">
+                      <p:stCondLst>
+                        <p:cond delay="indefinite"/>
+                      </p:stCondLst>
+                      <p:childTnLst>
+                        <p:par>
+                          <p:cTn id="19" fill="hold">
+                            <p:stCondLst>
+                              <p:cond delay="0"/>
+                            </p:stCondLst>
+                            <p:childTnLst>
+                              <p:par>
+                                <p:cTn id="20" presetID="10" presetClass="entr" presetSubtype="0" fill="hold" grpId="0" nodeType="clickEffect">
+                                  <p:stCondLst>
+                                    <p:cond delay="0"/>
+                                  </p:stCondLst>
+                                  <p:childTnLst>
+                                    <p:set>
+                                      <p:cBhvr>
+                                        <p:cTn id="21" dur="1" fill="hold">
+                                          <p:stCondLst>
+                                            <p:cond delay="0"/>
+                                          </p:stCondLst>
+                                        </p:cTn>
+                                        <p:tgtEl>
+                                          <p:spTgt spid="8"/>
+                                        </p:tgtEl>
+                                        <p:attrNameLst>
+                                          <p:attrName>style.visibility</p:attrName>
+                                        </p:attrNameLst>
+                                      </p:cBhvr>
+                                      <p:to>
+                                        <p:strVal val="visible"/>
+                                      </p:to>
+                                    </p:set>
+                                    <p:animEffect transition="in" filter="fade">
+                                      <p:cBhvr>
+                                        <p:cTn id="22" dur="500"/>
+                                        <p:tgtEl>
+                                          <p:spTgt spid="8"/>
+                                        </p:tgtEl>
+                                      </p:cBhvr>
+                                    </p:animEffect>
+                                  </p:childTnLst>
+                                </p:cTn>
+                              </p:par>
+                            </p:childTnLst>
+                          </p:cTn>
+                        </p:par>
+                      </p:childTnLst>
+                    </p:cTn>
+                  </p:par>
+                  <p:par>
+                    <p:cTn id="23" fill="hold">
+                      <p:stCondLst>
+                        <p:cond delay="indefinite"/>
+                      </p:stCondLst>
+                      <p:childTnLst>
+                        <p:par>
+                          <p:cTn id="24" fill="hold">
+                            <p:stCondLst>
+                              <p:cond delay="0"/>
+                            </p:stCondLst>
+                            <p:childTnLst>
+                              <p:par>
+                                <p:cTn id="25" presetID="10" presetClass="entr" presetSubtype="0" fill="hold" grpId="0" nodeType="clickEffect">
+                                  <p:stCondLst>
+                                    <p:cond delay="0"/>
+                                  </p:stCondLst>
+                                  <p:childTnLst>
+                                    <p:set>
+                                      <p:cBhvr>
+                                        <p:cTn id="26" dur="1" fill="hold">
+                                          <p:stCondLst>
+                                            <p:cond delay="0"/>
+                                          </p:stCondLst>
+                                        </p:cTn>
+                                        <p:tgtEl>
+                                          <p:spTgt spid="9"/>
+                                        </p:tgtEl>
+                                        <p:attrNameLst>
+                                          <p:attrName>style.visibility</p:attrName>
+                                        </p:attrNameLst>
+                                      </p:cBhvr>
+                                      <p:to>
+                                        <p:strVal val="visible"/>
+                                      </p:to>
+                                    </p:set>
+                                    <p:animEffect transition="in" filter="fade">
+                                      <p:cBhvr>
+                                        <p:cTn id="27" dur="500"/>
+                                        <p:tgtEl>
+                                          <p:spTgt spid="9"/>
+                                        </p:tgtEl>
+                                      </p:cBhvr>
+                                    </p:animEffect>
+                                  </p:childTnLst>
+                                </p:cTn>
+                              </p:par>
+                            </p:childTnLst>
+                          </p:cTn>
+                        </p:par>
+                      </p:childTnLst>
+                    </p:cTn>
+                  </p:par>
+                </p:childTnLst>
+              </p:cTn>
+              <p:prevCondLst>
+                <p:cond evt="onPrev" delay="0">
+                  <p:tgtEl>
+                    <p:sldTgt/>
+                  </p:tgtEl>
+                </p:cond>
+              </p:prevCondLst>
+              <p:nextCondLst>
+                <p:cond evt="onNext" delay="0">
+                  <p:tgtEl>
+                    <p:sldTgt/>
+                  </p:tgtEl>
+                </p:cond>
+              </p:nextCondLst>
+            </p:seq>
+          </p:childTnLst>
+        </p:cTn>
+      </p:par>
+    </p:tnLst>
+    <p:bldLst>
+      <p:bldP spid="5" grpId="0"/>
+      <p:bldP spid="6" grpId="0"/>
+      <p:bldP spid="7" grpId="0"/>
+      <p:bldP spid="8" grpId="0"/>
+      <p:bldP spid="9" grpId="0"/>
+    </p:bldLst>
+  </p:timing>
 </p:sld>
 </file>
 
@@ -11973,35 +12556,1845 @@
             <p:ph type="body" sz="quarter" idx="11"/>
           </p:nvPr>
         </p:nvSpPr>
-        <p:spPr/>
+        <p:spPr>
+          <a:xfrm>
+            <a:off x="328613" y="1079047"/>
+            <a:ext cx="8401246" cy="871051"/>
+          </a:xfrm>
+        </p:spPr>
         <p:txBody>
           <a:bodyPr/>
           <a:lstStyle/>
           <a:p>
             <a:r>
-              <a:rPr lang="en-US" dirty="0" err="1"/>
-              <a:t>Deployability</a:t>
-            </a:r>
+              <a:rPr lang="en-US" dirty="0"/>
+              <a:t>Interface Segregation Principle</a:t>
+            </a:r>
+          </a:p>
+          <a:p>
             <a:endParaRPr lang="en-US" dirty="0"/>
           </a:p>
           <a:p>
             <a:endParaRPr lang="en-US" dirty="0"/>
           </a:p>
-          <a:p>
-            <a:endParaRPr lang="en-US" dirty="0"/>
-          </a:p>
-        </p:txBody>
-      </p:sp>
+        </p:txBody>
+      </p:sp>
+      <p:sp>
+        <p:nvSpPr>
+          <p:cNvPr id="3" name="Rectangle 2">
+            <a:extLst>
+              <a:ext uri="{FF2B5EF4-FFF2-40B4-BE49-F238E27FC236}">
+                <a16:creationId xmlns:a16="http://schemas.microsoft.com/office/drawing/2014/main" id="{8C871F0E-693A-4A6A-9DC6-58ACB9CDCCC1}"/>
+              </a:ext>
+            </a:extLst>
+          </p:cNvPr>
+          <p:cNvSpPr/>
+          <p:nvPr/>
+        </p:nvSpPr>
+        <p:spPr>
+          <a:xfrm>
+            <a:off x="909738" y="2020513"/>
+            <a:ext cx="1110343" cy="690465"/>
+          </a:xfrm>
+          <a:prstGeom prst="rect">
+            <a:avLst/>
+          </a:prstGeom>
+        </p:spPr>
+        <p:style>
+          <a:lnRef idx="1">
+            <a:schemeClr val="accent1"/>
+          </a:lnRef>
+          <a:fillRef idx="3">
+            <a:schemeClr val="accent1"/>
+          </a:fillRef>
+          <a:effectRef idx="2">
+            <a:schemeClr val="accent1"/>
+          </a:effectRef>
+          <a:fontRef idx="minor">
+            <a:schemeClr val="lt1"/>
+          </a:fontRef>
+        </p:style>
+        <p:txBody>
+          <a:bodyPr rot="0" spcFirstLastPara="0" vertOverflow="overflow" horzOverflow="overflow" vert="horz" wrap="square" lIns="91440" tIns="45720" rIns="91440" bIns="45720" numCol="1" spcCol="0" rtlCol="0" fromWordArt="0" anchor="ctr" anchorCtr="0" forceAA="0" compatLnSpc="1">
+            <a:prstTxWarp prst="textNoShape">
+              <a:avLst/>
+            </a:prstTxWarp>
+            <a:noAutofit/>
+          </a:bodyPr>
+          <a:lstStyle/>
+          <a:p>
+            <a:pPr algn="ctr"/>
+            <a:r>
+              <a:rPr lang="it-IT" dirty="0">
+                <a:ln w="0"/>
+                <a:solidFill>
+                  <a:schemeClr val="tx1"/>
+                </a:solidFill>
+                <a:effectLst>
+                  <a:outerShdw blurRad="38100" dist="19050" dir="2700000" algn="tl" rotWithShape="0">
+                    <a:schemeClr val="dk1">
+                      <a:alpha val="40000"/>
+                    </a:schemeClr>
+                  </a:outerShdw>
+                </a:effectLst>
+              </a:rPr>
+              <a:t>Desktop Web</a:t>
+            </a:r>
+          </a:p>
+        </p:txBody>
+      </p:sp>
+      <p:sp>
+        <p:nvSpPr>
+          <p:cNvPr id="8" name="Rectangle 7">
+            <a:extLst>
+              <a:ext uri="{FF2B5EF4-FFF2-40B4-BE49-F238E27FC236}">
+                <a16:creationId xmlns:a16="http://schemas.microsoft.com/office/drawing/2014/main" id="{4E9C25D7-8DD2-443B-B5B7-43AF1A8D0FB1}"/>
+              </a:ext>
+            </a:extLst>
+          </p:cNvPr>
+          <p:cNvSpPr/>
+          <p:nvPr/>
+        </p:nvSpPr>
+        <p:spPr>
+          <a:xfrm>
+            <a:off x="909738" y="2816337"/>
+            <a:ext cx="1110343" cy="690465"/>
+          </a:xfrm>
+          <a:prstGeom prst="rect">
+            <a:avLst/>
+          </a:prstGeom>
+        </p:spPr>
+        <p:style>
+          <a:lnRef idx="1">
+            <a:schemeClr val="dk1"/>
+          </a:lnRef>
+          <a:fillRef idx="3">
+            <a:schemeClr val="dk1"/>
+          </a:fillRef>
+          <a:effectRef idx="2">
+            <a:schemeClr val="dk1"/>
+          </a:effectRef>
+          <a:fontRef idx="minor">
+            <a:schemeClr val="lt1"/>
+          </a:fontRef>
+        </p:style>
+        <p:txBody>
+          <a:bodyPr rot="0" spcFirstLastPara="0" vertOverflow="overflow" horzOverflow="overflow" vert="horz" wrap="square" lIns="91440" tIns="45720" rIns="91440" bIns="45720" numCol="1" spcCol="0" rtlCol="0" fromWordArt="0" anchor="ctr" anchorCtr="0" forceAA="0" compatLnSpc="1">
+            <a:prstTxWarp prst="textNoShape">
+              <a:avLst/>
+            </a:prstTxWarp>
+            <a:noAutofit/>
+          </a:bodyPr>
+          <a:lstStyle/>
+          <a:p>
+            <a:pPr algn="ctr"/>
+            <a:r>
+              <a:rPr lang="it-IT" dirty="0">
+                <a:ln w="0"/>
+                <a:solidFill>
+                  <a:schemeClr val="tx1"/>
+                </a:solidFill>
+                <a:effectLst>
+                  <a:outerShdw blurRad="38100" dist="19050" dir="2700000" algn="tl" rotWithShape="0">
+                    <a:schemeClr val="dk1">
+                      <a:alpha val="40000"/>
+                    </a:schemeClr>
+                  </a:outerShdw>
+                </a:effectLst>
+              </a:rPr>
+              <a:t>Mobile Web</a:t>
+            </a:r>
+          </a:p>
+        </p:txBody>
+      </p:sp>
+      <p:sp>
+        <p:nvSpPr>
+          <p:cNvPr id="9" name="Rectangle 8">
+            <a:extLst>
+              <a:ext uri="{FF2B5EF4-FFF2-40B4-BE49-F238E27FC236}">
+                <a16:creationId xmlns:a16="http://schemas.microsoft.com/office/drawing/2014/main" id="{A8B84411-7AEA-40C7-8FD3-2AAA3E2783F1}"/>
+              </a:ext>
+            </a:extLst>
+          </p:cNvPr>
+          <p:cNvSpPr/>
+          <p:nvPr/>
+        </p:nvSpPr>
+        <p:spPr>
+          <a:xfrm>
+            <a:off x="895736" y="3883621"/>
+            <a:ext cx="1110343" cy="690465"/>
+          </a:xfrm>
+          <a:prstGeom prst="rect">
+            <a:avLst/>
+          </a:prstGeom>
+        </p:spPr>
+        <p:style>
+          <a:lnRef idx="2">
+            <a:schemeClr val="accent3">
+              <a:shade val="50000"/>
+            </a:schemeClr>
+          </a:lnRef>
+          <a:fillRef idx="1">
+            <a:schemeClr val="accent3"/>
+          </a:fillRef>
+          <a:effectRef idx="0">
+            <a:schemeClr val="accent3"/>
+          </a:effectRef>
+          <a:fontRef idx="minor">
+            <a:schemeClr val="lt1"/>
+          </a:fontRef>
+        </p:style>
+        <p:txBody>
+          <a:bodyPr rot="0" spcFirstLastPara="0" vertOverflow="overflow" horzOverflow="overflow" vert="horz" wrap="square" lIns="91440" tIns="45720" rIns="91440" bIns="45720" numCol="1" spcCol="0" rtlCol="0" fromWordArt="0" anchor="ctr" anchorCtr="0" forceAA="0" compatLnSpc="1">
+            <a:prstTxWarp prst="textNoShape">
+              <a:avLst/>
+            </a:prstTxWarp>
+            <a:noAutofit/>
+          </a:bodyPr>
+          <a:lstStyle/>
+          <a:p>
+            <a:pPr algn="ctr"/>
+            <a:r>
+              <a:rPr lang="it-IT" dirty="0">
+                <a:ln w="0"/>
+                <a:solidFill>
+                  <a:schemeClr val="tx1"/>
+                </a:solidFill>
+                <a:effectLst>
+                  <a:outerShdw blurRad="38100" dist="19050" dir="2700000" algn="tl" rotWithShape="0">
+                    <a:schemeClr val="dk1">
+                      <a:alpha val="40000"/>
+                    </a:schemeClr>
+                  </a:outerShdw>
+                </a:effectLst>
+              </a:rPr>
+              <a:t>Android</a:t>
+            </a:r>
+          </a:p>
+        </p:txBody>
+      </p:sp>
+      <p:sp>
+        <p:nvSpPr>
+          <p:cNvPr id="10" name="Rectangle 9">
+            <a:extLst>
+              <a:ext uri="{FF2B5EF4-FFF2-40B4-BE49-F238E27FC236}">
+                <a16:creationId xmlns:a16="http://schemas.microsoft.com/office/drawing/2014/main" id="{B58A11F2-5F26-4DCA-B1C8-7D39B33A9019}"/>
+              </a:ext>
+            </a:extLst>
+          </p:cNvPr>
+          <p:cNvSpPr/>
+          <p:nvPr/>
+        </p:nvSpPr>
+        <p:spPr>
+          <a:xfrm>
+            <a:off x="895736" y="4686053"/>
+            <a:ext cx="1110343" cy="690465"/>
+          </a:xfrm>
+          <a:prstGeom prst="rect">
+            <a:avLst/>
+          </a:prstGeom>
+        </p:spPr>
+        <p:style>
+          <a:lnRef idx="2">
+            <a:schemeClr val="accent4">
+              <a:shade val="50000"/>
+            </a:schemeClr>
+          </a:lnRef>
+          <a:fillRef idx="1">
+            <a:schemeClr val="accent4"/>
+          </a:fillRef>
+          <a:effectRef idx="0">
+            <a:schemeClr val="accent4"/>
+          </a:effectRef>
+          <a:fontRef idx="minor">
+            <a:schemeClr val="lt1"/>
+          </a:fontRef>
+        </p:style>
+        <p:txBody>
+          <a:bodyPr rot="0" spcFirstLastPara="0" vertOverflow="overflow" horzOverflow="overflow" vert="horz" wrap="square" lIns="91440" tIns="45720" rIns="91440" bIns="45720" numCol="1" spcCol="0" rtlCol="0" fromWordArt="0" anchor="ctr" anchorCtr="0" forceAA="0" compatLnSpc="1">
+            <a:prstTxWarp prst="textNoShape">
+              <a:avLst/>
+            </a:prstTxWarp>
+            <a:noAutofit/>
+          </a:bodyPr>
+          <a:lstStyle/>
+          <a:p>
+            <a:pPr algn="ctr"/>
+            <a:r>
+              <a:rPr lang="it-IT" dirty="0">
+                <a:ln w="0"/>
+                <a:solidFill>
+                  <a:schemeClr val="tx1"/>
+                </a:solidFill>
+                <a:effectLst>
+                  <a:outerShdw blurRad="38100" dist="19050" dir="2700000" algn="tl" rotWithShape="0">
+                    <a:schemeClr val="dk1">
+                      <a:alpha val="40000"/>
+                    </a:schemeClr>
+                  </a:outerShdw>
+                </a:effectLst>
+              </a:rPr>
+              <a:t>iOS</a:t>
+            </a:r>
+          </a:p>
+        </p:txBody>
+      </p:sp>
+      <p:sp>
+        <p:nvSpPr>
+          <p:cNvPr id="11" name="Rectangle 10">
+            <a:extLst>
+              <a:ext uri="{FF2B5EF4-FFF2-40B4-BE49-F238E27FC236}">
+                <a16:creationId xmlns:a16="http://schemas.microsoft.com/office/drawing/2014/main" id="{AFEF2AF2-B510-4230-9435-D43D0BA58FB2}"/>
+              </a:ext>
+            </a:extLst>
+          </p:cNvPr>
+          <p:cNvSpPr/>
+          <p:nvPr/>
+        </p:nvSpPr>
+        <p:spPr>
+          <a:xfrm>
+            <a:off x="881734" y="5803930"/>
+            <a:ext cx="1110343" cy="690465"/>
+          </a:xfrm>
+          <a:prstGeom prst="rect">
+            <a:avLst/>
+          </a:prstGeom>
+        </p:spPr>
+        <p:style>
+          <a:lnRef idx="1">
+            <a:schemeClr val="dk1"/>
+          </a:lnRef>
+          <a:fillRef idx="2">
+            <a:schemeClr val="dk1"/>
+          </a:fillRef>
+          <a:effectRef idx="1">
+            <a:schemeClr val="dk1"/>
+          </a:effectRef>
+          <a:fontRef idx="minor">
+            <a:schemeClr val="dk1"/>
+          </a:fontRef>
+        </p:style>
+        <p:txBody>
+          <a:bodyPr rtlCol="0" anchor="ctr"/>
+          <a:lstStyle/>
+          <a:p>
+            <a:pPr algn="ctr"/>
+            <a:r>
+              <a:rPr lang="it-IT" dirty="0"/>
+              <a:t>3° Party</a:t>
+            </a:r>
+          </a:p>
+        </p:txBody>
+      </p:sp>
+      <p:sp>
+        <p:nvSpPr>
+          <p:cNvPr id="4" name="Rectangle: Rounded Corners 3">
+            <a:extLst>
+              <a:ext uri="{FF2B5EF4-FFF2-40B4-BE49-F238E27FC236}">
+                <a16:creationId xmlns:a16="http://schemas.microsoft.com/office/drawing/2014/main" id="{61E8C97A-33FF-46ED-B778-03691E86FFED}"/>
+              </a:ext>
+            </a:extLst>
+          </p:cNvPr>
+          <p:cNvSpPr/>
+          <p:nvPr/>
+        </p:nvSpPr>
+        <p:spPr>
+          <a:xfrm>
+            <a:off x="3353578" y="2062065"/>
+            <a:ext cx="1520890" cy="1243694"/>
+          </a:xfrm>
+          <a:prstGeom prst="roundRect">
+            <a:avLst/>
+          </a:prstGeom>
+        </p:spPr>
+        <p:style>
+          <a:lnRef idx="1">
+            <a:schemeClr val="accent3"/>
+          </a:lnRef>
+          <a:fillRef idx="3">
+            <a:schemeClr val="accent3"/>
+          </a:fillRef>
+          <a:effectRef idx="2">
+            <a:schemeClr val="accent3"/>
+          </a:effectRef>
+          <a:fontRef idx="minor">
+            <a:schemeClr val="lt1"/>
+          </a:fontRef>
+        </p:style>
+        <p:txBody>
+          <a:bodyPr rot="0" spcFirstLastPara="0" vertOverflow="overflow" horzOverflow="overflow" vert="horz" wrap="square" lIns="91440" tIns="45720" rIns="91440" bIns="45720" numCol="1" spcCol="0" rtlCol="0" fromWordArt="0" anchor="ctr" anchorCtr="0" forceAA="0" compatLnSpc="1">
+            <a:prstTxWarp prst="textNoShape">
+              <a:avLst/>
+            </a:prstTxWarp>
+            <a:noAutofit/>
+          </a:bodyPr>
+          <a:lstStyle/>
+          <a:p>
+            <a:pPr algn="ctr"/>
+            <a:r>
+              <a:rPr lang="it-IT" dirty="0">
+                <a:ln w="0"/>
+                <a:solidFill>
+                  <a:schemeClr val="tx1"/>
+                </a:solidFill>
+                <a:effectLst>
+                  <a:outerShdw blurRad="38100" dist="19050" dir="2700000" algn="tl" rotWithShape="0">
+                    <a:schemeClr val="dk1">
+                      <a:alpha val="40000"/>
+                    </a:schemeClr>
+                  </a:outerShdw>
+                </a:effectLst>
+              </a:rPr>
+              <a:t>BFF</a:t>
+            </a:r>
+          </a:p>
+          <a:p>
+            <a:pPr algn="ctr"/>
+            <a:r>
+              <a:rPr lang="it-IT" dirty="0">
+                <a:ln w="0"/>
+                <a:solidFill>
+                  <a:schemeClr val="tx1"/>
+                </a:solidFill>
+                <a:effectLst>
+                  <a:outerShdw blurRad="38100" dist="19050" dir="2700000" algn="tl" rotWithShape="0">
+                    <a:schemeClr val="dk1">
+                      <a:alpha val="40000"/>
+                    </a:schemeClr>
+                  </a:outerShdw>
+                </a:effectLst>
+              </a:rPr>
+              <a:t>Web Apps</a:t>
+            </a:r>
+          </a:p>
+        </p:txBody>
+      </p:sp>
+      <p:sp>
+        <p:nvSpPr>
+          <p:cNvPr id="13" name="Rectangle: Rounded Corners 12">
+            <a:extLst>
+              <a:ext uri="{FF2B5EF4-FFF2-40B4-BE49-F238E27FC236}">
+                <a16:creationId xmlns:a16="http://schemas.microsoft.com/office/drawing/2014/main" id="{E9AF20B5-3E7F-4E0C-A87B-D1DDCDD15E05}"/>
+              </a:ext>
+            </a:extLst>
+          </p:cNvPr>
+          <p:cNvSpPr/>
+          <p:nvPr/>
+        </p:nvSpPr>
+        <p:spPr>
+          <a:xfrm>
+            <a:off x="3353578" y="5440328"/>
+            <a:ext cx="1520890" cy="1243694"/>
+          </a:xfrm>
+          <a:prstGeom prst="roundRect">
+            <a:avLst/>
+          </a:prstGeom>
+        </p:spPr>
+        <p:style>
+          <a:lnRef idx="1">
+            <a:schemeClr val="accent5"/>
+          </a:lnRef>
+          <a:fillRef idx="3">
+            <a:schemeClr val="accent5"/>
+          </a:fillRef>
+          <a:effectRef idx="2">
+            <a:schemeClr val="accent5"/>
+          </a:effectRef>
+          <a:fontRef idx="minor">
+            <a:schemeClr val="lt1"/>
+          </a:fontRef>
+        </p:style>
+        <p:txBody>
+          <a:bodyPr rot="0" spcFirstLastPara="0" vertOverflow="overflow" horzOverflow="overflow" vert="horz" wrap="square" lIns="91440" tIns="45720" rIns="91440" bIns="45720" numCol="1" spcCol="0" rtlCol="0" fromWordArt="0" anchor="ctr" anchorCtr="0" forceAA="0" compatLnSpc="1">
+            <a:prstTxWarp prst="textNoShape">
+              <a:avLst/>
+            </a:prstTxWarp>
+            <a:noAutofit/>
+          </a:bodyPr>
+          <a:lstStyle/>
+          <a:p>
+            <a:pPr algn="ctr"/>
+            <a:r>
+              <a:rPr lang="it-IT" dirty="0">
+                <a:ln w="0"/>
+                <a:solidFill>
+                  <a:schemeClr val="tx1"/>
+                </a:solidFill>
+                <a:effectLst>
+                  <a:outerShdw blurRad="38100" dist="19050" dir="2700000" algn="tl" rotWithShape="0">
+                    <a:schemeClr val="dk1">
+                      <a:alpha val="40000"/>
+                    </a:schemeClr>
+                  </a:outerShdw>
+                </a:effectLst>
+              </a:rPr>
+              <a:t>BFF</a:t>
+            </a:r>
+          </a:p>
+          <a:p>
+            <a:pPr algn="ctr"/>
+            <a:r>
+              <a:rPr lang="it-IT" dirty="0">
+                <a:ln w="0"/>
+                <a:solidFill>
+                  <a:schemeClr val="tx1"/>
+                </a:solidFill>
+                <a:effectLst>
+                  <a:outerShdw blurRad="38100" dist="19050" dir="2700000" algn="tl" rotWithShape="0">
+                    <a:schemeClr val="dk1">
+                      <a:alpha val="40000"/>
+                    </a:schemeClr>
+                  </a:outerShdw>
+                </a:effectLst>
+              </a:rPr>
+              <a:t>Public API</a:t>
+            </a:r>
+          </a:p>
+        </p:txBody>
+      </p:sp>
+      <p:sp>
+        <p:nvSpPr>
+          <p:cNvPr id="14" name="Rectangle: Rounded Corners 13">
+            <a:extLst>
+              <a:ext uri="{FF2B5EF4-FFF2-40B4-BE49-F238E27FC236}">
+                <a16:creationId xmlns:a16="http://schemas.microsoft.com/office/drawing/2014/main" id="{B5207ADC-CDD0-4823-B827-46328C4E4EFA}"/>
+              </a:ext>
+            </a:extLst>
+          </p:cNvPr>
+          <p:cNvSpPr/>
+          <p:nvPr/>
+        </p:nvSpPr>
+        <p:spPr>
+          <a:xfrm>
+            <a:off x="3353578" y="3751196"/>
+            <a:ext cx="1520890" cy="1243694"/>
+          </a:xfrm>
+          <a:prstGeom prst="roundRect">
+            <a:avLst/>
+          </a:prstGeom>
+        </p:spPr>
+        <p:style>
+          <a:lnRef idx="1">
+            <a:schemeClr val="accent6"/>
+          </a:lnRef>
+          <a:fillRef idx="3">
+            <a:schemeClr val="accent6"/>
+          </a:fillRef>
+          <a:effectRef idx="2">
+            <a:schemeClr val="accent6"/>
+          </a:effectRef>
+          <a:fontRef idx="minor">
+            <a:schemeClr val="lt1"/>
+          </a:fontRef>
+        </p:style>
+        <p:txBody>
+          <a:bodyPr rot="0" spcFirstLastPara="0" vertOverflow="overflow" horzOverflow="overflow" vert="horz" wrap="square" lIns="91440" tIns="45720" rIns="91440" bIns="45720" numCol="1" spcCol="0" rtlCol="0" fromWordArt="0" anchor="ctr" anchorCtr="0" forceAA="0" compatLnSpc="1">
+            <a:prstTxWarp prst="textNoShape">
+              <a:avLst/>
+            </a:prstTxWarp>
+            <a:noAutofit/>
+          </a:bodyPr>
+          <a:lstStyle/>
+          <a:p>
+            <a:pPr algn="ctr"/>
+            <a:r>
+              <a:rPr lang="it-IT" dirty="0">
+                <a:ln w="0"/>
+                <a:solidFill>
+                  <a:schemeClr val="tx1"/>
+                </a:solidFill>
+                <a:effectLst>
+                  <a:outerShdw blurRad="38100" dist="19050" dir="2700000" algn="tl" rotWithShape="0">
+                    <a:schemeClr val="dk1">
+                      <a:alpha val="40000"/>
+                    </a:schemeClr>
+                  </a:outerShdw>
+                </a:effectLst>
+              </a:rPr>
+              <a:t>BFF</a:t>
+            </a:r>
+          </a:p>
+          <a:p>
+            <a:pPr algn="ctr"/>
+            <a:r>
+              <a:rPr lang="it-IT" dirty="0">
+                <a:ln w="0"/>
+                <a:solidFill>
+                  <a:schemeClr val="tx1"/>
+                </a:solidFill>
+                <a:effectLst>
+                  <a:outerShdw blurRad="38100" dist="19050" dir="2700000" algn="tl" rotWithShape="0">
+                    <a:schemeClr val="dk1">
+                      <a:alpha val="40000"/>
+                    </a:schemeClr>
+                  </a:outerShdw>
+                </a:effectLst>
+              </a:rPr>
+              <a:t>Mobile Apps</a:t>
+            </a:r>
+          </a:p>
+        </p:txBody>
+      </p:sp>
+      <p:sp>
+        <p:nvSpPr>
+          <p:cNvPr id="15" name="Oval 14">
+            <a:extLst>
+              <a:ext uri="{FF2B5EF4-FFF2-40B4-BE49-F238E27FC236}">
+                <a16:creationId xmlns:a16="http://schemas.microsoft.com/office/drawing/2014/main" id="{8FD3EC83-F1C4-43FC-85B5-87D9019C494E}"/>
+              </a:ext>
+            </a:extLst>
+          </p:cNvPr>
+          <p:cNvSpPr/>
+          <p:nvPr/>
+        </p:nvSpPr>
+        <p:spPr>
+          <a:xfrm>
+            <a:off x="6699379" y="3600399"/>
+            <a:ext cx="1800808" cy="1508547"/>
+          </a:xfrm>
+          <a:prstGeom prst="ellipse">
+            <a:avLst/>
+          </a:prstGeom>
+        </p:spPr>
+        <p:style>
+          <a:lnRef idx="1">
+            <a:schemeClr val="accent2"/>
+          </a:lnRef>
+          <a:fillRef idx="3">
+            <a:schemeClr val="accent2"/>
+          </a:fillRef>
+          <a:effectRef idx="2">
+            <a:schemeClr val="accent2"/>
+          </a:effectRef>
+          <a:fontRef idx="minor">
+            <a:schemeClr val="lt1"/>
+          </a:fontRef>
+        </p:style>
+        <p:txBody>
+          <a:bodyPr rot="0" spcFirstLastPara="0" vertOverflow="overflow" horzOverflow="overflow" vert="horz" wrap="square" lIns="91440" tIns="45720" rIns="91440" bIns="45720" numCol="1" spcCol="0" rtlCol="0" fromWordArt="0" anchor="ctr" anchorCtr="0" forceAA="0" compatLnSpc="1">
+            <a:prstTxWarp prst="textNoShape">
+              <a:avLst/>
+            </a:prstTxWarp>
+            <a:noAutofit/>
+          </a:bodyPr>
+          <a:lstStyle/>
+          <a:p>
+            <a:pPr algn="ctr"/>
+            <a:r>
+              <a:rPr lang="it-IT" dirty="0">
+                <a:ln w="0"/>
+                <a:solidFill>
+                  <a:schemeClr val="tx1"/>
+                </a:solidFill>
+                <a:effectLst>
+                  <a:outerShdw blurRad="38100" dist="19050" dir="2700000" algn="tl" rotWithShape="0">
+                    <a:schemeClr val="dk1">
+                      <a:alpha val="40000"/>
+                    </a:schemeClr>
+                  </a:outerShdw>
+                </a:effectLst>
+              </a:rPr>
+              <a:t>SVC</a:t>
+            </a:r>
+          </a:p>
+        </p:txBody>
+      </p:sp>
+      <p:cxnSp>
+        <p:nvCxnSpPr>
+          <p:cNvPr id="17" name="Straight Arrow Connector 16">
+            <a:extLst>
+              <a:ext uri="{FF2B5EF4-FFF2-40B4-BE49-F238E27FC236}">
+                <a16:creationId xmlns:a16="http://schemas.microsoft.com/office/drawing/2014/main" id="{D7A7F9B8-3094-48DC-A4CE-CA7252981EF7}"/>
+              </a:ext>
+            </a:extLst>
+          </p:cNvPr>
+          <p:cNvCxnSpPr>
+            <a:stCxn id="3" idx="3"/>
+            <a:endCxn id="4" idx="1"/>
+          </p:cNvCxnSpPr>
+          <p:nvPr/>
+        </p:nvCxnSpPr>
+        <p:spPr>
+          <a:xfrm>
+            <a:off x="2020081" y="2365746"/>
+            <a:ext cx="1333497" cy="318166"/>
+          </a:xfrm>
+          <a:prstGeom prst="straightConnector1">
+            <a:avLst/>
+          </a:prstGeom>
+          <a:ln>
+            <a:tailEnd type="triangle"/>
+          </a:ln>
+        </p:spPr>
+        <p:style>
+          <a:lnRef idx="2">
+            <a:schemeClr val="dk1"/>
+          </a:lnRef>
+          <a:fillRef idx="0">
+            <a:schemeClr val="dk1"/>
+          </a:fillRef>
+          <a:effectRef idx="1">
+            <a:schemeClr val="dk1"/>
+          </a:effectRef>
+          <a:fontRef idx="minor">
+            <a:schemeClr val="tx1"/>
+          </a:fontRef>
+        </p:style>
+      </p:cxnSp>
+      <p:cxnSp>
+        <p:nvCxnSpPr>
+          <p:cNvPr id="18" name="Straight Arrow Connector 17">
+            <a:extLst>
+              <a:ext uri="{FF2B5EF4-FFF2-40B4-BE49-F238E27FC236}">
+                <a16:creationId xmlns:a16="http://schemas.microsoft.com/office/drawing/2014/main" id="{BC62D5E6-D892-4A73-AF5D-C8E33CDE25F1}"/>
+              </a:ext>
+            </a:extLst>
+          </p:cNvPr>
+          <p:cNvCxnSpPr>
+            <a:cxnSpLocks/>
+            <a:stCxn id="8" idx="3"/>
+            <a:endCxn id="4" idx="1"/>
+          </p:cNvCxnSpPr>
+          <p:nvPr/>
+        </p:nvCxnSpPr>
+        <p:spPr>
+          <a:xfrm flipV="1">
+            <a:off x="2020081" y="2683912"/>
+            <a:ext cx="1333497" cy="477658"/>
+          </a:xfrm>
+          <a:prstGeom prst="straightConnector1">
+            <a:avLst/>
+          </a:prstGeom>
+          <a:ln>
+            <a:tailEnd type="triangle"/>
+          </a:ln>
+        </p:spPr>
+        <p:style>
+          <a:lnRef idx="2">
+            <a:schemeClr val="dk1"/>
+          </a:lnRef>
+          <a:fillRef idx="0">
+            <a:schemeClr val="dk1"/>
+          </a:fillRef>
+          <a:effectRef idx="1">
+            <a:schemeClr val="dk1"/>
+          </a:effectRef>
+          <a:fontRef idx="minor">
+            <a:schemeClr val="tx1"/>
+          </a:fontRef>
+        </p:style>
+      </p:cxnSp>
+      <p:cxnSp>
+        <p:nvCxnSpPr>
+          <p:cNvPr id="21" name="Straight Arrow Connector 20">
+            <a:extLst>
+              <a:ext uri="{FF2B5EF4-FFF2-40B4-BE49-F238E27FC236}">
+                <a16:creationId xmlns:a16="http://schemas.microsoft.com/office/drawing/2014/main" id="{F860207C-37FD-46FC-9708-835AFD9DF0C6}"/>
+              </a:ext>
+            </a:extLst>
+          </p:cNvPr>
+          <p:cNvCxnSpPr>
+            <a:cxnSpLocks/>
+            <a:stCxn id="9" idx="3"/>
+            <a:endCxn id="14" idx="1"/>
+          </p:cNvCxnSpPr>
+          <p:nvPr/>
+        </p:nvCxnSpPr>
+        <p:spPr>
+          <a:xfrm>
+            <a:off x="2006079" y="4228854"/>
+            <a:ext cx="1347499" cy="144189"/>
+          </a:xfrm>
+          <a:prstGeom prst="straightConnector1">
+            <a:avLst/>
+          </a:prstGeom>
+          <a:ln>
+            <a:tailEnd type="triangle"/>
+          </a:ln>
+        </p:spPr>
+        <p:style>
+          <a:lnRef idx="2">
+            <a:schemeClr val="dk1"/>
+          </a:lnRef>
+          <a:fillRef idx="0">
+            <a:schemeClr val="dk1"/>
+          </a:fillRef>
+          <a:effectRef idx="1">
+            <a:schemeClr val="dk1"/>
+          </a:effectRef>
+          <a:fontRef idx="minor">
+            <a:schemeClr val="tx1"/>
+          </a:fontRef>
+        </p:style>
+      </p:cxnSp>
+      <p:cxnSp>
+        <p:nvCxnSpPr>
+          <p:cNvPr id="24" name="Straight Arrow Connector 23">
+            <a:extLst>
+              <a:ext uri="{FF2B5EF4-FFF2-40B4-BE49-F238E27FC236}">
+                <a16:creationId xmlns:a16="http://schemas.microsoft.com/office/drawing/2014/main" id="{4E3D44B4-7F76-4B19-BA8D-CCEFF3DE783E}"/>
+              </a:ext>
+            </a:extLst>
+          </p:cNvPr>
+          <p:cNvCxnSpPr>
+            <a:cxnSpLocks/>
+            <a:stCxn id="10" idx="3"/>
+            <a:endCxn id="14" idx="1"/>
+          </p:cNvCxnSpPr>
+          <p:nvPr/>
+        </p:nvCxnSpPr>
+        <p:spPr>
+          <a:xfrm flipV="1">
+            <a:off x="2006079" y="4373043"/>
+            <a:ext cx="1347499" cy="658243"/>
+          </a:xfrm>
+          <a:prstGeom prst="straightConnector1">
+            <a:avLst/>
+          </a:prstGeom>
+          <a:ln>
+            <a:tailEnd type="triangle"/>
+          </a:ln>
+        </p:spPr>
+        <p:style>
+          <a:lnRef idx="2">
+            <a:schemeClr val="dk1"/>
+          </a:lnRef>
+          <a:fillRef idx="0">
+            <a:schemeClr val="dk1"/>
+          </a:fillRef>
+          <a:effectRef idx="1">
+            <a:schemeClr val="dk1"/>
+          </a:effectRef>
+          <a:fontRef idx="minor">
+            <a:schemeClr val="tx1"/>
+          </a:fontRef>
+        </p:style>
+      </p:cxnSp>
+      <p:cxnSp>
+        <p:nvCxnSpPr>
+          <p:cNvPr id="27" name="Straight Arrow Connector 26">
+            <a:extLst>
+              <a:ext uri="{FF2B5EF4-FFF2-40B4-BE49-F238E27FC236}">
+                <a16:creationId xmlns:a16="http://schemas.microsoft.com/office/drawing/2014/main" id="{2142D1C1-CABD-403D-A907-AFAFFF6ECAD4}"/>
+              </a:ext>
+            </a:extLst>
+          </p:cNvPr>
+          <p:cNvCxnSpPr>
+            <a:cxnSpLocks/>
+            <a:stCxn id="11" idx="3"/>
+            <a:endCxn id="13" idx="1"/>
+          </p:cNvCxnSpPr>
+          <p:nvPr/>
+        </p:nvCxnSpPr>
+        <p:spPr>
+          <a:xfrm flipV="1">
+            <a:off x="1992077" y="6062175"/>
+            <a:ext cx="1361501" cy="86988"/>
+          </a:xfrm>
+          <a:prstGeom prst="straightConnector1">
+            <a:avLst/>
+          </a:prstGeom>
+          <a:ln>
+            <a:tailEnd type="triangle"/>
+          </a:ln>
+        </p:spPr>
+        <p:style>
+          <a:lnRef idx="2">
+            <a:schemeClr val="dk1"/>
+          </a:lnRef>
+          <a:fillRef idx="0">
+            <a:schemeClr val="dk1"/>
+          </a:fillRef>
+          <a:effectRef idx="1">
+            <a:schemeClr val="dk1"/>
+          </a:effectRef>
+          <a:fontRef idx="minor">
+            <a:schemeClr val="tx1"/>
+          </a:fontRef>
+        </p:style>
+      </p:cxnSp>
+      <p:cxnSp>
+        <p:nvCxnSpPr>
+          <p:cNvPr id="30" name="Straight Arrow Connector 29">
+            <a:extLst>
+              <a:ext uri="{FF2B5EF4-FFF2-40B4-BE49-F238E27FC236}">
+                <a16:creationId xmlns:a16="http://schemas.microsoft.com/office/drawing/2014/main" id="{EEE9540E-D928-4764-B0BD-F1C191155D31}"/>
+              </a:ext>
+            </a:extLst>
+          </p:cNvPr>
+          <p:cNvCxnSpPr>
+            <a:cxnSpLocks/>
+            <a:endCxn id="15" idx="1"/>
+          </p:cNvCxnSpPr>
+          <p:nvPr/>
+        </p:nvCxnSpPr>
+        <p:spPr>
+          <a:xfrm>
+            <a:off x="4874468" y="2710978"/>
+            <a:ext cx="2088633" cy="1110343"/>
+          </a:xfrm>
+          <a:prstGeom prst="straightConnector1">
+            <a:avLst/>
+          </a:prstGeom>
+          <a:ln>
+            <a:tailEnd type="triangle"/>
+          </a:ln>
+        </p:spPr>
+        <p:style>
+          <a:lnRef idx="2">
+            <a:schemeClr val="dk1"/>
+          </a:lnRef>
+          <a:fillRef idx="0">
+            <a:schemeClr val="dk1"/>
+          </a:fillRef>
+          <a:effectRef idx="1">
+            <a:schemeClr val="dk1"/>
+          </a:effectRef>
+          <a:fontRef idx="minor">
+            <a:schemeClr val="tx1"/>
+          </a:fontRef>
+        </p:style>
+      </p:cxnSp>
+      <p:cxnSp>
+        <p:nvCxnSpPr>
+          <p:cNvPr id="33" name="Straight Arrow Connector 32">
+            <a:extLst>
+              <a:ext uri="{FF2B5EF4-FFF2-40B4-BE49-F238E27FC236}">
+                <a16:creationId xmlns:a16="http://schemas.microsoft.com/office/drawing/2014/main" id="{735F16B8-5BB7-44FC-A8A4-95B8F5E200F2}"/>
+              </a:ext>
+            </a:extLst>
+          </p:cNvPr>
+          <p:cNvCxnSpPr>
+            <a:cxnSpLocks/>
+            <a:stCxn id="14" idx="3"/>
+            <a:endCxn id="15" idx="2"/>
+          </p:cNvCxnSpPr>
+          <p:nvPr/>
+        </p:nvCxnSpPr>
+        <p:spPr>
+          <a:xfrm flipV="1">
+            <a:off x="4874468" y="4354673"/>
+            <a:ext cx="1824911" cy="18370"/>
+          </a:xfrm>
+          <a:prstGeom prst="straightConnector1">
+            <a:avLst/>
+          </a:prstGeom>
+          <a:ln>
+            <a:tailEnd type="triangle"/>
+          </a:ln>
+        </p:spPr>
+        <p:style>
+          <a:lnRef idx="2">
+            <a:schemeClr val="dk1"/>
+          </a:lnRef>
+          <a:fillRef idx="0">
+            <a:schemeClr val="dk1"/>
+          </a:fillRef>
+          <a:effectRef idx="1">
+            <a:schemeClr val="dk1"/>
+          </a:effectRef>
+          <a:fontRef idx="minor">
+            <a:schemeClr val="tx1"/>
+          </a:fontRef>
+        </p:style>
+      </p:cxnSp>
+      <p:cxnSp>
+        <p:nvCxnSpPr>
+          <p:cNvPr id="36" name="Straight Arrow Connector 35">
+            <a:extLst>
+              <a:ext uri="{FF2B5EF4-FFF2-40B4-BE49-F238E27FC236}">
+                <a16:creationId xmlns:a16="http://schemas.microsoft.com/office/drawing/2014/main" id="{0F284597-9800-42EF-8C93-07095DEF53D2}"/>
+              </a:ext>
+            </a:extLst>
+          </p:cNvPr>
+          <p:cNvCxnSpPr>
+            <a:cxnSpLocks/>
+            <a:stCxn id="13" idx="3"/>
+            <a:endCxn id="15" idx="3"/>
+          </p:cNvCxnSpPr>
+          <p:nvPr/>
+        </p:nvCxnSpPr>
+        <p:spPr>
+          <a:xfrm flipV="1">
+            <a:off x="4874468" y="4888024"/>
+            <a:ext cx="2088633" cy="1174151"/>
+          </a:xfrm>
+          <a:prstGeom prst="straightConnector1">
+            <a:avLst/>
+          </a:prstGeom>
+          <a:ln>
+            <a:tailEnd type="triangle"/>
+          </a:ln>
+        </p:spPr>
+        <p:style>
+          <a:lnRef idx="2">
+            <a:schemeClr val="dk1"/>
+          </a:lnRef>
+          <a:fillRef idx="0">
+            <a:schemeClr val="dk1"/>
+          </a:fillRef>
+          <a:effectRef idx="1">
+            <a:schemeClr val="dk1"/>
+          </a:effectRef>
+          <a:fontRef idx="minor">
+            <a:schemeClr val="tx1"/>
+          </a:fontRef>
+        </p:style>
+      </p:cxnSp>
     </p:spTree>
     <p:extLst>
       <p:ext uri="{BB962C8B-B14F-4D97-AF65-F5344CB8AC3E}">
-        <p14:creationId xmlns:p14="http://schemas.microsoft.com/office/powerpoint/2010/main" val="2249306102"/>
+        <p14:creationId xmlns:p14="http://schemas.microsoft.com/office/powerpoint/2010/main" val="3519078401"/>
       </p:ext>
     </p:extLst>
   </p:cSld>
   <p:clrMapOvr>
     <a:masterClrMapping/>
   </p:clrMapOvr>
+  <p:timing>
+    <p:tnLst>
+      <p:par>
+        <p:cTn id="1" dur="indefinite" restart="never" nodeType="tmRoot">
+          <p:childTnLst>
+            <p:seq concurrent="1" nextAc="seek">
+              <p:cTn id="2" dur="indefinite" nodeType="mainSeq">
+                <p:childTnLst>
+                  <p:par>
+                    <p:cTn id="3" fill="hold">
+                      <p:stCondLst>
+                        <p:cond delay="indefinite"/>
+                      </p:stCondLst>
+                      <p:childTnLst>
+                        <p:par>
+                          <p:cTn id="4" fill="hold">
+                            <p:stCondLst>
+                              <p:cond delay="0"/>
+                            </p:stCondLst>
+                            <p:childTnLst>
+                              <p:par>
+                                <p:cTn id="5" presetID="10" presetClass="entr" presetSubtype="0" fill="hold" grpId="0" nodeType="clickEffect">
+                                  <p:stCondLst>
+                                    <p:cond delay="0"/>
+                                  </p:stCondLst>
+                                  <p:childTnLst>
+                                    <p:set>
+                                      <p:cBhvr>
+                                        <p:cTn id="6" dur="1" fill="hold">
+                                          <p:stCondLst>
+                                            <p:cond delay="0"/>
+                                          </p:stCondLst>
+                                        </p:cTn>
+                                        <p:tgtEl>
+                                          <p:spTgt spid="3"/>
+                                        </p:tgtEl>
+                                        <p:attrNameLst>
+                                          <p:attrName>style.visibility</p:attrName>
+                                        </p:attrNameLst>
+                                      </p:cBhvr>
+                                      <p:to>
+                                        <p:strVal val="visible"/>
+                                      </p:to>
+                                    </p:set>
+                                    <p:animEffect transition="in" filter="fade">
+                                      <p:cBhvr>
+                                        <p:cTn id="7" dur="500"/>
+                                        <p:tgtEl>
+                                          <p:spTgt spid="3"/>
+                                        </p:tgtEl>
+                                      </p:cBhvr>
+                                    </p:animEffect>
+                                  </p:childTnLst>
+                                </p:cTn>
+                              </p:par>
+                            </p:childTnLst>
+                          </p:cTn>
+                        </p:par>
+                        <p:par>
+                          <p:cTn id="8" fill="hold">
+                            <p:stCondLst>
+                              <p:cond delay="500"/>
+                            </p:stCondLst>
+                            <p:childTnLst>
+                              <p:par>
+                                <p:cTn id="9" presetID="10" presetClass="entr" presetSubtype="0" fill="hold" grpId="0" nodeType="afterEffect">
+                                  <p:stCondLst>
+                                    <p:cond delay="0"/>
+                                  </p:stCondLst>
+                                  <p:childTnLst>
+                                    <p:set>
+                                      <p:cBhvr>
+                                        <p:cTn id="10" dur="1" fill="hold">
+                                          <p:stCondLst>
+                                            <p:cond delay="0"/>
+                                          </p:stCondLst>
+                                        </p:cTn>
+                                        <p:tgtEl>
+                                          <p:spTgt spid="8"/>
+                                        </p:tgtEl>
+                                        <p:attrNameLst>
+                                          <p:attrName>style.visibility</p:attrName>
+                                        </p:attrNameLst>
+                                      </p:cBhvr>
+                                      <p:to>
+                                        <p:strVal val="visible"/>
+                                      </p:to>
+                                    </p:set>
+                                    <p:animEffect transition="in" filter="fade">
+                                      <p:cBhvr>
+                                        <p:cTn id="11" dur="500"/>
+                                        <p:tgtEl>
+                                          <p:spTgt spid="8"/>
+                                        </p:tgtEl>
+                                      </p:cBhvr>
+                                    </p:animEffect>
+                                  </p:childTnLst>
+                                </p:cTn>
+                              </p:par>
+                            </p:childTnLst>
+                          </p:cTn>
+                        </p:par>
+                      </p:childTnLst>
+                    </p:cTn>
+                  </p:par>
+                  <p:par>
+                    <p:cTn id="12" fill="hold">
+                      <p:stCondLst>
+                        <p:cond delay="indefinite"/>
+                      </p:stCondLst>
+                      <p:childTnLst>
+                        <p:par>
+                          <p:cTn id="13" fill="hold">
+                            <p:stCondLst>
+                              <p:cond delay="0"/>
+                            </p:stCondLst>
+                            <p:childTnLst>
+                              <p:par>
+                                <p:cTn id="14" presetID="10" presetClass="entr" presetSubtype="0" fill="hold" grpId="0" nodeType="clickEffect">
+                                  <p:stCondLst>
+                                    <p:cond delay="0"/>
+                                  </p:stCondLst>
+                                  <p:childTnLst>
+                                    <p:set>
+                                      <p:cBhvr>
+                                        <p:cTn id="15" dur="1" fill="hold">
+                                          <p:stCondLst>
+                                            <p:cond delay="0"/>
+                                          </p:stCondLst>
+                                        </p:cTn>
+                                        <p:tgtEl>
+                                          <p:spTgt spid="9"/>
+                                        </p:tgtEl>
+                                        <p:attrNameLst>
+                                          <p:attrName>style.visibility</p:attrName>
+                                        </p:attrNameLst>
+                                      </p:cBhvr>
+                                      <p:to>
+                                        <p:strVal val="visible"/>
+                                      </p:to>
+                                    </p:set>
+                                    <p:animEffect transition="in" filter="fade">
+                                      <p:cBhvr>
+                                        <p:cTn id="16" dur="500"/>
+                                        <p:tgtEl>
+                                          <p:spTgt spid="9"/>
+                                        </p:tgtEl>
+                                      </p:cBhvr>
+                                    </p:animEffect>
+                                  </p:childTnLst>
+                                </p:cTn>
+                              </p:par>
+                            </p:childTnLst>
+                          </p:cTn>
+                        </p:par>
+                        <p:par>
+                          <p:cTn id="17" fill="hold">
+                            <p:stCondLst>
+                              <p:cond delay="500"/>
+                            </p:stCondLst>
+                            <p:childTnLst>
+                              <p:par>
+                                <p:cTn id="18" presetID="10" presetClass="entr" presetSubtype="0" fill="hold" grpId="0" nodeType="afterEffect">
+                                  <p:stCondLst>
+                                    <p:cond delay="0"/>
+                                  </p:stCondLst>
+                                  <p:childTnLst>
+                                    <p:set>
+                                      <p:cBhvr>
+                                        <p:cTn id="19" dur="1" fill="hold">
+                                          <p:stCondLst>
+                                            <p:cond delay="0"/>
+                                          </p:stCondLst>
+                                        </p:cTn>
+                                        <p:tgtEl>
+                                          <p:spTgt spid="10"/>
+                                        </p:tgtEl>
+                                        <p:attrNameLst>
+                                          <p:attrName>style.visibility</p:attrName>
+                                        </p:attrNameLst>
+                                      </p:cBhvr>
+                                      <p:to>
+                                        <p:strVal val="visible"/>
+                                      </p:to>
+                                    </p:set>
+                                    <p:animEffect transition="in" filter="fade">
+                                      <p:cBhvr>
+                                        <p:cTn id="20" dur="500"/>
+                                        <p:tgtEl>
+                                          <p:spTgt spid="10"/>
+                                        </p:tgtEl>
+                                      </p:cBhvr>
+                                    </p:animEffect>
+                                  </p:childTnLst>
+                                </p:cTn>
+                              </p:par>
+                            </p:childTnLst>
+                          </p:cTn>
+                        </p:par>
+                      </p:childTnLst>
+                    </p:cTn>
+                  </p:par>
+                  <p:par>
+                    <p:cTn id="21" fill="hold">
+                      <p:stCondLst>
+                        <p:cond delay="indefinite"/>
+                      </p:stCondLst>
+                      <p:childTnLst>
+                        <p:par>
+                          <p:cTn id="22" fill="hold">
+                            <p:stCondLst>
+                              <p:cond delay="0"/>
+                            </p:stCondLst>
+                            <p:childTnLst>
+                              <p:par>
+                                <p:cTn id="23" presetID="10" presetClass="entr" presetSubtype="0" fill="hold" grpId="0" nodeType="clickEffect">
+                                  <p:stCondLst>
+                                    <p:cond delay="0"/>
+                                  </p:stCondLst>
+                                  <p:childTnLst>
+                                    <p:set>
+                                      <p:cBhvr>
+                                        <p:cTn id="24" dur="1" fill="hold">
+                                          <p:stCondLst>
+                                            <p:cond delay="0"/>
+                                          </p:stCondLst>
+                                        </p:cTn>
+                                        <p:tgtEl>
+                                          <p:spTgt spid="11"/>
+                                        </p:tgtEl>
+                                        <p:attrNameLst>
+                                          <p:attrName>style.visibility</p:attrName>
+                                        </p:attrNameLst>
+                                      </p:cBhvr>
+                                      <p:to>
+                                        <p:strVal val="visible"/>
+                                      </p:to>
+                                    </p:set>
+                                    <p:animEffect transition="in" filter="fade">
+                                      <p:cBhvr>
+                                        <p:cTn id="25" dur="500"/>
+                                        <p:tgtEl>
+                                          <p:spTgt spid="11"/>
+                                        </p:tgtEl>
+                                      </p:cBhvr>
+                                    </p:animEffect>
+                                  </p:childTnLst>
+                                </p:cTn>
+                              </p:par>
+                            </p:childTnLst>
+                          </p:cTn>
+                        </p:par>
+                      </p:childTnLst>
+                    </p:cTn>
+                  </p:par>
+                  <p:par>
+                    <p:cTn id="26" fill="hold">
+                      <p:stCondLst>
+                        <p:cond delay="indefinite"/>
+                      </p:stCondLst>
+                      <p:childTnLst>
+                        <p:par>
+                          <p:cTn id="27" fill="hold">
+                            <p:stCondLst>
+                              <p:cond delay="0"/>
+                            </p:stCondLst>
+                            <p:childTnLst>
+                              <p:par>
+                                <p:cTn id="28" presetID="1" presetClass="entr" presetSubtype="0" fill="hold" grpId="0" nodeType="clickEffect">
+                                  <p:stCondLst>
+                                    <p:cond delay="0"/>
+                                  </p:stCondLst>
+                                  <p:childTnLst>
+                                    <p:set>
+                                      <p:cBhvr>
+                                        <p:cTn id="29" dur="1" fill="hold">
+                                          <p:stCondLst>
+                                            <p:cond delay="0"/>
+                                          </p:stCondLst>
+                                        </p:cTn>
+                                        <p:tgtEl>
+                                          <p:spTgt spid="15"/>
+                                        </p:tgtEl>
+                                        <p:attrNameLst>
+                                          <p:attrName>style.visibility</p:attrName>
+                                        </p:attrNameLst>
+                                      </p:cBhvr>
+                                      <p:to>
+                                        <p:strVal val="visible"/>
+                                      </p:to>
+                                    </p:set>
+                                  </p:childTnLst>
+                                </p:cTn>
+                              </p:par>
+                            </p:childTnLst>
+                          </p:cTn>
+                        </p:par>
+                      </p:childTnLst>
+                    </p:cTn>
+                  </p:par>
+                  <p:par>
+                    <p:cTn id="30" fill="hold">
+                      <p:stCondLst>
+                        <p:cond delay="indefinite"/>
+                      </p:stCondLst>
+                      <p:childTnLst>
+                        <p:par>
+                          <p:cTn id="31" fill="hold">
+                            <p:stCondLst>
+                              <p:cond delay="0"/>
+                            </p:stCondLst>
+                            <p:childTnLst>
+                              <p:par>
+                                <p:cTn id="32" presetID="10" presetClass="entr" presetSubtype="0" fill="hold" grpId="0" nodeType="clickEffect">
+                                  <p:stCondLst>
+                                    <p:cond delay="0"/>
+                                  </p:stCondLst>
+                                  <p:childTnLst>
+                                    <p:set>
+                                      <p:cBhvr>
+                                        <p:cTn id="33" dur="1" fill="hold">
+                                          <p:stCondLst>
+                                            <p:cond delay="0"/>
+                                          </p:stCondLst>
+                                        </p:cTn>
+                                        <p:tgtEl>
+                                          <p:spTgt spid="4"/>
+                                        </p:tgtEl>
+                                        <p:attrNameLst>
+                                          <p:attrName>style.visibility</p:attrName>
+                                        </p:attrNameLst>
+                                      </p:cBhvr>
+                                      <p:to>
+                                        <p:strVal val="visible"/>
+                                      </p:to>
+                                    </p:set>
+                                    <p:animEffect transition="in" filter="fade">
+                                      <p:cBhvr>
+                                        <p:cTn id="34" dur="500"/>
+                                        <p:tgtEl>
+                                          <p:spTgt spid="4"/>
+                                        </p:tgtEl>
+                                      </p:cBhvr>
+                                    </p:animEffect>
+                                  </p:childTnLst>
+                                </p:cTn>
+                              </p:par>
+                            </p:childTnLst>
+                          </p:cTn>
+                        </p:par>
+                        <p:par>
+                          <p:cTn id="35" fill="hold">
+                            <p:stCondLst>
+                              <p:cond delay="500"/>
+                            </p:stCondLst>
+                            <p:childTnLst>
+                              <p:par>
+                                <p:cTn id="36" presetID="10" presetClass="entr" presetSubtype="0" fill="hold" nodeType="afterEffect">
+                                  <p:stCondLst>
+                                    <p:cond delay="0"/>
+                                  </p:stCondLst>
+                                  <p:childTnLst>
+                                    <p:set>
+                                      <p:cBhvr>
+                                        <p:cTn id="37" dur="1" fill="hold">
+                                          <p:stCondLst>
+                                            <p:cond delay="0"/>
+                                          </p:stCondLst>
+                                        </p:cTn>
+                                        <p:tgtEl>
+                                          <p:spTgt spid="17"/>
+                                        </p:tgtEl>
+                                        <p:attrNameLst>
+                                          <p:attrName>style.visibility</p:attrName>
+                                        </p:attrNameLst>
+                                      </p:cBhvr>
+                                      <p:to>
+                                        <p:strVal val="visible"/>
+                                      </p:to>
+                                    </p:set>
+                                    <p:animEffect transition="in" filter="fade">
+                                      <p:cBhvr>
+                                        <p:cTn id="38" dur="500"/>
+                                        <p:tgtEl>
+                                          <p:spTgt spid="17"/>
+                                        </p:tgtEl>
+                                      </p:cBhvr>
+                                    </p:animEffect>
+                                  </p:childTnLst>
+                                </p:cTn>
+                              </p:par>
+                            </p:childTnLst>
+                          </p:cTn>
+                        </p:par>
+                        <p:par>
+                          <p:cTn id="39" fill="hold">
+                            <p:stCondLst>
+                              <p:cond delay="1000"/>
+                            </p:stCondLst>
+                            <p:childTnLst>
+                              <p:par>
+                                <p:cTn id="40" presetID="10" presetClass="entr" presetSubtype="0" fill="hold" nodeType="afterEffect">
+                                  <p:stCondLst>
+                                    <p:cond delay="0"/>
+                                  </p:stCondLst>
+                                  <p:childTnLst>
+                                    <p:set>
+                                      <p:cBhvr>
+                                        <p:cTn id="41" dur="1" fill="hold">
+                                          <p:stCondLst>
+                                            <p:cond delay="0"/>
+                                          </p:stCondLst>
+                                        </p:cTn>
+                                        <p:tgtEl>
+                                          <p:spTgt spid="18"/>
+                                        </p:tgtEl>
+                                        <p:attrNameLst>
+                                          <p:attrName>style.visibility</p:attrName>
+                                        </p:attrNameLst>
+                                      </p:cBhvr>
+                                      <p:to>
+                                        <p:strVal val="visible"/>
+                                      </p:to>
+                                    </p:set>
+                                    <p:animEffect transition="in" filter="fade">
+                                      <p:cBhvr>
+                                        <p:cTn id="42" dur="500"/>
+                                        <p:tgtEl>
+                                          <p:spTgt spid="18"/>
+                                        </p:tgtEl>
+                                      </p:cBhvr>
+                                    </p:animEffect>
+                                  </p:childTnLst>
+                                </p:cTn>
+                              </p:par>
+                            </p:childTnLst>
+                          </p:cTn>
+                        </p:par>
+                        <p:par>
+                          <p:cTn id="43" fill="hold">
+                            <p:stCondLst>
+                              <p:cond delay="1500"/>
+                            </p:stCondLst>
+                            <p:childTnLst>
+                              <p:par>
+                                <p:cTn id="44" presetID="10" presetClass="entr" presetSubtype="0" fill="hold" nodeType="afterEffect">
+                                  <p:stCondLst>
+                                    <p:cond delay="0"/>
+                                  </p:stCondLst>
+                                  <p:childTnLst>
+                                    <p:set>
+                                      <p:cBhvr>
+                                        <p:cTn id="45" dur="1" fill="hold">
+                                          <p:stCondLst>
+                                            <p:cond delay="0"/>
+                                          </p:stCondLst>
+                                        </p:cTn>
+                                        <p:tgtEl>
+                                          <p:spTgt spid="30"/>
+                                        </p:tgtEl>
+                                        <p:attrNameLst>
+                                          <p:attrName>style.visibility</p:attrName>
+                                        </p:attrNameLst>
+                                      </p:cBhvr>
+                                      <p:to>
+                                        <p:strVal val="visible"/>
+                                      </p:to>
+                                    </p:set>
+                                    <p:animEffect transition="in" filter="fade">
+                                      <p:cBhvr>
+                                        <p:cTn id="46" dur="500"/>
+                                        <p:tgtEl>
+                                          <p:spTgt spid="30"/>
+                                        </p:tgtEl>
+                                      </p:cBhvr>
+                                    </p:animEffect>
+                                  </p:childTnLst>
+                                </p:cTn>
+                              </p:par>
+                            </p:childTnLst>
+                          </p:cTn>
+                        </p:par>
+                      </p:childTnLst>
+                    </p:cTn>
+                  </p:par>
+                  <p:par>
+                    <p:cTn id="47" fill="hold">
+                      <p:stCondLst>
+                        <p:cond delay="indefinite"/>
+                      </p:stCondLst>
+                      <p:childTnLst>
+                        <p:par>
+                          <p:cTn id="48" fill="hold">
+                            <p:stCondLst>
+                              <p:cond delay="0"/>
+                            </p:stCondLst>
+                            <p:childTnLst>
+                              <p:par>
+                                <p:cTn id="49" presetID="10" presetClass="entr" presetSubtype="0" fill="hold" grpId="0" nodeType="clickEffect">
+                                  <p:stCondLst>
+                                    <p:cond delay="0"/>
+                                  </p:stCondLst>
+                                  <p:childTnLst>
+                                    <p:set>
+                                      <p:cBhvr>
+                                        <p:cTn id="50" dur="1" fill="hold">
+                                          <p:stCondLst>
+                                            <p:cond delay="0"/>
+                                          </p:stCondLst>
+                                        </p:cTn>
+                                        <p:tgtEl>
+                                          <p:spTgt spid="14"/>
+                                        </p:tgtEl>
+                                        <p:attrNameLst>
+                                          <p:attrName>style.visibility</p:attrName>
+                                        </p:attrNameLst>
+                                      </p:cBhvr>
+                                      <p:to>
+                                        <p:strVal val="visible"/>
+                                      </p:to>
+                                    </p:set>
+                                    <p:animEffect transition="in" filter="fade">
+                                      <p:cBhvr>
+                                        <p:cTn id="51" dur="500"/>
+                                        <p:tgtEl>
+                                          <p:spTgt spid="14"/>
+                                        </p:tgtEl>
+                                      </p:cBhvr>
+                                    </p:animEffect>
+                                  </p:childTnLst>
+                                </p:cTn>
+                              </p:par>
+                            </p:childTnLst>
+                          </p:cTn>
+                        </p:par>
+                        <p:par>
+                          <p:cTn id="52" fill="hold">
+                            <p:stCondLst>
+                              <p:cond delay="500"/>
+                            </p:stCondLst>
+                            <p:childTnLst>
+                              <p:par>
+                                <p:cTn id="53" presetID="10" presetClass="entr" presetSubtype="0" fill="hold" nodeType="afterEffect">
+                                  <p:stCondLst>
+                                    <p:cond delay="0"/>
+                                  </p:stCondLst>
+                                  <p:childTnLst>
+                                    <p:set>
+                                      <p:cBhvr>
+                                        <p:cTn id="54" dur="1" fill="hold">
+                                          <p:stCondLst>
+                                            <p:cond delay="0"/>
+                                          </p:stCondLst>
+                                        </p:cTn>
+                                        <p:tgtEl>
+                                          <p:spTgt spid="21"/>
+                                        </p:tgtEl>
+                                        <p:attrNameLst>
+                                          <p:attrName>style.visibility</p:attrName>
+                                        </p:attrNameLst>
+                                      </p:cBhvr>
+                                      <p:to>
+                                        <p:strVal val="visible"/>
+                                      </p:to>
+                                    </p:set>
+                                    <p:animEffect transition="in" filter="fade">
+                                      <p:cBhvr>
+                                        <p:cTn id="55" dur="500"/>
+                                        <p:tgtEl>
+                                          <p:spTgt spid="21"/>
+                                        </p:tgtEl>
+                                      </p:cBhvr>
+                                    </p:animEffect>
+                                  </p:childTnLst>
+                                </p:cTn>
+                              </p:par>
+                            </p:childTnLst>
+                          </p:cTn>
+                        </p:par>
+                        <p:par>
+                          <p:cTn id="56" fill="hold">
+                            <p:stCondLst>
+                              <p:cond delay="1000"/>
+                            </p:stCondLst>
+                            <p:childTnLst>
+                              <p:par>
+                                <p:cTn id="57" presetID="10" presetClass="entr" presetSubtype="0" fill="hold" nodeType="afterEffect">
+                                  <p:stCondLst>
+                                    <p:cond delay="0"/>
+                                  </p:stCondLst>
+                                  <p:childTnLst>
+                                    <p:set>
+                                      <p:cBhvr>
+                                        <p:cTn id="58" dur="1" fill="hold">
+                                          <p:stCondLst>
+                                            <p:cond delay="0"/>
+                                          </p:stCondLst>
+                                        </p:cTn>
+                                        <p:tgtEl>
+                                          <p:spTgt spid="24"/>
+                                        </p:tgtEl>
+                                        <p:attrNameLst>
+                                          <p:attrName>style.visibility</p:attrName>
+                                        </p:attrNameLst>
+                                      </p:cBhvr>
+                                      <p:to>
+                                        <p:strVal val="visible"/>
+                                      </p:to>
+                                    </p:set>
+                                    <p:animEffect transition="in" filter="fade">
+                                      <p:cBhvr>
+                                        <p:cTn id="59" dur="500"/>
+                                        <p:tgtEl>
+                                          <p:spTgt spid="24"/>
+                                        </p:tgtEl>
+                                      </p:cBhvr>
+                                    </p:animEffect>
+                                  </p:childTnLst>
+                                </p:cTn>
+                              </p:par>
+                            </p:childTnLst>
+                          </p:cTn>
+                        </p:par>
+                        <p:par>
+                          <p:cTn id="60" fill="hold">
+                            <p:stCondLst>
+                              <p:cond delay="1500"/>
+                            </p:stCondLst>
+                            <p:childTnLst>
+                              <p:par>
+                                <p:cTn id="61" presetID="10" presetClass="entr" presetSubtype="0" fill="hold" nodeType="afterEffect">
+                                  <p:stCondLst>
+                                    <p:cond delay="0"/>
+                                  </p:stCondLst>
+                                  <p:childTnLst>
+                                    <p:set>
+                                      <p:cBhvr>
+                                        <p:cTn id="62" dur="1" fill="hold">
+                                          <p:stCondLst>
+                                            <p:cond delay="0"/>
+                                          </p:stCondLst>
+                                        </p:cTn>
+                                        <p:tgtEl>
+                                          <p:spTgt spid="33"/>
+                                        </p:tgtEl>
+                                        <p:attrNameLst>
+                                          <p:attrName>style.visibility</p:attrName>
+                                        </p:attrNameLst>
+                                      </p:cBhvr>
+                                      <p:to>
+                                        <p:strVal val="visible"/>
+                                      </p:to>
+                                    </p:set>
+                                    <p:animEffect transition="in" filter="fade">
+                                      <p:cBhvr>
+                                        <p:cTn id="63" dur="500"/>
+                                        <p:tgtEl>
+                                          <p:spTgt spid="33"/>
+                                        </p:tgtEl>
+                                      </p:cBhvr>
+                                    </p:animEffect>
+                                  </p:childTnLst>
+                                </p:cTn>
+                              </p:par>
+                            </p:childTnLst>
+                          </p:cTn>
+                        </p:par>
+                      </p:childTnLst>
+                    </p:cTn>
+                  </p:par>
+                  <p:par>
+                    <p:cTn id="64" fill="hold">
+                      <p:stCondLst>
+                        <p:cond delay="indefinite"/>
+                      </p:stCondLst>
+                      <p:childTnLst>
+                        <p:par>
+                          <p:cTn id="65" fill="hold">
+                            <p:stCondLst>
+                              <p:cond delay="0"/>
+                            </p:stCondLst>
+                            <p:childTnLst>
+                              <p:par>
+                                <p:cTn id="66" presetID="10" presetClass="entr" presetSubtype="0" fill="hold" grpId="0" nodeType="clickEffect">
+                                  <p:stCondLst>
+                                    <p:cond delay="0"/>
+                                  </p:stCondLst>
+                                  <p:childTnLst>
+                                    <p:set>
+                                      <p:cBhvr>
+                                        <p:cTn id="67" dur="1" fill="hold">
+                                          <p:stCondLst>
+                                            <p:cond delay="0"/>
+                                          </p:stCondLst>
+                                        </p:cTn>
+                                        <p:tgtEl>
+                                          <p:spTgt spid="13"/>
+                                        </p:tgtEl>
+                                        <p:attrNameLst>
+                                          <p:attrName>style.visibility</p:attrName>
+                                        </p:attrNameLst>
+                                      </p:cBhvr>
+                                      <p:to>
+                                        <p:strVal val="visible"/>
+                                      </p:to>
+                                    </p:set>
+                                    <p:animEffect transition="in" filter="fade">
+                                      <p:cBhvr>
+                                        <p:cTn id="68" dur="500"/>
+                                        <p:tgtEl>
+                                          <p:spTgt spid="13"/>
+                                        </p:tgtEl>
+                                      </p:cBhvr>
+                                    </p:animEffect>
+                                  </p:childTnLst>
+                                </p:cTn>
+                              </p:par>
+                            </p:childTnLst>
+                          </p:cTn>
+                        </p:par>
+                        <p:par>
+                          <p:cTn id="69" fill="hold">
+                            <p:stCondLst>
+                              <p:cond delay="500"/>
+                            </p:stCondLst>
+                            <p:childTnLst>
+                              <p:par>
+                                <p:cTn id="70" presetID="10" presetClass="entr" presetSubtype="0" fill="hold" nodeType="afterEffect">
+                                  <p:stCondLst>
+                                    <p:cond delay="0"/>
+                                  </p:stCondLst>
+                                  <p:childTnLst>
+                                    <p:set>
+                                      <p:cBhvr>
+                                        <p:cTn id="71" dur="1" fill="hold">
+                                          <p:stCondLst>
+                                            <p:cond delay="0"/>
+                                          </p:stCondLst>
+                                        </p:cTn>
+                                        <p:tgtEl>
+                                          <p:spTgt spid="27"/>
+                                        </p:tgtEl>
+                                        <p:attrNameLst>
+                                          <p:attrName>style.visibility</p:attrName>
+                                        </p:attrNameLst>
+                                      </p:cBhvr>
+                                      <p:to>
+                                        <p:strVal val="visible"/>
+                                      </p:to>
+                                    </p:set>
+                                    <p:animEffect transition="in" filter="fade">
+                                      <p:cBhvr>
+                                        <p:cTn id="72" dur="500"/>
+                                        <p:tgtEl>
+                                          <p:spTgt spid="27"/>
+                                        </p:tgtEl>
+                                      </p:cBhvr>
+                                    </p:animEffect>
+                                  </p:childTnLst>
+                                </p:cTn>
+                              </p:par>
+                            </p:childTnLst>
+                          </p:cTn>
+                        </p:par>
+                        <p:par>
+                          <p:cTn id="73" fill="hold">
+                            <p:stCondLst>
+                              <p:cond delay="1000"/>
+                            </p:stCondLst>
+                            <p:childTnLst>
+                              <p:par>
+                                <p:cTn id="74" presetID="10" presetClass="entr" presetSubtype="0" fill="hold" nodeType="afterEffect">
+                                  <p:stCondLst>
+                                    <p:cond delay="0"/>
+                                  </p:stCondLst>
+                                  <p:childTnLst>
+                                    <p:set>
+                                      <p:cBhvr>
+                                        <p:cTn id="75" dur="1" fill="hold">
+                                          <p:stCondLst>
+                                            <p:cond delay="0"/>
+                                          </p:stCondLst>
+                                        </p:cTn>
+                                        <p:tgtEl>
+                                          <p:spTgt spid="36"/>
+                                        </p:tgtEl>
+                                        <p:attrNameLst>
+                                          <p:attrName>style.visibility</p:attrName>
+                                        </p:attrNameLst>
+                                      </p:cBhvr>
+                                      <p:to>
+                                        <p:strVal val="visible"/>
+                                      </p:to>
+                                    </p:set>
+                                    <p:animEffect transition="in" filter="fade">
+                                      <p:cBhvr>
+                                        <p:cTn id="76" dur="500"/>
+                                        <p:tgtEl>
+                                          <p:spTgt spid="36"/>
+                                        </p:tgtEl>
+                                      </p:cBhvr>
+                                    </p:animEffect>
+                                  </p:childTnLst>
+                                </p:cTn>
+                              </p:par>
+                            </p:childTnLst>
+                          </p:cTn>
+                        </p:par>
+                      </p:childTnLst>
+                    </p:cTn>
+                  </p:par>
+                </p:childTnLst>
+              </p:cTn>
+              <p:prevCondLst>
+                <p:cond evt="onPrev" delay="0">
+                  <p:tgtEl>
+                    <p:sldTgt/>
+                  </p:tgtEl>
+                </p:cond>
+              </p:prevCondLst>
+              <p:nextCondLst>
+                <p:cond evt="onNext" delay="0">
+                  <p:tgtEl>
+                    <p:sldTgt/>
+                  </p:tgtEl>
+                </p:cond>
+              </p:nextCondLst>
+            </p:seq>
+          </p:childTnLst>
+        </p:cTn>
+      </p:par>
+    </p:tnLst>
+    <p:bldLst>
+      <p:bldP spid="3" grpId="0" animBg="1"/>
+      <p:bldP spid="8" grpId="0" animBg="1"/>
+      <p:bldP spid="9" grpId="0" animBg="1"/>
+      <p:bldP spid="10" grpId="0" animBg="1"/>
+      <p:bldP spid="11" grpId="0" animBg="1"/>
+      <p:bldP spid="4" grpId="0" animBg="1"/>
+      <p:bldP spid="13" grpId="0" animBg="1"/>
+      <p:bldP spid="14" grpId="0" animBg="1"/>
+      <p:bldP spid="15" grpId="0" animBg="1"/>
+    </p:bldLst>
+  </p:timing>
 </p:sld>
 </file>
 
@@ -12168,9 +14561,10 @@
           <a:lstStyle/>
           <a:p>
             <a:r>
-              <a:rPr lang="en-US" dirty="0"/>
-              <a:t>Event-Driven</a:t>
-            </a:r>
+              <a:rPr lang="en-US" dirty="0" err="1"/>
+              <a:t>Deployability</a:t>
+            </a:r>
+            <a:endParaRPr lang="en-US" dirty="0"/>
           </a:p>
           <a:p>
             <a:endParaRPr lang="en-US" dirty="0"/>
@@ -12183,7 +14577,7 @@
     </p:spTree>
     <p:extLst>
       <p:ext uri="{BB962C8B-B14F-4D97-AF65-F5344CB8AC3E}">
-        <p14:creationId xmlns:p14="http://schemas.microsoft.com/office/powerpoint/2010/main" val="2242557126"/>
+        <p14:creationId xmlns:p14="http://schemas.microsoft.com/office/powerpoint/2010/main" val="2249306102"/>
       </p:ext>
     </p:extLst>
   </p:cSld>
@@ -12227,6 +14621,64 @@
           <a:p>
             <a:r>
               <a:rPr lang="en-US" dirty="0"/>
+              <a:t>Event-Driven</a:t>
+            </a:r>
+          </a:p>
+          <a:p>
+            <a:endParaRPr lang="en-US" dirty="0"/>
+          </a:p>
+          <a:p>
+            <a:endParaRPr lang="en-US" dirty="0"/>
+          </a:p>
+        </p:txBody>
+      </p:sp>
+    </p:spTree>
+    <p:extLst>
+      <p:ext uri="{BB962C8B-B14F-4D97-AF65-F5344CB8AC3E}">
+        <p14:creationId xmlns:p14="http://schemas.microsoft.com/office/powerpoint/2010/main" val="2242557126"/>
+      </p:ext>
+    </p:extLst>
+  </p:cSld>
+  <p:clrMapOvr>
+    <a:masterClrMapping/>
+  </p:clrMapOvr>
+</p:sld>
+</file>
+
+<file path=ppt/slides/slide42.xml><?xml version="1.0" encoding="utf-8"?>
+<p:sld xmlns:a="http://schemas.openxmlformats.org/drawingml/2006/main" xmlns:r="http://schemas.openxmlformats.org/officeDocument/2006/relationships" xmlns:p="http://schemas.openxmlformats.org/presentationml/2006/main">
+  <p:cSld>
+    <p:spTree>
+      <p:nvGrpSpPr>
+        <p:cNvPr id="1" name=""/>
+        <p:cNvGrpSpPr/>
+        <p:nvPr/>
+      </p:nvGrpSpPr>
+      <p:grpSpPr>
+        <a:xfrm>
+          <a:off x="0" y="0"/>
+          <a:ext cx="0" cy="0"/>
+          <a:chOff x="0" y="0"/>
+          <a:chExt cx="0" cy="0"/>
+        </a:xfrm>
+      </p:grpSpPr>
+      <p:sp>
+        <p:nvSpPr>
+          <p:cNvPr id="2" name="Text Placeholder 1"/>
+          <p:cNvSpPr>
+            <a:spLocks noGrp="1"/>
+          </p:cNvSpPr>
+          <p:nvPr>
+            <p:ph type="body" sz="quarter" idx="11"/>
+          </p:nvPr>
+        </p:nvSpPr>
+        <p:spPr/>
+        <p:txBody>
+          <a:bodyPr/>
+          <a:lstStyle/>
+          <a:p>
+            <a:r>
+              <a:rPr lang="en-US" dirty="0"/>
               <a:t>Loose-Coupling</a:t>
             </a:r>
           </a:p>
@@ -12248,7 +14700,7 @@
 </p:sld>
 </file>
 
-<file path=ppt/slides/slide42.xml><?xml version="1.0" encoding="utf-8"?>
+<file path=ppt/slides/slide43.xml><?xml version="1.0" encoding="utf-8"?>
 <p:sld xmlns:a="http://schemas.openxmlformats.org/drawingml/2006/main" xmlns:r="http://schemas.openxmlformats.org/officeDocument/2006/relationships" xmlns:p="http://schemas.openxmlformats.org/presentationml/2006/main">
   <p:cSld>
     <p:spTree>

</xml_diff>

<commit_message>
adding ci-cd push and pull diagrams
</commit_message>
<xml_diff>
--- a/docs/solid.pptx
+++ b/docs/solid.pptx
@@ -5,10 +5,10 @@
     <p:sldMasterId id="2147483650" r:id="rId1"/>
   </p:sldMasterIdLst>
   <p:notesMasterIdLst>
-    <p:notesMasterId r:id="rId48"/>
+    <p:notesMasterId r:id="rId50"/>
   </p:notesMasterIdLst>
   <p:handoutMasterIdLst>
-    <p:handoutMasterId r:id="rId49"/>
+    <p:handoutMasterId r:id="rId51"/>
   </p:handoutMasterIdLst>
   <p:sldIdLst>
     <p:sldId id="309" r:id="rId2"/>
@@ -54,9 +54,11 @@
     <p:sldId id="337" r:id="rId42"/>
     <p:sldId id="338" r:id="rId43"/>
     <p:sldId id="339" r:id="rId44"/>
-    <p:sldId id="334" r:id="rId45"/>
-    <p:sldId id="335" r:id="rId46"/>
-    <p:sldId id="330" r:id="rId47"/>
+    <p:sldId id="340" r:id="rId45"/>
+    <p:sldId id="342" r:id="rId46"/>
+    <p:sldId id="334" r:id="rId47"/>
+    <p:sldId id="335" r:id="rId48"/>
+    <p:sldId id="330" r:id="rId49"/>
   </p:sldIdLst>
   <p:sldSz cx="9144000" cy="6858000" type="screen4x3"/>
   <p:notesSz cx="6858000" cy="9144000"/>
@@ -4434,7 +4436,7 @@
     </p:spTree>
     <p:extLst>
       <p:ext uri="{BB962C8B-B14F-4D97-AF65-F5344CB8AC3E}">
-        <p14:creationId xmlns:p14="http://schemas.microsoft.com/office/powerpoint/2010/main" val="715644702"/>
+        <p14:creationId xmlns:p14="http://schemas.microsoft.com/office/powerpoint/2010/main" val="3343323683"/>
       </p:ext>
     </p:extLst>
   </p:cSld>
@@ -4526,7 +4528,7 @@
     </p:spTree>
     <p:extLst>
       <p:ext uri="{BB962C8B-B14F-4D97-AF65-F5344CB8AC3E}">
-        <p14:creationId xmlns:p14="http://schemas.microsoft.com/office/powerpoint/2010/main" val="2866667866"/>
+        <p14:creationId xmlns:p14="http://schemas.microsoft.com/office/powerpoint/2010/main" val="744288894"/>
       </p:ext>
     </p:extLst>
   </p:cSld>
@@ -4610,6 +4612,190 @@
             <a:fld id="{2C5A56FE-B2E8-4285-8F31-2AEEB8EA39C6}" type="slidenum">
               <a:rPr lang="en-GB" smtClean="0"/>
               <a:t>46</a:t>
+            </a:fld>
+            <a:endParaRPr lang="en-GB"/>
+          </a:p>
+        </p:txBody>
+      </p:sp>
+    </p:spTree>
+    <p:extLst>
+      <p:ext uri="{BB962C8B-B14F-4D97-AF65-F5344CB8AC3E}">
+        <p14:creationId xmlns:p14="http://schemas.microsoft.com/office/powerpoint/2010/main" val="715644702"/>
+      </p:ext>
+    </p:extLst>
+  </p:cSld>
+  <p:clrMapOvr>
+    <a:masterClrMapping/>
+  </p:clrMapOvr>
+</p:notes>
+</file>
+
+<file path=ppt/notesSlides/notesSlide47.xml><?xml version="1.0" encoding="utf-8"?>
+<p:notes xmlns:a="http://schemas.openxmlformats.org/drawingml/2006/main" xmlns:r="http://schemas.openxmlformats.org/officeDocument/2006/relationships" xmlns:p="http://schemas.openxmlformats.org/presentationml/2006/main">
+  <p:cSld>
+    <p:spTree>
+      <p:nvGrpSpPr>
+        <p:cNvPr id="1" name=""/>
+        <p:cNvGrpSpPr/>
+        <p:nvPr/>
+      </p:nvGrpSpPr>
+      <p:grpSpPr>
+        <a:xfrm>
+          <a:off x="0" y="0"/>
+          <a:ext cx="0" cy="0"/>
+          <a:chOff x="0" y="0"/>
+          <a:chExt cx="0" cy="0"/>
+        </a:xfrm>
+      </p:grpSpPr>
+      <p:sp>
+        <p:nvSpPr>
+          <p:cNvPr id="2" name="Slide Image Placeholder 1"/>
+          <p:cNvSpPr>
+            <a:spLocks noGrp="1" noRot="1" noChangeAspect="1"/>
+          </p:cNvSpPr>
+          <p:nvPr>
+            <p:ph type="sldImg"/>
+          </p:nvPr>
+        </p:nvSpPr>
+        <p:spPr>
+          <a:xfrm>
+            <a:off x="1143000" y="685800"/>
+            <a:ext cx="4572000" cy="3429000"/>
+          </a:xfrm>
+          <a:prstGeom prst="rect">
+            <a:avLst/>
+          </a:prstGeom>
+        </p:spPr>
+      </p:sp>
+      <p:sp>
+        <p:nvSpPr>
+          <p:cNvPr id="3" name="Notes Placeholder 2"/>
+          <p:cNvSpPr>
+            <a:spLocks noGrp="1"/>
+          </p:cNvSpPr>
+          <p:nvPr>
+            <p:ph type="body" idx="1"/>
+          </p:nvPr>
+        </p:nvSpPr>
+        <p:spPr/>
+        <p:txBody>
+          <a:bodyPr/>
+          <a:lstStyle/>
+          <a:p>
+            <a:endParaRPr lang="it-IT" dirty="0"/>
+          </a:p>
+        </p:txBody>
+      </p:sp>
+      <p:sp>
+        <p:nvSpPr>
+          <p:cNvPr id="4" name="Slide Number Placeholder 3"/>
+          <p:cNvSpPr>
+            <a:spLocks noGrp="1"/>
+          </p:cNvSpPr>
+          <p:nvPr>
+            <p:ph type="sldNum" sz="quarter" idx="10"/>
+          </p:nvPr>
+        </p:nvSpPr>
+        <p:spPr/>
+        <p:txBody>
+          <a:bodyPr/>
+          <a:lstStyle/>
+          <a:p>
+            <a:fld id="{2C5A56FE-B2E8-4285-8F31-2AEEB8EA39C6}" type="slidenum">
+              <a:rPr lang="en-GB" smtClean="0"/>
+              <a:t>47</a:t>
+            </a:fld>
+            <a:endParaRPr lang="en-GB"/>
+          </a:p>
+        </p:txBody>
+      </p:sp>
+    </p:spTree>
+    <p:extLst>
+      <p:ext uri="{BB962C8B-B14F-4D97-AF65-F5344CB8AC3E}">
+        <p14:creationId xmlns:p14="http://schemas.microsoft.com/office/powerpoint/2010/main" val="2866667866"/>
+      </p:ext>
+    </p:extLst>
+  </p:cSld>
+  <p:clrMapOvr>
+    <a:masterClrMapping/>
+  </p:clrMapOvr>
+</p:notes>
+</file>
+
+<file path=ppt/notesSlides/notesSlide48.xml><?xml version="1.0" encoding="utf-8"?>
+<p:notes xmlns:a="http://schemas.openxmlformats.org/drawingml/2006/main" xmlns:r="http://schemas.openxmlformats.org/officeDocument/2006/relationships" xmlns:p="http://schemas.openxmlformats.org/presentationml/2006/main">
+  <p:cSld>
+    <p:spTree>
+      <p:nvGrpSpPr>
+        <p:cNvPr id="1" name=""/>
+        <p:cNvGrpSpPr/>
+        <p:nvPr/>
+      </p:nvGrpSpPr>
+      <p:grpSpPr>
+        <a:xfrm>
+          <a:off x="0" y="0"/>
+          <a:ext cx="0" cy="0"/>
+          <a:chOff x="0" y="0"/>
+          <a:chExt cx="0" cy="0"/>
+        </a:xfrm>
+      </p:grpSpPr>
+      <p:sp>
+        <p:nvSpPr>
+          <p:cNvPr id="2" name="Slide Image Placeholder 1"/>
+          <p:cNvSpPr>
+            <a:spLocks noGrp="1" noRot="1" noChangeAspect="1"/>
+          </p:cNvSpPr>
+          <p:nvPr>
+            <p:ph type="sldImg"/>
+          </p:nvPr>
+        </p:nvSpPr>
+        <p:spPr>
+          <a:xfrm>
+            <a:off x="1143000" y="685800"/>
+            <a:ext cx="4572000" cy="3429000"/>
+          </a:xfrm>
+          <a:prstGeom prst="rect">
+            <a:avLst/>
+          </a:prstGeom>
+        </p:spPr>
+      </p:sp>
+      <p:sp>
+        <p:nvSpPr>
+          <p:cNvPr id="3" name="Notes Placeholder 2"/>
+          <p:cNvSpPr>
+            <a:spLocks noGrp="1"/>
+          </p:cNvSpPr>
+          <p:nvPr>
+            <p:ph type="body" idx="1"/>
+          </p:nvPr>
+        </p:nvSpPr>
+        <p:spPr/>
+        <p:txBody>
+          <a:bodyPr/>
+          <a:lstStyle/>
+          <a:p>
+            <a:endParaRPr lang="it-IT" dirty="0"/>
+          </a:p>
+        </p:txBody>
+      </p:sp>
+      <p:sp>
+        <p:nvSpPr>
+          <p:cNvPr id="4" name="Slide Number Placeholder 3"/>
+          <p:cNvSpPr>
+            <a:spLocks noGrp="1"/>
+          </p:cNvSpPr>
+          <p:nvPr>
+            <p:ph type="sldNum" sz="quarter" idx="10"/>
+          </p:nvPr>
+        </p:nvSpPr>
+        <p:spPr/>
+        <p:txBody>
+          <a:bodyPr/>
+          <a:lstStyle/>
+          <a:p>
+            <a:fld id="{2C5A56FE-B2E8-4285-8F31-2AEEB8EA39C6}" type="slidenum">
+              <a:rPr lang="en-GB" smtClean="0"/>
+              <a:t>48</a:t>
             </a:fld>
             <a:endParaRPr lang="en-GB"/>
           </a:p>
@@ -17865,28 +18051,973 @@
             <p:ph type="body" sz="quarter" idx="11"/>
           </p:nvPr>
         </p:nvSpPr>
-        <p:spPr/>
+        <p:spPr>
+          <a:xfrm>
+            <a:off x="328613" y="1079048"/>
+            <a:ext cx="8401246" cy="731092"/>
+          </a:xfrm>
+        </p:spPr>
         <p:txBody>
           <a:bodyPr/>
           <a:lstStyle/>
           <a:p>
             <a:r>
-              <a:rPr lang="en-US" dirty="0"/>
-              <a:t>Event-Driven</a:t>
-            </a:r>
-          </a:p>
-          <a:p>
+              <a:rPr lang="en-US" dirty="0" err="1"/>
+              <a:t>Deployability</a:t>
+            </a:r>
             <a:endParaRPr lang="en-US" dirty="0"/>
           </a:p>
-          <a:p>
-            <a:endParaRPr lang="en-US" dirty="0"/>
+        </p:txBody>
+      </p:sp>
+      <p:sp>
+        <p:nvSpPr>
+          <p:cNvPr id="11" name="TextBox 10">
+            <a:extLst>
+              <a:ext uri="{FF2B5EF4-FFF2-40B4-BE49-F238E27FC236}">
+                <a16:creationId xmlns:a16="http://schemas.microsoft.com/office/drawing/2014/main" id="{05247ED7-02F4-49CB-B839-553286B18DF6}"/>
+              </a:ext>
+            </a:extLst>
+          </p:cNvPr>
+          <p:cNvSpPr txBox="1"/>
+          <p:nvPr/>
+        </p:nvSpPr>
+        <p:spPr>
+          <a:xfrm>
+            <a:off x="328610" y="2113935"/>
+            <a:ext cx="8210747" cy="523220"/>
+          </a:xfrm>
+          <a:prstGeom prst="rect">
+            <a:avLst/>
+          </a:prstGeom>
+          <a:noFill/>
+        </p:spPr>
+        <p:txBody>
+          <a:bodyPr wrap="square" rtlCol="0">
+            <a:spAutoFit/>
+          </a:bodyPr>
+          <a:lstStyle/>
+          <a:p>
+            <a:r>
+              <a:rPr lang="en-GB" sz="2800" dirty="0"/>
+              <a:t>CI/CD Push</a:t>
+            </a:r>
+          </a:p>
+        </p:txBody>
+      </p:sp>
+      <p:pic>
+        <p:nvPicPr>
+          <p:cNvPr id="5" name="Picture 4">
+            <a:extLst>
+              <a:ext uri="{FF2B5EF4-FFF2-40B4-BE49-F238E27FC236}">
+                <a16:creationId xmlns:a16="http://schemas.microsoft.com/office/drawing/2014/main" id="{7660FE69-5CE6-45C1-9AC8-A4F1E2C187DA}"/>
+              </a:ext>
+            </a:extLst>
+          </p:cNvPr>
+          <p:cNvPicPr>
+            <a:picLocks noChangeAspect="1"/>
+          </p:cNvPicPr>
+          <p:nvPr/>
+        </p:nvPicPr>
+        <p:blipFill>
+          <a:blip r:embed="rId3"/>
+          <a:stretch>
+            <a:fillRect/>
+          </a:stretch>
+        </p:blipFill>
+        <p:spPr>
+          <a:xfrm>
+            <a:off x="162618" y="4107883"/>
+            <a:ext cx="688886" cy="682230"/>
+          </a:xfrm>
+          <a:prstGeom prst="rect">
+            <a:avLst/>
+          </a:prstGeom>
+        </p:spPr>
+      </p:pic>
+      <p:pic>
+        <p:nvPicPr>
+          <p:cNvPr id="6" name="Picture 5">
+            <a:extLst>
+              <a:ext uri="{FF2B5EF4-FFF2-40B4-BE49-F238E27FC236}">
+                <a16:creationId xmlns:a16="http://schemas.microsoft.com/office/drawing/2014/main" id="{FF110200-A312-4203-81D8-F0A866FC0DCF}"/>
+              </a:ext>
+            </a:extLst>
+          </p:cNvPr>
+          <p:cNvPicPr>
+            <a:picLocks noChangeAspect="1"/>
+          </p:cNvPicPr>
+          <p:nvPr/>
+        </p:nvPicPr>
+        <p:blipFill>
+          <a:blip r:embed="rId4"/>
+          <a:stretch>
+            <a:fillRect/>
+          </a:stretch>
+        </p:blipFill>
+        <p:spPr>
+          <a:xfrm>
+            <a:off x="1167955" y="4111244"/>
+            <a:ext cx="688886" cy="685542"/>
+          </a:xfrm>
+          <a:prstGeom prst="rect">
+            <a:avLst/>
+          </a:prstGeom>
+        </p:spPr>
+      </p:pic>
+      <p:pic>
+        <p:nvPicPr>
+          <p:cNvPr id="7" name="Picture 6">
+            <a:extLst>
+              <a:ext uri="{FF2B5EF4-FFF2-40B4-BE49-F238E27FC236}">
+                <a16:creationId xmlns:a16="http://schemas.microsoft.com/office/drawing/2014/main" id="{085578EC-DDA6-4185-AFED-A254BFC6EF2A}"/>
+              </a:ext>
+            </a:extLst>
+          </p:cNvPr>
+          <p:cNvPicPr>
+            <a:picLocks noChangeAspect="1"/>
+          </p:cNvPicPr>
+          <p:nvPr/>
+        </p:nvPicPr>
+        <p:blipFill>
+          <a:blip r:embed="rId5"/>
+          <a:stretch>
+            <a:fillRect/>
+          </a:stretch>
+        </p:blipFill>
+        <p:spPr>
+          <a:xfrm>
+            <a:off x="4572000" y="2736737"/>
+            <a:ext cx="688886" cy="692263"/>
+          </a:xfrm>
+          <a:prstGeom prst="rect">
+            <a:avLst/>
+          </a:prstGeom>
+        </p:spPr>
+      </p:pic>
+      <p:pic>
+        <p:nvPicPr>
+          <p:cNvPr id="9" name="Picture 8">
+            <a:extLst>
+              <a:ext uri="{FF2B5EF4-FFF2-40B4-BE49-F238E27FC236}">
+                <a16:creationId xmlns:a16="http://schemas.microsoft.com/office/drawing/2014/main" id="{52063F44-719C-4E90-9622-D99619064F35}"/>
+              </a:ext>
+            </a:extLst>
+          </p:cNvPr>
+          <p:cNvPicPr>
+            <a:picLocks noChangeAspect="1"/>
+          </p:cNvPicPr>
+          <p:nvPr/>
+        </p:nvPicPr>
+        <p:blipFill>
+          <a:blip r:embed="rId6"/>
+          <a:stretch>
+            <a:fillRect/>
+          </a:stretch>
+        </p:blipFill>
+        <p:spPr>
+          <a:xfrm>
+            <a:off x="2436378" y="4094538"/>
+            <a:ext cx="1803618" cy="695575"/>
+          </a:xfrm>
+          <a:prstGeom prst="rect">
+            <a:avLst/>
+          </a:prstGeom>
+        </p:spPr>
+      </p:pic>
+      <p:pic>
+        <p:nvPicPr>
+          <p:cNvPr id="18" name="Picture 17">
+            <a:extLst>
+              <a:ext uri="{FF2B5EF4-FFF2-40B4-BE49-F238E27FC236}">
+                <a16:creationId xmlns:a16="http://schemas.microsoft.com/office/drawing/2014/main" id="{DD24B6D0-0FFC-40B8-974A-E1595867DBC7}"/>
+              </a:ext>
+            </a:extLst>
+          </p:cNvPr>
+          <p:cNvPicPr>
+            <a:picLocks noChangeAspect="1"/>
+          </p:cNvPicPr>
+          <p:nvPr/>
+        </p:nvPicPr>
+        <p:blipFill>
+          <a:blip r:embed="rId6"/>
+          <a:stretch>
+            <a:fillRect/>
+          </a:stretch>
+        </p:blipFill>
+        <p:spPr>
+          <a:xfrm>
+            <a:off x="4681350" y="4088250"/>
+            <a:ext cx="1803618" cy="695575"/>
+          </a:xfrm>
+          <a:prstGeom prst="rect">
+            <a:avLst/>
+          </a:prstGeom>
+        </p:spPr>
+      </p:pic>
+      <p:pic>
+        <p:nvPicPr>
+          <p:cNvPr id="10" name="Picture 9">
+            <a:extLst>
+              <a:ext uri="{FF2B5EF4-FFF2-40B4-BE49-F238E27FC236}">
+                <a16:creationId xmlns:a16="http://schemas.microsoft.com/office/drawing/2014/main" id="{3CCCBA9C-E2D5-4C3C-A5DC-F247D04CDA64}"/>
+              </a:ext>
+            </a:extLst>
+          </p:cNvPr>
+          <p:cNvPicPr>
+            <a:picLocks noChangeAspect="1"/>
+          </p:cNvPicPr>
+          <p:nvPr/>
+        </p:nvPicPr>
+        <p:blipFill>
+          <a:blip r:embed="rId7"/>
+          <a:stretch>
+            <a:fillRect/>
+          </a:stretch>
+        </p:blipFill>
+        <p:spPr>
+          <a:xfrm>
+            <a:off x="6953392" y="4111244"/>
+            <a:ext cx="1923385" cy="678566"/>
+          </a:xfrm>
+          <a:prstGeom prst="rect">
+            <a:avLst/>
+          </a:prstGeom>
+        </p:spPr>
+      </p:pic>
+      <p:cxnSp>
+        <p:nvCxnSpPr>
+          <p:cNvPr id="21" name="Straight Arrow Connector 20">
+            <a:extLst>
+              <a:ext uri="{FF2B5EF4-FFF2-40B4-BE49-F238E27FC236}">
+                <a16:creationId xmlns:a16="http://schemas.microsoft.com/office/drawing/2014/main" id="{C6AE85D1-08BB-427C-AEF1-15A344CEDD4A}"/>
+              </a:ext>
+            </a:extLst>
+          </p:cNvPr>
+          <p:cNvCxnSpPr>
+            <a:stCxn id="5" idx="3"/>
+            <a:endCxn id="6" idx="1"/>
+          </p:cNvCxnSpPr>
+          <p:nvPr/>
+        </p:nvCxnSpPr>
+        <p:spPr>
+          <a:xfrm>
+            <a:off x="851504" y="4448998"/>
+            <a:ext cx="316451" cy="5017"/>
+          </a:xfrm>
+          <a:prstGeom prst="straightConnector1">
+            <a:avLst/>
+          </a:prstGeom>
+          <a:ln>
+            <a:tailEnd type="triangle"/>
+          </a:ln>
+        </p:spPr>
+        <p:style>
+          <a:lnRef idx="2">
+            <a:schemeClr val="accent3"/>
+          </a:lnRef>
+          <a:fillRef idx="0">
+            <a:schemeClr val="accent3"/>
+          </a:fillRef>
+          <a:effectRef idx="1">
+            <a:schemeClr val="accent3"/>
+          </a:effectRef>
+          <a:fontRef idx="minor">
+            <a:schemeClr val="tx1"/>
+          </a:fontRef>
+        </p:style>
+      </p:cxnSp>
+      <p:cxnSp>
+        <p:nvCxnSpPr>
+          <p:cNvPr id="25" name="Straight Arrow Connector 24">
+            <a:extLst>
+              <a:ext uri="{FF2B5EF4-FFF2-40B4-BE49-F238E27FC236}">
+                <a16:creationId xmlns:a16="http://schemas.microsoft.com/office/drawing/2014/main" id="{2DD7F8B1-6870-4B24-A0A3-7D4E6C1E9D1F}"/>
+              </a:ext>
+            </a:extLst>
+          </p:cNvPr>
+          <p:cNvCxnSpPr>
+            <a:stCxn id="6" idx="3"/>
+            <a:endCxn id="9" idx="1"/>
+          </p:cNvCxnSpPr>
+          <p:nvPr/>
+        </p:nvCxnSpPr>
+        <p:spPr>
+          <a:xfrm flipV="1">
+            <a:off x="1856841" y="4442326"/>
+            <a:ext cx="579537" cy="11689"/>
+          </a:xfrm>
+          <a:prstGeom prst="straightConnector1">
+            <a:avLst/>
+          </a:prstGeom>
+          <a:ln>
+            <a:tailEnd type="triangle"/>
+          </a:ln>
+        </p:spPr>
+        <p:style>
+          <a:lnRef idx="2">
+            <a:schemeClr val="accent6"/>
+          </a:lnRef>
+          <a:fillRef idx="0">
+            <a:schemeClr val="accent6"/>
+          </a:fillRef>
+          <a:effectRef idx="1">
+            <a:schemeClr val="accent6"/>
+          </a:effectRef>
+          <a:fontRef idx="minor">
+            <a:schemeClr val="tx1"/>
+          </a:fontRef>
+        </p:style>
+      </p:cxnSp>
+      <p:cxnSp>
+        <p:nvCxnSpPr>
+          <p:cNvPr id="29" name="Straight Arrow Connector 28">
+            <a:extLst>
+              <a:ext uri="{FF2B5EF4-FFF2-40B4-BE49-F238E27FC236}">
+                <a16:creationId xmlns:a16="http://schemas.microsoft.com/office/drawing/2014/main" id="{1F025491-1681-4596-B433-ED1D40D682BA}"/>
+              </a:ext>
+            </a:extLst>
+          </p:cNvPr>
+          <p:cNvCxnSpPr>
+            <a:cxnSpLocks/>
+            <a:stCxn id="9" idx="3"/>
+            <a:endCxn id="18" idx="1"/>
+          </p:cNvCxnSpPr>
+          <p:nvPr/>
+        </p:nvCxnSpPr>
+        <p:spPr>
+          <a:xfrm flipV="1">
+            <a:off x="4239996" y="4436038"/>
+            <a:ext cx="441354" cy="6288"/>
+          </a:xfrm>
+          <a:prstGeom prst="straightConnector1">
+            <a:avLst/>
+          </a:prstGeom>
+          <a:ln>
+            <a:tailEnd type="triangle"/>
+          </a:ln>
+        </p:spPr>
+        <p:style>
+          <a:lnRef idx="2">
+            <a:schemeClr val="accent6"/>
+          </a:lnRef>
+          <a:fillRef idx="0">
+            <a:schemeClr val="accent6"/>
+          </a:fillRef>
+          <a:effectRef idx="1">
+            <a:schemeClr val="accent6"/>
+          </a:effectRef>
+          <a:fontRef idx="minor">
+            <a:schemeClr val="tx1"/>
+          </a:fontRef>
+        </p:style>
+      </p:cxnSp>
+      <p:cxnSp>
+        <p:nvCxnSpPr>
+          <p:cNvPr id="39" name="Straight Arrow Connector 38">
+            <a:extLst>
+              <a:ext uri="{FF2B5EF4-FFF2-40B4-BE49-F238E27FC236}">
+                <a16:creationId xmlns:a16="http://schemas.microsoft.com/office/drawing/2014/main" id="{1A76A7FB-D933-4979-B7B9-7FD0D967E725}"/>
+              </a:ext>
+            </a:extLst>
+          </p:cNvPr>
+          <p:cNvCxnSpPr>
+            <a:cxnSpLocks/>
+            <a:stCxn id="18" idx="3"/>
+            <a:endCxn id="10" idx="1"/>
+          </p:cNvCxnSpPr>
+          <p:nvPr/>
+        </p:nvCxnSpPr>
+        <p:spPr>
+          <a:xfrm>
+            <a:off x="6484968" y="4436038"/>
+            <a:ext cx="468424" cy="14489"/>
+          </a:xfrm>
+          <a:prstGeom prst="straightConnector1">
+            <a:avLst/>
+          </a:prstGeom>
+          <a:ln>
+            <a:tailEnd type="triangle"/>
+          </a:ln>
+        </p:spPr>
+        <p:style>
+          <a:lnRef idx="2">
+            <a:schemeClr val="accent1"/>
+          </a:lnRef>
+          <a:fillRef idx="0">
+            <a:schemeClr val="accent1"/>
+          </a:fillRef>
+          <a:effectRef idx="1">
+            <a:schemeClr val="accent1"/>
+          </a:effectRef>
+          <a:fontRef idx="minor">
+            <a:schemeClr val="tx1"/>
+          </a:fontRef>
+        </p:style>
+      </p:cxnSp>
+      <p:pic>
+        <p:nvPicPr>
+          <p:cNvPr id="54" name="Picture 53">
+            <a:extLst>
+              <a:ext uri="{FF2B5EF4-FFF2-40B4-BE49-F238E27FC236}">
+                <a16:creationId xmlns:a16="http://schemas.microsoft.com/office/drawing/2014/main" id="{4B487240-2F9D-4328-A4DF-371D8F3B1167}"/>
+              </a:ext>
+            </a:extLst>
+          </p:cNvPr>
+          <p:cNvPicPr>
+            <a:picLocks noChangeAspect="1"/>
+          </p:cNvPicPr>
+          <p:nvPr/>
+        </p:nvPicPr>
+        <p:blipFill>
+          <a:blip r:embed="rId4"/>
+          <a:stretch>
+            <a:fillRect/>
+          </a:stretch>
+        </p:blipFill>
+        <p:spPr>
+          <a:xfrm>
+            <a:off x="1167955" y="5359936"/>
+            <a:ext cx="688886" cy="685542"/>
+          </a:xfrm>
+          <a:prstGeom prst="rect">
+            <a:avLst/>
+          </a:prstGeom>
+        </p:spPr>
+      </p:pic>
+      <p:cxnSp>
+        <p:nvCxnSpPr>
+          <p:cNvPr id="56" name="Connector: Elbow 55">
+            <a:extLst>
+              <a:ext uri="{FF2B5EF4-FFF2-40B4-BE49-F238E27FC236}">
+                <a16:creationId xmlns:a16="http://schemas.microsoft.com/office/drawing/2014/main" id="{03A371B6-E050-421E-9F51-10755D6B88F8}"/>
+              </a:ext>
+            </a:extLst>
+          </p:cNvPr>
+          <p:cNvCxnSpPr>
+            <a:stCxn id="9" idx="0"/>
+            <a:endCxn id="7" idx="1"/>
+          </p:cNvCxnSpPr>
+          <p:nvPr/>
+        </p:nvCxnSpPr>
+        <p:spPr>
+          <a:xfrm rot="5400000" flipH="1" flipV="1">
+            <a:off x="3449259" y="2971798"/>
+            <a:ext cx="1011669" cy="1233813"/>
+          </a:xfrm>
+          <a:prstGeom prst="bentConnector2">
+            <a:avLst/>
+          </a:prstGeom>
+          <a:ln>
+            <a:tailEnd type="triangle"/>
+          </a:ln>
+        </p:spPr>
+        <p:style>
+          <a:lnRef idx="2">
+            <a:schemeClr val="accent1"/>
+          </a:lnRef>
+          <a:fillRef idx="0">
+            <a:schemeClr val="accent1"/>
+          </a:fillRef>
+          <a:effectRef idx="1">
+            <a:schemeClr val="accent1"/>
+          </a:effectRef>
+          <a:fontRef idx="minor">
+            <a:schemeClr val="tx1"/>
+          </a:fontRef>
+        </p:style>
+      </p:cxnSp>
+      <p:cxnSp>
+        <p:nvCxnSpPr>
+          <p:cNvPr id="58" name="Connector: Elbow 57">
+            <a:extLst>
+              <a:ext uri="{FF2B5EF4-FFF2-40B4-BE49-F238E27FC236}">
+                <a16:creationId xmlns:a16="http://schemas.microsoft.com/office/drawing/2014/main" id="{57DD01CF-EF12-459A-A58D-1D4D19A47645}"/>
+              </a:ext>
+            </a:extLst>
+          </p:cNvPr>
+          <p:cNvCxnSpPr>
+            <a:stCxn id="10" idx="0"/>
+            <a:endCxn id="7" idx="3"/>
+          </p:cNvCxnSpPr>
+          <p:nvPr/>
+        </p:nvCxnSpPr>
+        <p:spPr>
+          <a:xfrm rot="16200000" flipV="1">
+            <a:off x="6073799" y="2269957"/>
+            <a:ext cx="1028375" cy="2654199"/>
+          </a:xfrm>
+          <a:prstGeom prst="bentConnector2">
+            <a:avLst/>
+          </a:prstGeom>
+          <a:ln>
+            <a:tailEnd type="triangle"/>
+          </a:ln>
+        </p:spPr>
+        <p:style>
+          <a:lnRef idx="2">
+            <a:schemeClr val="accent1"/>
+          </a:lnRef>
+          <a:fillRef idx="0">
+            <a:schemeClr val="accent1"/>
+          </a:fillRef>
+          <a:effectRef idx="1">
+            <a:schemeClr val="accent1"/>
+          </a:effectRef>
+          <a:fontRef idx="minor">
+            <a:schemeClr val="tx1"/>
+          </a:fontRef>
+        </p:style>
+      </p:cxnSp>
+      <p:cxnSp>
+        <p:nvCxnSpPr>
+          <p:cNvPr id="63" name="Connector: Elbow 62">
+            <a:extLst>
+              <a:ext uri="{FF2B5EF4-FFF2-40B4-BE49-F238E27FC236}">
+                <a16:creationId xmlns:a16="http://schemas.microsoft.com/office/drawing/2014/main" id="{F603E818-39DA-4481-AAD1-32ED0DD22095}"/>
+              </a:ext>
+            </a:extLst>
+          </p:cNvPr>
+          <p:cNvCxnSpPr>
+            <a:stCxn id="18" idx="2"/>
+            <a:endCxn id="54" idx="3"/>
+          </p:cNvCxnSpPr>
+          <p:nvPr/>
+        </p:nvCxnSpPr>
+        <p:spPr>
+          <a:xfrm rot="5400000">
+            <a:off x="3260559" y="3380107"/>
+            <a:ext cx="918882" cy="3726318"/>
+          </a:xfrm>
+          <a:prstGeom prst="bentConnector2">
+            <a:avLst/>
+          </a:prstGeom>
+          <a:ln>
+            <a:tailEnd type="triangle"/>
+          </a:ln>
+        </p:spPr>
+        <p:style>
+          <a:lnRef idx="2">
+            <a:schemeClr val="accent1"/>
+          </a:lnRef>
+          <a:fillRef idx="0">
+            <a:schemeClr val="accent1"/>
+          </a:fillRef>
+          <a:effectRef idx="1">
+            <a:schemeClr val="accent1"/>
+          </a:effectRef>
+          <a:fontRef idx="minor">
+            <a:schemeClr val="tx1"/>
+          </a:fontRef>
+        </p:style>
+      </p:cxnSp>
+      <p:cxnSp>
+        <p:nvCxnSpPr>
+          <p:cNvPr id="65" name="Connector: Elbow 64">
+            <a:extLst>
+              <a:ext uri="{FF2B5EF4-FFF2-40B4-BE49-F238E27FC236}">
+                <a16:creationId xmlns:a16="http://schemas.microsoft.com/office/drawing/2014/main" id="{AE702056-0792-45B9-AA66-0E1603CFFEF8}"/>
+              </a:ext>
+            </a:extLst>
+          </p:cNvPr>
+          <p:cNvCxnSpPr>
+            <a:stCxn id="5" idx="2"/>
+            <a:endCxn id="54" idx="1"/>
+          </p:cNvCxnSpPr>
+          <p:nvPr/>
+        </p:nvCxnSpPr>
+        <p:spPr>
+          <a:xfrm rot="16200000" flipH="1">
+            <a:off x="381211" y="4915963"/>
+            <a:ext cx="912594" cy="660894"/>
+          </a:xfrm>
+          <a:prstGeom prst="bentConnector2">
+            <a:avLst/>
+          </a:prstGeom>
+          <a:ln>
+            <a:tailEnd type="triangle"/>
+          </a:ln>
+        </p:spPr>
+        <p:style>
+          <a:lnRef idx="2">
+            <a:schemeClr val="accent3"/>
+          </a:lnRef>
+          <a:fillRef idx="0">
+            <a:schemeClr val="accent3"/>
+          </a:fillRef>
+          <a:effectRef idx="1">
+            <a:schemeClr val="accent3"/>
+          </a:effectRef>
+          <a:fontRef idx="minor">
+            <a:schemeClr val="tx1"/>
+          </a:fontRef>
+        </p:style>
+      </p:cxnSp>
+      <p:sp>
+        <p:nvSpPr>
+          <p:cNvPr id="68" name="Callout: Bent Line 67">
+            <a:extLst>
+              <a:ext uri="{FF2B5EF4-FFF2-40B4-BE49-F238E27FC236}">
+                <a16:creationId xmlns:a16="http://schemas.microsoft.com/office/drawing/2014/main" id="{655782EB-BCBD-437F-963A-E9D99D36E4BC}"/>
+              </a:ext>
+            </a:extLst>
+          </p:cNvPr>
+          <p:cNvSpPr/>
+          <p:nvPr/>
+        </p:nvSpPr>
+        <p:spPr>
+          <a:xfrm>
+            <a:off x="1228914" y="3284229"/>
+            <a:ext cx="914400" cy="403591"/>
+          </a:xfrm>
+          <a:prstGeom prst="borderCallout2">
+            <a:avLst>
+              <a:gd name="adj1" fmla="val 47357"/>
+              <a:gd name="adj2" fmla="val -1666"/>
+              <a:gd name="adj3" fmla="val 47358"/>
+              <a:gd name="adj4" fmla="val -22500"/>
+              <a:gd name="adj5" fmla="val 272152"/>
+              <a:gd name="adj6" fmla="val -29167"/>
+            </a:avLst>
+          </a:prstGeom>
+        </p:spPr>
+        <p:style>
+          <a:lnRef idx="1">
+            <a:schemeClr val="accent3"/>
+          </a:lnRef>
+          <a:fillRef idx="2">
+            <a:schemeClr val="accent3"/>
+          </a:fillRef>
+          <a:effectRef idx="1">
+            <a:schemeClr val="accent3"/>
+          </a:effectRef>
+          <a:fontRef idx="minor">
+            <a:schemeClr val="dk1"/>
+          </a:fontRef>
+        </p:style>
+        <p:txBody>
+          <a:bodyPr rtlCol="0" anchor="ctr"/>
+          <a:lstStyle/>
+          <a:p>
+            <a:pPr algn="ctr"/>
+            <a:r>
+              <a:rPr lang="it-IT" sz="1200" dirty="0"/>
+              <a:t>code</a:t>
+            </a:r>
+          </a:p>
+        </p:txBody>
+      </p:sp>
+      <p:sp>
+        <p:nvSpPr>
+          <p:cNvPr id="69" name="TextBox 68">
+            <a:extLst>
+              <a:ext uri="{FF2B5EF4-FFF2-40B4-BE49-F238E27FC236}">
+                <a16:creationId xmlns:a16="http://schemas.microsoft.com/office/drawing/2014/main" id="{2A099489-91B1-4416-8928-85C82DE51283}"/>
+              </a:ext>
+            </a:extLst>
+          </p:cNvPr>
+          <p:cNvSpPr txBox="1"/>
+          <p:nvPr/>
+        </p:nvSpPr>
+        <p:spPr>
+          <a:xfrm>
+            <a:off x="3147455" y="4269349"/>
+            <a:ext cx="659155" cy="369332"/>
+          </a:xfrm>
+          <a:prstGeom prst="rect">
+            <a:avLst/>
+          </a:prstGeom>
+          <a:noFill/>
+        </p:spPr>
+        <p:txBody>
+          <a:bodyPr wrap="none" rtlCol="0">
+            <a:spAutoFit/>
+          </a:bodyPr>
+          <a:lstStyle/>
+          <a:p>
+            <a:r>
+              <a:rPr lang="it-IT" dirty="0"/>
+              <a:t>Build</a:t>
+            </a:r>
+          </a:p>
+        </p:txBody>
+      </p:sp>
+      <p:sp>
+        <p:nvSpPr>
+          <p:cNvPr id="70" name="TextBox 69">
+            <a:extLst>
+              <a:ext uri="{FF2B5EF4-FFF2-40B4-BE49-F238E27FC236}">
+                <a16:creationId xmlns:a16="http://schemas.microsoft.com/office/drawing/2014/main" id="{A8A3D390-B92A-4856-9B6D-9D094973A69E}"/>
+              </a:ext>
+            </a:extLst>
+          </p:cNvPr>
+          <p:cNvSpPr txBox="1"/>
+          <p:nvPr/>
+        </p:nvSpPr>
+        <p:spPr>
+          <a:xfrm>
+            <a:off x="5384459" y="4260969"/>
+            <a:ext cx="842282" cy="369332"/>
+          </a:xfrm>
+          <a:prstGeom prst="rect">
+            <a:avLst/>
+          </a:prstGeom>
+          <a:noFill/>
+        </p:spPr>
+        <p:txBody>
+          <a:bodyPr wrap="none" rtlCol="0">
+            <a:spAutoFit/>
+          </a:bodyPr>
+          <a:lstStyle/>
+          <a:p>
+            <a:r>
+              <a:rPr lang="it-IT" dirty="0" err="1"/>
+              <a:t>Deploy</a:t>
+            </a:r>
+            <a:endParaRPr lang="it-IT" dirty="0"/>
+          </a:p>
+        </p:txBody>
+      </p:sp>
+      <p:sp>
+        <p:nvSpPr>
+          <p:cNvPr id="71" name="Callout: Bent Line 70">
+            <a:extLst>
+              <a:ext uri="{FF2B5EF4-FFF2-40B4-BE49-F238E27FC236}">
+                <a16:creationId xmlns:a16="http://schemas.microsoft.com/office/drawing/2014/main" id="{21A0D03B-2C67-467D-BD7A-7504F5203673}"/>
+              </a:ext>
+            </a:extLst>
+          </p:cNvPr>
+          <p:cNvSpPr/>
+          <p:nvPr/>
+        </p:nvSpPr>
+        <p:spPr>
+          <a:xfrm>
+            <a:off x="3976783" y="1952987"/>
+            <a:ext cx="914400" cy="403591"/>
+          </a:xfrm>
+          <a:prstGeom prst="borderCallout2">
+            <a:avLst>
+              <a:gd name="adj1" fmla="val 47357"/>
+              <a:gd name="adj2" fmla="val -1666"/>
+              <a:gd name="adj3" fmla="val 47358"/>
+              <a:gd name="adj4" fmla="val -22500"/>
+              <a:gd name="adj5" fmla="val 272152"/>
+              <a:gd name="adj6" fmla="val -29167"/>
+            </a:avLst>
+          </a:prstGeom>
+        </p:spPr>
+        <p:style>
+          <a:lnRef idx="1">
+            <a:schemeClr val="accent3"/>
+          </a:lnRef>
+          <a:fillRef idx="2">
+            <a:schemeClr val="accent3"/>
+          </a:fillRef>
+          <a:effectRef idx="1">
+            <a:schemeClr val="accent3"/>
+          </a:effectRef>
+          <a:fontRef idx="minor">
+            <a:schemeClr val="dk1"/>
+          </a:fontRef>
+        </p:style>
+        <p:txBody>
+          <a:bodyPr rtlCol="0" anchor="ctr"/>
+          <a:lstStyle/>
+          <a:p>
+            <a:pPr algn="ctr"/>
+            <a:r>
+              <a:rPr lang="it-IT" sz="1200" dirty="0" err="1"/>
+              <a:t>Push</a:t>
+            </a:r>
+            <a:r>
+              <a:rPr lang="it-IT" sz="1200" dirty="0"/>
+              <a:t> images</a:t>
+            </a:r>
+          </a:p>
+        </p:txBody>
+      </p:sp>
+      <p:sp>
+        <p:nvSpPr>
+          <p:cNvPr id="72" name="Callout: Bent Line 71">
+            <a:extLst>
+              <a:ext uri="{FF2B5EF4-FFF2-40B4-BE49-F238E27FC236}">
+                <a16:creationId xmlns:a16="http://schemas.microsoft.com/office/drawing/2014/main" id="{3DC4799E-B154-455B-83E7-034248166A4C}"/>
+              </a:ext>
+            </a:extLst>
+          </p:cNvPr>
+          <p:cNvSpPr/>
+          <p:nvPr/>
+        </p:nvSpPr>
+        <p:spPr>
+          <a:xfrm>
+            <a:off x="1064778" y="6265858"/>
+            <a:ext cx="914400" cy="403591"/>
+          </a:xfrm>
+          <a:prstGeom prst="borderCallout2">
+            <a:avLst>
+              <a:gd name="adj1" fmla="val 47357"/>
+              <a:gd name="adj2" fmla="val -1666"/>
+              <a:gd name="adj3" fmla="val 47358"/>
+              <a:gd name="adj4" fmla="val -22500"/>
+              <a:gd name="adj5" fmla="val -120562"/>
+              <a:gd name="adj6" fmla="val -20001"/>
+            </a:avLst>
+          </a:prstGeom>
+        </p:spPr>
+        <p:style>
+          <a:lnRef idx="1">
+            <a:schemeClr val="accent3"/>
+          </a:lnRef>
+          <a:fillRef idx="2">
+            <a:schemeClr val="accent3"/>
+          </a:fillRef>
+          <a:effectRef idx="1">
+            <a:schemeClr val="accent3"/>
+          </a:effectRef>
+          <a:fontRef idx="minor">
+            <a:schemeClr val="dk1"/>
+          </a:fontRef>
+        </p:style>
+        <p:txBody>
+          <a:bodyPr rtlCol="0" anchor="ctr"/>
+          <a:lstStyle/>
+          <a:p>
+            <a:pPr algn="ctr"/>
+            <a:r>
+              <a:rPr lang="it-IT" sz="1200" dirty="0" err="1"/>
+              <a:t>config</a:t>
+            </a:r>
+            <a:endParaRPr lang="it-IT" sz="1200" dirty="0"/>
+          </a:p>
+        </p:txBody>
+      </p:sp>
+      <p:sp>
+        <p:nvSpPr>
+          <p:cNvPr id="75" name="Callout: Bent Line 74">
+            <a:extLst>
+              <a:ext uri="{FF2B5EF4-FFF2-40B4-BE49-F238E27FC236}">
+                <a16:creationId xmlns:a16="http://schemas.microsoft.com/office/drawing/2014/main" id="{BE6D9DDE-5E3D-48AB-BBA2-7C598223B901}"/>
+              </a:ext>
+            </a:extLst>
+          </p:cNvPr>
+          <p:cNvSpPr/>
+          <p:nvPr/>
+        </p:nvSpPr>
+        <p:spPr>
+          <a:xfrm>
+            <a:off x="7061645" y="5237545"/>
+            <a:ext cx="914400" cy="685542"/>
+          </a:xfrm>
+          <a:prstGeom prst="borderCallout2">
+            <a:avLst>
+              <a:gd name="adj1" fmla="val 47357"/>
+              <a:gd name="adj2" fmla="val -1666"/>
+              <a:gd name="adj3" fmla="val 47358"/>
+              <a:gd name="adj4" fmla="val -22500"/>
+              <a:gd name="adj5" fmla="val -100142"/>
+              <a:gd name="adj6" fmla="val -40834"/>
+            </a:avLst>
+          </a:prstGeom>
+        </p:spPr>
+        <p:style>
+          <a:lnRef idx="1">
+            <a:schemeClr val="accent3"/>
+          </a:lnRef>
+          <a:fillRef idx="2">
+            <a:schemeClr val="accent3"/>
+          </a:fillRef>
+          <a:effectRef idx="1">
+            <a:schemeClr val="accent3"/>
+          </a:effectRef>
+          <a:fontRef idx="minor">
+            <a:schemeClr val="dk1"/>
+          </a:fontRef>
+        </p:style>
+        <p:txBody>
+          <a:bodyPr rtlCol="0" anchor="ctr"/>
+          <a:lstStyle/>
+          <a:p>
+            <a:pPr algn="ctr"/>
+            <a:r>
+              <a:rPr lang="it-IT" sz="1200" dirty="0"/>
+              <a:t>Scripts</a:t>
+            </a:r>
+          </a:p>
+          <a:p>
+            <a:pPr algn="ctr"/>
+            <a:r>
+              <a:rPr lang="it-IT" sz="1200" dirty="0" err="1"/>
+              <a:t>Helm</a:t>
+            </a:r>
+            <a:endParaRPr lang="it-IT" sz="1200" dirty="0"/>
+          </a:p>
+          <a:p>
+            <a:pPr algn="ctr"/>
+            <a:r>
+              <a:rPr lang="it-IT" sz="1200" dirty="0" err="1"/>
+              <a:t>kubectl</a:t>
+            </a:r>
+            <a:endParaRPr lang="it-IT" sz="1200" dirty="0"/>
+          </a:p>
+        </p:txBody>
+      </p:sp>
+      <p:sp>
+        <p:nvSpPr>
+          <p:cNvPr id="76" name="Callout: Bent Line 75">
+            <a:extLst>
+              <a:ext uri="{FF2B5EF4-FFF2-40B4-BE49-F238E27FC236}">
+                <a16:creationId xmlns:a16="http://schemas.microsoft.com/office/drawing/2014/main" id="{E8F13834-E9F2-4ADD-9D04-4273326B1FC4}"/>
+              </a:ext>
+            </a:extLst>
+          </p:cNvPr>
+          <p:cNvSpPr/>
+          <p:nvPr/>
+        </p:nvSpPr>
+        <p:spPr>
+          <a:xfrm>
+            <a:off x="6375279" y="2106631"/>
+            <a:ext cx="914400" cy="403591"/>
+          </a:xfrm>
+          <a:prstGeom prst="borderCallout2">
+            <a:avLst>
+              <a:gd name="adj1" fmla="val 45469"/>
+              <a:gd name="adj2" fmla="val 101667"/>
+              <a:gd name="adj3" fmla="val 90783"/>
+              <a:gd name="adj4" fmla="val 137500"/>
+              <a:gd name="adj5" fmla="val 217398"/>
+              <a:gd name="adj6" fmla="val 148333"/>
+            </a:avLst>
+          </a:prstGeom>
+        </p:spPr>
+        <p:style>
+          <a:lnRef idx="1">
+            <a:schemeClr val="accent3"/>
+          </a:lnRef>
+          <a:fillRef idx="2">
+            <a:schemeClr val="accent3"/>
+          </a:fillRef>
+          <a:effectRef idx="1">
+            <a:schemeClr val="accent3"/>
+          </a:effectRef>
+          <a:fontRef idx="minor">
+            <a:schemeClr val="dk1"/>
+          </a:fontRef>
+        </p:style>
+        <p:txBody>
+          <a:bodyPr rtlCol="0" anchor="ctr"/>
+          <a:lstStyle/>
+          <a:p>
+            <a:pPr algn="ctr"/>
+            <a:r>
+              <a:rPr lang="it-IT" sz="1200" dirty="0"/>
+              <a:t>Pull images</a:t>
+            </a:r>
           </a:p>
         </p:txBody>
       </p:sp>
     </p:spTree>
     <p:extLst>
       <p:ext uri="{BB962C8B-B14F-4D97-AF65-F5344CB8AC3E}">
-        <p14:creationId xmlns:p14="http://schemas.microsoft.com/office/powerpoint/2010/main" val="2242557126"/>
+        <p14:creationId xmlns:p14="http://schemas.microsoft.com/office/powerpoint/2010/main" val="3042618897"/>
       </p:ext>
     </p:extLst>
   </p:cSld>
@@ -17923,6 +19054,1037 @@
             <p:ph type="body" sz="quarter" idx="11"/>
           </p:nvPr>
         </p:nvSpPr>
+        <p:spPr>
+          <a:xfrm>
+            <a:off x="328613" y="1079048"/>
+            <a:ext cx="8401246" cy="731092"/>
+          </a:xfrm>
+        </p:spPr>
+        <p:txBody>
+          <a:bodyPr/>
+          <a:lstStyle/>
+          <a:p>
+            <a:r>
+              <a:rPr lang="en-US" dirty="0" err="1"/>
+              <a:t>Deployability</a:t>
+            </a:r>
+            <a:endParaRPr lang="en-US" dirty="0"/>
+          </a:p>
+        </p:txBody>
+      </p:sp>
+      <p:sp>
+        <p:nvSpPr>
+          <p:cNvPr id="11" name="TextBox 10">
+            <a:extLst>
+              <a:ext uri="{FF2B5EF4-FFF2-40B4-BE49-F238E27FC236}">
+                <a16:creationId xmlns:a16="http://schemas.microsoft.com/office/drawing/2014/main" id="{05247ED7-02F4-49CB-B839-553286B18DF6}"/>
+              </a:ext>
+            </a:extLst>
+          </p:cNvPr>
+          <p:cNvSpPr txBox="1"/>
+          <p:nvPr/>
+        </p:nvSpPr>
+        <p:spPr>
+          <a:xfrm>
+            <a:off x="328610" y="2113935"/>
+            <a:ext cx="8210747" cy="523220"/>
+          </a:xfrm>
+          <a:prstGeom prst="rect">
+            <a:avLst/>
+          </a:prstGeom>
+          <a:noFill/>
+        </p:spPr>
+        <p:txBody>
+          <a:bodyPr wrap="square" rtlCol="0">
+            <a:spAutoFit/>
+          </a:bodyPr>
+          <a:lstStyle/>
+          <a:p>
+            <a:r>
+              <a:rPr lang="en-GB" sz="2800" dirty="0"/>
+              <a:t>CI/CD Pull (</a:t>
+            </a:r>
+            <a:r>
+              <a:rPr lang="en-GB" sz="2800" dirty="0" err="1"/>
+              <a:t>GitOps</a:t>
+            </a:r>
+            <a:r>
+              <a:rPr lang="en-GB" sz="2800" dirty="0"/>
+              <a:t>)</a:t>
+            </a:r>
+          </a:p>
+        </p:txBody>
+      </p:sp>
+      <p:pic>
+        <p:nvPicPr>
+          <p:cNvPr id="5" name="Picture 4">
+            <a:extLst>
+              <a:ext uri="{FF2B5EF4-FFF2-40B4-BE49-F238E27FC236}">
+                <a16:creationId xmlns:a16="http://schemas.microsoft.com/office/drawing/2014/main" id="{7660FE69-5CE6-45C1-9AC8-A4F1E2C187DA}"/>
+              </a:ext>
+            </a:extLst>
+          </p:cNvPr>
+          <p:cNvPicPr>
+            <a:picLocks noChangeAspect="1"/>
+          </p:cNvPicPr>
+          <p:nvPr/>
+        </p:nvPicPr>
+        <p:blipFill>
+          <a:blip r:embed="rId3"/>
+          <a:stretch>
+            <a:fillRect/>
+          </a:stretch>
+        </p:blipFill>
+        <p:spPr>
+          <a:xfrm>
+            <a:off x="162618" y="4107883"/>
+            <a:ext cx="688886" cy="682230"/>
+          </a:xfrm>
+          <a:prstGeom prst="rect">
+            <a:avLst/>
+          </a:prstGeom>
+        </p:spPr>
+      </p:pic>
+      <p:pic>
+        <p:nvPicPr>
+          <p:cNvPr id="6" name="Picture 5">
+            <a:extLst>
+              <a:ext uri="{FF2B5EF4-FFF2-40B4-BE49-F238E27FC236}">
+                <a16:creationId xmlns:a16="http://schemas.microsoft.com/office/drawing/2014/main" id="{FF110200-A312-4203-81D8-F0A866FC0DCF}"/>
+              </a:ext>
+            </a:extLst>
+          </p:cNvPr>
+          <p:cNvPicPr>
+            <a:picLocks noChangeAspect="1"/>
+          </p:cNvPicPr>
+          <p:nvPr/>
+        </p:nvPicPr>
+        <p:blipFill>
+          <a:blip r:embed="rId4"/>
+          <a:stretch>
+            <a:fillRect/>
+          </a:stretch>
+        </p:blipFill>
+        <p:spPr>
+          <a:xfrm>
+            <a:off x="1167955" y="4111244"/>
+            <a:ext cx="688886" cy="685542"/>
+          </a:xfrm>
+          <a:prstGeom prst="rect">
+            <a:avLst/>
+          </a:prstGeom>
+        </p:spPr>
+      </p:pic>
+      <p:pic>
+        <p:nvPicPr>
+          <p:cNvPr id="7" name="Picture 6">
+            <a:extLst>
+              <a:ext uri="{FF2B5EF4-FFF2-40B4-BE49-F238E27FC236}">
+                <a16:creationId xmlns:a16="http://schemas.microsoft.com/office/drawing/2014/main" id="{085578EC-DDA6-4185-AFED-A254BFC6EF2A}"/>
+              </a:ext>
+            </a:extLst>
+          </p:cNvPr>
+          <p:cNvPicPr>
+            <a:picLocks noChangeAspect="1"/>
+          </p:cNvPicPr>
+          <p:nvPr/>
+        </p:nvPicPr>
+        <p:blipFill>
+          <a:blip r:embed="rId5"/>
+          <a:stretch>
+            <a:fillRect/>
+          </a:stretch>
+        </p:blipFill>
+        <p:spPr>
+          <a:xfrm>
+            <a:off x="4572000" y="2736737"/>
+            <a:ext cx="688886" cy="692263"/>
+          </a:xfrm>
+          <a:prstGeom prst="rect">
+            <a:avLst/>
+          </a:prstGeom>
+        </p:spPr>
+      </p:pic>
+      <p:pic>
+        <p:nvPicPr>
+          <p:cNvPr id="9" name="Picture 8">
+            <a:extLst>
+              <a:ext uri="{FF2B5EF4-FFF2-40B4-BE49-F238E27FC236}">
+                <a16:creationId xmlns:a16="http://schemas.microsoft.com/office/drawing/2014/main" id="{52063F44-719C-4E90-9622-D99619064F35}"/>
+              </a:ext>
+            </a:extLst>
+          </p:cNvPr>
+          <p:cNvPicPr>
+            <a:picLocks noChangeAspect="1"/>
+          </p:cNvPicPr>
+          <p:nvPr/>
+        </p:nvPicPr>
+        <p:blipFill>
+          <a:blip r:embed="rId6"/>
+          <a:stretch>
+            <a:fillRect/>
+          </a:stretch>
+        </p:blipFill>
+        <p:spPr>
+          <a:xfrm>
+            <a:off x="2436378" y="4094538"/>
+            <a:ext cx="1803618" cy="695575"/>
+          </a:xfrm>
+          <a:prstGeom prst="rect">
+            <a:avLst/>
+          </a:prstGeom>
+        </p:spPr>
+      </p:pic>
+      <p:pic>
+        <p:nvPicPr>
+          <p:cNvPr id="10" name="Picture 9">
+            <a:extLst>
+              <a:ext uri="{FF2B5EF4-FFF2-40B4-BE49-F238E27FC236}">
+                <a16:creationId xmlns:a16="http://schemas.microsoft.com/office/drawing/2014/main" id="{3CCCBA9C-E2D5-4C3C-A5DC-F247D04CDA64}"/>
+              </a:ext>
+            </a:extLst>
+          </p:cNvPr>
+          <p:cNvPicPr>
+            <a:picLocks noChangeAspect="1"/>
+          </p:cNvPicPr>
+          <p:nvPr/>
+        </p:nvPicPr>
+        <p:blipFill>
+          <a:blip r:embed="rId7"/>
+          <a:stretch>
+            <a:fillRect/>
+          </a:stretch>
+        </p:blipFill>
+        <p:spPr>
+          <a:xfrm>
+            <a:off x="6863570" y="4118391"/>
+            <a:ext cx="1923385" cy="678566"/>
+          </a:xfrm>
+          <a:prstGeom prst="rect">
+            <a:avLst/>
+          </a:prstGeom>
+        </p:spPr>
+      </p:pic>
+      <p:cxnSp>
+        <p:nvCxnSpPr>
+          <p:cNvPr id="21" name="Straight Arrow Connector 20">
+            <a:extLst>
+              <a:ext uri="{FF2B5EF4-FFF2-40B4-BE49-F238E27FC236}">
+                <a16:creationId xmlns:a16="http://schemas.microsoft.com/office/drawing/2014/main" id="{C6AE85D1-08BB-427C-AEF1-15A344CEDD4A}"/>
+              </a:ext>
+            </a:extLst>
+          </p:cNvPr>
+          <p:cNvCxnSpPr>
+            <a:stCxn id="5" idx="3"/>
+            <a:endCxn id="6" idx="1"/>
+          </p:cNvCxnSpPr>
+          <p:nvPr/>
+        </p:nvCxnSpPr>
+        <p:spPr>
+          <a:xfrm>
+            <a:off x="851504" y="4448998"/>
+            <a:ext cx="316451" cy="5017"/>
+          </a:xfrm>
+          <a:prstGeom prst="straightConnector1">
+            <a:avLst/>
+          </a:prstGeom>
+          <a:ln>
+            <a:tailEnd type="triangle"/>
+          </a:ln>
+        </p:spPr>
+        <p:style>
+          <a:lnRef idx="2">
+            <a:schemeClr val="accent3"/>
+          </a:lnRef>
+          <a:fillRef idx="0">
+            <a:schemeClr val="accent3"/>
+          </a:fillRef>
+          <a:effectRef idx="1">
+            <a:schemeClr val="accent3"/>
+          </a:effectRef>
+          <a:fontRef idx="minor">
+            <a:schemeClr val="tx1"/>
+          </a:fontRef>
+        </p:style>
+      </p:cxnSp>
+      <p:cxnSp>
+        <p:nvCxnSpPr>
+          <p:cNvPr id="25" name="Straight Arrow Connector 24">
+            <a:extLst>
+              <a:ext uri="{FF2B5EF4-FFF2-40B4-BE49-F238E27FC236}">
+                <a16:creationId xmlns:a16="http://schemas.microsoft.com/office/drawing/2014/main" id="{2DD7F8B1-6870-4B24-A0A3-7D4E6C1E9D1F}"/>
+              </a:ext>
+            </a:extLst>
+          </p:cNvPr>
+          <p:cNvCxnSpPr>
+            <a:stCxn id="6" idx="3"/>
+            <a:endCxn id="9" idx="1"/>
+          </p:cNvCxnSpPr>
+          <p:nvPr/>
+        </p:nvCxnSpPr>
+        <p:spPr>
+          <a:xfrm flipV="1">
+            <a:off x="1856841" y="4442326"/>
+            <a:ext cx="579537" cy="11689"/>
+          </a:xfrm>
+          <a:prstGeom prst="straightConnector1">
+            <a:avLst/>
+          </a:prstGeom>
+          <a:ln>
+            <a:tailEnd type="triangle"/>
+          </a:ln>
+        </p:spPr>
+        <p:style>
+          <a:lnRef idx="2">
+            <a:schemeClr val="accent6"/>
+          </a:lnRef>
+          <a:fillRef idx="0">
+            <a:schemeClr val="accent6"/>
+          </a:fillRef>
+          <a:effectRef idx="1">
+            <a:schemeClr val="accent6"/>
+          </a:effectRef>
+          <a:fontRef idx="minor">
+            <a:schemeClr val="tx1"/>
+          </a:fontRef>
+        </p:style>
+      </p:cxnSp>
+      <p:pic>
+        <p:nvPicPr>
+          <p:cNvPr id="54" name="Picture 53">
+            <a:extLst>
+              <a:ext uri="{FF2B5EF4-FFF2-40B4-BE49-F238E27FC236}">
+                <a16:creationId xmlns:a16="http://schemas.microsoft.com/office/drawing/2014/main" id="{4B487240-2F9D-4328-A4DF-371D8F3B1167}"/>
+              </a:ext>
+            </a:extLst>
+          </p:cNvPr>
+          <p:cNvPicPr>
+            <a:picLocks noChangeAspect="1"/>
+          </p:cNvPicPr>
+          <p:nvPr/>
+        </p:nvPicPr>
+        <p:blipFill>
+          <a:blip r:embed="rId4"/>
+          <a:stretch>
+            <a:fillRect/>
+          </a:stretch>
+        </p:blipFill>
+        <p:spPr>
+          <a:xfrm>
+            <a:off x="1167955" y="5359936"/>
+            <a:ext cx="688886" cy="685542"/>
+          </a:xfrm>
+          <a:prstGeom prst="rect">
+            <a:avLst/>
+          </a:prstGeom>
+        </p:spPr>
+      </p:pic>
+      <p:cxnSp>
+        <p:nvCxnSpPr>
+          <p:cNvPr id="56" name="Connector: Elbow 55">
+            <a:extLst>
+              <a:ext uri="{FF2B5EF4-FFF2-40B4-BE49-F238E27FC236}">
+                <a16:creationId xmlns:a16="http://schemas.microsoft.com/office/drawing/2014/main" id="{03A371B6-E050-421E-9F51-10755D6B88F8}"/>
+              </a:ext>
+            </a:extLst>
+          </p:cNvPr>
+          <p:cNvCxnSpPr>
+            <a:stCxn id="9" idx="0"/>
+            <a:endCxn id="7" idx="1"/>
+          </p:cNvCxnSpPr>
+          <p:nvPr/>
+        </p:nvCxnSpPr>
+        <p:spPr>
+          <a:xfrm rot="5400000" flipH="1" flipV="1">
+            <a:off x="3449259" y="2971798"/>
+            <a:ext cx="1011669" cy="1233813"/>
+          </a:xfrm>
+          <a:prstGeom prst="bentConnector2">
+            <a:avLst/>
+          </a:prstGeom>
+          <a:ln>
+            <a:tailEnd type="triangle"/>
+          </a:ln>
+        </p:spPr>
+        <p:style>
+          <a:lnRef idx="2">
+            <a:schemeClr val="accent1"/>
+          </a:lnRef>
+          <a:fillRef idx="0">
+            <a:schemeClr val="accent1"/>
+          </a:fillRef>
+          <a:effectRef idx="1">
+            <a:schemeClr val="accent1"/>
+          </a:effectRef>
+          <a:fontRef idx="minor">
+            <a:schemeClr val="tx1"/>
+          </a:fontRef>
+        </p:style>
+      </p:cxnSp>
+      <p:cxnSp>
+        <p:nvCxnSpPr>
+          <p:cNvPr id="58" name="Connector: Elbow 57">
+            <a:extLst>
+              <a:ext uri="{FF2B5EF4-FFF2-40B4-BE49-F238E27FC236}">
+                <a16:creationId xmlns:a16="http://schemas.microsoft.com/office/drawing/2014/main" id="{57DD01CF-EF12-459A-A58D-1D4D19A47645}"/>
+              </a:ext>
+            </a:extLst>
+          </p:cNvPr>
+          <p:cNvCxnSpPr>
+            <a:stCxn id="10" idx="0"/>
+            <a:endCxn id="7" idx="3"/>
+          </p:cNvCxnSpPr>
+          <p:nvPr/>
+        </p:nvCxnSpPr>
+        <p:spPr>
+          <a:xfrm rot="16200000" flipV="1">
+            <a:off x="6025314" y="2318441"/>
+            <a:ext cx="1035522" cy="2564377"/>
+          </a:xfrm>
+          <a:prstGeom prst="bentConnector2">
+            <a:avLst/>
+          </a:prstGeom>
+          <a:ln>
+            <a:tailEnd type="triangle"/>
+          </a:ln>
+        </p:spPr>
+        <p:style>
+          <a:lnRef idx="2">
+            <a:schemeClr val="accent1"/>
+          </a:lnRef>
+          <a:fillRef idx="0">
+            <a:schemeClr val="accent1"/>
+          </a:fillRef>
+          <a:effectRef idx="1">
+            <a:schemeClr val="accent1"/>
+          </a:effectRef>
+          <a:fontRef idx="minor">
+            <a:schemeClr val="tx1"/>
+          </a:fontRef>
+        </p:style>
+      </p:cxnSp>
+      <p:cxnSp>
+        <p:nvCxnSpPr>
+          <p:cNvPr id="63" name="Connector: Elbow 62">
+            <a:extLst>
+              <a:ext uri="{FF2B5EF4-FFF2-40B4-BE49-F238E27FC236}">
+                <a16:creationId xmlns:a16="http://schemas.microsoft.com/office/drawing/2014/main" id="{F603E818-39DA-4481-AAD1-32ED0DD22095}"/>
+              </a:ext>
+            </a:extLst>
+          </p:cNvPr>
+          <p:cNvCxnSpPr>
+            <a:cxnSpLocks/>
+            <a:stCxn id="13" idx="2"/>
+            <a:endCxn id="54" idx="3"/>
+          </p:cNvCxnSpPr>
+          <p:nvPr/>
+        </p:nvCxnSpPr>
+        <p:spPr>
+          <a:xfrm rot="5400000">
+            <a:off x="3485586" y="3226427"/>
+            <a:ext cx="847536" cy="4105025"/>
+          </a:xfrm>
+          <a:prstGeom prst="bentConnector2">
+            <a:avLst/>
+          </a:prstGeom>
+          <a:ln>
+            <a:tailEnd type="triangle"/>
+          </a:ln>
+        </p:spPr>
+        <p:style>
+          <a:lnRef idx="2">
+            <a:schemeClr val="accent1"/>
+          </a:lnRef>
+          <a:fillRef idx="0">
+            <a:schemeClr val="accent1"/>
+          </a:fillRef>
+          <a:effectRef idx="1">
+            <a:schemeClr val="accent1"/>
+          </a:effectRef>
+          <a:fontRef idx="minor">
+            <a:schemeClr val="tx1"/>
+          </a:fontRef>
+        </p:style>
+      </p:cxnSp>
+      <p:cxnSp>
+        <p:nvCxnSpPr>
+          <p:cNvPr id="65" name="Connector: Elbow 64">
+            <a:extLst>
+              <a:ext uri="{FF2B5EF4-FFF2-40B4-BE49-F238E27FC236}">
+                <a16:creationId xmlns:a16="http://schemas.microsoft.com/office/drawing/2014/main" id="{AE702056-0792-45B9-AA66-0E1603CFFEF8}"/>
+              </a:ext>
+            </a:extLst>
+          </p:cNvPr>
+          <p:cNvCxnSpPr>
+            <a:stCxn id="5" idx="2"/>
+            <a:endCxn id="54" idx="1"/>
+          </p:cNvCxnSpPr>
+          <p:nvPr/>
+        </p:nvCxnSpPr>
+        <p:spPr>
+          <a:xfrm rot="16200000" flipH="1">
+            <a:off x="381211" y="4915963"/>
+            <a:ext cx="912594" cy="660894"/>
+          </a:xfrm>
+          <a:prstGeom prst="bentConnector2">
+            <a:avLst/>
+          </a:prstGeom>
+          <a:ln>
+            <a:tailEnd type="triangle"/>
+          </a:ln>
+        </p:spPr>
+        <p:style>
+          <a:lnRef idx="2">
+            <a:schemeClr val="accent3"/>
+          </a:lnRef>
+          <a:fillRef idx="0">
+            <a:schemeClr val="accent3"/>
+          </a:fillRef>
+          <a:effectRef idx="1">
+            <a:schemeClr val="accent3"/>
+          </a:effectRef>
+          <a:fontRef idx="minor">
+            <a:schemeClr val="tx1"/>
+          </a:fontRef>
+        </p:style>
+      </p:cxnSp>
+      <p:sp>
+        <p:nvSpPr>
+          <p:cNvPr id="68" name="Callout: Bent Line 67">
+            <a:extLst>
+              <a:ext uri="{FF2B5EF4-FFF2-40B4-BE49-F238E27FC236}">
+                <a16:creationId xmlns:a16="http://schemas.microsoft.com/office/drawing/2014/main" id="{655782EB-BCBD-437F-963A-E9D99D36E4BC}"/>
+              </a:ext>
+            </a:extLst>
+          </p:cNvPr>
+          <p:cNvSpPr/>
+          <p:nvPr/>
+        </p:nvSpPr>
+        <p:spPr>
+          <a:xfrm>
+            <a:off x="1228914" y="3284229"/>
+            <a:ext cx="914400" cy="403591"/>
+          </a:xfrm>
+          <a:prstGeom prst="borderCallout2">
+            <a:avLst>
+              <a:gd name="adj1" fmla="val 47357"/>
+              <a:gd name="adj2" fmla="val -1666"/>
+              <a:gd name="adj3" fmla="val 47358"/>
+              <a:gd name="adj4" fmla="val -22500"/>
+              <a:gd name="adj5" fmla="val 272152"/>
+              <a:gd name="adj6" fmla="val -29167"/>
+            </a:avLst>
+          </a:prstGeom>
+        </p:spPr>
+        <p:style>
+          <a:lnRef idx="1">
+            <a:schemeClr val="accent3"/>
+          </a:lnRef>
+          <a:fillRef idx="2">
+            <a:schemeClr val="accent3"/>
+          </a:fillRef>
+          <a:effectRef idx="1">
+            <a:schemeClr val="accent3"/>
+          </a:effectRef>
+          <a:fontRef idx="minor">
+            <a:schemeClr val="dk1"/>
+          </a:fontRef>
+        </p:style>
+        <p:txBody>
+          <a:bodyPr rtlCol="0" anchor="ctr"/>
+          <a:lstStyle/>
+          <a:p>
+            <a:pPr algn="ctr"/>
+            <a:r>
+              <a:rPr lang="it-IT" sz="1200" dirty="0"/>
+              <a:t>code</a:t>
+            </a:r>
+          </a:p>
+        </p:txBody>
+      </p:sp>
+      <p:sp>
+        <p:nvSpPr>
+          <p:cNvPr id="69" name="TextBox 68">
+            <a:extLst>
+              <a:ext uri="{FF2B5EF4-FFF2-40B4-BE49-F238E27FC236}">
+                <a16:creationId xmlns:a16="http://schemas.microsoft.com/office/drawing/2014/main" id="{2A099489-91B1-4416-8928-85C82DE51283}"/>
+              </a:ext>
+            </a:extLst>
+          </p:cNvPr>
+          <p:cNvSpPr txBox="1"/>
+          <p:nvPr/>
+        </p:nvSpPr>
+        <p:spPr>
+          <a:xfrm>
+            <a:off x="3147455" y="4269349"/>
+            <a:ext cx="659155" cy="369332"/>
+          </a:xfrm>
+          <a:prstGeom prst="rect">
+            <a:avLst/>
+          </a:prstGeom>
+          <a:noFill/>
+        </p:spPr>
+        <p:txBody>
+          <a:bodyPr wrap="none" rtlCol="0">
+            <a:spAutoFit/>
+          </a:bodyPr>
+          <a:lstStyle/>
+          <a:p>
+            <a:r>
+              <a:rPr lang="it-IT" dirty="0"/>
+              <a:t>Build</a:t>
+            </a:r>
+          </a:p>
+        </p:txBody>
+      </p:sp>
+      <p:sp>
+        <p:nvSpPr>
+          <p:cNvPr id="71" name="Callout: Bent Line 70">
+            <a:extLst>
+              <a:ext uri="{FF2B5EF4-FFF2-40B4-BE49-F238E27FC236}">
+                <a16:creationId xmlns:a16="http://schemas.microsoft.com/office/drawing/2014/main" id="{21A0D03B-2C67-467D-BD7A-7504F5203673}"/>
+              </a:ext>
+            </a:extLst>
+          </p:cNvPr>
+          <p:cNvSpPr/>
+          <p:nvPr/>
+        </p:nvSpPr>
+        <p:spPr>
+          <a:xfrm>
+            <a:off x="3976783" y="1952987"/>
+            <a:ext cx="914400" cy="403591"/>
+          </a:xfrm>
+          <a:prstGeom prst="borderCallout2">
+            <a:avLst>
+              <a:gd name="adj1" fmla="val 47357"/>
+              <a:gd name="adj2" fmla="val -1666"/>
+              <a:gd name="adj3" fmla="val 47358"/>
+              <a:gd name="adj4" fmla="val -22500"/>
+              <a:gd name="adj5" fmla="val 272152"/>
+              <a:gd name="adj6" fmla="val -29167"/>
+            </a:avLst>
+          </a:prstGeom>
+        </p:spPr>
+        <p:style>
+          <a:lnRef idx="1">
+            <a:schemeClr val="accent3"/>
+          </a:lnRef>
+          <a:fillRef idx="2">
+            <a:schemeClr val="accent3"/>
+          </a:fillRef>
+          <a:effectRef idx="1">
+            <a:schemeClr val="accent3"/>
+          </a:effectRef>
+          <a:fontRef idx="minor">
+            <a:schemeClr val="dk1"/>
+          </a:fontRef>
+        </p:style>
+        <p:txBody>
+          <a:bodyPr rtlCol="0" anchor="ctr"/>
+          <a:lstStyle/>
+          <a:p>
+            <a:pPr algn="ctr"/>
+            <a:r>
+              <a:rPr lang="it-IT" sz="1200" dirty="0" err="1"/>
+              <a:t>Push</a:t>
+            </a:r>
+            <a:r>
+              <a:rPr lang="it-IT" sz="1200" dirty="0"/>
+              <a:t> images</a:t>
+            </a:r>
+          </a:p>
+        </p:txBody>
+      </p:sp>
+      <p:sp>
+        <p:nvSpPr>
+          <p:cNvPr id="72" name="Callout: Bent Line 71">
+            <a:extLst>
+              <a:ext uri="{FF2B5EF4-FFF2-40B4-BE49-F238E27FC236}">
+                <a16:creationId xmlns:a16="http://schemas.microsoft.com/office/drawing/2014/main" id="{3DC4799E-B154-455B-83E7-034248166A4C}"/>
+              </a:ext>
+            </a:extLst>
+          </p:cNvPr>
+          <p:cNvSpPr/>
+          <p:nvPr/>
+        </p:nvSpPr>
+        <p:spPr>
+          <a:xfrm>
+            <a:off x="1064778" y="6265858"/>
+            <a:ext cx="914400" cy="403591"/>
+          </a:xfrm>
+          <a:prstGeom prst="borderCallout2">
+            <a:avLst>
+              <a:gd name="adj1" fmla="val 47357"/>
+              <a:gd name="adj2" fmla="val -1666"/>
+              <a:gd name="adj3" fmla="val 47358"/>
+              <a:gd name="adj4" fmla="val -22500"/>
+              <a:gd name="adj5" fmla="val -120562"/>
+              <a:gd name="adj6" fmla="val -20001"/>
+            </a:avLst>
+          </a:prstGeom>
+        </p:spPr>
+        <p:style>
+          <a:lnRef idx="1">
+            <a:schemeClr val="accent3"/>
+          </a:lnRef>
+          <a:fillRef idx="2">
+            <a:schemeClr val="accent3"/>
+          </a:fillRef>
+          <a:effectRef idx="1">
+            <a:schemeClr val="accent3"/>
+          </a:effectRef>
+          <a:fontRef idx="minor">
+            <a:schemeClr val="dk1"/>
+          </a:fontRef>
+        </p:style>
+        <p:txBody>
+          <a:bodyPr rtlCol="0" anchor="ctr"/>
+          <a:lstStyle/>
+          <a:p>
+            <a:pPr algn="ctr"/>
+            <a:r>
+              <a:rPr lang="it-IT" sz="1200" dirty="0" err="1"/>
+              <a:t>config</a:t>
+            </a:r>
+            <a:endParaRPr lang="it-IT" sz="1200" dirty="0"/>
+          </a:p>
+        </p:txBody>
+      </p:sp>
+      <p:sp>
+        <p:nvSpPr>
+          <p:cNvPr id="76" name="Callout: Bent Line 75">
+            <a:extLst>
+              <a:ext uri="{FF2B5EF4-FFF2-40B4-BE49-F238E27FC236}">
+                <a16:creationId xmlns:a16="http://schemas.microsoft.com/office/drawing/2014/main" id="{E8F13834-E9F2-4ADD-9D04-4273326B1FC4}"/>
+              </a:ext>
+            </a:extLst>
+          </p:cNvPr>
+          <p:cNvSpPr/>
+          <p:nvPr/>
+        </p:nvSpPr>
+        <p:spPr>
+          <a:xfrm>
+            <a:off x="6375279" y="2106631"/>
+            <a:ext cx="914400" cy="403591"/>
+          </a:xfrm>
+          <a:prstGeom prst="borderCallout2">
+            <a:avLst>
+              <a:gd name="adj1" fmla="val 45469"/>
+              <a:gd name="adj2" fmla="val 101667"/>
+              <a:gd name="adj3" fmla="val 90783"/>
+              <a:gd name="adj4" fmla="val 137500"/>
+              <a:gd name="adj5" fmla="val 217398"/>
+              <a:gd name="adj6" fmla="val 148333"/>
+            </a:avLst>
+          </a:prstGeom>
+        </p:spPr>
+        <p:style>
+          <a:lnRef idx="1">
+            <a:schemeClr val="accent3"/>
+          </a:lnRef>
+          <a:fillRef idx="2">
+            <a:schemeClr val="accent3"/>
+          </a:fillRef>
+          <a:effectRef idx="1">
+            <a:schemeClr val="accent3"/>
+          </a:effectRef>
+          <a:fontRef idx="minor">
+            <a:schemeClr val="dk1"/>
+          </a:fontRef>
+        </p:style>
+        <p:txBody>
+          <a:bodyPr rtlCol="0" anchor="ctr"/>
+          <a:lstStyle/>
+          <a:p>
+            <a:pPr algn="ctr"/>
+            <a:r>
+              <a:rPr lang="it-IT" sz="1200" dirty="0"/>
+              <a:t>Pull images</a:t>
+            </a:r>
+          </a:p>
+        </p:txBody>
+      </p:sp>
+      <p:sp>
+        <p:nvSpPr>
+          <p:cNvPr id="4" name="Rectangle: Rounded Corners 3">
+            <a:extLst>
+              <a:ext uri="{FF2B5EF4-FFF2-40B4-BE49-F238E27FC236}">
+                <a16:creationId xmlns:a16="http://schemas.microsoft.com/office/drawing/2014/main" id="{6A483C46-CF31-4C26-B741-BBF6777EC4CD}"/>
+              </a:ext>
+            </a:extLst>
+          </p:cNvPr>
+          <p:cNvSpPr/>
+          <p:nvPr/>
+        </p:nvSpPr>
+        <p:spPr>
+          <a:xfrm>
+            <a:off x="5434869" y="3638797"/>
+            <a:ext cx="3488151" cy="1672116"/>
+          </a:xfrm>
+          <a:prstGeom prst="roundRect">
+            <a:avLst/>
+          </a:prstGeom>
+          <a:noFill/>
+          <a:ln w="9525" cap="flat" cmpd="sng" algn="ctr">
+            <a:solidFill>
+              <a:schemeClr val="accent1"/>
+            </a:solidFill>
+            <a:prstDash val="solid"/>
+            <a:round/>
+            <a:headEnd type="none" w="med" len="med"/>
+            <a:tailEnd type="none" w="med" len="med"/>
+          </a:ln>
+        </p:spPr>
+        <p:style>
+          <a:lnRef idx="0">
+            <a:scrgbClr r="0" g="0" b="0"/>
+          </a:lnRef>
+          <a:fillRef idx="0">
+            <a:scrgbClr r="0" g="0" b="0"/>
+          </a:fillRef>
+          <a:effectRef idx="0">
+            <a:scrgbClr r="0" g="0" b="0"/>
+          </a:effectRef>
+          <a:fontRef idx="minor">
+            <a:schemeClr val="accent1"/>
+          </a:fontRef>
+        </p:style>
+        <p:txBody>
+          <a:bodyPr rtlCol="0" anchor="ctr"/>
+          <a:lstStyle/>
+          <a:p>
+            <a:pPr algn="ctr"/>
+            <a:endParaRPr lang="it-IT"/>
+          </a:p>
+        </p:txBody>
+      </p:sp>
+      <p:pic>
+        <p:nvPicPr>
+          <p:cNvPr id="13" name="Picture 12">
+            <a:extLst>
+              <a:ext uri="{FF2B5EF4-FFF2-40B4-BE49-F238E27FC236}">
+                <a16:creationId xmlns:a16="http://schemas.microsoft.com/office/drawing/2014/main" id="{D98297BE-0239-4E34-BAB9-9FDA507DC22E}"/>
+              </a:ext>
+            </a:extLst>
+          </p:cNvPr>
+          <p:cNvPicPr>
+            <a:picLocks noChangeAspect="1"/>
+          </p:cNvPicPr>
+          <p:nvPr/>
+        </p:nvPicPr>
+        <p:blipFill>
+          <a:blip r:embed="rId8"/>
+          <a:stretch>
+            <a:fillRect/>
+          </a:stretch>
+        </p:blipFill>
+        <p:spPr>
+          <a:xfrm>
+            <a:off x="5570606" y="4068256"/>
+            <a:ext cx="782519" cy="786915"/>
+          </a:xfrm>
+          <a:prstGeom prst="rect">
+            <a:avLst/>
+          </a:prstGeom>
+        </p:spPr>
+      </p:pic>
+      <p:sp>
+        <p:nvSpPr>
+          <p:cNvPr id="31" name="Callout: Bent Line 30">
+            <a:extLst>
+              <a:ext uri="{FF2B5EF4-FFF2-40B4-BE49-F238E27FC236}">
+                <a16:creationId xmlns:a16="http://schemas.microsoft.com/office/drawing/2014/main" id="{B638BC96-A5FB-4AC8-A2BC-04E197F361DF}"/>
+              </a:ext>
+            </a:extLst>
+          </p:cNvPr>
+          <p:cNvSpPr/>
+          <p:nvPr/>
+        </p:nvSpPr>
+        <p:spPr>
+          <a:xfrm>
+            <a:off x="7368064" y="5989591"/>
+            <a:ext cx="914400" cy="403591"/>
+          </a:xfrm>
+          <a:prstGeom prst="borderCallout2">
+            <a:avLst>
+              <a:gd name="adj1" fmla="val 47357"/>
+              <a:gd name="adj2" fmla="val -1666"/>
+              <a:gd name="adj3" fmla="val 47358"/>
+              <a:gd name="adj4" fmla="val -22500"/>
+              <a:gd name="adj5" fmla="val -281046"/>
+              <a:gd name="adj6" fmla="val -116667"/>
+            </a:avLst>
+          </a:prstGeom>
+        </p:spPr>
+        <p:style>
+          <a:lnRef idx="1">
+            <a:schemeClr val="accent3"/>
+          </a:lnRef>
+          <a:fillRef idx="2">
+            <a:schemeClr val="accent3"/>
+          </a:fillRef>
+          <a:effectRef idx="1">
+            <a:schemeClr val="accent3"/>
+          </a:effectRef>
+          <a:fontRef idx="minor">
+            <a:schemeClr val="dk1"/>
+          </a:fontRef>
+        </p:style>
+        <p:txBody>
+          <a:bodyPr rtlCol="0" anchor="ctr"/>
+          <a:lstStyle/>
+          <a:p>
+            <a:pPr algn="ctr"/>
+            <a:r>
+              <a:rPr lang="it-IT" sz="1200" dirty="0"/>
+              <a:t>Operator</a:t>
+            </a:r>
+          </a:p>
+        </p:txBody>
+      </p:sp>
+      <p:cxnSp>
+        <p:nvCxnSpPr>
+          <p:cNvPr id="33" name="Connector: Elbow 32">
+            <a:extLst>
+              <a:ext uri="{FF2B5EF4-FFF2-40B4-BE49-F238E27FC236}">
+                <a16:creationId xmlns:a16="http://schemas.microsoft.com/office/drawing/2014/main" id="{EE48F134-5479-4201-BBD3-96F44E037AFB}"/>
+              </a:ext>
+            </a:extLst>
+          </p:cNvPr>
+          <p:cNvCxnSpPr>
+            <a:cxnSpLocks/>
+            <a:stCxn id="13" idx="3"/>
+            <a:endCxn id="10" idx="1"/>
+          </p:cNvCxnSpPr>
+          <p:nvPr/>
+        </p:nvCxnSpPr>
+        <p:spPr>
+          <a:xfrm flipV="1">
+            <a:off x="6353125" y="4457674"/>
+            <a:ext cx="510445" cy="4040"/>
+          </a:xfrm>
+          <a:prstGeom prst="bentConnector3">
+            <a:avLst>
+              <a:gd name="adj1" fmla="val 50000"/>
+            </a:avLst>
+          </a:prstGeom>
+          <a:ln>
+            <a:tailEnd type="triangle"/>
+          </a:ln>
+        </p:spPr>
+        <p:style>
+          <a:lnRef idx="2">
+            <a:schemeClr val="accent1"/>
+          </a:lnRef>
+          <a:fillRef idx="0">
+            <a:schemeClr val="accent1"/>
+          </a:fillRef>
+          <a:effectRef idx="1">
+            <a:schemeClr val="accent1"/>
+          </a:effectRef>
+          <a:fontRef idx="minor">
+            <a:schemeClr val="tx1"/>
+          </a:fontRef>
+        </p:style>
+      </p:cxnSp>
+    </p:spTree>
+    <p:extLst>
+      <p:ext uri="{BB962C8B-B14F-4D97-AF65-F5344CB8AC3E}">
+        <p14:creationId xmlns:p14="http://schemas.microsoft.com/office/powerpoint/2010/main" val="2411463346"/>
+      </p:ext>
+    </p:extLst>
+  </p:cSld>
+  <p:clrMapOvr>
+    <a:masterClrMapping/>
+  </p:clrMapOvr>
+</p:sld>
+</file>
+
+<file path=ppt/slides/slide46.xml><?xml version="1.0" encoding="utf-8"?>
+<p:sld xmlns:a="http://schemas.openxmlformats.org/drawingml/2006/main" xmlns:r="http://schemas.openxmlformats.org/officeDocument/2006/relationships" xmlns:p="http://schemas.openxmlformats.org/presentationml/2006/main">
+  <p:cSld>
+    <p:spTree>
+      <p:nvGrpSpPr>
+        <p:cNvPr id="1" name=""/>
+        <p:cNvGrpSpPr/>
+        <p:nvPr/>
+      </p:nvGrpSpPr>
+      <p:grpSpPr>
+        <a:xfrm>
+          <a:off x="0" y="0"/>
+          <a:ext cx="0" cy="0"/>
+          <a:chOff x="0" y="0"/>
+          <a:chExt cx="0" cy="0"/>
+        </a:xfrm>
+      </p:grpSpPr>
+      <p:sp>
+        <p:nvSpPr>
+          <p:cNvPr id="2" name="Text Placeholder 1"/>
+          <p:cNvSpPr>
+            <a:spLocks noGrp="1"/>
+          </p:cNvSpPr>
+          <p:nvPr>
+            <p:ph type="body" sz="quarter" idx="11"/>
+          </p:nvPr>
+        </p:nvSpPr>
+        <p:spPr/>
+        <p:txBody>
+          <a:bodyPr/>
+          <a:lstStyle/>
+          <a:p>
+            <a:r>
+              <a:rPr lang="en-US" dirty="0"/>
+              <a:t>Event-Driven</a:t>
+            </a:r>
+          </a:p>
+          <a:p>
+            <a:endParaRPr lang="en-US" dirty="0"/>
+          </a:p>
+          <a:p>
+            <a:endParaRPr lang="en-US" dirty="0"/>
+          </a:p>
+        </p:txBody>
+      </p:sp>
+    </p:spTree>
+    <p:extLst>
+      <p:ext uri="{BB962C8B-B14F-4D97-AF65-F5344CB8AC3E}">
+        <p14:creationId xmlns:p14="http://schemas.microsoft.com/office/powerpoint/2010/main" val="2242557126"/>
+      </p:ext>
+    </p:extLst>
+  </p:cSld>
+  <p:clrMapOvr>
+    <a:masterClrMapping/>
+  </p:clrMapOvr>
+</p:sld>
+</file>
+
+<file path=ppt/slides/slide47.xml><?xml version="1.0" encoding="utf-8"?>
+<p:sld xmlns:a="http://schemas.openxmlformats.org/drawingml/2006/main" xmlns:r="http://schemas.openxmlformats.org/officeDocument/2006/relationships" xmlns:p="http://schemas.openxmlformats.org/presentationml/2006/main">
+  <p:cSld>
+    <p:spTree>
+      <p:nvGrpSpPr>
+        <p:cNvPr id="1" name=""/>
+        <p:cNvGrpSpPr/>
+        <p:nvPr/>
+      </p:nvGrpSpPr>
+      <p:grpSpPr>
+        <a:xfrm>
+          <a:off x="0" y="0"/>
+          <a:ext cx="0" cy="0"/>
+          <a:chOff x="0" y="0"/>
+          <a:chExt cx="0" cy="0"/>
+        </a:xfrm>
+      </p:grpSpPr>
+      <p:sp>
+        <p:nvSpPr>
+          <p:cNvPr id="2" name="Text Placeholder 1"/>
+          <p:cNvSpPr>
+            <a:spLocks noGrp="1"/>
+          </p:cNvSpPr>
+          <p:nvPr>
+            <p:ph type="body" sz="quarter" idx="11"/>
+          </p:nvPr>
+        </p:nvSpPr>
         <p:spPr/>
         <p:txBody>
           <a:bodyPr/>
@@ -17951,7 +20113,7 @@
 </p:sld>
 </file>
 
-<file path=ppt/slides/slide46.xml><?xml version="1.0" encoding="utf-8"?>
+<file path=ppt/slides/slide48.xml><?xml version="1.0" encoding="utf-8"?>
 <p:sld xmlns:a="http://schemas.openxmlformats.org/drawingml/2006/main" xmlns:r="http://schemas.openxmlformats.org/officeDocument/2006/relationships" xmlns:p="http://schemas.openxmlformats.org/presentationml/2006/main">
   <p:cSld>
     <p:spTree>

</xml_diff>

<commit_message>
introducing loose coupling chapter
</commit_message>
<xml_diff>
--- a/docs/solid.pptx
+++ b/docs/solid.pptx
@@ -5,10 +5,10 @@
     <p:sldMasterId id="2147483650" r:id="rId1"/>
   </p:sldMasterIdLst>
   <p:notesMasterIdLst>
-    <p:notesMasterId r:id="rId51"/>
+    <p:notesMasterId r:id="rId52"/>
   </p:notesMasterIdLst>
   <p:handoutMasterIdLst>
-    <p:handoutMasterId r:id="rId52"/>
+    <p:handoutMasterId r:id="rId53"/>
   </p:handoutMasterIdLst>
   <p:sldIdLst>
     <p:sldId id="309" r:id="rId2"/>
@@ -58,8 +58,9 @@
     <p:sldId id="342" r:id="rId46"/>
     <p:sldId id="334" r:id="rId47"/>
     <p:sldId id="335" r:id="rId48"/>
-    <p:sldId id="343" r:id="rId49"/>
-    <p:sldId id="330" r:id="rId50"/>
+    <p:sldId id="344" r:id="rId49"/>
+    <p:sldId id="343" r:id="rId50"/>
+    <p:sldId id="330" r:id="rId51"/>
   </p:sldIdLst>
   <p:sldSz cx="9144000" cy="6858000" type="screen4x3"/>
   <p:notesSz cx="6858000" cy="9144000"/>
@@ -282,7 +283,7 @@
           <a:p>
             <a:fld id="{BB6D47BE-B638-4384-8186-1BE11A133744}" type="datetimeFigureOut">
               <a:rPr lang="it-IT" smtClean="0"/>
-              <a:t>08/07/2021</a:t>
+              <a:t>12/07/2021</a:t>
             </a:fld>
             <a:endParaRPr lang="it-IT"/>
           </a:p>
@@ -459,7 +460,7 @@
           <a:p>
             <a:fld id="{511C7247-C3DA-4B1B-BCAA-E9308B4A9CD3}" type="datetimeFigureOut">
               <a:rPr lang="en-GB" smtClean="0"/>
-              <a:t>08/07/2021</a:t>
+              <a:t>12/07/2021</a:t>
             </a:fld>
             <a:endParaRPr lang="en-GB"/>
           </a:p>
@@ -4805,7 +4806,7 @@
     </p:spTree>
     <p:extLst>
       <p:ext uri="{BB962C8B-B14F-4D97-AF65-F5344CB8AC3E}">
-        <p14:creationId xmlns:p14="http://schemas.microsoft.com/office/powerpoint/2010/main" val="3060836967"/>
+        <p14:creationId xmlns:p14="http://schemas.microsoft.com/office/powerpoint/2010/main" val="138877905"/>
       </p:ext>
     </p:extLst>
   </p:cSld>
@@ -4897,7 +4898,7 @@
     </p:spTree>
     <p:extLst>
       <p:ext uri="{BB962C8B-B14F-4D97-AF65-F5344CB8AC3E}">
-        <p14:creationId xmlns:p14="http://schemas.microsoft.com/office/powerpoint/2010/main" val="3055954277"/>
+        <p14:creationId xmlns:p14="http://schemas.microsoft.com/office/powerpoint/2010/main" val="3060836967"/>
       </p:ext>
     </p:extLst>
   </p:cSld>
@@ -4990,6 +4991,98 @@
     <p:extLst>
       <p:ext uri="{BB962C8B-B14F-4D97-AF65-F5344CB8AC3E}">
         <p14:creationId xmlns:p14="http://schemas.microsoft.com/office/powerpoint/2010/main" val="4071013871"/>
+      </p:ext>
+    </p:extLst>
+  </p:cSld>
+  <p:clrMapOvr>
+    <a:masterClrMapping/>
+  </p:clrMapOvr>
+</p:notes>
+</file>
+
+<file path=ppt/notesSlides/notesSlide50.xml><?xml version="1.0" encoding="utf-8"?>
+<p:notes xmlns:a="http://schemas.openxmlformats.org/drawingml/2006/main" xmlns:r="http://schemas.openxmlformats.org/officeDocument/2006/relationships" xmlns:p="http://schemas.openxmlformats.org/presentationml/2006/main">
+  <p:cSld>
+    <p:spTree>
+      <p:nvGrpSpPr>
+        <p:cNvPr id="1" name=""/>
+        <p:cNvGrpSpPr/>
+        <p:nvPr/>
+      </p:nvGrpSpPr>
+      <p:grpSpPr>
+        <a:xfrm>
+          <a:off x="0" y="0"/>
+          <a:ext cx="0" cy="0"/>
+          <a:chOff x="0" y="0"/>
+          <a:chExt cx="0" cy="0"/>
+        </a:xfrm>
+      </p:grpSpPr>
+      <p:sp>
+        <p:nvSpPr>
+          <p:cNvPr id="2" name="Slide Image Placeholder 1"/>
+          <p:cNvSpPr>
+            <a:spLocks noGrp="1" noRot="1" noChangeAspect="1"/>
+          </p:cNvSpPr>
+          <p:nvPr>
+            <p:ph type="sldImg"/>
+          </p:nvPr>
+        </p:nvSpPr>
+        <p:spPr>
+          <a:xfrm>
+            <a:off x="1143000" y="685800"/>
+            <a:ext cx="4572000" cy="3429000"/>
+          </a:xfrm>
+          <a:prstGeom prst="rect">
+            <a:avLst/>
+          </a:prstGeom>
+        </p:spPr>
+      </p:sp>
+      <p:sp>
+        <p:nvSpPr>
+          <p:cNvPr id="3" name="Notes Placeholder 2"/>
+          <p:cNvSpPr>
+            <a:spLocks noGrp="1"/>
+          </p:cNvSpPr>
+          <p:nvPr>
+            <p:ph type="body" idx="1"/>
+          </p:nvPr>
+        </p:nvSpPr>
+        <p:spPr/>
+        <p:txBody>
+          <a:bodyPr/>
+          <a:lstStyle/>
+          <a:p>
+            <a:endParaRPr lang="it-IT" dirty="0"/>
+          </a:p>
+        </p:txBody>
+      </p:sp>
+      <p:sp>
+        <p:nvSpPr>
+          <p:cNvPr id="4" name="Slide Number Placeholder 3"/>
+          <p:cNvSpPr>
+            <a:spLocks noGrp="1"/>
+          </p:cNvSpPr>
+          <p:nvPr>
+            <p:ph type="sldNum" sz="quarter" idx="10"/>
+          </p:nvPr>
+        </p:nvSpPr>
+        <p:spPr/>
+        <p:txBody>
+          <a:bodyPr/>
+          <a:lstStyle/>
+          <a:p>
+            <a:fld id="{2C5A56FE-B2E8-4285-8F31-2AEEB8EA39C6}" type="slidenum">
+              <a:rPr lang="en-GB" smtClean="0"/>
+              <a:t>50</a:t>
+            </a:fld>
+            <a:endParaRPr lang="en-GB"/>
+          </a:p>
+        </p:txBody>
+      </p:sp>
+    </p:spTree>
+    <p:extLst>
+      <p:ext uri="{BB962C8B-B14F-4D97-AF65-F5344CB8AC3E}">
+        <p14:creationId xmlns:p14="http://schemas.microsoft.com/office/powerpoint/2010/main" val="3055954277"/>
       </p:ext>
     </p:extLst>
   </p:cSld>
@@ -20120,7 +20213,12 @@
             <p:ph type="body" sz="quarter" idx="11"/>
           </p:nvPr>
         </p:nvSpPr>
-        <p:spPr/>
+        <p:spPr>
+          <a:xfrm>
+            <a:off x="328613" y="1079047"/>
+            <a:ext cx="8401246" cy="719525"/>
+          </a:xfrm>
+        </p:spPr>
         <p:txBody>
           <a:bodyPr/>
           <a:lstStyle/>
@@ -20130,11 +20228,258 @@
               <a:t>Event-Driven</a:t>
             </a:r>
           </a:p>
-          <a:p>
-            <a:endParaRPr lang="en-US" dirty="0"/>
-          </a:p>
-          <a:p>
-            <a:endParaRPr lang="en-US" dirty="0"/>
+        </p:txBody>
+      </p:sp>
+      <p:sp>
+        <p:nvSpPr>
+          <p:cNvPr id="3" name="TextBox 2">
+            <a:extLst>
+              <a:ext uri="{FF2B5EF4-FFF2-40B4-BE49-F238E27FC236}">
+                <a16:creationId xmlns:a16="http://schemas.microsoft.com/office/drawing/2014/main" id="{2457306B-AA66-4A6F-A8EB-0D3827C888F8}"/>
+              </a:ext>
+            </a:extLst>
+          </p:cNvPr>
+          <p:cNvSpPr txBox="1"/>
+          <p:nvPr/>
+        </p:nvSpPr>
+        <p:spPr>
+          <a:xfrm>
+            <a:off x="328613" y="2359417"/>
+            <a:ext cx="8210747" cy="338554"/>
+          </a:xfrm>
+          <a:prstGeom prst="rect">
+            <a:avLst/>
+          </a:prstGeom>
+          <a:noFill/>
+        </p:spPr>
+        <p:txBody>
+          <a:bodyPr wrap="square" rtlCol="0">
+            <a:spAutoFit/>
+          </a:bodyPr>
+          <a:lstStyle/>
+          <a:p>
+            <a:r>
+              <a:rPr lang="en-GB" sz="1600" dirty="0"/>
+              <a:t>Microservices are typically activated using one of these connectors</a:t>
+            </a:r>
+          </a:p>
+        </p:txBody>
+      </p:sp>
+      <p:sp>
+        <p:nvSpPr>
+          <p:cNvPr id="4" name="TextBox 3">
+            <a:extLst>
+              <a:ext uri="{FF2B5EF4-FFF2-40B4-BE49-F238E27FC236}">
+                <a16:creationId xmlns:a16="http://schemas.microsoft.com/office/drawing/2014/main" id="{6E9E41E6-FADC-4EDE-88B2-419F28151A29}"/>
+              </a:ext>
+            </a:extLst>
+          </p:cNvPr>
+          <p:cNvSpPr txBox="1"/>
+          <p:nvPr/>
+        </p:nvSpPr>
+        <p:spPr>
+          <a:xfrm>
+            <a:off x="783294" y="3099376"/>
+            <a:ext cx="8210747" cy="338554"/>
+          </a:xfrm>
+          <a:prstGeom prst="rect">
+            <a:avLst/>
+          </a:prstGeom>
+          <a:noFill/>
+        </p:spPr>
+        <p:txBody>
+          <a:bodyPr wrap="square" rtlCol="0">
+            <a:spAutoFit/>
+          </a:bodyPr>
+          <a:lstStyle/>
+          <a:p>
+            <a:r>
+              <a:rPr lang="en-GB" sz="1600" dirty="0"/>
+              <a:t>HTTP call (REST service)</a:t>
+            </a:r>
+          </a:p>
+        </p:txBody>
+      </p:sp>
+      <p:sp>
+        <p:nvSpPr>
+          <p:cNvPr id="5" name="TextBox 4">
+            <a:extLst>
+              <a:ext uri="{FF2B5EF4-FFF2-40B4-BE49-F238E27FC236}">
+                <a16:creationId xmlns:a16="http://schemas.microsoft.com/office/drawing/2014/main" id="{09C5E7B5-2D60-4664-A19F-3D38A21BBD80}"/>
+              </a:ext>
+            </a:extLst>
+          </p:cNvPr>
+          <p:cNvSpPr txBox="1"/>
+          <p:nvPr/>
+        </p:nvSpPr>
+        <p:spPr>
+          <a:xfrm>
+            <a:off x="783293" y="3591073"/>
+            <a:ext cx="8210747" cy="338554"/>
+          </a:xfrm>
+          <a:prstGeom prst="rect">
+            <a:avLst/>
+          </a:prstGeom>
+          <a:noFill/>
+        </p:spPr>
+        <p:txBody>
+          <a:bodyPr wrap="square" rtlCol="0">
+            <a:spAutoFit/>
+          </a:bodyPr>
+          <a:lstStyle/>
+          <a:p>
+            <a:r>
+              <a:rPr lang="en-GB" sz="1600" dirty="0"/>
+              <a:t>RPC-Like call (</a:t>
+            </a:r>
+            <a:r>
+              <a:rPr lang="en-GB" sz="1600" dirty="0" err="1"/>
+              <a:t>gRPC</a:t>
+            </a:r>
+            <a:r>
+              <a:rPr lang="en-GB" sz="1600" dirty="0"/>
+              <a:t> service)</a:t>
+            </a:r>
+          </a:p>
+        </p:txBody>
+      </p:sp>
+      <p:sp>
+        <p:nvSpPr>
+          <p:cNvPr id="6" name="TextBox 5">
+            <a:extLst>
+              <a:ext uri="{FF2B5EF4-FFF2-40B4-BE49-F238E27FC236}">
+                <a16:creationId xmlns:a16="http://schemas.microsoft.com/office/drawing/2014/main" id="{5E633C8D-B83C-4199-B86D-3B304135ECB8}"/>
+              </a:ext>
+            </a:extLst>
+          </p:cNvPr>
+          <p:cNvSpPr txBox="1"/>
+          <p:nvPr/>
+        </p:nvSpPr>
+        <p:spPr>
+          <a:xfrm>
+            <a:off x="783294" y="4082770"/>
+            <a:ext cx="8210747" cy="338554"/>
+          </a:xfrm>
+          <a:prstGeom prst="rect">
+            <a:avLst/>
+          </a:prstGeom>
+          <a:noFill/>
+        </p:spPr>
+        <p:txBody>
+          <a:bodyPr wrap="square" rtlCol="0">
+            <a:spAutoFit/>
+          </a:bodyPr>
+          <a:lstStyle/>
+          <a:p>
+            <a:r>
+              <a:rPr lang="en-GB" sz="1600" dirty="0"/>
+              <a:t>Asynchronous messages using message broken</a:t>
+            </a:r>
+          </a:p>
+        </p:txBody>
+      </p:sp>
+      <p:sp>
+        <p:nvSpPr>
+          <p:cNvPr id="7" name="TextBox 6">
+            <a:extLst>
+              <a:ext uri="{FF2B5EF4-FFF2-40B4-BE49-F238E27FC236}">
+                <a16:creationId xmlns:a16="http://schemas.microsoft.com/office/drawing/2014/main" id="{ECEA8909-E8A8-410B-A7A7-072443361BC4}"/>
+              </a:ext>
+            </a:extLst>
+          </p:cNvPr>
+          <p:cNvSpPr txBox="1"/>
+          <p:nvPr/>
+        </p:nvSpPr>
+        <p:spPr>
+          <a:xfrm>
+            <a:off x="519112" y="4643280"/>
+            <a:ext cx="8210747" cy="584775"/>
+          </a:xfrm>
+          <a:prstGeom prst="rect">
+            <a:avLst/>
+          </a:prstGeom>
+          <a:noFill/>
+        </p:spPr>
+        <p:txBody>
+          <a:bodyPr wrap="square" rtlCol="0">
+            <a:spAutoFit/>
+          </a:bodyPr>
+          <a:lstStyle/>
+          <a:p>
+            <a:r>
+              <a:rPr lang="en-GB" sz="1600" dirty="0"/>
+              <a:t>Using Event-Driven architecture we improve scalability and throughput leveraging on Asynchronous communication</a:t>
+            </a:r>
+          </a:p>
+        </p:txBody>
+      </p:sp>
+      <p:sp>
+        <p:nvSpPr>
+          <p:cNvPr id="8" name="TextBox 7">
+            <a:extLst>
+              <a:ext uri="{FF2B5EF4-FFF2-40B4-BE49-F238E27FC236}">
+                <a16:creationId xmlns:a16="http://schemas.microsoft.com/office/drawing/2014/main" id="{FEBB2BD7-D3BD-4FC5-B4AE-B0BF1DA0B631}"/>
+              </a:ext>
+            </a:extLst>
+          </p:cNvPr>
+          <p:cNvSpPr txBox="1"/>
+          <p:nvPr/>
+        </p:nvSpPr>
+        <p:spPr>
+          <a:xfrm>
+            <a:off x="519112" y="5217191"/>
+            <a:ext cx="8210747" cy="584775"/>
+          </a:xfrm>
+          <a:prstGeom prst="rect">
+            <a:avLst/>
+          </a:prstGeom>
+          <a:noFill/>
+        </p:spPr>
+        <p:txBody>
+          <a:bodyPr wrap="square" rtlCol="0">
+            <a:spAutoFit/>
+          </a:bodyPr>
+          <a:lstStyle/>
+          <a:p>
+            <a:r>
+              <a:rPr lang="en-GB" sz="1600" dirty="0"/>
+              <a:t>Using Event-Driven also promotes loose-coupling since message senders and receivers are independent</a:t>
+            </a:r>
+          </a:p>
+        </p:txBody>
+      </p:sp>
+      <p:sp>
+        <p:nvSpPr>
+          <p:cNvPr id="9" name="TextBox 8">
+            <a:extLst>
+              <a:ext uri="{FF2B5EF4-FFF2-40B4-BE49-F238E27FC236}">
+                <a16:creationId xmlns:a16="http://schemas.microsoft.com/office/drawing/2014/main" id="{B5B7A6E2-6100-45AC-8BE4-854FEE107752}"/>
+              </a:ext>
+            </a:extLst>
+          </p:cNvPr>
+          <p:cNvSpPr txBox="1"/>
+          <p:nvPr/>
+        </p:nvSpPr>
+        <p:spPr>
+          <a:xfrm>
+            <a:off x="519111" y="5778953"/>
+            <a:ext cx="8210747" cy="584775"/>
+          </a:xfrm>
+          <a:prstGeom prst="rect">
+            <a:avLst/>
+          </a:prstGeom>
+          <a:noFill/>
+        </p:spPr>
+        <p:txBody>
+          <a:bodyPr wrap="square" rtlCol="0">
+            <a:spAutoFit/>
+          </a:bodyPr>
+          <a:lstStyle/>
+          <a:p>
+            <a:r>
+              <a:rPr lang="en-GB" sz="1600" dirty="0"/>
+              <a:t>Using Event-Driven also improve reliability because message could be stored in the queue if some service fails</a:t>
+            </a:r>
           </a:p>
         </p:txBody>
       </p:sp>
@@ -20148,6 +20493,362 @@
   <p:clrMapOvr>
     <a:masterClrMapping/>
   </p:clrMapOvr>
+  <p:timing>
+    <p:tnLst>
+      <p:par>
+        <p:cTn id="1" dur="indefinite" restart="never" nodeType="tmRoot">
+          <p:childTnLst>
+            <p:seq concurrent="1" nextAc="seek">
+              <p:cTn id="2" dur="indefinite" nodeType="mainSeq">
+                <p:childTnLst>
+                  <p:par>
+                    <p:cTn id="3" fill="hold">
+                      <p:stCondLst>
+                        <p:cond delay="indefinite"/>
+                      </p:stCondLst>
+                      <p:childTnLst>
+                        <p:par>
+                          <p:cTn id="4" fill="hold">
+                            <p:stCondLst>
+                              <p:cond delay="0"/>
+                            </p:stCondLst>
+                            <p:childTnLst>
+                              <p:par>
+                                <p:cTn id="5" presetID="10" presetClass="entr" presetSubtype="0" fill="hold" grpId="0" nodeType="clickEffect">
+                                  <p:stCondLst>
+                                    <p:cond delay="0"/>
+                                  </p:stCondLst>
+                                  <p:childTnLst>
+                                    <p:set>
+                                      <p:cBhvr>
+                                        <p:cTn id="6" dur="1" fill="hold">
+                                          <p:stCondLst>
+                                            <p:cond delay="0"/>
+                                          </p:stCondLst>
+                                        </p:cTn>
+                                        <p:tgtEl>
+                                          <p:spTgt spid="4"/>
+                                        </p:tgtEl>
+                                        <p:attrNameLst>
+                                          <p:attrName>style.visibility</p:attrName>
+                                        </p:attrNameLst>
+                                      </p:cBhvr>
+                                      <p:to>
+                                        <p:strVal val="visible"/>
+                                      </p:to>
+                                    </p:set>
+                                    <p:animEffect transition="in" filter="fade">
+                                      <p:cBhvr>
+                                        <p:cTn id="7" dur="500"/>
+                                        <p:tgtEl>
+                                          <p:spTgt spid="4"/>
+                                        </p:tgtEl>
+                                      </p:cBhvr>
+                                    </p:animEffect>
+                                  </p:childTnLst>
+                                </p:cTn>
+                              </p:par>
+                            </p:childTnLst>
+                          </p:cTn>
+                        </p:par>
+                      </p:childTnLst>
+                    </p:cTn>
+                  </p:par>
+                  <p:par>
+                    <p:cTn id="8" fill="hold">
+                      <p:stCondLst>
+                        <p:cond delay="indefinite"/>
+                      </p:stCondLst>
+                      <p:childTnLst>
+                        <p:par>
+                          <p:cTn id="9" fill="hold">
+                            <p:stCondLst>
+                              <p:cond delay="0"/>
+                            </p:stCondLst>
+                            <p:childTnLst>
+                              <p:par>
+                                <p:cTn id="10" presetID="10" presetClass="entr" presetSubtype="0" fill="hold" grpId="0" nodeType="clickEffect">
+                                  <p:stCondLst>
+                                    <p:cond delay="0"/>
+                                  </p:stCondLst>
+                                  <p:childTnLst>
+                                    <p:set>
+                                      <p:cBhvr>
+                                        <p:cTn id="11" dur="1" fill="hold">
+                                          <p:stCondLst>
+                                            <p:cond delay="0"/>
+                                          </p:stCondLst>
+                                        </p:cTn>
+                                        <p:tgtEl>
+                                          <p:spTgt spid="5"/>
+                                        </p:tgtEl>
+                                        <p:attrNameLst>
+                                          <p:attrName>style.visibility</p:attrName>
+                                        </p:attrNameLst>
+                                      </p:cBhvr>
+                                      <p:to>
+                                        <p:strVal val="visible"/>
+                                      </p:to>
+                                    </p:set>
+                                    <p:animEffect transition="in" filter="fade">
+                                      <p:cBhvr>
+                                        <p:cTn id="12" dur="500"/>
+                                        <p:tgtEl>
+                                          <p:spTgt spid="5"/>
+                                        </p:tgtEl>
+                                      </p:cBhvr>
+                                    </p:animEffect>
+                                  </p:childTnLst>
+                                </p:cTn>
+                              </p:par>
+                            </p:childTnLst>
+                          </p:cTn>
+                        </p:par>
+                      </p:childTnLst>
+                    </p:cTn>
+                  </p:par>
+                  <p:par>
+                    <p:cTn id="13" fill="hold">
+                      <p:stCondLst>
+                        <p:cond delay="indefinite"/>
+                      </p:stCondLst>
+                      <p:childTnLst>
+                        <p:par>
+                          <p:cTn id="14" fill="hold">
+                            <p:stCondLst>
+                              <p:cond delay="0"/>
+                            </p:stCondLst>
+                            <p:childTnLst>
+                              <p:par>
+                                <p:cTn id="15" presetID="10" presetClass="entr" presetSubtype="0" fill="hold" grpId="0" nodeType="clickEffect">
+                                  <p:stCondLst>
+                                    <p:cond delay="0"/>
+                                  </p:stCondLst>
+                                  <p:childTnLst>
+                                    <p:set>
+                                      <p:cBhvr>
+                                        <p:cTn id="16" dur="1" fill="hold">
+                                          <p:stCondLst>
+                                            <p:cond delay="0"/>
+                                          </p:stCondLst>
+                                        </p:cTn>
+                                        <p:tgtEl>
+                                          <p:spTgt spid="6"/>
+                                        </p:tgtEl>
+                                        <p:attrNameLst>
+                                          <p:attrName>style.visibility</p:attrName>
+                                        </p:attrNameLst>
+                                      </p:cBhvr>
+                                      <p:to>
+                                        <p:strVal val="visible"/>
+                                      </p:to>
+                                    </p:set>
+                                    <p:animEffect transition="in" filter="fade">
+                                      <p:cBhvr>
+                                        <p:cTn id="17" dur="500"/>
+                                        <p:tgtEl>
+                                          <p:spTgt spid="6"/>
+                                        </p:tgtEl>
+                                      </p:cBhvr>
+                                    </p:animEffect>
+                                  </p:childTnLst>
+                                </p:cTn>
+                              </p:par>
+                            </p:childTnLst>
+                          </p:cTn>
+                        </p:par>
+                      </p:childTnLst>
+                    </p:cTn>
+                  </p:par>
+                  <p:par>
+                    <p:cTn id="18" fill="hold">
+                      <p:stCondLst>
+                        <p:cond delay="indefinite"/>
+                      </p:stCondLst>
+                      <p:childTnLst>
+                        <p:par>
+                          <p:cTn id="19" fill="hold">
+                            <p:stCondLst>
+                              <p:cond delay="0"/>
+                            </p:stCondLst>
+                            <p:childTnLst>
+                              <p:par>
+                                <p:cTn id="20" presetID="10" presetClass="entr" presetSubtype="0" fill="hold" grpId="0" nodeType="clickEffect">
+                                  <p:stCondLst>
+                                    <p:cond delay="0"/>
+                                  </p:stCondLst>
+                                  <p:childTnLst>
+                                    <p:set>
+                                      <p:cBhvr>
+                                        <p:cTn id="21" dur="1" fill="hold">
+                                          <p:stCondLst>
+                                            <p:cond delay="0"/>
+                                          </p:stCondLst>
+                                        </p:cTn>
+                                        <p:tgtEl>
+                                          <p:spTgt spid="7"/>
+                                        </p:tgtEl>
+                                        <p:attrNameLst>
+                                          <p:attrName>style.visibility</p:attrName>
+                                        </p:attrNameLst>
+                                      </p:cBhvr>
+                                      <p:to>
+                                        <p:strVal val="visible"/>
+                                      </p:to>
+                                    </p:set>
+                                    <p:animEffect transition="in" filter="fade">
+                                      <p:cBhvr>
+                                        <p:cTn id="22" dur="500"/>
+                                        <p:tgtEl>
+                                          <p:spTgt spid="7"/>
+                                        </p:tgtEl>
+                                      </p:cBhvr>
+                                    </p:animEffect>
+                                  </p:childTnLst>
+                                </p:cTn>
+                              </p:par>
+                            </p:childTnLst>
+                          </p:cTn>
+                        </p:par>
+                      </p:childTnLst>
+                    </p:cTn>
+                  </p:par>
+                  <p:par>
+                    <p:cTn id="23" fill="hold">
+                      <p:stCondLst>
+                        <p:cond delay="indefinite"/>
+                      </p:stCondLst>
+                      <p:childTnLst>
+                        <p:par>
+                          <p:cTn id="24" fill="hold">
+                            <p:stCondLst>
+                              <p:cond delay="0"/>
+                            </p:stCondLst>
+                            <p:childTnLst>
+                              <p:par>
+                                <p:cTn id="25" presetID="10" presetClass="entr" presetSubtype="0" fill="hold" grpId="0" nodeType="clickEffect">
+                                  <p:stCondLst>
+                                    <p:cond delay="0"/>
+                                  </p:stCondLst>
+                                  <p:childTnLst>
+                                    <p:set>
+                                      <p:cBhvr>
+                                        <p:cTn id="26" dur="1" fill="hold">
+                                          <p:stCondLst>
+                                            <p:cond delay="0"/>
+                                          </p:stCondLst>
+                                        </p:cTn>
+                                        <p:tgtEl>
+                                          <p:spTgt spid="8"/>
+                                        </p:tgtEl>
+                                        <p:attrNameLst>
+                                          <p:attrName>style.visibility</p:attrName>
+                                        </p:attrNameLst>
+                                      </p:cBhvr>
+                                      <p:to>
+                                        <p:strVal val="visible"/>
+                                      </p:to>
+                                    </p:set>
+                                    <p:animEffect transition="in" filter="fade">
+                                      <p:cBhvr>
+                                        <p:cTn id="27" dur="500"/>
+                                        <p:tgtEl>
+                                          <p:spTgt spid="8"/>
+                                        </p:tgtEl>
+                                      </p:cBhvr>
+                                    </p:animEffect>
+                                  </p:childTnLst>
+                                </p:cTn>
+                              </p:par>
+                            </p:childTnLst>
+                          </p:cTn>
+                        </p:par>
+                      </p:childTnLst>
+                    </p:cTn>
+                  </p:par>
+                  <p:par>
+                    <p:cTn id="28" fill="hold">
+                      <p:stCondLst>
+                        <p:cond delay="indefinite"/>
+                      </p:stCondLst>
+                      <p:childTnLst>
+                        <p:par>
+                          <p:cTn id="29" fill="hold">
+                            <p:stCondLst>
+                              <p:cond delay="0"/>
+                            </p:stCondLst>
+                            <p:childTnLst>
+                              <p:par>
+                                <p:cTn id="30" presetID="10" presetClass="entr" presetSubtype="0" fill="hold" grpId="0" nodeType="clickEffect">
+                                  <p:stCondLst>
+                                    <p:cond delay="0"/>
+                                  </p:stCondLst>
+                                  <p:childTnLst>
+                                    <p:set>
+                                      <p:cBhvr>
+                                        <p:cTn id="31" dur="1" fill="hold">
+                                          <p:stCondLst>
+                                            <p:cond delay="0"/>
+                                          </p:stCondLst>
+                                        </p:cTn>
+                                        <p:tgtEl>
+                                          <p:spTgt spid="9"/>
+                                        </p:tgtEl>
+                                        <p:attrNameLst>
+                                          <p:attrName>style.visibility</p:attrName>
+                                        </p:attrNameLst>
+                                      </p:cBhvr>
+                                      <p:to>
+                                        <p:strVal val="visible"/>
+                                      </p:to>
+                                    </p:set>
+                                    <p:animEffect transition="in" filter="fade">
+                                      <p:cBhvr>
+                                        <p:cTn id="32" dur="500"/>
+                                        <p:tgtEl>
+                                          <p:spTgt spid="9"/>
+                                        </p:tgtEl>
+                                      </p:cBhvr>
+                                    </p:animEffect>
+                                  </p:childTnLst>
+                                </p:cTn>
+                              </p:par>
+                            </p:childTnLst>
+                          </p:cTn>
+                        </p:par>
+                      </p:childTnLst>
+                    </p:cTn>
+                  </p:par>
+                </p:childTnLst>
+              </p:cTn>
+              <p:prevCondLst>
+                <p:cond evt="onPrev" delay="0">
+                  <p:tgtEl>
+                    <p:sldTgt/>
+                  </p:tgtEl>
+                </p:cond>
+              </p:prevCondLst>
+              <p:nextCondLst>
+                <p:cond evt="onNext" delay="0">
+                  <p:tgtEl>
+                    <p:sldTgt/>
+                  </p:tgtEl>
+                </p:cond>
+              </p:nextCondLst>
+            </p:seq>
+          </p:childTnLst>
+        </p:cTn>
+      </p:par>
+    </p:tnLst>
+    <p:bldLst>
+      <p:bldP spid="4" grpId="0"/>
+      <p:bldP spid="5" grpId="0"/>
+      <p:bldP spid="6" grpId="0"/>
+      <p:bldP spid="7" grpId="0"/>
+      <p:bldP spid="8" grpId="0"/>
+      <p:bldP spid="9" grpId="0"/>
+    </p:bldLst>
+  </p:timing>
 </p:sld>
 </file>
 
@@ -20178,7 +20879,12 @@
             <p:ph type="body" sz="quarter" idx="11"/>
           </p:nvPr>
         </p:nvSpPr>
-        <p:spPr/>
+        <p:spPr>
+          <a:xfrm>
+            <a:off x="328613" y="1079047"/>
+            <a:ext cx="8401246" cy="779981"/>
+          </a:xfrm>
+        </p:spPr>
         <p:txBody>
           <a:bodyPr/>
           <a:lstStyle/>
@@ -20188,8 +20894,281 @@
               <a:t>Loose-Coupling</a:t>
             </a:r>
           </a:p>
-          <a:p>
-            <a:endParaRPr lang="en-US" dirty="0"/>
+        </p:txBody>
+      </p:sp>
+      <p:sp>
+        <p:nvSpPr>
+          <p:cNvPr id="3" name="TextBox 2">
+            <a:extLst>
+              <a:ext uri="{FF2B5EF4-FFF2-40B4-BE49-F238E27FC236}">
+                <a16:creationId xmlns:a16="http://schemas.microsoft.com/office/drawing/2014/main" id="{5DD5C7A7-43D1-47AC-9EDC-3A3A5AE795A2}"/>
+              </a:ext>
+            </a:extLst>
+          </p:cNvPr>
+          <p:cNvSpPr txBox="1"/>
+          <p:nvPr/>
+        </p:nvSpPr>
+        <p:spPr>
+          <a:xfrm>
+            <a:off x="423862" y="2247703"/>
+            <a:ext cx="8210747" cy="584775"/>
+          </a:xfrm>
+          <a:prstGeom prst="rect">
+            <a:avLst/>
+          </a:prstGeom>
+          <a:noFill/>
+        </p:spPr>
+        <p:txBody>
+          <a:bodyPr wrap="square" rtlCol="0">
+            <a:spAutoFit/>
+          </a:bodyPr>
+          <a:lstStyle/>
+          <a:p>
+            <a:r>
+              <a:rPr lang="en-US" sz="1600" dirty="0"/>
+              <a:t>In software engineering, coupling refers to the degree of interdependence between two software elements</a:t>
+            </a:r>
+            <a:endParaRPr lang="en-GB" sz="1600" dirty="0"/>
+          </a:p>
+        </p:txBody>
+      </p:sp>
+      <p:sp>
+        <p:nvSpPr>
+          <p:cNvPr id="4" name="TextBox 3">
+            <a:extLst>
+              <a:ext uri="{FF2B5EF4-FFF2-40B4-BE49-F238E27FC236}">
+                <a16:creationId xmlns:a16="http://schemas.microsoft.com/office/drawing/2014/main" id="{D996103C-F74C-49B6-9E4E-D1A26E5EA63B}"/>
+              </a:ext>
+            </a:extLst>
+          </p:cNvPr>
+          <p:cNvSpPr txBox="1"/>
+          <p:nvPr/>
+        </p:nvSpPr>
+        <p:spPr>
+          <a:xfrm>
+            <a:off x="423858" y="3420392"/>
+            <a:ext cx="8210747" cy="338554"/>
+          </a:xfrm>
+          <a:prstGeom prst="rect">
+            <a:avLst/>
+          </a:prstGeom>
+          <a:noFill/>
+        </p:spPr>
+        <p:txBody>
+          <a:bodyPr wrap="square" rtlCol="0">
+            <a:spAutoFit/>
+          </a:bodyPr>
+          <a:lstStyle/>
+          <a:p>
+            <a:r>
+              <a:rPr lang="en-US" sz="1600" dirty="0"/>
+              <a:t>Services exposes its functionality through the service contract (json, proto, xml) </a:t>
+            </a:r>
+            <a:endParaRPr lang="en-GB" sz="1600" dirty="0"/>
+          </a:p>
+        </p:txBody>
+      </p:sp>
+      <p:sp>
+        <p:nvSpPr>
+          <p:cNvPr id="5" name="TextBox 4">
+            <a:extLst>
+              <a:ext uri="{FF2B5EF4-FFF2-40B4-BE49-F238E27FC236}">
+                <a16:creationId xmlns:a16="http://schemas.microsoft.com/office/drawing/2014/main" id="{27F1C816-024C-4E94-AEC0-31C7E79EC846}"/>
+              </a:ext>
+            </a:extLst>
+          </p:cNvPr>
+          <p:cNvSpPr txBox="1"/>
+          <p:nvPr/>
+        </p:nvSpPr>
+        <p:spPr>
+          <a:xfrm>
+            <a:off x="423857" y="3807126"/>
+            <a:ext cx="8210747" cy="338554"/>
+          </a:xfrm>
+          <a:prstGeom prst="rect">
+            <a:avLst/>
+          </a:prstGeom>
+          <a:noFill/>
+        </p:spPr>
+        <p:txBody>
+          <a:bodyPr wrap="square" rtlCol="0">
+            <a:spAutoFit/>
+          </a:bodyPr>
+          <a:lstStyle/>
+          <a:p>
+            <a:r>
+              <a:rPr lang="en-US" sz="1600" dirty="0"/>
+              <a:t>The contract should not be tightly coupled to implementation details or a specific technology</a:t>
+            </a:r>
+            <a:endParaRPr lang="en-GB" sz="1600" dirty="0"/>
+          </a:p>
+        </p:txBody>
+      </p:sp>
+      <p:sp>
+        <p:nvSpPr>
+          <p:cNvPr id="6" name="TextBox 5">
+            <a:extLst>
+              <a:ext uri="{FF2B5EF4-FFF2-40B4-BE49-F238E27FC236}">
+                <a16:creationId xmlns:a16="http://schemas.microsoft.com/office/drawing/2014/main" id="{09577634-28EC-46FB-B7BB-2B9433E8F710}"/>
+              </a:ext>
+            </a:extLst>
+          </p:cNvPr>
+          <p:cNvSpPr txBox="1"/>
+          <p:nvPr/>
+        </p:nvSpPr>
+        <p:spPr>
+          <a:xfrm>
+            <a:off x="423859" y="3031717"/>
+            <a:ext cx="8210747" cy="369332"/>
+          </a:xfrm>
+          <a:prstGeom prst="rect">
+            <a:avLst/>
+          </a:prstGeom>
+          <a:noFill/>
+        </p:spPr>
+        <p:txBody>
+          <a:bodyPr wrap="square" rtlCol="0">
+            <a:spAutoFit/>
+          </a:bodyPr>
+          <a:lstStyle/>
+          <a:p>
+            <a:r>
+              <a:rPr lang="it-IT" b="1" i="1" dirty="0" err="1"/>
+              <a:t>Afferent</a:t>
+            </a:r>
+            <a:r>
+              <a:rPr lang="it-IT" b="1" i="1" dirty="0"/>
+              <a:t> </a:t>
+            </a:r>
+            <a:r>
+              <a:rPr lang="it-IT" b="1" i="1" dirty="0" err="1"/>
+              <a:t>coupling</a:t>
+            </a:r>
+            <a:r>
+              <a:rPr lang="it-IT" b="1" dirty="0"/>
+              <a:t> </a:t>
+            </a:r>
+            <a:endParaRPr lang="en-GB" sz="1600" b="1" dirty="0"/>
+          </a:p>
+        </p:txBody>
+      </p:sp>
+      <p:sp>
+        <p:nvSpPr>
+          <p:cNvPr id="8" name="TextBox 7">
+            <a:extLst>
+              <a:ext uri="{FF2B5EF4-FFF2-40B4-BE49-F238E27FC236}">
+                <a16:creationId xmlns:a16="http://schemas.microsoft.com/office/drawing/2014/main" id="{C85C853B-3606-4F01-B035-B05CBBC30DD9}"/>
+              </a:ext>
+            </a:extLst>
+          </p:cNvPr>
+          <p:cNvSpPr txBox="1"/>
+          <p:nvPr/>
+        </p:nvSpPr>
+        <p:spPr>
+          <a:xfrm>
+            <a:off x="423856" y="4427235"/>
+            <a:ext cx="8210747" cy="369332"/>
+          </a:xfrm>
+          <a:prstGeom prst="rect">
+            <a:avLst/>
+          </a:prstGeom>
+          <a:noFill/>
+        </p:spPr>
+        <p:txBody>
+          <a:bodyPr wrap="square" rtlCol="0">
+            <a:spAutoFit/>
+          </a:bodyPr>
+          <a:lstStyle/>
+          <a:p>
+            <a:r>
+              <a:rPr lang="it-IT" b="1" i="1" dirty="0" err="1"/>
+              <a:t>Efferent</a:t>
+            </a:r>
+            <a:r>
+              <a:rPr lang="it-IT" b="1" i="1" dirty="0"/>
+              <a:t> </a:t>
+            </a:r>
+            <a:r>
+              <a:rPr lang="it-IT" b="1" i="1" dirty="0" err="1"/>
+              <a:t>coupling</a:t>
+            </a:r>
+            <a:r>
+              <a:rPr lang="it-IT" b="1" dirty="0"/>
+              <a:t> </a:t>
+            </a:r>
+            <a:endParaRPr lang="en-GB" sz="1600" b="1" dirty="0"/>
+          </a:p>
+        </p:txBody>
+      </p:sp>
+      <p:sp>
+        <p:nvSpPr>
+          <p:cNvPr id="9" name="TextBox 8">
+            <a:extLst>
+              <a:ext uri="{FF2B5EF4-FFF2-40B4-BE49-F238E27FC236}">
+                <a16:creationId xmlns:a16="http://schemas.microsoft.com/office/drawing/2014/main" id="{CCC2D28F-A5F1-4889-8117-6C60E2611D6A}"/>
+              </a:ext>
+            </a:extLst>
+          </p:cNvPr>
+          <p:cNvSpPr txBox="1"/>
+          <p:nvPr/>
+        </p:nvSpPr>
+        <p:spPr>
+          <a:xfrm>
+            <a:off x="423862" y="4845007"/>
+            <a:ext cx="8210747" cy="338554"/>
+          </a:xfrm>
+          <a:prstGeom prst="rect">
+            <a:avLst/>
+          </a:prstGeom>
+          <a:noFill/>
+        </p:spPr>
+        <p:txBody>
+          <a:bodyPr wrap="square" rtlCol="0">
+            <a:spAutoFit/>
+          </a:bodyPr>
+          <a:lstStyle/>
+          <a:p>
+            <a:r>
+              <a:rPr lang="en-US" sz="1600" dirty="0"/>
+              <a:t>Services often need to interact each other</a:t>
+            </a:r>
+            <a:endParaRPr lang="en-GB" sz="1600" dirty="0"/>
+          </a:p>
+        </p:txBody>
+      </p:sp>
+      <p:sp>
+        <p:nvSpPr>
+          <p:cNvPr id="10" name="TextBox 9">
+            <a:extLst>
+              <a:ext uri="{FF2B5EF4-FFF2-40B4-BE49-F238E27FC236}">
+                <a16:creationId xmlns:a16="http://schemas.microsoft.com/office/drawing/2014/main" id="{E782462A-B5CC-4979-AC8B-0D070236D342}"/>
+              </a:ext>
+            </a:extLst>
+          </p:cNvPr>
+          <p:cNvSpPr txBox="1"/>
+          <p:nvPr/>
+        </p:nvSpPr>
+        <p:spPr>
+          <a:xfrm>
+            <a:off x="423855" y="5183561"/>
+            <a:ext cx="8210747" cy="338554"/>
+          </a:xfrm>
+          <a:prstGeom prst="rect">
+            <a:avLst/>
+          </a:prstGeom>
+          <a:noFill/>
+        </p:spPr>
+        <p:txBody>
+          <a:bodyPr wrap="square" rtlCol="0">
+            <a:spAutoFit/>
+          </a:bodyPr>
+          <a:lstStyle/>
+          <a:p>
+            <a:r>
+              <a:rPr lang="en-US" sz="1600" dirty="0"/>
+              <a:t>The interaction establishes runtime dependencies that directly impact the service autonomy</a:t>
+            </a:r>
+            <a:endParaRPr lang="en-GB" sz="1600" dirty="0"/>
           </a:p>
         </p:txBody>
       </p:sp>
@@ -20203,6 +21182,416 @@
   <p:clrMapOvr>
     <a:masterClrMapping/>
   </p:clrMapOvr>
+  <p:timing>
+    <p:tnLst>
+      <p:par>
+        <p:cTn id="1" dur="indefinite" restart="never" nodeType="tmRoot">
+          <p:childTnLst>
+            <p:seq concurrent="1" nextAc="seek">
+              <p:cTn id="2" dur="indefinite" nodeType="mainSeq">
+                <p:childTnLst>
+                  <p:par>
+                    <p:cTn id="3" fill="hold">
+                      <p:stCondLst>
+                        <p:cond delay="indefinite"/>
+                      </p:stCondLst>
+                      <p:childTnLst>
+                        <p:par>
+                          <p:cTn id="4" fill="hold">
+                            <p:stCondLst>
+                              <p:cond delay="0"/>
+                            </p:stCondLst>
+                            <p:childTnLst>
+                              <p:par>
+                                <p:cTn id="5" presetID="10" presetClass="entr" presetSubtype="0" fill="hold" grpId="0" nodeType="clickEffect">
+                                  <p:stCondLst>
+                                    <p:cond delay="0"/>
+                                  </p:stCondLst>
+                                  <p:childTnLst>
+                                    <p:set>
+                                      <p:cBhvr>
+                                        <p:cTn id="6" dur="1" fill="hold">
+                                          <p:stCondLst>
+                                            <p:cond delay="0"/>
+                                          </p:stCondLst>
+                                        </p:cTn>
+                                        <p:tgtEl>
+                                          <p:spTgt spid="3"/>
+                                        </p:tgtEl>
+                                        <p:attrNameLst>
+                                          <p:attrName>style.visibility</p:attrName>
+                                        </p:attrNameLst>
+                                      </p:cBhvr>
+                                      <p:to>
+                                        <p:strVal val="visible"/>
+                                      </p:to>
+                                    </p:set>
+                                    <p:animEffect transition="in" filter="fade">
+                                      <p:cBhvr>
+                                        <p:cTn id="7" dur="500"/>
+                                        <p:tgtEl>
+                                          <p:spTgt spid="3"/>
+                                        </p:tgtEl>
+                                      </p:cBhvr>
+                                    </p:animEffect>
+                                  </p:childTnLst>
+                                </p:cTn>
+                              </p:par>
+                            </p:childTnLst>
+                          </p:cTn>
+                        </p:par>
+                      </p:childTnLst>
+                    </p:cTn>
+                  </p:par>
+                  <p:par>
+                    <p:cTn id="8" fill="hold">
+                      <p:stCondLst>
+                        <p:cond delay="indefinite"/>
+                      </p:stCondLst>
+                      <p:childTnLst>
+                        <p:par>
+                          <p:cTn id="9" fill="hold">
+                            <p:stCondLst>
+                              <p:cond delay="0"/>
+                            </p:stCondLst>
+                            <p:childTnLst>
+                              <p:par>
+                                <p:cTn id="10" presetID="10" presetClass="entr" presetSubtype="0" fill="hold" grpId="0" nodeType="clickEffect">
+                                  <p:stCondLst>
+                                    <p:cond delay="0"/>
+                                  </p:stCondLst>
+                                  <p:childTnLst>
+                                    <p:set>
+                                      <p:cBhvr>
+                                        <p:cTn id="11" dur="1" fill="hold">
+                                          <p:stCondLst>
+                                            <p:cond delay="0"/>
+                                          </p:stCondLst>
+                                        </p:cTn>
+                                        <p:tgtEl>
+                                          <p:spTgt spid="4"/>
+                                        </p:tgtEl>
+                                        <p:attrNameLst>
+                                          <p:attrName>style.visibility</p:attrName>
+                                        </p:attrNameLst>
+                                      </p:cBhvr>
+                                      <p:to>
+                                        <p:strVal val="visible"/>
+                                      </p:to>
+                                    </p:set>
+                                    <p:animEffect transition="in" filter="fade">
+                                      <p:cBhvr>
+                                        <p:cTn id="12" dur="500"/>
+                                        <p:tgtEl>
+                                          <p:spTgt spid="4"/>
+                                        </p:tgtEl>
+                                      </p:cBhvr>
+                                    </p:animEffect>
+                                  </p:childTnLst>
+                                </p:cTn>
+                              </p:par>
+                            </p:childTnLst>
+                          </p:cTn>
+                        </p:par>
+                      </p:childTnLst>
+                    </p:cTn>
+                  </p:par>
+                  <p:par>
+                    <p:cTn id="13" fill="hold">
+                      <p:stCondLst>
+                        <p:cond delay="indefinite"/>
+                      </p:stCondLst>
+                      <p:childTnLst>
+                        <p:par>
+                          <p:cTn id="14" fill="hold">
+                            <p:stCondLst>
+                              <p:cond delay="0"/>
+                            </p:stCondLst>
+                            <p:childTnLst>
+                              <p:par>
+                                <p:cTn id="15" presetID="10" presetClass="entr" presetSubtype="0" fill="hold" grpId="0" nodeType="clickEffect">
+                                  <p:stCondLst>
+                                    <p:cond delay="0"/>
+                                  </p:stCondLst>
+                                  <p:childTnLst>
+                                    <p:set>
+                                      <p:cBhvr>
+                                        <p:cTn id="16" dur="1" fill="hold">
+                                          <p:stCondLst>
+                                            <p:cond delay="0"/>
+                                          </p:stCondLst>
+                                        </p:cTn>
+                                        <p:tgtEl>
+                                          <p:spTgt spid="5"/>
+                                        </p:tgtEl>
+                                        <p:attrNameLst>
+                                          <p:attrName>style.visibility</p:attrName>
+                                        </p:attrNameLst>
+                                      </p:cBhvr>
+                                      <p:to>
+                                        <p:strVal val="visible"/>
+                                      </p:to>
+                                    </p:set>
+                                    <p:animEffect transition="in" filter="fade">
+                                      <p:cBhvr>
+                                        <p:cTn id="17" dur="500"/>
+                                        <p:tgtEl>
+                                          <p:spTgt spid="5"/>
+                                        </p:tgtEl>
+                                      </p:cBhvr>
+                                    </p:animEffect>
+                                  </p:childTnLst>
+                                </p:cTn>
+                              </p:par>
+                            </p:childTnLst>
+                          </p:cTn>
+                        </p:par>
+                      </p:childTnLst>
+                    </p:cTn>
+                  </p:par>
+                  <p:par>
+                    <p:cTn id="18" fill="hold">
+                      <p:stCondLst>
+                        <p:cond delay="indefinite"/>
+                      </p:stCondLst>
+                      <p:childTnLst>
+                        <p:par>
+                          <p:cTn id="19" fill="hold">
+                            <p:stCondLst>
+                              <p:cond delay="0"/>
+                            </p:stCondLst>
+                            <p:childTnLst>
+                              <p:par>
+                                <p:cTn id="20" presetID="10" presetClass="entr" presetSubtype="0" fill="hold" grpId="0" nodeType="clickEffect">
+                                  <p:stCondLst>
+                                    <p:cond delay="0"/>
+                                  </p:stCondLst>
+                                  <p:childTnLst>
+                                    <p:set>
+                                      <p:cBhvr>
+                                        <p:cTn id="21" dur="1" fill="hold">
+                                          <p:stCondLst>
+                                            <p:cond delay="0"/>
+                                          </p:stCondLst>
+                                        </p:cTn>
+                                        <p:tgtEl>
+                                          <p:spTgt spid="6"/>
+                                        </p:tgtEl>
+                                        <p:attrNameLst>
+                                          <p:attrName>style.visibility</p:attrName>
+                                        </p:attrNameLst>
+                                      </p:cBhvr>
+                                      <p:to>
+                                        <p:strVal val="visible"/>
+                                      </p:to>
+                                    </p:set>
+                                    <p:animEffect transition="in" filter="fade">
+                                      <p:cBhvr>
+                                        <p:cTn id="22" dur="500"/>
+                                        <p:tgtEl>
+                                          <p:spTgt spid="6"/>
+                                        </p:tgtEl>
+                                      </p:cBhvr>
+                                    </p:animEffect>
+                                  </p:childTnLst>
+                                </p:cTn>
+                              </p:par>
+                            </p:childTnLst>
+                          </p:cTn>
+                        </p:par>
+                      </p:childTnLst>
+                    </p:cTn>
+                  </p:par>
+                  <p:par>
+                    <p:cTn id="23" fill="hold">
+                      <p:stCondLst>
+                        <p:cond delay="indefinite"/>
+                      </p:stCondLst>
+                      <p:childTnLst>
+                        <p:par>
+                          <p:cTn id="24" fill="hold">
+                            <p:stCondLst>
+                              <p:cond delay="0"/>
+                            </p:stCondLst>
+                            <p:childTnLst>
+                              <p:par>
+                                <p:cTn id="25" presetID="10" presetClass="entr" presetSubtype="0" fill="hold" grpId="0" nodeType="clickEffect">
+                                  <p:stCondLst>
+                                    <p:cond delay="0"/>
+                                  </p:stCondLst>
+                                  <p:childTnLst>
+                                    <p:set>
+                                      <p:cBhvr>
+                                        <p:cTn id="26" dur="1" fill="hold">
+                                          <p:stCondLst>
+                                            <p:cond delay="0"/>
+                                          </p:stCondLst>
+                                        </p:cTn>
+                                        <p:tgtEl>
+                                          <p:spTgt spid="8"/>
+                                        </p:tgtEl>
+                                        <p:attrNameLst>
+                                          <p:attrName>style.visibility</p:attrName>
+                                        </p:attrNameLst>
+                                      </p:cBhvr>
+                                      <p:to>
+                                        <p:strVal val="visible"/>
+                                      </p:to>
+                                    </p:set>
+                                    <p:animEffect transition="in" filter="fade">
+                                      <p:cBhvr>
+                                        <p:cTn id="27" dur="500"/>
+                                        <p:tgtEl>
+                                          <p:spTgt spid="8"/>
+                                        </p:tgtEl>
+                                      </p:cBhvr>
+                                    </p:animEffect>
+                                  </p:childTnLst>
+                                </p:cTn>
+                              </p:par>
+                            </p:childTnLst>
+                          </p:cTn>
+                        </p:par>
+                      </p:childTnLst>
+                    </p:cTn>
+                  </p:par>
+                  <p:par>
+                    <p:cTn id="28" fill="hold">
+                      <p:stCondLst>
+                        <p:cond delay="indefinite"/>
+                      </p:stCondLst>
+                      <p:childTnLst>
+                        <p:par>
+                          <p:cTn id="29" fill="hold">
+                            <p:stCondLst>
+                              <p:cond delay="0"/>
+                            </p:stCondLst>
+                            <p:childTnLst>
+                              <p:par>
+                                <p:cTn id="30" presetID="10" presetClass="entr" presetSubtype="0" fill="hold" grpId="0" nodeType="clickEffect">
+                                  <p:stCondLst>
+                                    <p:cond delay="0"/>
+                                  </p:stCondLst>
+                                  <p:childTnLst>
+                                    <p:set>
+                                      <p:cBhvr>
+                                        <p:cTn id="31" dur="1" fill="hold">
+                                          <p:stCondLst>
+                                            <p:cond delay="0"/>
+                                          </p:stCondLst>
+                                        </p:cTn>
+                                        <p:tgtEl>
+                                          <p:spTgt spid="9"/>
+                                        </p:tgtEl>
+                                        <p:attrNameLst>
+                                          <p:attrName>style.visibility</p:attrName>
+                                        </p:attrNameLst>
+                                      </p:cBhvr>
+                                      <p:to>
+                                        <p:strVal val="visible"/>
+                                      </p:to>
+                                    </p:set>
+                                    <p:animEffect transition="in" filter="fade">
+                                      <p:cBhvr>
+                                        <p:cTn id="32" dur="500"/>
+                                        <p:tgtEl>
+                                          <p:spTgt spid="9"/>
+                                        </p:tgtEl>
+                                      </p:cBhvr>
+                                    </p:animEffect>
+                                  </p:childTnLst>
+                                </p:cTn>
+                              </p:par>
+                            </p:childTnLst>
+                          </p:cTn>
+                        </p:par>
+                      </p:childTnLst>
+                    </p:cTn>
+                  </p:par>
+                  <p:par>
+                    <p:cTn id="33" fill="hold">
+                      <p:stCondLst>
+                        <p:cond delay="indefinite"/>
+                      </p:stCondLst>
+                      <p:childTnLst>
+                        <p:par>
+                          <p:cTn id="34" fill="hold">
+                            <p:stCondLst>
+                              <p:cond delay="0"/>
+                            </p:stCondLst>
+                            <p:childTnLst>
+                              <p:par>
+                                <p:cTn id="35" presetID="10" presetClass="entr" presetSubtype="0" fill="hold" grpId="0" nodeType="clickEffect">
+                                  <p:stCondLst>
+                                    <p:cond delay="0"/>
+                                  </p:stCondLst>
+                                  <p:childTnLst>
+                                    <p:set>
+                                      <p:cBhvr>
+                                        <p:cTn id="36" dur="1" fill="hold">
+                                          <p:stCondLst>
+                                            <p:cond delay="0"/>
+                                          </p:stCondLst>
+                                        </p:cTn>
+                                        <p:tgtEl>
+                                          <p:spTgt spid="10"/>
+                                        </p:tgtEl>
+                                        <p:attrNameLst>
+                                          <p:attrName>style.visibility</p:attrName>
+                                        </p:attrNameLst>
+                                      </p:cBhvr>
+                                      <p:to>
+                                        <p:strVal val="visible"/>
+                                      </p:to>
+                                    </p:set>
+                                    <p:animEffect transition="in" filter="fade">
+                                      <p:cBhvr>
+                                        <p:cTn id="37" dur="500"/>
+                                        <p:tgtEl>
+                                          <p:spTgt spid="10"/>
+                                        </p:tgtEl>
+                                      </p:cBhvr>
+                                    </p:animEffect>
+                                  </p:childTnLst>
+                                </p:cTn>
+                              </p:par>
+                            </p:childTnLst>
+                          </p:cTn>
+                        </p:par>
+                      </p:childTnLst>
+                    </p:cTn>
+                  </p:par>
+                </p:childTnLst>
+              </p:cTn>
+              <p:prevCondLst>
+                <p:cond evt="onPrev" delay="0">
+                  <p:tgtEl>
+                    <p:sldTgt/>
+                  </p:tgtEl>
+                </p:cond>
+              </p:prevCondLst>
+              <p:nextCondLst>
+                <p:cond evt="onNext" delay="0">
+                  <p:tgtEl>
+                    <p:sldTgt/>
+                  </p:tgtEl>
+                </p:cond>
+              </p:nextCondLst>
+            </p:seq>
+          </p:childTnLst>
+        </p:cTn>
+      </p:par>
+    </p:tnLst>
+    <p:bldLst>
+      <p:bldP spid="3" grpId="0"/>
+      <p:bldP spid="4" grpId="0"/>
+      <p:bldP spid="5" grpId="0"/>
+      <p:bldP spid="6" grpId="0"/>
+      <p:bldP spid="8" grpId="0"/>
+      <p:bldP spid="9" grpId="0"/>
+      <p:bldP spid="10" grpId="0"/>
+    </p:bldLst>
+  </p:timing>
 </p:sld>
 </file>
 
@@ -20233,31 +21622,865 @@
             <p:ph type="body" sz="quarter" idx="11"/>
           </p:nvPr>
         </p:nvSpPr>
-        <p:spPr/>
+        <p:spPr>
+          <a:xfrm>
+            <a:off x="328613" y="1079047"/>
+            <a:ext cx="8401246" cy="779981"/>
+          </a:xfrm>
+        </p:spPr>
         <p:txBody>
           <a:bodyPr/>
           <a:lstStyle/>
           <a:p>
             <a:r>
               <a:rPr lang="en-US" dirty="0"/>
-              <a:t>Single Responsibility</a:t>
-            </a:r>
-          </a:p>
-          <a:p>
-            <a:endParaRPr lang="en-US" dirty="0"/>
+              <a:t>Loose-Coupling</a:t>
+            </a:r>
+          </a:p>
+        </p:txBody>
+      </p:sp>
+      <p:sp>
+        <p:nvSpPr>
+          <p:cNvPr id="3" name="TextBox 2">
+            <a:extLst>
+              <a:ext uri="{FF2B5EF4-FFF2-40B4-BE49-F238E27FC236}">
+                <a16:creationId xmlns:a16="http://schemas.microsoft.com/office/drawing/2014/main" id="{5DD5C7A7-43D1-47AC-9EDC-3A3A5AE795A2}"/>
+              </a:ext>
+            </a:extLst>
+          </p:cNvPr>
+          <p:cNvSpPr txBox="1"/>
+          <p:nvPr/>
+        </p:nvSpPr>
+        <p:spPr>
+          <a:xfrm>
+            <a:off x="423862" y="2247703"/>
+            <a:ext cx="8210747" cy="338554"/>
+          </a:xfrm>
+          <a:prstGeom prst="rect">
+            <a:avLst/>
+          </a:prstGeom>
+          <a:noFill/>
+        </p:spPr>
+        <p:txBody>
+          <a:bodyPr wrap="square" rtlCol="0">
+            <a:spAutoFit/>
+          </a:bodyPr>
+          <a:lstStyle/>
+          <a:p>
+            <a:r>
+              <a:rPr lang="en-US" sz="1600" dirty="0"/>
+              <a:t>There are some strategies to promote </a:t>
+            </a:r>
+            <a:r>
+              <a:rPr lang="en-US" sz="1600" b="1" i="1" dirty="0"/>
+              <a:t>Afferent</a:t>
+            </a:r>
+            <a:r>
+              <a:rPr lang="en-US" sz="1600" dirty="0"/>
+              <a:t> and </a:t>
+            </a:r>
+            <a:r>
+              <a:rPr lang="en-US" sz="1600" b="1" i="1" dirty="0"/>
+              <a:t>Efferent</a:t>
+            </a:r>
+            <a:r>
+              <a:rPr lang="en-US" sz="1600" dirty="0"/>
+              <a:t> loose coupling</a:t>
+            </a:r>
+            <a:endParaRPr lang="en-GB" sz="1600" dirty="0"/>
+          </a:p>
+        </p:txBody>
+      </p:sp>
+      <p:sp>
+        <p:nvSpPr>
+          <p:cNvPr id="11" name="TextBox 10">
+            <a:extLst>
+              <a:ext uri="{FF2B5EF4-FFF2-40B4-BE49-F238E27FC236}">
+                <a16:creationId xmlns:a16="http://schemas.microsoft.com/office/drawing/2014/main" id="{6E2AA6D5-17B1-49AA-9348-810F97736A24}"/>
+              </a:ext>
+            </a:extLst>
+          </p:cNvPr>
+          <p:cNvSpPr txBox="1"/>
+          <p:nvPr/>
+        </p:nvSpPr>
+        <p:spPr>
+          <a:xfrm>
+            <a:off x="423859" y="3084989"/>
+            <a:ext cx="8210747" cy="369332"/>
+          </a:xfrm>
+          <a:prstGeom prst="rect">
+            <a:avLst/>
+          </a:prstGeom>
+          <a:noFill/>
+        </p:spPr>
+        <p:txBody>
+          <a:bodyPr wrap="square" rtlCol="0">
+            <a:spAutoFit/>
+          </a:bodyPr>
+          <a:lstStyle/>
+          <a:p>
+            <a:r>
+              <a:rPr lang="it-IT" b="1" i="1" dirty="0" err="1"/>
+              <a:t>Point-to-point</a:t>
+            </a:r>
+            <a:r>
+              <a:rPr lang="it-IT" b="1" i="1" dirty="0"/>
+              <a:t> and </a:t>
+            </a:r>
+            <a:r>
+              <a:rPr lang="it-IT" b="1" i="1" dirty="0" err="1"/>
+              <a:t>publish-subscribe</a:t>
+            </a:r>
+            <a:r>
+              <a:rPr lang="it-IT" b="1" i="1" dirty="0"/>
+              <a:t> </a:t>
+            </a:r>
+            <a:r>
+              <a:rPr lang="it-IT" sz="1400" dirty="0"/>
+              <a:t>(</a:t>
+            </a:r>
+            <a:r>
+              <a:rPr lang="it-IT" sz="1400" dirty="0" err="1"/>
+              <a:t>message-driven</a:t>
+            </a:r>
+            <a:r>
+              <a:rPr lang="it-IT" sz="1400" dirty="0"/>
+              <a:t> pattern to </a:t>
+            </a:r>
+            <a:r>
+              <a:rPr lang="it-IT" sz="1400" dirty="0" err="1"/>
+              <a:t>decouple</a:t>
+            </a:r>
+            <a:r>
+              <a:rPr lang="it-IT" sz="1400" dirty="0"/>
+              <a:t> </a:t>
+            </a:r>
+            <a:r>
+              <a:rPr lang="it-IT" sz="1400" dirty="0" err="1"/>
+              <a:t>senders</a:t>
+            </a:r>
+            <a:r>
+              <a:rPr lang="it-IT" sz="1400" dirty="0"/>
+              <a:t> and receivers)</a:t>
+            </a:r>
+            <a:endParaRPr lang="en-GB" sz="1400" b="1" dirty="0"/>
+          </a:p>
+        </p:txBody>
+      </p:sp>
+      <p:sp>
+        <p:nvSpPr>
+          <p:cNvPr id="12" name="TextBox 11">
+            <a:extLst>
+              <a:ext uri="{FF2B5EF4-FFF2-40B4-BE49-F238E27FC236}">
+                <a16:creationId xmlns:a16="http://schemas.microsoft.com/office/drawing/2014/main" id="{4BED8671-ADBE-436E-8B6E-2177F9FC1F02}"/>
+              </a:ext>
+            </a:extLst>
+          </p:cNvPr>
+          <p:cNvSpPr txBox="1"/>
+          <p:nvPr/>
+        </p:nvSpPr>
+        <p:spPr>
+          <a:xfrm>
+            <a:off x="423862" y="3539057"/>
+            <a:ext cx="8210747" cy="369332"/>
+          </a:xfrm>
+          <a:prstGeom prst="rect">
+            <a:avLst/>
+          </a:prstGeom>
+          <a:noFill/>
+        </p:spPr>
+        <p:txBody>
+          <a:bodyPr wrap="square" rtlCol="0">
+            <a:spAutoFit/>
+          </a:bodyPr>
+          <a:lstStyle/>
+          <a:p>
+            <a:r>
+              <a:rPr lang="it-IT" b="1" i="1" dirty="0"/>
+              <a:t>API gateway and BFF </a:t>
+            </a:r>
+            <a:r>
+              <a:rPr lang="it-IT" sz="1400" dirty="0"/>
+              <a:t>(</a:t>
+            </a:r>
+            <a:r>
+              <a:rPr lang="it-IT" sz="1400" dirty="0" err="1"/>
+              <a:t>intermediary</a:t>
+            </a:r>
+            <a:r>
+              <a:rPr lang="it-IT" sz="1400" dirty="0"/>
+              <a:t> component to deals with contract </a:t>
+            </a:r>
+            <a:r>
+              <a:rPr lang="it-IT" sz="1400" dirty="0" err="1"/>
+              <a:t>between</a:t>
+            </a:r>
+            <a:r>
+              <a:rPr lang="it-IT" sz="1400" dirty="0"/>
+              <a:t> clients and </a:t>
+            </a:r>
+            <a:r>
+              <a:rPr lang="it-IT" sz="1400" dirty="0" err="1"/>
+              <a:t>services</a:t>
+            </a:r>
+            <a:r>
+              <a:rPr lang="it-IT" sz="1400" dirty="0"/>
+              <a:t>)</a:t>
+            </a:r>
+            <a:endParaRPr lang="en-GB" sz="1400" b="1" dirty="0"/>
+          </a:p>
+        </p:txBody>
+      </p:sp>
+      <p:sp>
+        <p:nvSpPr>
+          <p:cNvPr id="13" name="TextBox 12">
+            <a:extLst>
+              <a:ext uri="{FF2B5EF4-FFF2-40B4-BE49-F238E27FC236}">
+                <a16:creationId xmlns:a16="http://schemas.microsoft.com/office/drawing/2014/main" id="{523BB7BB-AA00-495C-ABB8-FA0EFFD320F6}"/>
+              </a:ext>
+            </a:extLst>
+          </p:cNvPr>
+          <p:cNvSpPr txBox="1"/>
+          <p:nvPr/>
+        </p:nvSpPr>
+        <p:spPr>
+          <a:xfrm>
+            <a:off x="423858" y="3993125"/>
+            <a:ext cx="8210747" cy="369332"/>
+          </a:xfrm>
+          <a:prstGeom prst="rect">
+            <a:avLst/>
+          </a:prstGeom>
+          <a:noFill/>
+        </p:spPr>
+        <p:txBody>
+          <a:bodyPr wrap="square" rtlCol="0">
+            <a:spAutoFit/>
+          </a:bodyPr>
+          <a:lstStyle/>
+          <a:p>
+            <a:r>
+              <a:rPr lang="it-IT" b="1" i="1" dirty="0"/>
+              <a:t>Contract-first design </a:t>
+            </a:r>
+            <a:r>
+              <a:rPr lang="it-IT" sz="1400" dirty="0"/>
+              <a:t>(</a:t>
+            </a:r>
+            <a:r>
+              <a:rPr lang="it-IT" sz="1400" dirty="0" err="1"/>
+              <a:t>designing</a:t>
+            </a:r>
+            <a:r>
+              <a:rPr lang="it-IT" sz="1400" dirty="0"/>
+              <a:t> the contract </a:t>
+            </a:r>
+            <a:r>
+              <a:rPr lang="it-IT" sz="1400" dirty="0" err="1"/>
+              <a:t>independently</a:t>
+            </a:r>
+            <a:r>
+              <a:rPr lang="it-IT" sz="1400" dirty="0"/>
+              <a:t> of </a:t>
+            </a:r>
+            <a:r>
+              <a:rPr lang="it-IT" sz="1400" dirty="0" err="1"/>
+              <a:t>any</a:t>
+            </a:r>
+            <a:r>
+              <a:rPr lang="it-IT" sz="1400" dirty="0"/>
+              <a:t> </a:t>
+            </a:r>
+            <a:r>
+              <a:rPr lang="it-IT" sz="1400" dirty="0" err="1"/>
+              <a:t>existing</a:t>
+            </a:r>
+            <a:r>
+              <a:rPr lang="it-IT" sz="1400" dirty="0"/>
+              <a:t> code)</a:t>
+            </a:r>
+            <a:endParaRPr lang="en-GB" sz="1400" b="1" dirty="0"/>
+          </a:p>
+        </p:txBody>
+      </p:sp>
+      <p:sp>
+        <p:nvSpPr>
+          <p:cNvPr id="14" name="TextBox 13">
+            <a:extLst>
+              <a:ext uri="{FF2B5EF4-FFF2-40B4-BE49-F238E27FC236}">
+                <a16:creationId xmlns:a16="http://schemas.microsoft.com/office/drawing/2014/main" id="{B0B6AEE2-CE2A-4BF9-BD93-BDA6B39327E8}"/>
+              </a:ext>
+            </a:extLst>
+          </p:cNvPr>
+          <p:cNvSpPr txBox="1"/>
+          <p:nvPr/>
+        </p:nvSpPr>
+        <p:spPr>
+          <a:xfrm>
+            <a:off x="423857" y="4441691"/>
+            <a:ext cx="8210747" cy="369332"/>
+          </a:xfrm>
+          <a:prstGeom prst="rect">
+            <a:avLst/>
+          </a:prstGeom>
+          <a:noFill/>
+        </p:spPr>
+        <p:txBody>
+          <a:bodyPr wrap="square" rtlCol="0">
+            <a:spAutoFit/>
+          </a:bodyPr>
+          <a:lstStyle/>
+          <a:p>
+            <a:r>
+              <a:rPr lang="it-IT" b="1" i="1" dirty="0" err="1"/>
+              <a:t>Hypermedia</a:t>
+            </a:r>
+            <a:r>
+              <a:rPr lang="it-IT" b="1" i="1" dirty="0"/>
+              <a:t> </a:t>
+            </a:r>
+            <a:r>
+              <a:rPr lang="it-IT" sz="1400" dirty="0"/>
+              <a:t>(</a:t>
+            </a:r>
+            <a:r>
+              <a:rPr lang="it-IT" sz="1400" b="1" i="1" dirty="0" err="1"/>
+              <a:t>hateoas</a:t>
+            </a:r>
+            <a:r>
+              <a:rPr lang="it-IT" sz="1400" dirty="0"/>
+              <a:t> to help clients to be more </a:t>
+            </a:r>
+            <a:r>
+              <a:rPr lang="it-IT" sz="1400" dirty="0" err="1"/>
+              <a:t>independend</a:t>
+            </a:r>
+            <a:r>
+              <a:rPr lang="it-IT" sz="1400" dirty="0"/>
+              <a:t> of service endpoint)</a:t>
+            </a:r>
+            <a:endParaRPr lang="en-GB" sz="1400" b="1" dirty="0"/>
+          </a:p>
+        </p:txBody>
+      </p:sp>
+      <p:sp>
+        <p:nvSpPr>
+          <p:cNvPr id="15" name="TextBox 14">
+            <a:extLst>
+              <a:ext uri="{FF2B5EF4-FFF2-40B4-BE49-F238E27FC236}">
+                <a16:creationId xmlns:a16="http://schemas.microsoft.com/office/drawing/2014/main" id="{61418826-9FC3-4DB2-A70B-1BF92016EAB8}"/>
+              </a:ext>
+            </a:extLst>
+          </p:cNvPr>
+          <p:cNvSpPr txBox="1"/>
+          <p:nvPr/>
+        </p:nvSpPr>
+        <p:spPr>
+          <a:xfrm>
+            <a:off x="423862" y="4890257"/>
+            <a:ext cx="8210747" cy="369332"/>
+          </a:xfrm>
+          <a:prstGeom prst="rect">
+            <a:avLst/>
+          </a:prstGeom>
+          <a:noFill/>
+        </p:spPr>
+        <p:txBody>
+          <a:bodyPr wrap="square" rtlCol="0">
+            <a:spAutoFit/>
+          </a:bodyPr>
+          <a:lstStyle/>
+          <a:p>
+            <a:r>
+              <a:rPr lang="it-IT" b="1" i="1" dirty="0"/>
+              <a:t>Adapter/Wrapper </a:t>
+            </a:r>
+            <a:r>
+              <a:rPr lang="it-IT" b="1" i="1" dirty="0" err="1"/>
+              <a:t>patterns</a:t>
+            </a:r>
+            <a:r>
+              <a:rPr lang="it-IT" b="1" i="1" dirty="0"/>
+              <a:t> </a:t>
+            </a:r>
+            <a:r>
+              <a:rPr lang="it-IT" sz="1400" dirty="0"/>
+              <a:t>(code </a:t>
+            </a:r>
+            <a:r>
+              <a:rPr lang="it-IT" sz="1400" dirty="0" err="1"/>
+              <a:t>is</a:t>
+            </a:r>
+            <a:r>
+              <a:rPr lang="it-IT" sz="1400" dirty="0"/>
+              <a:t> </a:t>
+            </a:r>
+            <a:r>
+              <a:rPr lang="it-IT" sz="1400" dirty="0" err="1"/>
+              <a:t>not</a:t>
+            </a:r>
+            <a:r>
+              <a:rPr lang="it-IT" sz="1400" dirty="0"/>
+              <a:t> </a:t>
+            </a:r>
+            <a:r>
+              <a:rPr lang="it-IT" sz="1400" dirty="0" err="1"/>
+              <a:t>dependend</a:t>
+            </a:r>
+            <a:r>
+              <a:rPr lang="it-IT" sz="1400" dirty="0"/>
+              <a:t> from concrete implementation)</a:t>
+            </a:r>
+            <a:endParaRPr lang="en-GB" sz="1400" b="1" dirty="0"/>
+          </a:p>
+        </p:txBody>
+      </p:sp>
+      <p:sp>
+        <p:nvSpPr>
+          <p:cNvPr id="16" name="TextBox 15">
+            <a:extLst>
+              <a:ext uri="{FF2B5EF4-FFF2-40B4-BE49-F238E27FC236}">
+                <a16:creationId xmlns:a16="http://schemas.microsoft.com/office/drawing/2014/main" id="{8994139B-29CB-48FE-8F01-059DCF8D38A1}"/>
+              </a:ext>
+            </a:extLst>
+          </p:cNvPr>
+          <p:cNvSpPr txBox="1"/>
+          <p:nvPr/>
+        </p:nvSpPr>
+        <p:spPr>
+          <a:xfrm>
+            <a:off x="423862" y="5346281"/>
+            <a:ext cx="8210747" cy="369332"/>
+          </a:xfrm>
+          <a:prstGeom prst="rect">
+            <a:avLst/>
+          </a:prstGeom>
+          <a:noFill/>
+        </p:spPr>
+        <p:txBody>
+          <a:bodyPr wrap="square" rtlCol="0">
+            <a:spAutoFit/>
+          </a:bodyPr>
+          <a:lstStyle/>
+          <a:p>
+            <a:r>
+              <a:rPr lang="it-IT" b="1" i="1" dirty="0"/>
+              <a:t>Database per </a:t>
+            </a:r>
+            <a:r>
+              <a:rPr lang="it-IT" b="1" i="1" dirty="0" err="1"/>
+              <a:t>Microsertvice</a:t>
+            </a:r>
+            <a:r>
+              <a:rPr lang="it-IT" b="1" i="1" dirty="0"/>
+              <a:t> pattern </a:t>
+            </a:r>
+            <a:r>
+              <a:rPr lang="it-IT" sz="1400" dirty="0"/>
+              <a:t>(to </a:t>
+            </a:r>
+            <a:r>
+              <a:rPr lang="it-IT" sz="1400" dirty="0" err="1"/>
+              <a:t>avoid</a:t>
+            </a:r>
+            <a:r>
+              <a:rPr lang="it-IT" sz="1400" dirty="0"/>
+              <a:t> direct </a:t>
+            </a:r>
+            <a:r>
+              <a:rPr lang="it-IT" sz="1400" dirty="0" err="1"/>
+              <a:t>coupling</a:t>
+            </a:r>
+            <a:r>
+              <a:rPr lang="it-IT" sz="1400" dirty="0"/>
+              <a:t> to </a:t>
+            </a:r>
+            <a:r>
+              <a:rPr lang="it-IT" sz="1400" dirty="0" err="1"/>
+              <a:t>shared</a:t>
+            </a:r>
+            <a:r>
+              <a:rPr lang="it-IT" sz="1400" dirty="0"/>
+              <a:t> </a:t>
+            </a:r>
+            <a:r>
+              <a:rPr lang="it-IT" sz="1400" dirty="0" err="1"/>
+              <a:t>databases</a:t>
+            </a:r>
+            <a:r>
+              <a:rPr lang="it-IT" sz="1400" dirty="0"/>
+              <a:t>)</a:t>
+            </a:r>
+            <a:endParaRPr lang="en-GB" sz="1400" b="1" dirty="0"/>
           </a:p>
         </p:txBody>
       </p:sp>
     </p:spTree>
     <p:extLst>
       <p:ext uri="{BB962C8B-B14F-4D97-AF65-F5344CB8AC3E}">
-        <p14:creationId xmlns:p14="http://schemas.microsoft.com/office/powerpoint/2010/main" val="3590855284"/>
+        <p14:creationId xmlns:p14="http://schemas.microsoft.com/office/powerpoint/2010/main" val="580874257"/>
       </p:ext>
     </p:extLst>
   </p:cSld>
   <p:clrMapOvr>
     <a:masterClrMapping/>
   </p:clrMapOvr>
+  <p:timing>
+    <p:tnLst>
+      <p:par>
+        <p:cTn id="1" dur="indefinite" restart="never" nodeType="tmRoot">
+          <p:childTnLst>
+            <p:seq concurrent="1" nextAc="seek">
+              <p:cTn id="2" dur="indefinite" nodeType="mainSeq">
+                <p:childTnLst>
+                  <p:par>
+                    <p:cTn id="3" fill="hold">
+                      <p:stCondLst>
+                        <p:cond delay="indefinite"/>
+                      </p:stCondLst>
+                      <p:childTnLst>
+                        <p:par>
+                          <p:cTn id="4" fill="hold">
+                            <p:stCondLst>
+                              <p:cond delay="0"/>
+                            </p:stCondLst>
+                            <p:childTnLst>
+                              <p:par>
+                                <p:cTn id="5" presetID="10" presetClass="entr" presetSubtype="0" fill="hold" grpId="0" nodeType="clickEffect">
+                                  <p:stCondLst>
+                                    <p:cond delay="0"/>
+                                  </p:stCondLst>
+                                  <p:childTnLst>
+                                    <p:set>
+                                      <p:cBhvr>
+                                        <p:cTn id="6" dur="1" fill="hold">
+                                          <p:stCondLst>
+                                            <p:cond delay="0"/>
+                                          </p:stCondLst>
+                                        </p:cTn>
+                                        <p:tgtEl>
+                                          <p:spTgt spid="11"/>
+                                        </p:tgtEl>
+                                        <p:attrNameLst>
+                                          <p:attrName>style.visibility</p:attrName>
+                                        </p:attrNameLst>
+                                      </p:cBhvr>
+                                      <p:to>
+                                        <p:strVal val="visible"/>
+                                      </p:to>
+                                    </p:set>
+                                    <p:animEffect transition="in" filter="fade">
+                                      <p:cBhvr>
+                                        <p:cTn id="7" dur="500"/>
+                                        <p:tgtEl>
+                                          <p:spTgt spid="11"/>
+                                        </p:tgtEl>
+                                      </p:cBhvr>
+                                    </p:animEffect>
+                                  </p:childTnLst>
+                                </p:cTn>
+                              </p:par>
+                            </p:childTnLst>
+                          </p:cTn>
+                        </p:par>
+                      </p:childTnLst>
+                    </p:cTn>
+                  </p:par>
+                  <p:par>
+                    <p:cTn id="8" fill="hold">
+                      <p:stCondLst>
+                        <p:cond delay="indefinite"/>
+                      </p:stCondLst>
+                      <p:childTnLst>
+                        <p:par>
+                          <p:cTn id="9" fill="hold">
+                            <p:stCondLst>
+                              <p:cond delay="0"/>
+                            </p:stCondLst>
+                            <p:childTnLst>
+                              <p:par>
+                                <p:cTn id="10" presetID="10" presetClass="entr" presetSubtype="0" fill="hold" grpId="0" nodeType="clickEffect">
+                                  <p:stCondLst>
+                                    <p:cond delay="0"/>
+                                  </p:stCondLst>
+                                  <p:childTnLst>
+                                    <p:set>
+                                      <p:cBhvr>
+                                        <p:cTn id="11" dur="1" fill="hold">
+                                          <p:stCondLst>
+                                            <p:cond delay="0"/>
+                                          </p:stCondLst>
+                                        </p:cTn>
+                                        <p:tgtEl>
+                                          <p:spTgt spid="12"/>
+                                        </p:tgtEl>
+                                        <p:attrNameLst>
+                                          <p:attrName>style.visibility</p:attrName>
+                                        </p:attrNameLst>
+                                      </p:cBhvr>
+                                      <p:to>
+                                        <p:strVal val="visible"/>
+                                      </p:to>
+                                    </p:set>
+                                    <p:animEffect transition="in" filter="fade">
+                                      <p:cBhvr>
+                                        <p:cTn id="12" dur="500"/>
+                                        <p:tgtEl>
+                                          <p:spTgt spid="12"/>
+                                        </p:tgtEl>
+                                      </p:cBhvr>
+                                    </p:animEffect>
+                                  </p:childTnLst>
+                                </p:cTn>
+                              </p:par>
+                            </p:childTnLst>
+                          </p:cTn>
+                        </p:par>
+                      </p:childTnLst>
+                    </p:cTn>
+                  </p:par>
+                  <p:par>
+                    <p:cTn id="13" fill="hold">
+                      <p:stCondLst>
+                        <p:cond delay="indefinite"/>
+                      </p:stCondLst>
+                      <p:childTnLst>
+                        <p:par>
+                          <p:cTn id="14" fill="hold">
+                            <p:stCondLst>
+                              <p:cond delay="0"/>
+                            </p:stCondLst>
+                            <p:childTnLst>
+                              <p:par>
+                                <p:cTn id="15" presetID="10" presetClass="entr" presetSubtype="0" fill="hold" grpId="0" nodeType="clickEffect">
+                                  <p:stCondLst>
+                                    <p:cond delay="0"/>
+                                  </p:stCondLst>
+                                  <p:childTnLst>
+                                    <p:set>
+                                      <p:cBhvr>
+                                        <p:cTn id="16" dur="1" fill="hold">
+                                          <p:stCondLst>
+                                            <p:cond delay="0"/>
+                                          </p:stCondLst>
+                                        </p:cTn>
+                                        <p:tgtEl>
+                                          <p:spTgt spid="13"/>
+                                        </p:tgtEl>
+                                        <p:attrNameLst>
+                                          <p:attrName>style.visibility</p:attrName>
+                                        </p:attrNameLst>
+                                      </p:cBhvr>
+                                      <p:to>
+                                        <p:strVal val="visible"/>
+                                      </p:to>
+                                    </p:set>
+                                    <p:animEffect transition="in" filter="fade">
+                                      <p:cBhvr>
+                                        <p:cTn id="17" dur="500"/>
+                                        <p:tgtEl>
+                                          <p:spTgt spid="13"/>
+                                        </p:tgtEl>
+                                      </p:cBhvr>
+                                    </p:animEffect>
+                                  </p:childTnLst>
+                                </p:cTn>
+                              </p:par>
+                            </p:childTnLst>
+                          </p:cTn>
+                        </p:par>
+                      </p:childTnLst>
+                    </p:cTn>
+                  </p:par>
+                  <p:par>
+                    <p:cTn id="18" fill="hold">
+                      <p:stCondLst>
+                        <p:cond delay="indefinite"/>
+                      </p:stCondLst>
+                      <p:childTnLst>
+                        <p:par>
+                          <p:cTn id="19" fill="hold">
+                            <p:stCondLst>
+                              <p:cond delay="0"/>
+                            </p:stCondLst>
+                            <p:childTnLst>
+                              <p:par>
+                                <p:cTn id="20" presetID="10" presetClass="entr" presetSubtype="0" fill="hold" grpId="0" nodeType="clickEffect">
+                                  <p:stCondLst>
+                                    <p:cond delay="0"/>
+                                  </p:stCondLst>
+                                  <p:childTnLst>
+                                    <p:set>
+                                      <p:cBhvr>
+                                        <p:cTn id="21" dur="1" fill="hold">
+                                          <p:stCondLst>
+                                            <p:cond delay="0"/>
+                                          </p:stCondLst>
+                                        </p:cTn>
+                                        <p:tgtEl>
+                                          <p:spTgt spid="14"/>
+                                        </p:tgtEl>
+                                        <p:attrNameLst>
+                                          <p:attrName>style.visibility</p:attrName>
+                                        </p:attrNameLst>
+                                      </p:cBhvr>
+                                      <p:to>
+                                        <p:strVal val="visible"/>
+                                      </p:to>
+                                    </p:set>
+                                    <p:animEffect transition="in" filter="fade">
+                                      <p:cBhvr>
+                                        <p:cTn id="22" dur="500"/>
+                                        <p:tgtEl>
+                                          <p:spTgt spid="14"/>
+                                        </p:tgtEl>
+                                      </p:cBhvr>
+                                    </p:animEffect>
+                                  </p:childTnLst>
+                                </p:cTn>
+                              </p:par>
+                            </p:childTnLst>
+                          </p:cTn>
+                        </p:par>
+                      </p:childTnLst>
+                    </p:cTn>
+                  </p:par>
+                  <p:par>
+                    <p:cTn id="23" fill="hold">
+                      <p:stCondLst>
+                        <p:cond delay="indefinite"/>
+                      </p:stCondLst>
+                      <p:childTnLst>
+                        <p:par>
+                          <p:cTn id="24" fill="hold">
+                            <p:stCondLst>
+                              <p:cond delay="0"/>
+                            </p:stCondLst>
+                            <p:childTnLst>
+                              <p:par>
+                                <p:cTn id="25" presetID="10" presetClass="entr" presetSubtype="0" fill="hold" grpId="0" nodeType="clickEffect">
+                                  <p:stCondLst>
+                                    <p:cond delay="0"/>
+                                  </p:stCondLst>
+                                  <p:childTnLst>
+                                    <p:set>
+                                      <p:cBhvr>
+                                        <p:cTn id="26" dur="1" fill="hold">
+                                          <p:stCondLst>
+                                            <p:cond delay="0"/>
+                                          </p:stCondLst>
+                                        </p:cTn>
+                                        <p:tgtEl>
+                                          <p:spTgt spid="15"/>
+                                        </p:tgtEl>
+                                        <p:attrNameLst>
+                                          <p:attrName>style.visibility</p:attrName>
+                                        </p:attrNameLst>
+                                      </p:cBhvr>
+                                      <p:to>
+                                        <p:strVal val="visible"/>
+                                      </p:to>
+                                    </p:set>
+                                    <p:animEffect transition="in" filter="fade">
+                                      <p:cBhvr>
+                                        <p:cTn id="27" dur="500"/>
+                                        <p:tgtEl>
+                                          <p:spTgt spid="15"/>
+                                        </p:tgtEl>
+                                      </p:cBhvr>
+                                    </p:animEffect>
+                                  </p:childTnLst>
+                                </p:cTn>
+                              </p:par>
+                            </p:childTnLst>
+                          </p:cTn>
+                        </p:par>
+                      </p:childTnLst>
+                    </p:cTn>
+                  </p:par>
+                  <p:par>
+                    <p:cTn id="28" fill="hold">
+                      <p:stCondLst>
+                        <p:cond delay="indefinite"/>
+                      </p:stCondLst>
+                      <p:childTnLst>
+                        <p:par>
+                          <p:cTn id="29" fill="hold">
+                            <p:stCondLst>
+                              <p:cond delay="0"/>
+                            </p:stCondLst>
+                            <p:childTnLst>
+                              <p:par>
+                                <p:cTn id="30" presetID="10" presetClass="entr" presetSubtype="0" fill="hold" grpId="0" nodeType="clickEffect">
+                                  <p:stCondLst>
+                                    <p:cond delay="0"/>
+                                  </p:stCondLst>
+                                  <p:childTnLst>
+                                    <p:set>
+                                      <p:cBhvr>
+                                        <p:cTn id="31" dur="1" fill="hold">
+                                          <p:stCondLst>
+                                            <p:cond delay="0"/>
+                                          </p:stCondLst>
+                                        </p:cTn>
+                                        <p:tgtEl>
+                                          <p:spTgt spid="16"/>
+                                        </p:tgtEl>
+                                        <p:attrNameLst>
+                                          <p:attrName>style.visibility</p:attrName>
+                                        </p:attrNameLst>
+                                      </p:cBhvr>
+                                      <p:to>
+                                        <p:strVal val="visible"/>
+                                      </p:to>
+                                    </p:set>
+                                    <p:animEffect transition="in" filter="fade">
+                                      <p:cBhvr>
+                                        <p:cTn id="32" dur="500"/>
+                                        <p:tgtEl>
+                                          <p:spTgt spid="16"/>
+                                        </p:tgtEl>
+                                      </p:cBhvr>
+                                    </p:animEffect>
+                                  </p:childTnLst>
+                                </p:cTn>
+                              </p:par>
+                            </p:childTnLst>
+                          </p:cTn>
+                        </p:par>
+                      </p:childTnLst>
+                    </p:cTn>
+                  </p:par>
+                </p:childTnLst>
+              </p:cTn>
+              <p:prevCondLst>
+                <p:cond evt="onPrev" delay="0">
+                  <p:tgtEl>
+                    <p:sldTgt/>
+                  </p:tgtEl>
+                </p:cond>
+              </p:prevCondLst>
+              <p:nextCondLst>
+                <p:cond evt="onNext" delay="0">
+                  <p:tgtEl>
+                    <p:sldTgt/>
+                  </p:tgtEl>
+                </p:cond>
+              </p:nextCondLst>
+            </p:seq>
+          </p:childTnLst>
+        </p:cTn>
+      </p:par>
+    </p:tnLst>
+    <p:bldLst>
+      <p:bldP spid="11" grpId="0"/>
+      <p:bldP spid="12" grpId="0"/>
+      <p:bldP spid="13" grpId="0"/>
+      <p:bldP spid="14" grpId="0"/>
+      <p:bldP spid="15" grpId="0"/>
+      <p:bldP spid="16" grpId="0"/>
+    </p:bldLst>
+  </p:timing>
 </p:sld>
 </file>
 
@@ -20295,91 +22518,18 @@
           <a:p>
             <a:r>
               <a:rPr lang="en-US" dirty="0"/>
-              <a:t>IDEALS Principles</a:t>
+              <a:t>Single Responsibility</a:t>
             </a:r>
           </a:p>
           <a:p>
             <a:endParaRPr lang="en-US" dirty="0"/>
-          </a:p>
-        </p:txBody>
-      </p:sp>
-      <p:sp>
-        <p:nvSpPr>
-          <p:cNvPr id="5" name="TextBox 4"/>
-          <p:cNvSpPr txBox="1"/>
-          <p:nvPr/>
-        </p:nvSpPr>
-        <p:spPr>
-          <a:xfrm>
-            <a:off x="621372" y="1859340"/>
-            <a:ext cx="8210747" cy="2554545"/>
-          </a:xfrm>
-          <a:prstGeom prst="rect">
-            <a:avLst/>
-          </a:prstGeom>
-          <a:noFill/>
-        </p:spPr>
-        <p:txBody>
-          <a:bodyPr wrap="square" rtlCol="0">
-            <a:spAutoFit/>
-          </a:bodyPr>
-          <a:lstStyle/>
-          <a:p>
-            <a:endParaRPr lang="en-GB" sz="1600" u="sng" dirty="0">
-              <a:latin typeface="Chronicle Display" pitchFamily="50" charset="0"/>
-            </a:endParaRPr>
-          </a:p>
-          <a:p>
-            <a:endParaRPr lang="en-GB" sz="1600" u="sng" dirty="0">
-              <a:latin typeface="Chronicle Display" pitchFamily="50" charset="0"/>
-            </a:endParaRPr>
-          </a:p>
-          <a:p>
-            <a:r>
-              <a:rPr lang="en-GB" sz="3200" b="1" i="1" dirty="0">
-                <a:latin typeface="Chronicle Display" pitchFamily="50" charset="0"/>
-              </a:rPr>
-              <a:t>Resources</a:t>
-            </a:r>
-          </a:p>
-          <a:p>
-            <a:endParaRPr lang="en-GB" sz="3200" b="1" i="1" dirty="0">
-              <a:latin typeface="Chronicle Display" pitchFamily="50" charset="0"/>
-            </a:endParaRPr>
-          </a:p>
-          <a:p>
-            <a:endParaRPr lang="en-GB" sz="1600" dirty="0">
-              <a:latin typeface="Chronicle Display" pitchFamily="50" charset="0"/>
-            </a:endParaRPr>
-          </a:p>
-          <a:p>
-            <a:r>
-              <a:rPr lang="en-GB" sz="1600" b="1" i="1" dirty="0">
-                <a:latin typeface="Chronicle Display" pitchFamily="50" charset="0"/>
-                <a:hlinkClick r:id="rId3"/>
-              </a:rPr>
-              <a:t>https://www.infoq.com/articles/microservices-design-ideals/</a:t>
-            </a:r>
-            <a:endParaRPr lang="en-GB" sz="1600" b="1" i="1" dirty="0">
-              <a:latin typeface="Chronicle Display" pitchFamily="50" charset="0"/>
-            </a:endParaRPr>
-          </a:p>
-          <a:p>
-            <a:endParaRPr lang="en-GB" sz="1600" dirty="0">
-              <a:latin typeface="Chronicle Display" pitchFamily="50" charset="0"/>
-            </a:endParaRPr>
-          </a:p>
-          <a:p>
-            <a:endParaRPr lang="en-GB" sz="1600" dirty="0">
-              <a:latin typeface="Chronicle Display" pitchFamily="50" charset="0"/>
-            </a:endParaRPr>
           </a:p>
         </p:txBody>
       </p:sp>
     </p:spTree>
     <p:extLst>
       <p:ext uri="{BB962C8B-B14F-4D97-AF65-F5344CB8AC3E}">
-        <p14:creationId xmlns:p14="http://schemas.microsoft.com/office/powerpoint/2010/main" val="3371919035"/>
+        <p14:creationId xmlns:p14="http://schemas.microsoft.com/office/powerpoint/2010/main" val="3590855284"/>
       </p:ext>
     </p:extLst>
   </p:cSld>
@@ -20468,6 +22618,134 @@
     <p:extLst>
       <p:ext uri="{BB962C8B-B14F-4D97-AF65-F5344CB8AC3E}">
         <p14:creationId xmlns:p14="http://schemas.microsoft.com/office/powerpoint/2010/main" val="2045971338"/>
+      </p:ext>
+    </p:extLst>
+  </p:cSld>
+  <p:clrMapOvr>
+    <a:masterClrMapping/>
+  </p:clrMapOvr>
+</p:sld>
+</file>
+
+<file path=ppt/slides/slide50.xml><?xml version="1.0" encoding="utf-8"?>
+<p:sld xmlns:a="http://schemas.openxmlformats.org/drawingml/2006/main" xmlns:r="http://schemas.openxmlformats.org/officeDocument/2006/relationships" xmlns:p="http://schemas.openxmlformats.org/presentationml/2006/main">
+  <p:cSld>
+    <p:spTree>
+      <p:nvGrpSpPr>
+        <p:cNvPr id="1" name=""/>
+        <p:cNvGrpSpPr/>
+        <p:nvPr/>
+      </p:nvGrpSpPr>
+      <p:grpSpPr>
+        <a:xfrm>
+          <a:off x="0" y="0"/>
+          <a:ext cx="0" cy="0"/>
+          <a:chOff x="0" y="0"/>
+          <a:chExt cx="0" cy="0"/>
+        </a:xfrm>
+      </p:grpSpPr>
+      <p:sp>
+        <p:nvSpPr>
+          <p:cNvPr id="2" name="Text Placeholder 1"/>
+          <p:cNvSpPr>
+            <a:spLocks noGrp="1"/>
+          </p:cNvSpPr>
+          <p:nvPr>
+            <p:ph type="body" sz="quarter" idx="11"/>
+          </p:nvPr>
+        </p:nvSpPr>
+        <p:spPr/>
+        <p:txBody>
+          <a:bodyPr/>
+          <a:lstStyle/>
+          <a:p>
+            <a:r>
+              <a:rPr lang="en-US" dirty="0"/>
+              <a:t>IDEALS Principles</a:t>
+            </a:r>
+          </a:p>
+          <a:p>
+            <a:endParaRPr lang="en-US" dirty="0"/>
+          </a:p>
+        </p:txBody>
+      </p:sp>
+      <p:sp>
+        <p:nvSpPr>
+          <p:cNvPr id="5" name="TextBox 4"/>
+          <p:cNvSpPr txBox="1"/>
+          <p:nvPr/>
+        </p:nvSpPr>
+        <p:spPr>
+          <a:xfrm>
+            <a:off x="621372" y="1859340"/>
+            <a:ext cx="8210747" cy="2554545"/>
+          </a:xfrm>
+          <a:prstGeom prst="rect">
+            <a:avLst/>
+          </a:prstGeom>
+          <a:noFill/>
+        </p:spPr>
+        <p:txBody>
+          <a:bodyPr wrap="square" rtlCol="0">
+            <a:spAutoFit/>
+          </a:bodyPr>
+          <a:lstStyle/>
+          <a:p>
+            <a:endParaRPr lang="en-GB" sz="1600" u="sng" dirty="0">
+              <a:latin typeface="Chronicle Display" pitchFamily="50" charset="0"/>
+            </a:endParaRPr>
+          </a:p>
+          <a:p>
+            <a:endParaRPr lang="en-GB" sz="1600" u="sng" dirty="0">
+              <a:latin typeface="Chronicle Display" pitchFamily="50" charset="0"/>
+            </a:endParaRPr>
+          </a:p>
+          <a:p>
+            <a:r>
+              <a:rPr lang="en-GB" sz="3200" b="1" i="1" dirty="0">
+                <a:latin typeface="Chronicle Display" pitchFamily="50" charset="0"/>
+              </a:rPr>
+              <a:t>Resources</a:t>
+            </a:r>
+          </a:p>
+          <a:p>
+            <a:endParaRPr lang="en-GB" sz="3200" b="1" i="1" dirty="0">
+              <a:latin typeface="Chronicle Display" pitchFamily="50" charset="0"/>
+            </a:endParaRPr>
+          </a:p>
+          <a:p>
+            <a:endParaRPr lang="en-GB" sz="1600" dirty="0">
+              <a:latin typeface="Chronicle Display" pitchFamily="50" charset="0"/>
+            </a:endParaRPr>
+          </a:p>
+          <a:p>
+            <a:r>
+              <a:rPr lang="en-GB" sz="1600" b="1" i="1" dirty="0">
+                <a:latin typeface="Chronicle Display" pitchFamily="50" charset="0"/>
+                <a:hlinkClick r:id="rId3"/>
+              </a:rPr>
+              <a:t>https://www.infoq.com/articles/microservices-design-ideals/</a:t>
+            </a:r>
+            <a:endParaRPr lang="en-GB" sz="1600" b="1" i="1" dirty="0">
+              <a:latin typeface="Chronicle Display" pitchFamily="50" charset="0"/>
+            </a:endParaRPr>
+          </a:p>
+          <a:p>
+            <a:endParaRPr lang="en-GB" sz="1600" dirty="0">
+              <a:latin typeface="Chronicle Display" pitchFamily="50" charset="0"/>
+            </a:endParaRPr>
+          </a:p>
+          <a:p>
+            <a:endParaRPr lang="en-GB" sz="1600" dirty="0">
+              <a:latin typeface="Chronicle Display" pitchFamily="50" charset="0"/>
+            </a:endParaRPr>
+          </a:p>
+        </p:txBody>
+      </p:sp>
+    </p:spTree>
+    <p:extLst>
+      <p:ext uri="{BB962C8B-B14F-4D97-AF65-F5344CB8AC3E}">
+        <p14:creationId xmlns:p14="http://schemas.microsoft.com/office/powerpoint/2010/main" val="3371919035"/>
       </p:ext>
     </p:extLst>
   </p:cSld>

</xml_diff>

<commit_message>
introducing availability over consistency chapter
</commit_message>
<xml_diff>
--- a/docs/solid.pptx
+++ b/docs/solid.pptx
@@ -5,10 +5,10 @@
     <p:sldMasterId id="2147483650" r:id="rId1"/>
   </p:sldMasterIdLst>
   <p:notesMasterIdLst>
-    <p:notesMasterId r:id="rId52"/>
+    <p:notesMasterId r:id="rId55"/>
   </p:notesMasterIdLst>
   <p:handoutMasterIdLst>
-    <p:handoutMasterId r:id="rId53"/>
+    <p:handoutMasterId r:id="rId56"/>
   </p:handoutMasterIdLst>
   <p:sldIdLst>
     <p:sldId id="309" r:id="rId2"/>
@@ -57,10 +57,13 @@
     <p:sldId id="340" r:id="rId45"/>
     <p:sldId id="342" r:id="rId46"/>
     <p:sldId id="334" r:id="rId47"/>
-    <p:sldId id="335" r:id="rId48"/>
-    <p:sldId id="344" r:id="rId49"/>
-    <p:sldId id="343" r:id="rId50"/>
-    <p:sldId id="330" r:id="rId51"/>
+    <p:sldId id="343" r:id="rId48"/>
+    <p:sldId id="346" r:id="rId49"/>
+    <p:sldId id="347" r:id="rId50"/>
+    <p:sldId id="335" r:id="rId51"/>
+    <p:sldId id="344" r:id="rId52"/>
+    <p:sldId id="345" r:id="rId53"/>
+    <p:sldId id="330" r:id="rId54"/>
   </p:sldIdLst>
   <p:sldSz cx="9144000" cy="6858000" type="screen4x3"/>
   <p:notesSz cx="6858000" cy="9144000"/>
@@ -4714,7 +4717,7 @@
     </p:spTree>
     <p:extLst>
       <p:ext uri="{BB962C8B-B14F-4D97-AF65-F5344CB8AC3E}">
-        <p14:creationId xmlns:p14="http://schemas.microsoft.com/office/powerpoint/2010/main" val="2866667866"/>
+        <p14:creationId xmlns:p14="http://schemas.microsoft.com/office/powerpoint/2010/main" val="3060836967"/>
       </p:ext>
     </p:extLst>
   </p:cSld>
@@ -4806,7 +4809,7 @@
     </p:spTree>
     <p:extLst>
       <p:ext uri="{BB962C8B-B14F-4D97-AF65-F5344CB8AC3E}">
-        <p14:creationId xmlns:p14="http://schemas.microsoft.com/office/powerpoint/2010/main" val="138877905"/>
+        <p14:creationId xmlns:p14="http://schemas.microsoft.com/office/powerpoint/2010/main" val="2311791083"/>
       </p:ext>
     </p:extLst>
   </p:cSld>
@@ -4898,7 +4901,7 @@
     </p:spTree>
     <p:extLst>
       <p:ext uri="{BB962C8B-B14F-4D97-AF65-F5344CB8AC3E}">
-        <p14:creationId xmlns:p14="http://schemas.microsoft.com/office/powerpoint/2010/main" val="3060836967"/>
+        <p14:creationId xmlns:p14="http://schemas.microsoft.com/office/powerpoint/2010/main" val="1125692931"/>
       </p:ext>
     </p:extLst>
   </p:cSld>
@@ -5074,6 +5077,282 @@
             <a:fld id="{2C5A56FE-B2E8-4285-8F31-2AEEB8EA39C6}" type="slidenum">
               <a:rPr lang="en-GB" smtClean="0"/>
               <a:t>50</a:t>
+            </a:fld>
+            <a:endParaRPr lang="en-GB"/>
+          </a:p>
+        </p:txBody>
+      </p:sp>
+    </p:spTree>
+    <p:extLst>
+      <p:ext uri="{BB962C8B-B14F-4D97-AF65-F5344CB8AC3E}">
+        <p14:creationId xmlns:p14="http://schemas.microsoft.com/office/powerpoint/2010/main" val="2866667866"/>
+      </p:ext>
+    </p:extLst>
+  </p:cSld>
+  <p:clrMapOvr>
+    <a:masterClrMapping/>
+  </p:clrMapOvr>
+</p:notes>
+</file>
+
+<file path=ppt/notesSlides/notesSlide51.xml><?xml version="1.0" encoding="utf-8"?>
+<p:notes xmlns:a="http://schemas.openxmlformats.org/drawingml/2006/main" xmlns:r="http://schemas.openxmlformats.org/officeDocument/2006/relationships" xmlns:p="http://schemas.openxmlformats.org/presentationml/2006/main">
+  <p:cSld>
+    <p:spTree>
+      <p:nvGrpSpPr>
+        <p:cNvPr id="1" name=""/>
+        <p:cNvGrpSpPr/>
+        <p:nvPr/>
+      </p:nvGrpSpPr>
+      <p:grpSpPr>
+        <a:xfrm>
+          <a:off x="0" y="0"/>
+          <a:ext cx="0" cy="0"/>
+          <a:chOff x="0" y="0"/>
+          <a:chExt cx="0" cy="0"/>
+        </a:xfrm>
+      </p:grpSpPr>
+      <p:sp>
+        <p:nvSpPr>
+          <p:cNvPr id="2" name="Slide Image Placeholder 1"/>
+          <p:cNvSpPr>
+            <a:spLocks noGrp="1" noRot="1" noChangeAspect="1"/>
+          </p:cNvSpPr>
+          <p:nvPr>
+            <p:ph type="sldImg"/>
+          </p:nvPr>
+        </p:nvSpPr>
+        <p:spPr>
+          <a:xfrm>
+            <a:off x="1143000" y="685800"/>
+            <a:ext cx="4572000" cy="3429000"/>
+          </a:xfrm>
+          <a:prstGeom prst="rect">
+            <a:avLst/>
+          </a:prstGeom>
+        </p:spPr>
+      </p:sp>
+      <p:sp>
+        <p:nvSpPr>
+          <p:cNvPr id="3" name="Notes Placeholder 2"/>
+          <p:cNvSpPr>
+            <a:spLocks noGrp="1"/>
+          </p:cNvSpPr>
+          <p:nvPr>
+            <p:ph type="body" idx="1"/>
+          </p:nvPr>
+        </p:nvSpPr>
+        <p:spPr/>
+        <p:txBody>
+          <a:bodyPr/>
+          <a:lstStyle/>
+          <a:p>
+            <a:endParaRPr lang="it-IT" dirty="0"/>
+          </a:p>
+        </p:txBody>
+      </p:sp>
+      <p:sp>
+        <p:nvSpPr>
+          <p:cNvPr id="4" name="Slide Number Placeholder 3"/>
+          <p:cNvSpPr>
+            <a:spLocks noGrp="1"/>
+          </p:cNvSpPr>
+          <p:nvPr>
+            <p:ph type="sldNum" sz="quarter" idx="10"/>
+          </p:nvPr>
+        </p:nvSpPr>
+        <p:spPr/>
+        <p:txBody>
+          <a:bodyPr/>
+          <a:lstStyle/>
+          <a:p>
+            <a:fld id="{2C5A56FE-B2E8-4285-8F31-2AEEB8EA39C6}" type="slidenum">
+              <a:rPr lang="en-GB" smtClean="0"/>
+              <a:t>51</a:t>
+            </a:fld>
+            <a:endParaRPr lang="en-GB"/>
+          </a:p>
+        </p:txBody>
+      </p:sp>
+    </p:spTree>
+    <p:extLst>
+      <p:ext uri="{BB962C8B-B14F-4D97-AF65-F5344CB8AC3E}">
+        <p14:creationId xmlns:p14="http://schemas.microsoft.com/office/powerpoint/2010/main" val="138877905"/>
+      </p:ext>
+    </p:extLst>
+  </p:cSld>
+  <p:clrMapOvr>
+    <a:masterClrMapping/>
+  </p:clrMapOvr>
+</p:notes>
+</file>
+
+<file path=ppt/notesSlides/notesSlide52.xml><?xml version="1.0" encoding="utf-8"?>
+<p:notes xmlns:a="http://schemas.openxmlformats.org/drawingml/2006/main" xmlns:r="http://schemas.openxmlformats.org/officeDocument/2006/relationships" xmlns:p="http://schemas.openxmlformats.org/presentationml/2006/main">
+  <p:cSld>
+    <p:spTree>
+      <p:nvGrpSpPr>
+        <p:cNvPr id="1" name=""/>
+        <p:cNvGrpSpPr/>
+        <p:nvPr/>
+      </p:nvGrpSpPr>
+      <p:grpSpPr>
+        <a:xfrm>
+          <a:off x="0" y="0"/>
+          <a:ext cx="0" cy="0"/>
+          <a:chOff x="0" y="0"/>
+          <a:chExt cx="0" cy="0"/>
+        </a:xfrm>
+      </p:grpSpPr>
+      <p:sp>
+        <p:nvSpPr>
+          <p:cNvPr id="2" name="Slide Image Placeholder 1"/>
+          <p:cNvSpPr>
+            <a:spLocks noGrp="1" noRot="1" noChangeAspect="1"/>
+          </p:cNvSpPr>
+          <p:nvPr>
+            <p:ph type="sldImg"/>
+          </p:nvPr>
+        </p:nvSpPr>
+        <p:spPr>
+          <a:xfrm>
+            <a:off x="1143000" y="685800"/>
+            <a:ext cx="4572000" cy="3429000"/>
+          </a:xfrm>
+          <a:prstGeom prst="rect">
+            <a:avLst/>
+          </a:prstGeom>
+        </p:spPr>
+      </p:sp>
+      <p:sp>
+        <p:nvSpPr>
+          <p:cNvPr id="3" name="Notes Placeholder 2"/>
+          <p:cNvSpPr>
+            <a:spLocks noGrp="1"/>
+          </p:cNvSpPr>
+          <p:nvPr>
+            <p:ph type="body" idx="1"/>
+          </p:nvPr>
+        </p:nvSpPr>
+        <p:spPr/>
+        <p:txBody>
+          <a:bodyPr/>
+          <a:lstStyle/>
+          <a:p>
+            <a:endParaRPr lang="it-IT" dirty="0"/>
+          </a:p>
+        </p:txBody>
+      </p:sp>
+      <p:sp>
+        <p:nvSpPr>
+          <p:cNvPr id="4" name="Slide Number Placeholder 3"/>
+          <p:cNvSpPr>
+            <a:spLocks noGrp="1"/>
+          </p:cNvSpPr>
+          <p:nvPr>
+            <p:ph type="sldNum" sz="quarter" idx="10"/>
+          </p:nvPr>
+        </p:nvSpPr>
+        <p:spPr/>
+        <p:txBody>
+          <a:bodyPr/>
+          <a:lstStyle/>
+          <a:p>
+            <a:fld id="{2C5A56FE-B2E8-4285-8F31-2AEEB8EA39C6}" type="slidenum">
+              <a:rPr lang="en-GB" smtClean="0"/>
+              <a:t>52</a:t>
+            </a:fld>
+            <a:endParaRPr lang="en-GB"/>
+          </a:p>
+        </p:txBody>
+      </p:sp>
+    </p:spTree>
+    <p:extLst>
+      <p:ext uri="{BB962C8B-B14F-4D97-AF65-F5344CB8AC3E}">
+        <p14:creationId xmlns:p14="http://schemas.microsoft.com/office/powerpoint/2010/main" val="996561776"/>
+      </p:ext>
+    </p:extLst>
+  </p:cSld>
+  <p:clrMapOvr>
+    <a:masterClrMapping/>
+  </p:clrMapOvr>
+</p:notes>
+</file>
+
+<file path=ppt/notesSlides/notesSlide53.xml><?xml version="1.0" encoding="utf-8"?>
+<p:notes xmlns:a="http://schemas.openxmlformats.org/drawingml/2006/main" xmlns:r="http://schemas.openxmlformats.org/officeDocument/2006/relationships" xmlns:p="http://schemas.openxmlformats.org/presentationml/2006/main">
+  <p:cSld>
+    <p:spTree>
+      <p:nvGrpSpPr>
+        <p:cNvPr id="1" name=""/>
+        <p:cNvGrpSpPr/>
+        <p:nvPr/>
+      </p:nvGrpSpPr>
+      <p:grpSpPr>
+        <a:xfrm>
+          <a:off x="0" y="0"/>
+          <a:ext cx="0" cy="0"/>
+          <a:chOff x="0" y="0"/>
+          <a:chExt cx="0" cy="0"/>
+        </a:xfrm>
+      </p:grpSpPr>
+      <p:sp>
+        <p:nvSpPr>
+          <p:cNvPr id="2" name="Slide Image Placeholder 1"/>
+          <p:cNvSpPr>
+            <a:spLocks noGrp="1" noRot="1" noChangeAspect="1"/>
+          </p:cNvSpPr>
+          <p:nvPr>
+            <p:ph type="sldImg"/>
+          </p:nvPr>
+        </p:nvSpPr>
+        <p:spPr>
+          <a:xfrm>
+            <a:off x="1143000" y="685800"/>
+            <a:ext cx="4572000" cy="3429000"/>
+          </a:xfrm>
+          <a:prstGeom prst="rect">
+            <a:avLst/>
+          </a:prstGeom>
+        </p:spPr>
+      </p:sp>
+      <p:sp>
+        <p:nvSpPr>
+          <p:cNvPr id="3" name="Notes Placeholder 2"/>
+          <p:cNvSpPr>
+            <a:spLocks noGrp="1"/>
+          </p:cNvSpPr>
+          <p:nvPr>
+            <p:ph type="body" idx="1"/>
+          </p:nvPr>
+        </p:nvSpPr>
+        <p:spPr/>
+        <p:txBody>
+          <a:bodyPr/>
+          <a:lstStyle/>
+          <a:p>
+            <a:endParaRPr lang="it-IT" dirty="0"/>
+          </a:p>
+        </p:txBody>
+      </p:sp>
+      <p:sp>
+        <p:nvSpPr>
+          <p:cNvPr id="4" name="Slide Number Placeholder 3"/>
+          <p:cNvSpPr>
+            <a:spLocks noGrp="1"/>
+          </p:cNvSpPr>
+          <p:nvPr>
+            <p:ph type="sldNum" sz="quarter" idx="10"/>
+          </p:nvPr>
+        </p:nvSpPr>
+        <p:spPr/>
+        <p:txBody>
+          <a:bodyPr/>
+          <a:lstStyle/>
+          <a:p>
+            <a:fld id="{2C5A56FE-B2E8-4285-8F31-2AEEB8EA39C6}" type="slidenum">
+              <a:rPr lang="en-GB" smtClean="0"/>
+              <a:t>53</a:t>
             </a:fld>
             <a:endParaRPr lang="en-GB"/>
           </a:p>
@@ -20294,8 +20573,12 @@
           <a:lstStyle/>
           <a:p>
             <a:r>
+              <a:rPr lang="en-GB" sz="1600" b="1" dirty="0"/>
+              <a:t>HTTP call </a:t>
+            </a:r>
+            <a:r>
               <a:rPr lang="en-GB" sz="1600" dirty="0"/>
-              <a:t>HTTP call (REST service)</a:t>
+              <a:t>(REST service)</a:t>
             </a:r>
           </a:p>
         </p:txBody>
@@ -20329,8 +20612,12 @@
           <a:lstStyle/>
           <a:p>
             <a:r>
+              <a:rPr lang="en-GB" sz="1600" b="1" dirty="0"/>
+              <a:t>RPC-Like call</a:t>
+            </a:r>
+            <a:r>
               <a:rPr lang="en-GB" sz="1600" dirty="0"/>
-              <a:t>RPC-Like call (</a:t>
+              <a:t> (</a:t>
             </a:r>
             <a:r>
               <a:rPr lang="en-GB" sz="1600" dirty="0" err="1"/>
@@ -20372,8 +20659,12 @@
           <a:lstStyle/>
           <a:p>
             <a:r>
+              <a:rPr lang="en-GB" sz="1600" b="1" dirty="0"/>
+              <a:t>Asynchronous messages </a:t>
+            </a:r>
+            <a:r>
               <a:rPr lang="en-GB" sz="1600" dirty="0"/>
-              <a:t>Asynchronous messages using message broken</a:t>
+              <a:t>using message broken</a:t>
             </a:r>
           </a:p>
         </p:txBody>
@@ -20853,6 +21144,1786 @@
 </file>
 
 <file path=ppt/slides/slide47.xml><?xml version="1.0" encoding="utf-8"?>
+<p:sld xmlns:a="http://schemas.openxmlformats.org/drawingml/2006/main" xmlns:r="http://schemas.openxmlformats.org/officeDocument/2006/relationships" xmlns:p="http://schemas.openxmlformats.org/presentationml/2006/main">
+  <p:cSld>
+    <p:spTree>
+      <p:nvGrpSpPr>
+        <p:cNvPr id="1" name=""/>
+        <p:cNvGrpSpPr/>
+        <p:nvPr/>
+      </p:nvGrpSpPr>
+      <p:grpSpPr>
+        <a:xfrm>
+          <a:off x="0" y="0"/>
+          <a:ext cx="0" cy="0"/>
+          <a:chOff x="0" y="0"/>
+          <a:chExt cx="0" cy="0"/>
+        </a:xfrm>
+      </p:grpSpPr>
+      <p:sp>
+        <p:nvSpPr>
+          <p:cNvPr id="2" name="Text Placeholder 1"/>
+          <p:cNvSpPr>
+            <a:spLocks noGrp="1"/>
+          </p:cNvSpPr>
+          <p:nvPr>
+            <p:ph type="body" sz="quarter" idx="11"/>
+          </p:nvPr>
+        </p:nvSpPr>
+        <p:spPr>
+          <a:xfrm>
+            <a:off x="328613" y="1079048"/>
+            <a:ext cx="8401246" cy="742196"/>
+          </a:xfrm>
+        </p:spPr>
+        <p:txBody>
+          <a:bodyPr/>
+          <a:lstStyle/>
+          <a:p>
+            <a:r>
+              <a:rPr lang="en-US" dirty="0"/>
+              <a:t>Availability over Consistency</a:t>
+            </a:r>
+          </a:p>
+        </p:txBody>
+      </p:sp>
+      <p:sp>
+        <p:nvSpPr>
+          <p:cNvPr id="3" name="TextBox 2">
+            <a:extLst>
+              <a:ext uri="{FF2B5EF4-FFF2-40B4-BE49-F238E27FC236}">
+                <a16:creationId xmlns:a16="http://schemas.microsoft.com/office/drawing/2014/main" id="{647886CA-AD8B-4217-A687-4BE0AA037954}"/>
+              </a:ext>
+            </a:extLst>
+          </p:cNvPr>
+          <p:cNvSpPr txBox="1"/>
+          <p:nvPr/>
+        </p:nvSpPr>
+        <p:spPr>
+          <a:xfrm>
+            <a:off x="423862" y="2247703"/>
+            <a:ext cx="8210747" cy="400110"/>
+          </a:xfrm>
+          <a:prstGeom prst="rect">
+            <a:avLst/>
+          </a:prstGeom>
+          <a:noFill/>
+        </p:spPr>
+        <p:txBody>
+          <a:bodyPr wrap="square" rtlCol="0">
+            <a:spAutoFit/>
+          </a:bodyPr>
+          <a:lstStyle/>
+          <a:p>
+            <a:r>
+              <a:rPr lang="en-US" sz="2000" b="1" i="1" dirty="0"/>
+              <a:t>CAP Theorem</a:t>
+            </a:r>
+            <a:endParaRPr lang="en-GB" sz="2000" b="1" i="1" dirty="0"/>
+          </a:p>
+        </p:txBody>
+      </p:sp>
+      <p:pic>
+        <p:nvPicPr>
+          <p:cNvPr id="1026" name="Picture 2" descr="BlingTechs: CAP THEOREM">
+            <a:extLst>
+              <a:ext uri="{FF2B5EF4-FFF2-40B4-BE49-F238E27FC236}">
+                <a16:creationId xmlns:a16="http://schemas.microsoft.com/office/drawing/2014/main" id="{87EA086C-1088-445C-B186-474521F93AEB}"/>
+              </a:ext>
+            </a:extLst>
+          </p:cNvPr>
+          <p:cNvPicPr>
+            <a:picLocks noChangeAspect="1" noChangeArrowheads="1"/>
+          </p:cNvPicPr>
+          <p:nvPr/>
+        </p:nvPicPr>
+        <p:blipFill>
+          <a:blip r:embed="rId3">
+            <a:extLst>
+              <a:ext uri="{28A0092B-C50C-407E-A947-70E740481C1C}">
+                <a14:useLocalDpi xmlns:a14="http://schemas.microsoft.com/office/drawing/2010/main" val="0"/>
+              </a:ext>
+            </a:extLst>
+          </a:blip>
+          <a:srcRect/>
+          <a:stretch>
+            <a:fillRect/>
+          </a:stretch>
+        </p:blipFill>
+        <p:spPr bwMode="auto">
+          <a:xfrm>
+            <a:off x="3910288" y="2247703"/>
+            <a:ext cx="4240436" cy="4099088"/>
+          </a:xfrm>
+          <a:prstGeom prst="rect">
+            <a:avLst/>
+          </a:prstGeom>
+          <a:noFill/>
+          <a:extLst>
+            <a:ext uri="{909E8E84-426E-40DD-AFC4-6F175D3DCCD1}">
+              <a14:hiddenFill xmlns:a14="http://schemas.microsoft.com/office/drawing/2010/main">
+                <a:solidFill>
+                  <a:srgbClr val="FFFFFF"/>
+                </a:solidFill>
+              </a14:hiddenFill>
+            </a:ext>
+          </a:extLst>
+        </p:spPr>
+      </p:pic>
+      <p:sp>
+        <p:nvSpPr>
+          <p:cNvPr id="5" name="TextBox 4">
+            <a:extLst>
+              <a:ext uri="{FF2B5EF4-FFF2-40B4-BE49-F238E27FC236}">
+                <a16:creationId xmlns:a16="http://schemas.microsoft.com/office/drawing/2014/main" id="{886BF60B-E17D-4152-AF56-B9C0BB7C11D9}"/>
+              </a:ext>
+            </a:extLst>
+          </p:cNvPr>
+          <p:cNvSpPr txBox="1"/>
+          <p:nvPr/>
+        </p:nvSpPr>
+        <p:spPr>
+          <a:xfrm>
+            <a:off x="423863" y="3074272"/>
+            <a:ext cx="3097712" cy="1323439"/>
+          </a:xfrm>
+          <a:prstGeom prst="rect">
+            <a:avLst/>
+          </a:prstGeom>
+          <a:noFill/>
+        </p:spPr>
+        <p:txBody>
+          <a:bodyPr wrap="square" rtlCol="0">
+            <a:spAutoFit/>
+          </a:bodyPr>
+          <a:lstStyle/>
+          <a:p>
+            <a:r>
+              <a:rPr lang="en-GB" sz="1600" b="1" i="1" dirty="0"/>
+              <a:t>“It’s not possible for a distributed data store to simultaneously provide more than two features between Consistency, Availability and Partition tolerance”</a:t>
+            </a:r>
+          </a:p>
+        </p:txBody>
+      </p:sp>
+    </p:spTree>
+    <p:extLst>
+      <p:ext uri="{BB962C8B-B14F-4D97-AF65-F5344CB8AC3E}">
+        <p14:creationId xmlns:p14="http://schemas.microsoft.com/office/powerpoint/2010/main" val="3590855284"/>
+      </p:ext>
+    </p:extLst>
+  </p:cSld>
+  <p:clrMapOvr>
+    <a:masterClrMapping/>
+  </p:clrMapOvr>
+  <p:timing>
+    <p:tnLst>
+      <p:par>
+        <p:cTn id="1" dur="indefinite" restart="never" nodeType="tmRoot">
+          <p:childTnLst>
+            <p:seq concurrent="1" nextAc="seek">
+              <p:cTn id="2" dur="indefinite" nodeType="mainSeq">
+                <p:childTnLst>
+                  <p:par>
+                    <p:cTn id="3" fill="hold">
+                      <p:stCondLst>
+                        <p:cond delay="indefinite"/>
+                      </p:stCondLst>
+                      <p:childTnLst>
+                        <p:par>
+                          <p:cTn id="4" fill="hold">
+                            <p:stCondLst>
+                              <p:cond delay="0"/>
+                            </p:stCondLst>
+                            <p:childTnLst>
+                              <p:par>
+                                <p:cTn id="5" presetID="10" presetClass="entr" presetSubtype="0" fill="hold" grpId="0" nodeType="clickEffect">
+                                  <p:stCondLst>
+                                    <p:cond delay="0"/>
+                                  </p:stCondLst>
+                                  <p:childTnLst>
+                                    <p:set>
+                                      <p:cBhvr>
+                                        <p:cTn id="6" dur="1" fill="hold">
+                                          <p:stCondLst>
+                                            <p:cond delay="0"/>
+                                          </p:stCondLst>
+                                        </p:cTn>
+                                        <p:tgtEl>
+                                          <p:spTgt spid="5"/>
+                                        </p:tgtEl>
+                                        <p:attrNameLst>
+                                          <p:attrName>style.visibility</p:attrName>
+                                        </p:attrNameLst>
+                                      </p:cBhvr>
+                                      <p:to>
+                                        <p:strVal val="visible"/>
+                                      </p:to>
+                                    </p:set>
+                                    <p:animEffect transition="in" filter="fade">
+                                      <p:cBhvr>
+                                        <p:cTn id="7" dur="500"/>
+                                        <p:tgtEl>
+                                          <p:spTgt spid="5"/>
+                                        </p:tgtEl>
+                                      </p:cBhvr>
+                                    </p:animEffect>
+                                  </p:childTnLst>
+                                </p:cTn>
+                              </p:par>
+                            </p:childTnLst>
+                          </p:cTn>
+                        </p:par>
+                        <p:par>
+                          <p:cTn id="8" fill="hold">
+                            <p:stCondLst>
+                              <p:cond delay="500"/>
+                            </p:stCondLst>
+                            <p:childTnLst>
+                              <p:par>
+                                <p:cTn id="9" presetID="10" presetClass="entr" presetSubtype="0" fill="hold" nodeType="afterEffect">
+                                  <p:stCondLst>
+                                    <p:cond delay="0"/>
+                                  </p:stCondLst>
+                                  <p:childTnLst>
+                                    <p:set>
+                                      <p:cBhvr>
+                                        <p:cTn id="10" dur="1" fill="hold">
+                                          <p:stCondLst>
+                                            <p:cond delay="0"/>
+                                          </p:stCondLst>
+                                        </p:cTn>
+                                        <p:tgtEl>
+                                          <p:spTgt spid="1026"/>
+                                        </p:tgtEl>
+                                        <p:attrNameLst>
+                                          <p:attrName>style.visibility</p:attrName>
+                                        </p:attrNameLst>
+                                      </p:cBhvr>
+                                      <p:to>
+                                        <p:strVal val="visible"/>
+                                      </p:to>
+                                    </p:set>
+                                    <p:animEffect transition="in" filter="fade">
+                                      <p:cBhvr>
+                                        <p:cTn id="11" dur="500"/>
+                                        <p:tgtEl>
+                                          <p:spTgt spid="1026"/>
+                                        </p:tgtEl>
+                                      </p:cBhvr>
+                                    </p:animEffect>
+                                  </p:childTnLst>
+                                </p:cTn>
+                              </p:par>
+                            </p:childTnLst>
+                          </p:cTn>
+                        </p:par>
+                      </p:childTnLst>
+                    </p:cTn>
+                  </p:par>
+                </p:childTnLst>
+              </p:cTn>
+              <p:prevCondLst>
+                <p:cond evt="onPrev" delay="0">
+                  <p:tgtEl>
+                    <p:sldTgt/>
+                  </p:tgtEl>
+                </p:cond>
+              </p:prevCondLst>
+              <p:nextCondLst>
+                <p:cond evt="onNext" delay="0">
+                  <p:tgtEl>
+                    <p:sldTgt/>
+                  </p:tgtEl>
+                </p:cond>
+              </p:nextCondLst>
+            </p:seq>
+          </p:childTnLst>
+        </p:cTn>
+      </p:par>
+    </p:tnLst>
+    <p:bldLst>
+      <p:bldP spid="5" grpId="0"/>
+    </p:bldLst>
+  </p:timing>
+</p:sld>
+</file>
+
+<file path=ppt/slides/slide48.xml><?xml version="1.0" encoding="utf-8"?>
+<p:sld xmlns:a="http://schemas.openxmlformats.org/drawingml/2006/main" xmlns:r="http://schemas.openxmlformats.org/officeDocument/2006/relationships" xmlns:p="http://schemas.openxmlformats.org/presentationml/2006/main">
+  <p:cSld>
+    <p:spTree>
+      <p:nvGrpSpPr>
+        <p:cNvPr id="1" name=""/>
+        <p:cNvGrpSpPr/>
+        <p:nvPr/>
+      </p:nvGrpSpPr>
+      <p:grpSpPr>
+        <a:xfrm>
+          <a:off x="0" y="0"/>
+          <a:ext cx="0" cy="0"/>
+          <a:chOff x="0" y="0"/>
+          <a:chExt cx="0" cy="0"/>
+        </a:xfrm>
+      </p:grpSpPr>
+      <p:sp>
+        <p:nvSpPr>
+          <p:cNvPr id="2" name="Text Placeholder 1"/>
+          <p:cNvSpPr>
+            <a:spLocks noGrp="1"/>
+          </p:cNvSpPr>
+          <p:nvPr>
+            <p:ph type="body" sz="quarter" idx="11"/>
+          </p:nvPr>
+        </p:nvSpPr>
+        <p:spPr>
+          <a:xfrm>
+            <a:off x="328613" y="1079048"/>
+            <a:ext cx="8401246" cy="742196"/>
+          </a:xfrm>
+        </p:spPr>
+        <p:txBody>
+          <a:bodyPr/>
+          <a:lstStyle/>
+          <a:p>
+            <a:r>
+              <a:rPr lang="en-US" dirty="0"/>
+              <a:t>Availability over Consistency</a:t>
+            </a:r>
+          </a:p>
+        </p:txBody>
+      </p:sp>
+      <p:sp>
+        <p:nvSpPr>
+          <p:cNvPr id="3" name="TextBox 2">
+            <a:extLst>
+              <a:ext uri="{FF2B5EF4-FFF2-40B4-BE49-F238E27FC236}">
+                <a16:creationId xmlns:a16="http://schemas.microsoft.com/office/drawing/2014/main" id="{647886CA-AD8B-4217-A687-4BE0AA037954}"/>
+              </a:ext>
+            </a:extLst>
+          </p:cNvPr>
+          <p:cNvSpPr txBox="1"/>
+          <p:nvPr/>
+        </p:nvSpPr>
+        <p:spPr>
+          <a:xfrm>
+            <a:off x="423862" y="2247703"/>
+            <a:ext cx="8210747" cy="338554"/>
+          </a:xfrm>
+          <a:prstGeom prst="rect">
+            <a:avLst/>
+          </a:prstGeom>
+          <a:noFill/>
+        </p:spPr>
+        <p:txBody>
+          <a:bodyPr wrap="square" rtlCol="0">
+            <a:spAutoFit/>
+          </a:bodyPr>
+          <a:lstStyle/>
+          <a:p>
+            <a:r>
+              <a:rPr lang="en-US" sz="1600" dirty="0"/>
+              <a:t>The CAP Theorem gives you two options: </a:t>
+            </a:r>
+            <a:r>
+              <a:rPr lang="en-US" sz="1600" b="1" dirty="0"/>
+              <a:t>availability XOR consistency</a:t>
+            </a:r>
+            <a:endParaRPr lang="en-GB" sz="1600" b="1" dirty="0"/>
+          </a:p>
+        </p:txBody>
+      </p:sp>
+      <p:sp>
+        <p:nvSpPr>
+          <p:cNvPr id="6" name="TextBox 5">
+            <a:extLst>
+              <a:ext uri="{FF2B5EF4-FFF2-40B4-BE49-F238E27FC236}">
+                <a16:creationId xmlns:a16="http://schemas.microsoft.com/office/drawing/2014/main" id="{CF978CE5-93C7-4236-B957-9AB892CE3538}"/>
+              </a:ext>
+            </a:extLst>
+          </p:cNvPr>
+          <p:cNvSpPr txBox="1"/>
+          <p:nvPr/>
+        </p:nvSpPr>
+        <p:spPr>
+          <a:xfrm>
+            <a:off x="423862" y="2754024"/>
+            <a:ext cx="8210747" cy="338554"/>
+          </a:xfrm>
+          <a:prstGeom prst="rect">
+            <a:avLst/>
+          </a:prstGeom>
+          <a:noFill/>
+        </p:spPr>
+        <p:txBody>
+          <a:bodyPr wrap="square" rtlCol="0">
+            <a:spAutoFit/>
+          </a:bodyPr>
+          <a:lstStyle/>
+          <a:p>
+            <a:r>
+              <a:rPr lang="en-US" sz="1600" dirty="0"/>
+              <a:t>For microservices, the main strategy that enables the availability choice is </a:t>
+            </a:r>
+            <a:r>
+              <a:rPr lang="en-US" sz="1600" b="1" dirty="0"/>
+              <a:t>data replication</a:t>
+            </a:r>
+            <a:endParaRPr lang="en-GB" sz="1600" b="1" dirty="0"/>
+          </a:p>
+        </p:txBody>
+      </p:sp>
+      <p:sp>
+        <p:nvSpPr>
+          <p:cNvPr id="7" name="TextBox 6">
+            <a:extLst>
+              <a:ext uri="{FF2B5EF4-FFF2-40B4-BE49-F238E27FC236}">
+                <a16:creationId xmlns:a16="http://schemas.microsoft.com/office/drawing/2014/main" id="{7D232326-BB19-4432-9B2A-47594D3FBE80}"/>
+              </a:ext>
+            </a:extLst>
+          </p:cNvPr>
+          <p:cNvSpPr txBox="1"/>
+          <p:nvPr/>
+        </p:nvSpPr>
+        <p:spPr>
+          <a:xfrm>
+            <a:off x="1360933" y="3473035"/>
+            <a:ext cx="7273676" cy="338554"/>
+          </a:xfrm>
+          <a:prstGeom prst="rect">
+            <a:avLst/>
+          </a:prstGeom>
+          <a:noFill/>
+        </p:spPr>
+        <p:txBody>
+          <a:bodyPr wrap="square" rtlCol="0">
+            <a:spAutoFit/>
+          </a:bodyPr>
+          <a:lstStyle/>
+          <a:p>
+            <a:r>
+              <a:rPr lang="en-US" sz="1600" b="1" i="1" dirty="0"/>
+              <a:t>Service Data Replications pattern</a:t>
+            </a:r>
+            <a:endParaRPr lang="en-GB" sz="1600" b="1" i="1" dirty="0"/>
+          </a:p>
+        </p:txBody>
+      </p:sp>
+      <p:sp>
+        <p:nvSpPr>
+          <p:cNvPr id="8" name="TextBox 7">
+            <a:extLst>
+              <a:ext uri="{FF2B5EF4-FFF2-40B4-BE49-F238E27FC236}">
+                <a16:creationId xmlns:a16="http://schemas.microsoft.com/office/drawing/2014/main" id="{4F8039B8-83AD-4A0A-B67E-7D27373E6FDF}"/>
+              </a:ext>
+            </a:extLst>
+          </p:cNvPr>
+          <p:cNvSpPr txBox="1"/>
+          <p:nvPr/>
+        </p:nvSpPr>
+        <p:spPr>
+          <a:xfrm>
+            <a:off x="1360933" y="4022769"/>
+            <a:ext cx="7273676" cy="338554"/>
+          </a:xfrm>
+          <a:prstGeom prst="rect">
+            <a:avLst/>
+          </a:prstGeom>
+          <a:noFill/>
+        </p:spPr>
+        <p:txBody>
+          <a:bodyPr wrap="square" rtlCol="0">
+            <a:spAutoFit/>
+          </a:bodyPr>
+          <a:lstStyle/>
+          <a:p>
+            <a:r>
+              <a:rPr lang="en-US" sz="1600" b="1" i="1" dirty="0"/>
+              <a:t>Command Query Responsibility Segregation CQRS pattern</a:t>
+            </a:r>
+            <a:endParaRPr lang="en-GB" sz="1600" b="1" i="1" dirty="0"/>
+          </a:p>
+        </p:txBody>
+      </p:sp>
+      <p:sp>
+        <p:nvSpPr>
+          <p:cNvPr id="9" name="TextBox 8">
+            <a:extLst>
+              <a:ext uri="{FF2B5EF4-FFF2-40B4-BE49-F238E27FC236}">
+                <a16:creationId xmlns:a16="http://schemas.microsoft.com/office/drawing/2014/main" id="{F0E22410-5BFF-4F7F-AD53-AA75D6772463}"/>
+              </a:ext>
+            </a:extLst>
+          </p:cNvPr>
+          <p:cNvSpPr txBox="1"/>
+          <p:nvPr/>
+        </p:nvSpPr>
+        <p:spPr>
+          <a:xfrm>
+            <a:off x="1360933" y="4572503"/>
+            <a:ext cx="7273676" cy="338554"/>
+          </a:xfrm>
+          <a:prstGeom prst="rect">
+            <a:avLst/>
+          </a:prstGeom>
+          <a:noFill/>
+        </p:spPr>
+        <p:txBody>
+          <a:bodyPr wrap="square" rtlCol="0">
+            <a:spAutoFit/>
+          </a:bodyPr>
+          <a:lstStyle/>
+          <a:p>
+            <a:r>
+              <a:rPr lang="en-US" sz="1600" b="1" i="1" dirty="0"/>
+              <a:t>Event Sourcing pattern</a:t>
+            </a:r>
+            <a:endParaRPr lang="en-GB" sz="1600" b="1" i="1" dirty="0"/>
+          </a:p>
+        </p:txBody>
+      </p:sp>
+    </p:spTree>
+    <p:extLst>
+      <p:ext uri="{BB962C8B-B14F-4D97-AF65-F5344CB8AC3E}">
+        <p14:creationId xmlns:p14="http://schemas.microsoft.com/office/powerpoint/2010/main" val="835469970"/>
+      </p:ext>
+    </p:extLst>
+  </p:cSld>
+  <p:clrMapOvr>
+    <a:masterClrMapping/>
+  </p:clrMapOvr>
+  <p:timing>
+    <p:tnLst>
+      <p:par>
+        <p:cTn id="1" dur="indefinite" restart="never" nodeType="tmRoot">
+          <p:childTnLst>
+            <p:seq concurrent="1" nextAc="seek">
+              <p:cTn id="2" dur="indefinite" nodeType="mainSeq">
+                <p:childTnLst>
+                  <p:par>
+                    <p:cTn id="3" fill="hold">
+                      <p:stCondLst>
+                        <p:cond delay="indefinite"/>
+                      </p:stCondLst>
+                      <p:childTnLst>
+                        <p:par>
+                          <p:cTn id="4" fill="hold">
+                            <p:stCondLst>
+                              <p:cond delay="0"/>
+                            </p:stCondLst>
+                            <p:childTnLst>
+                              <p:par>
+                                <p:cTn id="5" presetID="10" presetClass="entr" presetSubtype="0" fill="hold" grpId="0" nodeType="clickEffect">
+                                  <p:stCondLst>
+                                    <p:cond delay="0"/>
+                                  </p:stCondLst>
+                                  <p:childTnLst>
+                                    <p:set>
+                                      <p:cBhvr>
+                                        <p:cTn id="6" dur="1" fill="hold">
+                                          <p:stCondLst>
+                                            <p:cond delay="0"/>
+                                          </p:stCondLst>
+                                        </p:cTn>
+                                        <p:tgtEl>
+                                          <p:spTgt spid="3"/>
+                                        </p:tgtEl>
+                                        <p:attrNameLst>
+                                          <p:attrName>style.visibility</p:attrName>
+                                        </p:attrNameLst>
+                                      </p:cBhvr>
+                                      <p:to>
+                                        <p:strVal val="visible"/>
+                                      </p:to>
+                                    </p:set>
+                                    <p:animEffect transition="in" filter="fade">
+                                      <p:cBhvr>
+                                        <p:cTn id="7" dur="500"/>
+                                        <p:tgtEl>
+                                          <p:spTgt spid="3"/>
+                                        </p:tgtEl>
+                                      </p:cBhvr>
+                                    </p:animEffect>
+                                  </p:childTnLst>
+                                </p:cTn>
+                              </p:par>
+                            </p:childTnLst>
+                          </p:cTn>
+                        </p:par>
+                      </p:childTnLst>
+                    </p:cTn>
+                  </p:par>
+                  <p:par>
+                    <p:cTn id="8" fill="hold">
+                      <p:stCondLst>
+                        <p:cond delay="indefinite"/>
+                      </p:stCondLst>
+                      <p:childTnLst>
+                        <p:par>
+                          <p:cTn id="9" fill="hold">
+                            <p:stCondLst>
+                              <p:cond delay="0"/>
+                            </p:stCondLst>
+                            <p:childTnLst>
+                              <p:par>
+                                <p:cTn id="10" presetID="10" presetClass="entr" presetSubtype="0" fill="hold" grpId="0" nodeType="clickEffect">
+                                  <p:stCondLst>
+                                    <p:cond delay="0"/>
+                                  </p:stCondLst>
+                                  <p:childTnLst>
+                                    <p:set>
+                                      <p:cBhvr>
+                                        <p:cTn id="11" dur="1" fill="hold">
+                                          <p:stCondLst>
+                                            <p:cond delay="0"/>
+                                          </p:stCondLst>
+                                        </p:cTn>
+                                        <p:tgtEl>
+                                          <p:spTgt spid="6"/>
+                                        </p:tgtEl>
+                                        <p:attrNameLst>
+                                          <p:attrName>style.visibility</p:attrName>
+                                        </p:attrNameLst>
+                                      </p:cBhvr>
+                                      <p:to>
+                                        <p:strVal val="visible"/>
+                                      </p:to>
+                                    </p:set>
+                                    <p:animEffect transition="in" filter="fade">
+                                      <p:cBhvr>
+                                        <p:cTn id="12" dur="500"/>
+                                        <p:tgtEl>
+                                          <p:spTgt spid="6"/>
+                                        </p:tgtEl>
+                                      </p:cBhvr>
+                                    </p:animEffect>
+                                  </p:childTnLst>
+                                </p:cTn>
+                              </p:par>
+                            </p:childTnLst>
+                          </p:cTn>
+                        </p:par>
+                      </p:childTnLst>
+                    </p:cTn>
+                  </p:par>
+                  <p:par>
+                    <p:cTn id="13" fill="hold">
+                      <p:stCondLst>
+                        <p:cond delay="indefinite"/>
+                      </p:stCondLst>
+                      <p:childTnLst>
+                        <p:par>
+                          <p:cTn id="14" fill="hold">
+                            <p:stCondLst>
+                              <p:cond delay="0"/>
+                            </p:stCondLst>
+                            <p:childTnLst>
+                              <p:par>
+                                <p:cTn id="15" presetID="10" presetClass="entr" presetSubtype="0" fill="hold" grpId="0" nodeType="clickEffect">
+                                  <p:stCondLst>
+                                    <p:cond delay="0"/>
+                                  </p:stCondLst>
+                                  <p:childTnLst>
+                                    <p:set>
+                                      <p:cBhvr>
+                                        <p:cTn id="16" dur="1" fill="hold">
+                                          <p:stCondLst>
+                                            <p:cond delay="0"/>
+                                          </p:stCondLst>
+                                        </p:cTn>
+                                        <p:tgtEl>
+                                          <p:spTgt spid="7"/>
+                                        </p:tgtEl>
+                                        <p:attrNameLst>
+                                          <p:attrName>style.visibility</p:attrName>
+                                        </p:attrNameLst>
+                                      </p:cBhvr>
+                                      <p:to>
+                                        <p:strVal val="visible"/>
+                                      </p:to>
+                                    </p:set>
+                                    <p:animEffect transition="in" filter="fade">
+                                      <p:cBhvr>
+                                        <p:cTn id="17" dur="500"/>
+                                        <p:tgtEl>
+                                          <p:spTgt spid="7"/>
+                                        </p:tgtEl>
+                                      </p:cBhvr>
+                                    </p:animEffect>
+                                  </p:childTnLst>
+                                </p:cTn>
+                              </p:par>
+                            </p:childTnLst>
+                          </p:cTn>
+                        </p:par>
+                      </p:childTnLst>
+                    </p:cTn>
+                  </p:par>
+                  <p:par>
+                    <p:cTn id="18" fill="hold">
+                      <p:stCondLst>
+                        <p:cond delay="indefinite"/>
+                      </p:stCondLst>
+                      <p:childTnLst>
+                        <p:par>
+                          <p:cTn id="19" fill="hold">
+                            <p:stCondLst>
+                              <p:cond delay="0"/>
+                            </p:stCondLst>
+                            <p:childTnLst>
+                              <p:par>
+                                <p:cTn id="20" presetID="10" presetClass="entr" presetSubtype="0" fill="hold" grpId="0" nodeType="clickEffect">
+                                  <p:stCondLst>
+                                    <p:cond delay="0"/>
+                                  </p:stCondLst>
+                                  <p:childTnLst>
+                                    <p:set>
+                                      <p:cBhvr>
+                                        <p:cTn id="21" dur="1" fill="hold">
+                                          <p:stCondLst>
+                                            <p:cond delay="0"/>
+                                          </p:stCondLst>
+                                        </p:cTn>
+                                        <p:tgtEl>
+                                          <p:spTgt spid="8"/>
+                                        </p:tgtEl>
+                                        <p:attrNameLst>
+                                          <p:attrName>style.visibility</p:attrName>
+                                        </p:attrNameLst>
+                                      </p:cBhvr>
+                                      <p:to>
+                                        <p:strVal val="visible"/>
+                                      </p:to>
+                                    </p:set>
+                                    <p:animEffect transition="in" filter="fade">
+                                      <p:cBhvr>
+                                        <p:cTn id="22" dur="500"/>
+                                        <p:tgtEl>
+                                          <p:spTgt spid="8"/>
+                                        </p:tgtEl>
+                                      </p:cBhvr>
+                                    </p:animEffect>
+                                  </p:childTnLst>
+                                </p:cTn>
+                              </p:par>
+                            </p:childTnLst>
+                          </p:cTn>
+                        </p:par>
+                      </p:childTnLst>
+                    </p:cTn>
+                  </p:par>
+                  <p:par>
+                    <p:cTn id="23" fill="hold">
+                      <p:stCondLst>
+                        <p:cond delay="indefinite"/>
+                      </p:stCondLst>
+                      <p:childTnLst>
+                        <p:par>
+                          <p:cTn id="24" fill="hold">
+                            <p:stCondLst>
+                              <p:cond delay="0"/>
+                            </p:stCondLst>
+                            <p:childTnLst>
+                              <p:par>
+                                <p:cTn id="25" presetID="10" presetClass="entr" presetSubtype="0" fill="hold" grpId="0" nodeType="clickEffect">
+                                  <p:stCondLst>
+                                    <p:cond delay="0"/>
+                                  </p:stCondLst>
+                                  <p:childTnLst>
+                                    <p:set>
+                                      <p:cBhvr>
+                                        <p:cTn id="26" dur="1" fill="hold">
+                                          <p:stCondLst>
+                                            <p:cond delay="0"/>
+                                          </p:stCondLst>
+                                        </p:cTn>
+                                        <p:tgtEl>
+                                          <p:spTgt spid="9"/>
+                                        </p:tgtEl>
+                                        <p:attrNameLst>
+                                          <p:attrName>style.visibility</p:attrName>
+                                        </p:attrNameLst>
+                                      </p:cBhvr>
+                                      <p:to>
+                                        <p:strVal val="visible"/>
+                                      </p:to>
+                                    </p:set>
+                                    <p:animEffect transition="in" filter="fade">
+                                      <p:cBhvr>
+                                        <p:cTn id="27" dur="500"/>
+                                        <p:tgtEl>
+                                          <p:spTgt spid="9"/>
+                                        </p:tgtEl>
+                                      </p:cBhvr>
+                                    </p:animEffect>
+                                  </p:childTnLst>
+                                </p:cTn>
+                              </p:par>
+                            </p:childTnLst>
+                          </p:cTn>
+                        </p:par>
+                      </p:childTnLst>
+                    </p:cTn>
+                  </p:par>
+                </p:childTnLst>
+              </p:cTn>
+              <p:prevCondLst>
+                <p:cond evt="onPrev" delay="0">
+                  <p:tgtEl>
+                    <p:sldTgt/>
+                  </p:tgtEl>
+                </p:cond>
+              </p:prevCondLst>
+              <p:nextCondLst>
+                <p:cond evt="onNext" delay="0">
+                  <p:tgtEl>
+                    <p:sldTgt/>
+                  </p:tgtEl>
+                </p:cond>
+              </p:nextCondLst>
+            </p:seq>
+          </p:childTnLst>
+        </p:cTn>
+      </p:par>
+    </p:tnLst>
+    <p:bldLst>
+      <p:bldP spid="3" grpId="0"/>
+      <p:bldP spid="6" grpId="0"/>
+      <p:bldP spid="7" grpId="0"/>
+      <p:bldP spid="8" grpId="0"/>
+      <p:bldP spid="9" grpId="0"/>
+    </p:bldLst>
+  </p:timing>
+</p:sld>
+</file>
+
+<file path=ppt/slides/slide49.xml><?xml version="1.0" encoding="utf-8"?>
+<p:sld xmlns:a="http://schemas.openxmlformats.org/drawingml/2006/main" xmlns:r="http://schemas.openxmlformats.org/officeDocument/2006/relationships" xmlns:p="http://schemas.openxmlformats.org/presentationml/2006/main">
+  <p:cSld>
+    <p:spTree>
+      <p:nvGrpSpPr>
+        <p:cNvPr id="1" name=""/>
+        <p:cNvGrpSpPr/>
+        <p:nvPr/>
+      </p:nvGrpSpPr>
+      <p:grpSpPr>
+        <a:xfrm>
+          <a:off x="0" y="0"/>
+          <a:ext cx="0" cy="0"/>
+          <a:chOff x="0" y="0"/>
+          <a:chExt cx="0" cy="0"/>
+        </a:xfrm>
+      </p:grpSpPr>
+      <p:sp>
+        <p:nvSpPr>
+          <p:cNvPr id="2" name="Text Placeholder 1"/>
+          <p:cNvSpPr>
+            <a:spLocks noGrp="1"/>
+          </p:cNvSpPr>
+          <p:nvPr>
+            <p:ph type="body" sz="quarter" idx="11"/>
+          </p:nvPr>
+        </p:nvSpPr>
+        <p:spPr>
+          <a:xfrm>
+            <a:off x="328613" y="1079048"/>
+            <a:ext cx="8401246" cy="742196"/>
+          </a:xfrm>
+        </p:spPr>
+        <p:txBody>
+          <a:bodyPr/>
+          <a:lstStyle/>
+          <a:p>
+            <a:r>
+              <a:rPr lang="en-US" dirty="0"/>
+              <a:t>Availability over Consistency</a:t>
+            </a:r>
+          </a:p>
+        </p:txBody>
+      </p:sp>
+      <p:sp>
+        <p:nvSpPr>
+          <p:cNvPr id="10" name="Rectangle 9">
+            <a:extLst>
+              <a:ext uri="{FF2B5EF4-FFF2-40B4-BE49-F238E27FC236}">
+                <a16:creationId xmlns:a16="http://schemas.microsoft.com/office/drawing/2014/main" id="{C7C16F0E-1DA7-4C26-8AE0-9B062E1C9361}"/>
+              </a:ext>
+            </a:extLst>
+          </p:cNvPr>
+          <p:cNvSpPr/>
+          <p:nvPr/>
+        </p:nvSpPr>
+        <p:spPr>
+          <a:xfrm>
+            <a:off x="671123" y="3819085"/>
+            <a:ext cx="1110343" cy="690465"/>
+          </a:xfrm>
+          <a:prstGeom prst="rect">
+            <a:avLst/>
+          </a:prstGeom>
+        </p:spPr>
+        <p:style>
+          <a:lnRef idx="1">
+            <a:schemeClr val="accent1"/>
+          </a:lnRef>
+          <a:fillRef idx="3">
+            <a:schemeClr val="accent1"/>
+          </a:fillRef>
+          <a:effectRef idx="2">
+            <a:schemeClr val="accent1"/>
+          </a:effectRef>
+          <a:fontRef idx="minor">
+            <a:schemeClr val="lt1"/>
+          </a:fontRef>
+        </p:style>
+        <p:txBody>
+          <a:bodyPr rot="0" spcFirstLastPara="0" vertOverflow="overflow" horzOverflow="overflow" vert="horz" wrap="square" lIns="91440" tIns="45720" rIns="91440" bIns="45720" numCol="1" spcCol="0" rtlCol="0" fromWordArt="0" anchor="ctr" anchorCtr="0" forceAA="0" compatLnSpc="1">
+            <a:prstTxWarp prst="textNoShape">
+              <a:avLst/>
+            </a:prstTxWarp>
+            <a:noAutofit/>
+          </a:bodyPr>
+          <a:lstStyle/>
+          <a:p>
+            <a:pPr algn="ctr"/>
+            <a:r>
+              <a:rPr lang="it-IT" dirty="0">
+                <a:ln w="0"/>
+                <a:solidFill>
+                  <a:schemeClr val="tx1"/>
+                </a:solidFill>
+                <a:effectLst>
+                  <a:outerShdw blurRad="38100" dist="19050" dir="2700000" algn="tl" rotWithShape="0">
+                    <a:schemeClr val="dk1">
+                      <a:alpha val="40000"/>
+                    </a:schemeClr>
+                  </a:outerShdw>
+                </a:effectLst>
+              </a:rPr>
+              <a:t>Client App</a:t>
+            </a:r>
+          </a:p>
+        </p:txBody>
+      </p:sp>
+      <p:sp>
+        <p:nvSpPr>
+          <p:cNvPr id="11" name="Oval 10">
+            <a:extLst>
+              <a:ext uri="{FF2B5EF4-FFF2-40B4-BE49-F238E27FC236}">
+                <a16:creationId xmlns:a16="http://schemas.microsoft.com/office/drawing/2014/main" id="{A6F4AE5D-C9CE-401B-89BC-5FAE209C9A35}"/>
+              </a:ext>
+            </a:extLst>
+          </p:cNvPr>
+          <p:cNvSpPr/>
+          <p:nvPr/>
+        </p:nvSpPr>
+        <p:spPr>
+          <a:xfrm>
+            <a:off x="3124906" y="2219853"/>
+            <a:ext cx="1447094" cy="1209147"/>
+          </a:xfrm>
+          <a:prstGeom prst="ellipse">
+            <a:avLst/>
+          </a:prstGeom>
+        </p:spPr>
+        <p:style>
+          <a:lnRef idx="1">
+            <a:schemeClr val="accent2"/>
+          </a:lnRef>
+          <a:fillRef idx="3">
+            <a:schemeClr val="accent2"/>
+          </a:fillRef>
+          <a:effectRef idx="2">
+            <a:schemeClr val="accent2"/>
+          </a:effectRef>
+          <a:fontRef idx="minor">
+            <a:schemeClr val="lt1"/>
+          </a:fontRef>
+        </p:style>
+        <p:txBody>
+          <a:bodyPr rot="0" spcFirstLastPara="0" vertOverflow="overflow" horzOverflow="overflow" vert="horz" wrap="square" lIns="91440" tIns="45720" rIns="91440" bIns="45720" numCol="1" spcCol="0" rtlCol="0" fromWordArt="0" anchor="ctr" anchorCtr="0" forceAA="0" compatLnSpc="1">
+            <a:prstTxWarp prst="textNoShape">
+              <a:avLst/>
+            </a:prstTxWarp>
+            <a:noAutofit/>
+          </a:bodyPr>
+          <a:lstStyle/>
+          <a:p>
+            <a:pPr algn="ctr"/>
+            <a:r>
+              <a:rPr lang="it-IT" dirty="0">
+                <a:ln w="0"/>
+                <a:solidFill>
+                  <a:schemeClr val="tx1"/>
+                </a:solidFill>
+                <a:effectLst>
+                  <a:outerShdw blurRad="38100" dist="19050" dir="2700000" algn="tl" rotWithShape="0">
+                    <a:schemeClr val="dk1">
+                      <a:alpha val="40000"/>
+                    </a:schemeClr>
+                  </a:outerShdw>
+                </a:effectLst>
+              </a:rPr>
+              <a:t>REST service/ Query</a:t>
+            </a:r>
+          </a:p>
+        </p:txBody>
+      </p:sp>
+      <p:sp>
+        <p:nvSpPr>
+          <p:cNvPr id="12" name="Oval 11">
+            <a:extLst>
+              <a:ext uri="{FF2B5EF4-FFF2-40B4-BE49-F238E27FC236}">
+                <a16:creationId xmlns:a16="http://schemas.microsoft.com/office/drawing/2014/main" id="{F1E11EEB-84C1-4E1E-8B09-C84D2E536D7B}"/>
+              </a:ext>
+            </a:extLst>
+          </p:cNvPr>
+          <p:cNvSpPr/>
+          <p:nvPr/>
+        </p:nvSpPr>
+        <p:spPr>
+          <a:xfrm>
+            <a:off x="3082142" y="4977606"/>
+            <a:ext cx="1447094" cy="1209147"/>
+          </a:xfrm>
+          <a:prstGeom prst="ellipse">
+            <a:avLst/>
+          </a:prstGeom>
+        </p:spPr>
+        <p:style>
+          <a:lnRef idx="1">
+            <a:schemeClr val="accent2"/>
+          </a:lnRef>
+          <a:fillRef idx="3">
+            <a:schemeClr val="accent2"/>
+          </a:fillRef>
+          <a:effectRef idx="2">
+            <a:schemeClr val="accent2"/>
+          </a:effectRef>
+          <a:fontRef idx="minor">
+            <a:schemeClr val="lt1"/>
+          </a:fontRef>
+        </p:style>
+        <p:txBody>
+          <a:bodyPr rot="0" spcFirstLastPara="0" vertOverflow="overflow" horzOverflow="overflow" vert="horz" wrap="square" lIns="91440" tIns="45720" rIns="91440" bIns="45720" numCol="1" spcCol="0" rtlCol="0" fromWordArt="0" anchor="ctr" anchorCtr="0" forceAA="0" compatLnSpc="1">
+            <a:prstTxWarp prst="textNoShape">
+              <a:avLst/>
+            </a:prstTxWarp>
+            <a:noAutofit/>
+          </a:bodyPr>
+          <a:lstStyle/>
+          <a:p>
+            <a:pPr algn="ctr"/>
+            <a:r>
+              <a:rPr lang="it-IT" dirty="0">
+                <a:ln w="0"/>
+                <a:solidFill>
+                  <a:schemeClr val="tx1"/>
+                </a:solidFill>
+                <a:effectLst>
+                  <a:outerShdw blurRad="38100" dist="19050" dir="2700000" algn="tl" rotWithShape="0">
+                    <a:schemeClr val="dk1">
+                      <a:alpha val="40000"/>
+                    </a:schemeClr>
+                  </a:outerShdw>
+                </a:effectLst>
+              </a:rPr>
+              <a:t>REST service/ </a:t>
+            </a:r>
+            <a:r>
+              <a:rPr lang="it-IT" dirty="0" err="1">
+                <a:ln w="0"/>
+                <a:solidFill>
+                  <a:schemeClr val="tx1"/>
+                </a:solidFill>
+                <a:effectLst>
+                  <a:outerShdw blurRad="38100" dist="19050" dir="2700000" algn="tl" rotWithShape="0">
+                    <a:schemeClr val="dk1">
+                      <a:alpha val="40000"/>
+                    </a:schemeClr>
+                  </a:outerShdw>
+                </a:effectLst>
+              </a:rPr>
+              <a:t>Cmd</a:t>
+            </a:r>
+            <a:endParaRPr lang="it-IT" dirty="0">
+              <a:ln w="0"/>
+              <a:solidFill>
+                <a:schemeClr val="tx1"/>
+              </a:solidFill>
+              <a:effectLst>
+                <a:outerShdw blurRad="38100" dist="19050" dir="2700000" algn="tl" rotWithShape="0">
+                  <a:schemeClr val="dk1">
+                    <a:alpha val="40000"/>
+                  </a:schemeClr>
+                </a:outerShdw>
+              </a:effectLst>
+            </a:endParaRPr>
+          </a:p>
+        </p:txBody>
+      </p:sp>
+      <p:sp>
+        <p:nvSpPr>
+          <p:cNvPr id="13" name="Rectangle: Rounded Corners 12">
+            <a:extLst>
+              <a:ext uri="{FF2B5EF4-FFF2-40B4-BE49-F238E27FC236}">
+                <a16:creationId xmlns:a16="http://schemas.microsoft.com/office/drawing/2014/main" id="{CE8B0633-7818-4B53-B60D-57F957B8CD13}"/>
+              </a:ext>
+            </a:extLst>
+          </p:cNvPr>
+          <p:cNvSpPr/>
+          <p:nvPr/>
+        </p:nvSpPr>
+        <p:spPr>
+          <a:xfrm>
+            <a:off x="5771825" y="5240233"/>
+            <a:ext cx="1520890" cy="1243694"/>
+          </a:xfrm>
+          <a:prstGeom prst="roundRect">
+            <a:avLst/>
+          </a:prstGeom>
+        </p:spPr>
+        <p:style>
+          <a:lnRef idx="1">
+            <a:schemeClr val="accent3"/>
+          </a:lnRef>
+          <a:fillRef idx="3">
+            <a:schemeClr val="accent3"/>
+          </a:fillRef>
+          <a:effectRef idx="2">
+            <a:schemeClr val="accent3"/>
+          </a:effectRef>
+          <a:fontRef idx="minor">
+            <a:schemeClr val="lt1"/>
+          </a:fontRef>
+        </p:style>
+        <p:txBody>
+          <a:bodyPr rot="0" spcFirstLastPara="0" vertOverflow="overflow" horzOverflow="overflow" vert="horz" wrap="square" lIns="91440" tIns="45720" rIns="91440" bIns="45720" numCol="1" spcCol="0" rtlCol="0" fromWordArt="0" anchor="ctr" anchorCtr="0" forceAA="0" compatLnSpc="1">
+            <a:prstTxWarp prst="textNoShape">
+              <a:avLst/>
+            </a:prstTxWarp>
+            <a:noAutofit/>
+          </a:bodyPr>
+          <a:lstStyle/>
+          <a:p>
+            <a:pPr algn="ctr"/>
+            <a:r>
+              <a:rPr lang="it-IT" dirty="0">
+                <a:ln w="0"/>
+                <a:solidFill>
+                  <a:schemeClr val="tx1"/>
+                </a:solidFill>
+                <a:effectLst>
+                  <a:outerShdw blurRad="38100" dist="19050" dir="2700000" algn="tl" rotWithShape="0">
+                    <a:schemeClr val="dk1">
+                      <a:alpha val="40000"/>
+                    </a:schemeClr>
+                  </a:outerShdw>
+                </a:effectLst>
+              </a:rPr>
+              <a:t>Master data store</a:t>
+            </a:r>
+          </a:p>
+        </p:txBody>
+      </p:sp>
+      <p:sp>
+        <p:nvSpPr>
+          <p:cNvPr id="14" name="Rectangle: Rounded Corners 13">
+            <a:extLst>
+              <a:ext uri="{FF2B5EF4-FFF2-40B4-BE49-F238E27FC236}">
+                <a16:creationId xmlns:a16="http://schemas.microsoft.com/office/drawing/2014/main" id="{8FCC7B59-65CD-4353-9021-DE753173AA9B}"/>
+              </a:ext>
+            </a:extLst>
+          </p:cNvPr>
+          <p:cNvSpPr/>
+          <p:nvPr/>
+        </p:nvSpPr>
+        <p:spPr>
+          <a:xfrm>
+            <a:off x="5771825" y="2049139"/>
+            <a:ext cx="1520890" cy="1243694"/>
+          </a:xfrm>
+          <a:prstGeom prst="roundRect">
+            <a:avLst/>
+          </a:prstGeom>
+        </p:spPr>
+        <p:style>
+          <a:lnRef idx="1">
+            <a:schemeClr val="accent3"/>
+          </a:lnRef>
+          <a:fillRef idx="3">
+            <a:schemeClr val="accent3"/>
+          </a:fillRef>
+          <a:effectRef idx="2">
+            <a:schemeClr val="accent3"/>
+          </a:effectRef>
+          <a:fontRef idx="minor">
+            <a:schemeClr val="lt1"/>
+          </a:fontRef>
+        </p:style>
+        <p:txBody>
+          <a:bodyPr rot="0" spcFirstLastPara="0" vertOverflow="overflow" horzOverflow="overflow" vert="horz" wrap="square" lIns="91440" tIns="45720" rIns="91440" bIns="45720" numCol="1" spcCol="0" rtlCol="0" fromWordArt="0" anchor="ctr" anchorCtr="0" forceAA="0" compatLnSpc="1">
+            <a:prstTxWarp prst="textNoShape">
+              <a:avLst/>
+            </a:prstTxWarp>
+            <a:noAutofit/>
+          </a:bodyPr>
+          <a:lstStyle/>
+          <a:p>
+            <a:pPr algn="ctr"/>
+            <a:r>
+              <a:rPr lang="it-IT" dirty="0">
+                <a:ln w="0"/>
+                <a:solidFill>
+                  <a:schemeClr val="tx1"/>
+                </a:solidFill>
+                <a:effectLst>
+                  <a:outerShdw blurRad="38100" dist="19050" dir="2700000" algn="tl" rotWithShape="0">
+                    <a:schemeClr val="dk1">
+                      <a:alpha val="40000"/>
+                    </a:schemeClr>
+                  </a:outerShdw>
+                </a:effectLst>
+              </a:rPr>
+              <a:t>Query data store</a:t>
+            </a:r>
+          </a:p>
+        </p:txBody>
+      </p:sp>
+      <p:sp>
+        <p:nvSpPr>
+          <p:cNvPr id="15" name="Rectangle: Rounded Corners 14">
+            <a:extLst>
+              <a:ext uri="{FF2B5EF4-FFF2-40B4-BE49-F238E27FC236}">
+                <a16:creationId xmlns:a16="http://schemas.microsoft.com/office/drawing/2014/main" id="{6380BDC6-4994-4B91-8474-4F74AA51B757}"/>
+              </a:ext>
+            </a:extLst>
+          </p:cNvPr>
+          <p:cNvSpPr/>
+          <p:nvPr/>
+        </p:nvSpPr>
+        <p:spPr>
+          <a:xfrm>
+            <a:off x="7496755" y="3756775"/>
+            <a:ext cx="1322912" cy="1007648"/>
+          </a:xfrm>
+          <a:prstGeom prst="roundRect">
+            <a:avLst/>
+          </a:prstGeom>
+        </p:spPr>
+        <p:style>
+          <a:lnRef idx="1">
+            <a:schemeClr val="accent6"/>
+          </a:lnRef>
+          <a:fillRef idx="3">
+            <a:schemeClr val="accent6"/>
+          </a:fillRef>
+          <a:effectRef idx="2">
+            <a:schemeClr val="accent6"/>
+          </a:effectRef>
+          <a:fontRef idx="minor">
+            <a:schemeClr val="lt1"/>
+          </a:fontRef>
+        </p:style>
+        <p:txBody>
+          <a:bodyPr rot="0" spcFirstLastPara="0" vertOverflow="overflow" horzOverflow="overflow" vert="horz" wrap="square" lIns="91440" tIns="45720" rIns="91440" bIns="45720" numCol="1" spcCol="0" rtlCol="0" fromWordArt="0" anchor="ctr" anchorCtr="0" forceAA="0" compatLnSpc="1">
+            <a:prstTxWarp prst="textNoShape">
+              <a:avLst/>
+            </a:prstTxWarp>
+            <a:noAutofit/>
+          </a:bodyPr>
+          <a:lstStyle/>
+          <a:p>
+            <a:pPr algn="ctr"/>
+            <a:r>
+              <a:rPr lang="it-IT" dirty="0">
+                <a:ln w="0"/>
+                <a:solidFill>
+                  <a:schemeClr val="tx1"/>
+                </a:solidFill>
+                <a:effectLst>
+                  <a:outerShdw blurRad="38100" dist="19050" dir="2700000" algn="tl" rotWithShape="0">
+                    <a:schemeClr val="dk1">
+                      <a:alpha val="40000"/>
+                    </a:schemeClr>
+                  </a:outerShdw>
+                </a:effectLst>
+              </a:rPr>
+              <a:t>Replication</a:t>
+            </a:r>
+          </a:p>
+        </p:txBody>
+      </p:sp>
+      <p:cxnSp>
+        <p:nvCxnSpPr>
+          <p:cNvPr id="5" name="Straight Arrow Connector 4">
+            <a:extLst>
+              <a:ext uri="{FF2B5EF4-FFF2-40B4-BE49-F238E27FC236}">
+                <a16:creationId xmlns:a16="http://schemas.microsoft.com/office/drawing/2014/main" id="{95D90304-2D09-4BDB-9655-587F0969C745}"/>
+              </a:ext>
+            </a:extLst>
+          </p:cNvPr>
+          <p:cNvCxnSpPr>
+            <a:cxnSpLocks/>
+            <a:stCxn id="10" idx="3"/>
+            <a:endCxn id="12" idx="2"/>
+          </p:cNvCxnSpPr>
+          <p:nvPr/>
+        </p:nvCxnSpPr>
+        <p:spPr>
+          <a:xfrm>
+            <a:off x="1781466" y="4164318"/>
+            <a:ext cx="1300676" cy="1417862"/>
+          </a:xfrm>
+          <a:prstGeom prst="straightConnector1">
+            <a:avLst/>
+          </a:prstGeom>
+          <a:ln>
+            <a:tailEnd type="triangle"/>
+          </a:ln>
+        </p:spPr>
+        <p:style>
+          <a:lnRef idx="2">
+            <a:schemeClr val="accent1"/>
+          </a:lnRef>
+          <a:fillRef idx="0">
+            <a:schemeClr val="accent1"/>
+          </a:fillRef>
+          <a:effectRef idx="1">
+            <a:schemeClr val="accent1"/>
+          </a:effectRef>
+          <a:fontRef idx="minor">
+            <a:schemeClr val="tx1"/>
+          </a:fontRef>
+        </p:style>
+      </p:cxnSp>
+      <p:cxnSp>
+        <p:nvCxnSpPr>
+          <p:cNvPr id="16" name="Straight Arrow Connector 15">
+            <a:extLst>
+              <a:ext uri="{FF2B5EF4-FFF2-40B4-BE49-F238E27FC236}">
+                <a16:creationId xmlns:a16="http://schemas.microsoft.com/office/drawing/2014/main" id="{D9E8451C-1937-48CE-8387-DD845F29160C}"/>
+              </a:ext>
+            </a:extLst>
+          </p:cNvPr>
+          <p:cNvCxnSpPr>
+            <a:cxnSpLocks/>
+            <a:stCxn id="12" idx="6"/>
+            <a:endCxn id="13" idx="1"/>
+          </p:cNvCxnSpPr>
+          <p:nvPr/>
+        </p:nvCxnSpPr>
+        <p:spPr>
+          <a:xfrm>
+            <a:off x="4529236" y="5582180"/>
+            <a:ext cx="1242589" cy="279900"/>
+          </a:xfrm>
+          <a:prstGeom prst="straightConnector1">
+            <a:avLst/>
+          </a:prstGeom>
+          <a:ln>
+            <a:tailEnd type="triangle"/>
+          </a:ln>
+        </p:spPr>
+        <p:style>
+          <a:lnRef idx="2">
+            <a:schemeClr val="accent3"/>
+          </a:lnRef>
+          <a:fillRef idx="0">
+            <a:schemeClr val="accent3"/>
+          </a:fillRef>
+          <a:effectRef idx="1">
+            <a:schemeClr val="accent3"/>
+          </a:effectRef>
+          <a:fontRef idx="minor">
+            <a:schemeClr val="tx1"/>
+          </a:fontRef>
+        </p:style>
+      </p:cxnSp>
+      <p:cxnSp>
+        <p:nvCxnSpPr>
+          <p:cNvPr id="19" name="Straight Arrow Connector 18">
+            <a:extLst>
+              <a:ext uri="{FF2B5EF4-FFF2-40B4-BE49-F238E27FC236}">
+                <a16:creationId xmlns:a16="http://schemas.microsoft.com/office/drawing/2014/main" id="{C72A41B1-0FCA-4CA9-B23B-7787F6C93C00}"/>
+              </a:ext>
+            </a:extLst>
+          </p:cNvPr>
+          <p:cNvCxnSpPr>
+            <a:cxnSpLocks/>
+            <a:stCxn id="13" idx="3"/>
+            <a:endCxn id="15" idx="2"/>
+          </p:cNvCxnSpPr>
+          <p:nvPr/>
+        </p:nvCxnSpPr>
+        <p:spPr>
+          <a:xfrm flipV="1">
+            <a:off x="7292715" y="4764423"/>
+            <a:ext cx="865496" cy="1097657"/>
+          </a:xfrm>
+          <a:prstGeom prst="straightConnector1">
+            <a:avLst/>
+          </a:prstGeom>
+          <a:ln>
+            <a:tailEnd type="triangle"/>
+          </a:ln>
+        </p:spPr>
+        <p:style>
+          <a:lnRef idx="2">
+            <a:schemeClr val="accent3"/>
+          </a:lnRef>
+          <a:fillRef idx="0">
+            <a:schemeClr val="accent3"/>
+          </a:fillRef>
+          <a:effectRef idx="1">
+            <a:schemeClr val="accent3"/>
+          </a:effectRef>
+          <a:fontRef idx="minor">
+            <a:schemeClr val="tx1"/>
+          </a:fontRef>
+        </p:style>
+      </p:cxnSp>
+      <p:cxnSp>
+        <p:nvCxnSpPr>
+          <p:cNvPr id="22" name="Straight Arrow Connector 21">
+            <a:extLst>
+              <a:ext uri="{FF2B5EF4-FFF2-40B4-BE49-F238E27FC236}">
+                <a16:creationId xmlns:a16="http://schemas.microsoft.com/office/drawing/2014/main" id="{EC278F59-056C-4FC9-8B08-A65A2BC13AA0}"/>
+              </a:ext>
+            </a:extLst>
+          </p:cNvPr>
+          <p:cNvCxnSpPr>
+            <a:cxnSpLocks/>
+            <a:stCxn id="15" idx="0"/>
+            <a:endCxn id="14" idx="3"/>
+          </p:cNvCxnSpPr>
+          <p:nvPr/>
+        </p:nvCxnSpPr>
+        <p:spPr>
+          <a:xfrm flipH="1" flipV="1">
+            <a:off x="7292715" y="2670986"/>
+            <a:ext cx="865496" cy="1085789"/>
+          </a:xfrm>
+          <a:prstGeom prst="straightConnector1">
+            <a:avLst/>
+          </a:prstGeom>
+          <a:ln>
+            <a:tailEnd type="triangle"/>
+          </a:ln>
+        </p:spPr>
+        <p:style>
+          <a:lnRef idx="2">
+            <a:schemeClr val="accent3"/>
+          </a:lnRef>
+          <a:fillRef idx="0">
+            <a:schemeClr val="accent3"/>
+          </a:fillRef>
+          <a:effectRef idx="1">
+            <a:schemeClr val="accent3"/>
+          </a:effectRef>
+          <a:fontRef idx="minor">
+            <a:schemeClr val="tx1"/>
+          </a:fontRef>
+        </p:style>
+      </p:cxnSp>
+      <p:cxnSp>
+        <p:nvCxnSpPr>
+          <p:cNvPr id="28" name="Straight Arrow Connector 27">
+            <a:extLst>
+              <a:ext uri="{FF2B5EF4-FFF2-40B4-BE49-F238E27FC236}">
+                <a16:creationId xmlns:a16="http://schemas.microsoft.com/office/drawing/2014/main" id="{A987F837-C56F-4AE7-A092-E9B4D63B0463}"/>
+              </a:ext>
+            </a:extLst>
+          </p:cNvPr>
+          <p:cNvCxnSpPr>
+            <a:cxnSpLocks/>
+            <a:stCxn id="14" idx="1"/>
+            <a:endCxn id="11" idx="6"/>
+          </p:cNvCxnSpPr>
+          <p:nvPr/>
+        </p:nvCxnSpPr>
+        <p:spPr>
+          <a:xfrm flipH="1">
+            <a:off x="4572000" y="2670986"/>
+            <a:ext cx="1199825" cy="153441"/>
+          </a:xfrm>
+          <a:prstGeom prst="straightConnector1">
+            <a:avLst/>
+          </a:prstGeom>
+          <a:ln>
+            <a:tailEnd type="triangle"/>
+          </a:ln>
+        </p:spPr>
+        <p:style>
+          <a:lnRef idx="2">
+            <a:schemeClr val="accent3"/>
+          </a:lnRef>
+          <a:fillRef idx="0">
+            <a:schemeClr val="accent3"/>
+          </a:fillRef>
+          <a:effectRef idx="1">
+            <a:schemeClr val="accent3"/>
+          </a:effectRef>
+          <a:fontRef idx="minor">
+            <a:schemeClr val="tx1"/>
+          </a:fontRef>
+        </p:style>
+      </p:cxnSp>
+      <p:cxnSp>
+        <p:nvCxnSpPr>
+          <p:cNvPr id="31" name="Straight Arrow Connector 30">
+            <a:extLst>
+              <a:ext uri="{FF2B5EF4-FFF2-40B4-BE49-F238E27FC236}">
+                <a16:creationId xmlns:a16="http://schemas.microsoft.com/office/drawing/2014/main" id="{1D700850-A401-41E4-BCC2-89AAA85BCE7A}"/>
+              </a:ext>
+            </a:extLst>
+          </p:cNvPr>
+          <p:cNvCxnSpPr>
+            <a:cxnSpLocks/>
+            <a:stCxn id="10" idx="3"/>
+            <a:endCxn id="11" idx="2"/>
+          </p:cNvCxnSpPr>
+          <p:nvPr/>
+        </p:nvCxnSpPr>
+        <p:spPr>
+          <a:xfrm flipV="1">
+            <a:off x="1781466" y="2824427"/>
+            <a:ext cx="1343440" cy="1339891"/>
+          </a:xfrm>
+          <a:prstGeom prst="straightConnector1">
+            <a:avLst/>
+          </a:prstGeom>
+          <a:ln>
+            <a:tailEnd type="triangle"/>
+          </a:ln>
+        </p:spPr>
+        <p:style>
+          <a:lnRef idx="2">
+            <a:schemeClr val="accent1"/>
+          </a:lnRef>
+          <a:fillRef idx="0">
+            <a:schemeClr val="accent1"/>
+          </a:fillRef>
+          <a:effectRef idx="1">
+            <a:schemeClr val="accent1"/>
+          </a:effectRef>
+          <a:fontRef idx="minor">
+            <a:schemeClr val="tx1"/>
+          </a:fontRef>
+        </p:style>
+      </p:cxnSp>
+      <p:sp>
+        <p:nvSpPr>
+          <p:cNvPr id="37" name="Callout: Bent Line 36">
+            <a:extLst>
+              <a:ext uri="{FF2B5EF4-FFF2-40B4-BE49-F238E27FC236}">
+                <a16:creationId xmlns:a16="http://schemas.microsoft.com/office/drawing/2014/main" id="{D87F08E9-E24D-4B29-957C-5F6AB9D6F6BC}"/>
+              </a:ext>
+            </a:extLst>
+          </p:cNvPr>
+          <p:cNvSpPr/>
+          <p:nvPr/>
+        </p:nvSpPr>
+        <p:spPr>
+          <a:xfrm>
+            <a:off x="1382353" y="5783162"/>
+            <a:ext cx="914400" cy="403591"/>
+          </a:xfrm>
+          <a:prstGeom prst="borderCallout2">
+            <a:avLst>
+              <a:gd name="adj1" fmla="val -14434"/>
+              <a:gd name="adj2" fmla="val 53706"/>
+              <a:gd name="adj3" fmla="val -72479"/>
+              <a:gd name="adj4" fmla="val 94856"/>
+              <a:gd name="adj5" fmla="val -194088"/>
+              <a:gd name="adj6" fmla="val 110503"/>
+            </a:avLst>
+          </a:prstGeom>
+        </p:spPr>
+        <p:style>
+          <a:lnRef idx="1">
+            <a:schemeClr val="accent3"/>
+          </a:lnRef>
+          <a:fillRef idx="2">
+            <a:schemeClr val="accent3"/>
+          </a:fillRef>
+          <a:effectRef idx="1">
+            <a:schemeClr val="accent3"/>
+          </a:effectRef>
+          <a:fontRef idx="minor">
+            <a:schemeClr val="dk1"/>
+          </a:fontRef>
+        </p:style>
+        <p:txBody>
+          <a:bodyPr rtlCol="0" anchor="ctr"/>
+          <a:lstStyle/>
+          <a:p>
+            <a:pPr algn="ctr"/>
+            <a:r>
+              <a:rPr lang="it-IT" sz="1200" dirty="0" err="1"/>
+              <a:t>Command</a:t>
+            </a:r>
+            <a:r>
+              <a:rPr lang="it-IT" sz="1200" dirty="0"/>
+              <a:t> operations</a:t>
+            </a:r>
+          </a:p>
+        </p:txBody>
+      </p:sp>
+      <p:sp>
+        <p:nvSpPr>
+          <p:cNvPr id="38" name="Callout: Bent Line 37">
+            <a:extLst>
+              <a:ext uri="{FF2B5EF4-FFF2-40B4-BE49-F238E27FC236}">
+                <a16:creationId xmlns:a16="http://schemas.microsoft.com/office/drawing/2014/main" id="{10E32319-419C-46B5-99EF-639C7232AE6F}"/>
+              </a:ext>
+            </a:extLst>
+          </p:cNvPr>
+          <p:cNvSpPr/>
+          <p:nvPr/>
+        </p:nvSpPr>
+        <p:spPr>
+          <a:xfrm>
+            <a:off x="1324266" y="2371230"/>
+            <a:ext cx="914400" cy="403591"/>
+          </a:xfrm>
+          <a:prstGeom prst="borderCallout2">
+            <a:avLst>
+              <a:gd name="adj1" fmla="val 124127"/>
+              <a:gd name="adj2" fmla="val 50400"/>
+              <a:gd name="adj3" fmla="val 167194"/>
+              <a:gd name="adj4" fmla="val 60972"/>
+              <a:gd name="adj5" fmla="val 244064"/>
+              <a:gd name="adj6" fmla="val 125379"/>
+            </a:avLst>
+          </a:prstGeom>
+        </p:spPr>
+        <p:style>
+          <a:lnRef idx="1">
+            <a:schemeClr val="accent3"/>
+          </a:lnRef>
+          <a:fillRef idx="2">
+            <a:schemeClr val="accent3"/>
+          </a:fillRef>
+          <a:effectRef idx="1">
+            <a:schemeClr val="accent3"/>
+          </a:effectRef>
+          <a:fontRef idx="minor">
+            <a:schemeClr val="dk1"/>
+          </a:fontRef>
+        </p:style>
+        <p:txBody>
+          <a:bodyPr rtlCol="0" anchor="ctr"/>
+          <a:lstStyle/>
+          <a:p>
+            <a:pPr algn="ctr"/>
+            <a:r>
+              <a:rPr lang="it-IT" sz="1200" dirty="0"/>
+              <a:t>Query operations</a:t>
+            </a:r>
+          </a:p>
+        </p:txBody>
+      </p:sp>
+    </p:spTree>
+    <p:extLst>
+      <p:ext uri="{BB962C8B-B14F-4D97-AF65-F5344CB8AC3E}">
+        <p14:creationId xmlns:p14="http://schemas.microsoft.com/office/powerpoint/2010/main" val="2125302927"/>
+      </p:ext>
+    </p:extLst>
+  </p:cSld>
+  <p:clrMapOvr>
+    <a:masterClrMapping/>
+  </p:clrMapOvr>
+</p:sld>
+</file>
+
+<file path=ppt/slides/slide5.xml><?xml version="1.0" encoding="utf-8"?>
+<p:sld xmlns:a="http://schemas.openxmlformats.org/drawingml/2006/main" xmlns:r="http://schemas.openxmlformats.org/officeDocument/2006/relationships" xmlns:p="http://schemas.openxmlformats.org/presentationml/2006/main">
+  <p:cSld>
+    <p:spTree>
+      <p:nvGrpSpPr>
+        <p:cNvPr id="1" name=""/>
+        <p:cNvGrpSpPr/>
+        <p:nvPr/>
+      </p:nvGrpSpPr>
+      <p:grpSpPr>
+        <a:xfrm>
+          <a:off x="0" y="0"/>
+          <a:ext cx="0" cy="0"/>
+          <a:chOff x="0" y="0"/>
+          <a:chExt cx="0" cy="0"/>
+        </a:xfrm>
+      </p:grpSpPr>
+      <p:sp>
+        <p:nvSpPr>
+          <p:cNvPr id="2" name="Text Placeholder 1"/>
+          <p:cNvSpPr>
+            <a:spLocks noGrp="1"/>
+          </p:cNvSpPr>
+          <p:nvPr>
+            <p:ph type="body" sz="quarter" idx="11"/>
+          </p:nvPr>
+        </p:nvSpPr>
+        <p:spPr/>
+        <p:txBody>
+          <a:bodyPr/>
+          <a:lstStyle/>
+          <a:p>
+            <a:r>
+              <a:rPr lang="en-US"/>
+              <a:t>SRP Single Responsibility Principle</a:t>
+            </a:r>
+          </a:p>
+          <a:p>
+            <a:endParaRPr lang="en-US"/>
+          </a:p>
+          <a:p>
+            <a:endParaRPr lang="en-US" dirty="0"/>
+          </a:p>
+        </p:txBody>
+      </p:sp>
+      <p:pic>
+        <p:nvPicPr>
+          <p:cNvPr id="10" name="Picture 9">
+            <a:extLst>
+              <a:ext uri="{FF2B5EF4-FFF2-40B4-BE49-F238E27FC236}">
+                <a16:creationId xmlns:a16="http://schemas.microsoft.com/office/drawing/2014/main" id="{4190693A-9C04-40F2-8965-031E31197C0C}"/>
+              </a:ext>
+            </a:extLst>
+          </p:cNvPr>
+          <p:cNvPicPr>
+            <a:picLocks noChangeAspect="1"/>
+          </p:cNvPicPr>
+          <p:nvPr/>
+        </p:nvPicPr>
+        <p:blipFill>
+          <a:blip r:embed="rId3"/>
+          <a:stretch>
+            <a:fillRect/>
+          </a:stretch>
+        </p:blipFill>
+        <p:spPr>
+          <a:xfrm>
+            <a:off x="1504498" y="1855813"/>
+            <a:ext cx="6049475" cy="4852607"/>
+          </a:xfrm>
+          <a:prstGeom prst="rect">
+            <a:avLst/>
+          </a:prstGeom>
+        </p:spPr>
+      </p:pic>
+    </p:spTree>
+    <p:extLst>
+      <p:ext uri="{BB962C8B-B14F-4D97-AF65-F5344CB8AC3E}">
+        <p14:creationId xmlns:p14="http://schemas.microsoft.com/office/powerpoint/2010/main" val="2045971338"/>
+      </p:ext>
+    </p:extLst>
+  </p:cSld>
+  <p:clrMapOvr>
+    <a:masterClrMapping/>
+  </p:clrMapOvr>
+</p:sld>
+</file>
+
+<file path=ppt/slides/slide50.xml><?xml version="1.0" encoding="utf-8"?>
 <p:sld xmlns:a="http://schemas.openxmlformats.org/drawingml/2006/main" xmlns:r="http://schemas.openxmlformats.org/officeDocument/2006/relationships" xmlns:p="http://schemas.openxmlformats.org/presentationml/2006/main">
   <p:cSld>
     <p:spTree>
@@ -21595,7 +23666,7 @@
 </p:sld>
 </file>
 
-<file path=ppt/slides/slide48.xml><?xml version="1.0" encoding="utf-8"?>
+<file path=ppt/slides/slide51.xml><?xml version="1.0" encoding="utf-8"?>
 <p:sld xmlns:a="http://schemas.openxmlformats.org/drawingml/2006/main" xmlns:r="http://schemas.openxmlformats.org/officeDocument/2006/relationships" xmlns:p="http://schemas.openxmlformats.org/presentationml/2006/main">
   <p:cSld>
     <p:spTree>
@@ -22484,7 +24555,7 @@
 </p:sld>
 </file>
 
-<file path=ppt/slides/slide49.xml><?xml version="1.0" encoding="utf-8"?>
+<file path=ppt/slides/slide52.xml><?xml version="1.0" encoding="utf-8"?>
 <p:sld xmlns:a="http://schemas.openxmlformats.org/drawingml/2006/main" xmlns:r="http://schemas.openxmlformats.org/officeDocument/2006/relationships" xmlns:p="http://schemas.openxmlformats.org/presentationml/2006/main">
   <p:cSld>
     <p:spTree>
@@ -22529,7 +24600,7 @@
     </p:spTree>
     <p:extLst>
       <p:ext uri="{BB962C8B-B14F-4D97-AF65-F5344CB8AC3E}">
-        <p14:creationId xmlns:p14="http://schemas.microsoft.com/office/powerpoint/2010/main" val="3590855284"/>
+        <p14:creationId xmlns:p14="http://schemas.microsoft.com/office/powerpoint/2010/main" val="804912471"/>
       </p:ext>
     </p:extLst>
   </p:cSld>
@@ -22539,95 +24610,7 @@
 </p:sld>
 </file>
 
-<file path=ppt/slides/slide5.xml><?xml version="1.0" encoding="utf-8"?>
-<p:sld xmlns:a="http://schemas.openxmlformats.org/drawingml/2006/main" xmlns:r="http://schemas.openxmlformats.org/officeDocument/2006/relationships" xmlns:p="http://schemas.openxmlformats.org/presentationml/2006/main">
-  <p:cSld>
-    <p:spTree>
-      <p:nvGrpSpPr>
-        <p:cNvPr id="1" name=""/>
-        <p:cNvGrpSpPr/>
-        <p:nvPr/>
-      </p:nvGrpSpPr>
-      <p:grpSpPr>
-        <a:xfrm>
-          <a:off x="0" y="0"/>
-          <a:ext cx="0" cy="0"/>
-          <a:chOff x="0" y="0"/>
-          <a:chExt cx="0" cy="0"/>
-        </a:xfrm>
-      </p:grpSpPr>
-      <p:sp>
-        <p:nvSpPr>
-          <p:cNvPr id="2" name="Text Placeholder 1"/>
-          <p:cNvSpPr>
-            <a:spLocks noGrp="1"/>
-          </p:cNvSpPr>
-          <p:nvPr>
-            <p:ph type="body" sz="quarter" idx="11"/>
-          </p:nvPr>
-        </p:nvSpPr>
-        <p:spPr/>
-        <p:txBody>
-          <a:bodyPr/>
-          <a:lstStyle/>
-          <a:p>
-            <a:r>
-              <a:rPr lang="en-US"/>
-              <a:t>SRP Single Responsibility Principle</a:t>
-            </a:r>
-          </a:p>
-          <a:p>
-            <a:endParaRPr lang="en-US"/>
-          </a:p>
-          <a:p>
-            <a:endParaRPr lang="en-US" dirty="0"/>
-          </a:p>
-        </p:txBody>
-      </p:sp>
-      <p:pic>
-        <p:nvPicPr>
-          <p:cNvPr id="10" name="Picture 9">
-            <a:extLst>
-              <a:ext uri="{FF2B5EF4-FFF2-40B4-BE49-F238E27FC236}">
-                <a16:creationId xmlns:a16="http://schemas.microsoft.com/office/drawing/2014/main" id="{4190693A-9C04-40F2-8965-031E31197C0C}"/>
-              </a:ext>
-            </a:extLst>
-          </p:cNvPr>
-          <p:cNvPicPr>
-            <a:picLocks noChangeAspect="1"/>
-          </p:cNvPicPr>
-          <p:nvPr/>
-        </p:nvPicPr>
-        <p:blipFill>
-          <a:blip r:embed="rId3"/>
-          <a:stretch>
-            <a:fillRect/>
-          </a:stretch>
-        </p:blipFill>
-        <p:spPr>
-          <a:xfrm>
-            <a:off x="1504498" y="1855813"/>
-            <a:ext cx="6049475" cy="4852607"/>
-          </a:xfrm>
-          <a:prstGeom prst="rect">
-            <a:avLst/>
-          </a:prstGeom>
-        </p:spPr>
-      </p:pic>
-    </p:spTree>
-    <p:extLst>
-      <p:ext uri="{BB962C8B-B14F-4D97-AF65-F5344CB8AC3E}">
-        <p14:creationId xmlns:p14="http://schemas.microsoft.com/office/powerpoint/2010/main" val="2045971338"/>
-      </p:ext>
-    </p:extLst>
-  </p:cSld>
-  <p:clrMapOvr>
-    <a:masterClrMapping/>
-  </p:clrMapOvr>
-</p:sld>
-</file>
-
-<file path=ppt/slides/slide50.xml><?xml version="1.0" encoding="utf-8"?>
+<file path=ppt/slides/slide53.xml><?xml version="1.0" encoding="utf-8"?>
 <p:sld xmlns:a="http://schemas.openxmlformats.org/drawingml/2006/main" xmlns:r="http://schemas.openxmlformats.org/officeDocument/2006/relationships" xmlns:p="http://schemas.openxmlformats.org/presentationml/2006/main">
   <p:cSld>
     <p:spTree>

</xml_diff>

<commit_message>
adding Single responsibility chapter
</commit_message>
<xml_diff>
--- a/docs/solid.pptx
+++ b/docs/solid.pptx
@@ -286,7 +286,7 @@
           <a:p>
             <a:fld id="{BB6D47BE-B638-4384-8186-1BE11A133744}" type="datetimeFigureOut">
               <a:rPr lang="it-IT" smtClean="0"/>
-              <a:t>12/07/2021</a:t>
+              <a:t>13/07/2021</a:t>
             </a:fld>
             <a:endParaRPr lang="it-IT"/>
           </a:p>
@@ -463,7 +463,7 @@
           <a:p>
             <a:fld id="{511C7247-C3DA-4B1B-BCAA-E9308B4A9CD3}" type="datetimeFigureOut">
               <a:rPr lang="en-GB" smtClean="0"/>
-              <a:t>12/07/2021</a:t>
+              <a:t>13/07/2021</a:t>
             </a:fld>
             <a:endParaRPr lang="en-GB"/>
           </a:p>
@@ -24597,6 +24597,164 @@
           </a:p>
         </p:txBody>
       </p:sp>
+      <p:sp>
+        <p:nvSpPr>
+          <p:cNvPr id="3" name="TextBox 2">
+            <a:extLst>
+              <a:ext uri="{FF2B5EF4-FFF2-40B4-BE49-F238E27FC236}">
+                <a16:creationId xmlns:a16="http://schemas.microsoft.com/office/drawing/2014/main" id="{783286F2-3305-4443-93FE-33C7694E04E7}"/>
+              </a:ext>
+            </a:extLst>
+          </p:cNvPr>
+          <p:cNvSpPr txBox="1"/>
+          <p:nvPr/>
+        </p:nvSpPr>
+        <p:spPr>
+          <a:xfrm>
+            <a:off x="328613" y="2064791"/>
+            <a:ext cx="8210747" cy="584775"/>
+          </a:xfrm>
+          <a:prstGeom prst="rect">
+            <a:avLst/>
+          </a:prstGeom>
+          <a:noFill/>
+        </p:spPr>
+        <p:txBody>
+          <a:bodyPr wrap="square" rtlCol="0">
+            <a:spAutoFit/>
+          </a:bodyPr>
+          <a:lstStyle/>
+          <a:p>
+            <a:r>
+              <a:rPr lang="en-GB" sz="1600" b="1" dirty="0"/>
+              <a:t>SRP </a:t>
+            </a:r>
+            <a:r>
+              <a:rPr lang="en-GB" sz="1600" dirty="0"/>
+              <a:t>has we know from OOD is about having cohesive functionality giving one responsibility to a class</a:t>
+            </a:r>
+            <a:endParaRPr lang="en-GB" sz="1600" b="1" dirty="0"/>
+          </a:p>
+        </p:txBody>
+      </p:sp>
+      <p:sp>
+        <p:nvSpPr>
+          <p:cNvPr id="4" name="TextBox 3">
+            <a:extLst>
+              <a:ext uri="{FF2B5EF4-FFF2-40B4-BE49-F238E27FC236}">
+                <a16:creationId xmlns:a16="http://schemas.microsoft.com/office/drawing/2014/main" id="{B2D605F2-C84A-4C24-A154-091C3FDB83AA}"/>
+              </a:ext>
+            </a:extLst>
+          </p:cNvPr>
+          <p:cNvSpPr txBox="1"/>
+          <p:nvPr/>
+        </p:nvSpPr>
+        <p:spPr>
+          <a:xfrm>
+            <a:off x="328613" y="2649566"/>
+            <a:ext cx="8210747" cy="584775"/>
+          </a:xfrm>
+          <a:prstGeom prst="rect">
+            <a:avLst/>
+          </a:prstGeom>
+          <a:noFill/>
+        </p:spPr>
+        <p:txBody>
+          <a:bodyPr wrap="square" rtlCol="0">
+            <a:spAutoFit/>
+          </a:bodyPr>
+          <a:lstStyle/>
+          <a:p>
+            <a:r>
+              <a:rPr lang="en-US" sz="1600" dirty="0"/>
+              <a:t>The notion of single responsibility can be extended to the cohesiveness of services within a microservice</a:t>
+            </a:r>
+            <a:endParaRPr lang="en-GB" sz="1600" b="1" dirty="0"/>
+          </a:p>
+        </p:txBody>
+      </p:sp>
+      <p:sp>
+        <p:nvSpPr>
+          <p:cNvPr id="5" name="TextBox 4">
+            <a:extLst>
+              <a:ext uri="{FF2B5EF4-FFF2-40B4-BE49-F238E27FC236}">
+                <a16:creationId xmlns:a16="http://schemas.microsoft.com/office/drawing/2014/main" id="{BA66D40A-9112-43DD-9217-9A54345FD6F3}"/>
+              </a:ext>
+            </a:extLst>
+          </p:cNvPr>
+          <p:cNvSpPr txBox="1"/>
+          <p:nvPr/>
+        </p:nvSpPr>
+        <p:spPr>
+          <a:xfrm>
+            <a:off x="328613" y="3256946"/>
+            <a:ext cx="8210747" cy="584775"/>
+          </a:xfrm>
+          <a:prstGeom prst="rect">
+            <a:avLst/>
+          </a:prstGeom>
+          <a:noFill/>
+        </p:spPr>
+        <p:txBody>
+          <a:bodyPr wrap="square" rtlCol="0">
+            <a:spAutoFit/>
+          </a:bodyPr>
+          <a:lstStyle/>
+          <a:p>
+            <a:r>
+              <a:rPr lang="en-US" sz="1600" dirty="0"/>
+              <a:t>An important aspect of maturity in microservice design is the ability to create microservices that are not too coarse- or too fine-grained</a:t>
+            </a:r>
+            <a:endParaRPr lang="en-GB" sz="1600" b="1" dirty="0"/>
+          </a:p>
+        </p:txBody>
+      </p:sp>
+      <p:sp>
+        <p:nvSpPr>
+          <p:cNvPr id="6" name="TextBox 5">
+            <a:extLst>
+              <a:ext uri="{FF2B5EF4-FFF2-40B4-BE49-F238E27FC236}">
+                <a16:creationId xmlns:a16="http://schemas.microsoft.com/office/drawing/2014/main" id="{00C0D6D4-4503-4922-ABD2-101F77FE016C}"/>
+              </a:ext>
+            </a:extLst>
+          </p:cNvPr>
+          <p:cNvSpPr txBox="1"/>
+          <p:nvPr/>
+        </p:nvSpPr>
+        <p:spPr>
+          <a:xfrm>
+            <a:off x="328613" y="3864326"/>
+            <a:ext cx="8210747" cy="584775"/>
+          </a:xfrm>
+          <a:prstGeom prst="rect">
+            <a:avLst/>
+          </a:prstGeom>
+          <a:noFill/>
+        </p:spPr>
+        <p:txBody>
+          <a:bodyPr wrap="square" rtlCol="0">
+            <a:spAutoFit/>
+          </a:bodyPr>
+          <a:lstStyle/>
+          <a:p>
+            <a:r>
+              <a:rPr lang="en-US" sz="1600" dirty="0"/>
+              <a:t>An approach that has become popular in the industry to drive the scope of microservices is to follow </a:t>
+            </a:r>
+            <a:r>
+              <a:rPr lang="en-US" sz="1600" u="sng" dirty="0">
+                <a:hlinkClick r:id="rId3"/>
+              </a:rPr>
+              <a:t>Domain-Driven Design (DDD)</a:t>
+            </a:r>
+            <a:r>
+              <a:rPr lang="en-US" sz="1600" dirty="0"/>
+              <a:t> precepts</a:t>
+            </a:r>
+            <a:endParaRPr lang="en-GB" sz="1600" b="1" dirty="0"/>
+          </a:p>
+        </p:txBody>
+      </p:sp>
     </p:spTree>
     <p:extLst>
       <p:ext uri="{BB962C8B-B14F-4D97-AF65-F5344CB8AC3E}">
@@ -24607,6 +24765,254 @@
   <p:clrMapOvr>
     <a:masterClrMapping/>
   </p:clrMapOvr>
+  <p:timing>
+    <p:tnLst>
+      <p:par>
+        <p:cTn id="1" dur="indefinite" restart="never" nodeType="tmRoot">
+          <p:childTnLst>
+            <p:seq concurrent="1" nextAc="seek">
+              <p:cTn id="2" dur="indefinite" nodeType="mainSeq">
+                <p:childTnLst>
+                  <p:par>
+                    <p:cTn id="3" fill="hold">
+                      <p:stCondLst>
+                        <p:cond delay="indefinite"/>
+                      </p:stCondLst>
+                      <p:childTnLst>
+                        <p:par>
+                          <p:cTn id="4" fill="hold">
+                            <p:stCondLst>
+                              <p:cond delay="0"/>
+                            </p:stCondLst>
+                            <p:childTnLst>
+                              <p:par>
+                                <p:cTn id="5" presetID="10" presetClass="entr" presetSubtype="0" fill="hold" grpId="0" nodeType="clickEffect">
+                                  <p:stCondLst>
+                                    <p:cond delay="0"/>
+                                  </p:stCondLst>
+                                  <p:childTnLst>
+                                    <p:set>
+                                      <p:cBhvr>
+                                        <p:cTn id="6" dur="1" fill="hold">
+                                          <p:stCondLst>
+                                            <p:cond delay="0"/>
+                                          </p:stCondLst>
+                                        </p:cTn>
+                                        <p:tgtEl>
+                                          <p:spTgt spid="3"/>
+                                        </p:tgtEl>
+                                        <p:attrNameLst>
+                                          <p:attrName>style.visibility</p:attrName>
+                                        </p:attrNameLst>
+                                      </p:cBhvr>
+                                      <p:to>
+                                        <p:strVal val="visible"/>
+                                      </p:to>
+                                    </p:set>
+                                    <p:animEffect transition="in" filter="fade">
+                                      <p:cBhvr>
+                                        <p:cTn id="7" dur="500"/>
+                                        <p:tgtEl>
+                                          <p:spTgt spid="3"/>
+                                        </p:tgtEl>
+                                      </p:cBhvr>
+                                    </p:animEffect>
+                                  </p:childTnLst>
+                                </p:cTn>
+                              </p:par>
+                            </p:childTnLst>
+                          </p:cTn>
+                        </p:par>
+                      </p:childTnLst>
+                    </p:cTn>
+                  </p:par>
+                  <p:par>
+                    <p:cTn id="8" fill="hold">
+                      <p:stCondLst>
+                        <p:cond delay="indefinite"/>
+                      </p:stCondLst>
+                      <p:childTnLst>
+                        <p:par>
+                          <p:cTn id="9" fill="hold">
+                            <p:stCondLst>
+                              <p:cond delay="0"/>
+                            </p:stCondLst>
+                            <p:childTnLst>
+                              <p:par>
+                                <p:cTn id="10" presetID="10" presetClass="entr" presetSubtype="0" fill="hold" grpId="0" nodeType="clickEffect">
+                                  <p:stCondLst>
+                                    <p:cond delay="0"/>
+                                  </p:stCondLst>
+                                  <p:childTnLst>
+                                    <p:set>
+                                      <p:cBhvr>
+                                        <p:cTn id="11" dur="1" fill="hold">
+                                          <p:stCondLst>
+                                            <p:cond delay="0"/>
+                                          </p:stCondLst>
+                                        </p:cTn>
+                                        <p:tgtEl>
+                                          <p:spTgt spid="4"/>
+                                        </p:tgtEl>
+                                        <p:attrNameLst>
+                                          <p:attrName>style.visibility</p:attrName>
+                                        </p:attrNameLst>
+                                      </p:cBhvr>
+                                      <p:to>
+                                        <p:strVal val="visible"/>
+                                      </p:to>
+                                    </p:set>
+                                    <p:animEffect transition="in" filter="fade">
+                                      <p:cBhvr>
+                                        <p:cTn id="12" dur="500"/>
+                                        <p:tgtEl>
+                                          <p:spTgt spid="4"/>
+                                        </p:tgtEl>
+                                      </p:cBhvr>
+                                    </p:animEffect>
+                                  </p:childTnLst>
+                                </p:cTn>
+                              </p:par>
+                            </p:childTnLst>
+                          </p:cTn>
+                        </p:par>
+                      </p:childTnLst>
+                    </p:cTn>
+                  </p:par>
+                  <p:par>
+                    <p:cTn id="13" fill="hold">
+                      <p:stCondLst>
+                        <p:cond delay="indefinite"/>
+                      </p:stCondLst>
+                      <p:childTnLst>
+                        <p:par>
+                          <p:cTn id="14" fill="hold">
+                            <p:stCondLst>
+                              <p:cond delay="0"/>
+                            </p:stCondLst>
+                            <p:childTnLst>
+                              <p:par>
+                                <p:cTn id="15" presetID="10" presetClass="entr" presetSubtype="0" fill="hold" grpId="0" nodeType="clickEffect">
+                                  <p:stCondLst>
+                                    <p:cond delay="0"/>
+                                  </p:stCondLst>
+                                  <p:childTnLst>
+                                    <p:set>
+                                      <p:cBhvr>
+                                        <p:cTn id="16" dur="1" fill="hold">
+                                          <p:stCondLst>
+                                            <p:cond delay="0"/>
+                                          </p:stCondLst>
+                                        </p:cTn>
+                                        <p:tgtEl>
+                                          <p:spTgt spid="5"/>
+                                        </p:tgtEl>
+                                        <p:attrNameLst>
+                                          <p:attrName>style.visibility</p:attrName>
+                                        </p:attrNameLst>
+                                      </p:cBhvr>
+                                      <p:to>
+                                        <p:strVal val="visible"/>
+                                      </p:to>
+                                    </p:set>
+                                    <p:animEffect transition="in" filter="fade">
+                                      <p:cBhvr>
+                                        <p:cTn id="17" dur="500"/>
+                                        <p:tgtEl>
+                                          <p:spTgt spid="5"/>
+                                        </p:tgtEl>
+                                      </p:cBhvr>
+                                    </p:animEffect>
+                                  </p:childTnLst>
+                                </p:cTn>
+                              </p:par>
+                            </p:childTnLst>
+                          </p:cTn>
+                        </p:par>
+                      </p:childTnLst>
+                    </p:cTn>
+                  </p:par>
+                  <p:par>
+                    <p:cTn id="18" fill="hold">
+                      <p:stCondLst>
+                        <p:cond delay="indefinite"/>
+                      </p:stCondLst>
+                      <p:childTnLst>
+                        <p:par>
+                          <p:cTn id="19" fill="hold">
+                            <p:stCondLst>
+                              <p:cond delay="0"/>
+                            </p:stCondLst>
+                            <p:childTnLst>
+                              <p:par>
+                                <p:cTn id="20" presetID="10" presetClass="entr" presetSubtype="0" fill="hold" grpId="0" nodeType="clickEffect">
+                                  <p:stCondLst>
+                                    <p:cond delay="0"/>
+                                  </p:stCondLst>
+                                  <p:childTnLst>
+                                    <p:set>
+                                      <p:cBhvr>
+                                        <p:cTn id="21" dur="1" fill="hold">
+                                          <p:stCondLst>
+                                            <p:cond delay="0"/>
+                                          </p:stCondLst>
+                                        </p:cTn>
+                                        <p:tgtEl>
+                                          <p:spTgt spid="6"/>
+                                        </p:tgtEl>
+                                        <p:attrNameLst>
+                                          <p:attrName>style.visibility</p:attrName>
+                                        </p:attrNameLst>
+                                      </p:cBhvr>
+                                      <p:to>
+                                        <p:strVal val="visible"/>
+                                      </p:to>
+                                    </p:set>
+                                    <p:animEffect transition="in" filter="fade">
+                                      <p:cBhvr>
+                                        <p:cTn id="22" dur="500"/>
+                                        <p:tgtEl>
+                                          <p:spTgt spid="6"/>
+                                        </p:tgtEl>
+                                      </p:cBhvr>
+                                    </p:animEffect>
+                                  </p:childTnLst>
+                                </p:cTn>
+                              </p:par>
+                            </p:childTnLst>
+                          </p:cTn>
+                        </p:par>
+                      </p:childTnLst>
+                    </p:cTn>
+                  </p:par>
+                </p:childTnLst>
+              </p:cTn>
+              <p:prevCondLst>
+                <p:cond evt="onPrev" delay="0">
+                  <p:tgtEl>
+                    <p:sldTgt/>
+                  </p:tgtEl>
+                </p:cond>
+              </p:prevCondLst>
+              <p:nextCondLst>
+                <p:cond evt="onNext" delay="0">
+                  <p:tgtEl>
+                    <p:sldTgt/>
+                  </p:tgtEl>
+                </p:cond>
+              </p:nextCondLst>
+            </p:seq>
+          </p:childTnLst>
+        </p:cTn>
+      </p:par>
+    </p:tnLst>
+    <p:bldLst>
+      <p:bldP spid="3" grpId="0"/>
+      <p:bldP spid="4" grpId="0"/>
+      <p:bldP spid="5" grpId="0"/>
+      <p:bldP spid="6" grpId="0"/>
+    </p:bldLst>
+  </p:timing>
 </p:sld>
 </file>
 

</xml_diff>